<commit_message>
Add recommended to read section in presentation
</commit_message>
<xml_diff>
--- a/presentation/Sharing common assemblies.pptx
+++ b/presentation/Sharing common assemblies.pptx
@@ -210,7 +210,7 @@
           <a:p>
             <a:fld id="{7F262928-0CDC-44E0-A3C2-1349897640B6}" type="datetimeFigureOut">
               <a:rPr lang="en-US" smtClean="0"/>
-              <a:t>9/20/2017</a:t>
+              <a:t>20-Sep-17</a:t>
             </a:fld>
             <a:endParaRPr lang="en-US"/>
           </a:p>
@@ -1160,7 +1160,7 @@
             <a:fld id="{B61BEF0D-F0BB-DE4B-95CE-6DB70DBA9567}" type="datetimeFigureOut">
               <a:rPr lang="en-US" dirty="0"/>
               <a:pPr/>
-              <a:t>9/20/2017</a:t>
+              <a:t>20-Sep-17</a:t>
             </a:fld>
             <a:endParaRPr lang="en-US" dirty="0"/>
           </a:p>
@@ -1453,7 +1453,7 @@
             <a:fld id="{B61BEF0D-F0BB-DE4B-95CE-6DB70DBA9567}" type="datetimeFigureOut">
               <a:rPr lang="en-US" dirty="0"/>
               <a:pPr/>
-              <a:t>9/20/2017</a:t>
+              <a:t>20-Sep-17</a:t>
             </a:fld>
             <a:endParaRPr lang="en-US" dirty="0"/>
           </a:p>
@@ -1698,7 +1698,7 @@
             <a:fld id="{B61BEF0D-F0BB-DE4B-95CE-6DB70DBA9567}" type="datetimeFigureOut">
               <a:rPr lang="en-US" dirty="0"/>
               <a:pPr/>
-              <a:t>9/20/2017</a:t>
+              <a:t>20-Sep-17</a:t>
             </a:fld>
             <a:endParaRPr lang="en-US" dirty="0"/>
           </a:p>
@@ -2235,7 +2235,7 @@
             <a:fld id="{B61BEF0D-F0BB-DE4B-95CE-6DB70DBA9567}" type="datetimeFigureOut">
               <a:rPr lang="en-US" dirty="0"/>
               <a:pPr/>
-              <a:t>9/20/2017</a:t>
+              <a:t>20-Sep-17</a:t>
             </a:fld>
             <a:endParaRPr lang="en-US" dirty="0"/>
           </a:p>
@@ -2480,7 +2480,7 @@
             <a:fld id="{B61BEF0D-F0BB-DE4B-95CE-6DB70DBA9567}" type="datetimeFigureOut">
               <a:rPr lang="en-US" dirty="0"/>
               <a:pPr/>
-              <a:t>9/20/2017</a:t>
+              <a:t>20-Sep-17</a:t>
             </a:fld>
             <a:endParaRPr lang="en-US" dirty="0"/>
           </a:p>
@@ -3009,7 +3009,7 @@
             <a:fld id="{B61BEF0D-F0BB-DE4B-95CE-6DB70DBA9567}" type="datetimeFigureOut">
               <a:rPr lang="en-US" dirty="0"/>
               <a:pPr/>
-              <a:t>9/20/2017</a:t>
+              <a:t>20-Sep-17</a:t>
             </a:fld>
             <a:endParaRPr lang="en-US" dirty="0"/>
           </a:p>
@@ -3303,7 +3303,7 @@
             <a:fld id="{B61BEF0D-F0BB-DE4B-95CE-6DB70DBA9567}" type="datetimeFigureOut">
               <a:rPr lang="en-US" dirty="0"/>
               <a:pPr/>
-              <a:t>9/20/2017</a:t>
+              <a:t>20-Sep-17</a:t>
             </a:fld>
             <a:endParaRPr lang="en-US" dirty="0"/>
           </a:p>
@@ -3474,7 +3474,7 @@
             <a:fld id="{B61BEF0D-F0BB-DE4B-95CE-6DB70DBA9567}" type="datetimeFigureOut">
               <a:rPr lang="en-US" dirty="0"/>
               <a:pPr/>
-              <a:t>9/20/2017</a:t>
+              <a:t>20-Sep-17</a:t>
             </a:fld>
             <a:endParaRPr lang="en-US" dirty="0"/>
           </a:p>
@@ -3651,7 +3651,7 @@
             <a:fld id="{B61BEF0D-F0BB-DE4B-95CE-6DB70DBA9567}" type="datetimeFigureOut">
               <a:rPr lang="en-US" dirty="0"/>
               <a:pPr/>
-              <a:t>9/20/2017</a:t>
+              <a:t>20-Sep-17</a:t>
             </a:fld>
             <a:endParaRPr lang="en-US" dirty="0"/>
           </a:p>
@@ -3859,7 +3859,7 @@
             <a:fld id="{B61BEF0D-F0BB-DE4B-95CE-6DB70DBA9567}" type="datetimeFigureOut">
               <a:rPr lang="en-US" dirty="0"/>
               <a:pPr/>
-              <a:t>9/20/2017</a:t>
+              <a:t>20-Sep-17</a:t>
             </a:fld>
             <a:endParaRPr lang="en-US" dirty="0"/>
           </a:p>
@@ -4107,7 +4107,7 @@
             <a:fld id="{B61BEF0D-F0BB-DE4B-95CE-6DB70DBA9567}" type="datetimeFigureOut">
               <a:rPr lang="en-US" dirty="0"/>
               <a:pPr/>
-              <a:t>9/20/2017</a:t>
+              <a:t>20-Sep-17</a:t>
             </a:fld>
             <a:endParaRPr lang="en-US" dirty="0"/>
           </a:p>
@@ -4451,7 +4451,7 @@
             <a:fld id="{B61BEF0D-F0BB-DE4B-95CE-6DB70DBA9567}" type="datetimeFigureOut">
               <a:rPr lang="en-US" dirty="0"/>
               <a:pPr/>
-              <a:t>9/20/2017</a:t>
+              <a:t>20-Sep-17</a:t>
             </a:fld>
             <a:endParaRPr lang="en-US" dirty="0"/>
           </a:p>
@@ -4940,7 +4940,7 @@
             <a:fld id="{B61BEF0D-F0BB-DE4B-95CE-6DB70DBA9567}" type="datetimeFigureOut">
               <a:rPr lang="en-US" dirty="0"/>
               <a:pPr/>
-              <a:t>9/20/2017</a:t>
+              <a:t>20-Sep-17</a:t>
             </a:fld>
             <a:endParaRPr lang="en-US" dirty="0"/>
           </a:p>
@@ -5055,7 +5055,7 @@
             <a:fld id="{B61BEF0D-F0BB-DE4B-95CE-6DB70DBA9567}" type="datetimeFigureOut">
               <a:rPr lang="en-US" dirty="0"/>
               <a:pPr/>
-              <a:t>9/20/2017</a:t>
+              <a:t>20-Sep-17</a:t>
             </a:fld>
             <a:endParaRPr lang="en-US" dirty="0"/>
           </a:p>
@@ -5147,7 +5147,7 @@
             <a:fld id="{B61BEF0D-F0BB-DE4B-95CE-6DB70DBA9567}" type="datetimeFigureOut">
               <a:rPr lang="en-US" dirty="0"/>
               <a:pPr/>
-              <a:t>9/20/2017</a:t>
+              <a:t>20-Sep-17</a:t>
             </a:fld>
             <a:endParaRPr lang="en-US" dirty="0"/>
           </a:p>
@@ -5427,7 +5427,7 @@
             <a:fld id="{B61BEF0D-F0BB-DE4B-95CE-6DB70DBA9567}" type="datetimeFigureOut">
               <a:rPr lang="en-US" dirty="0"/>
               <a:pPr/>
-              <a:t>9/20/2017</a:t>
+              <a:t>20-Sep-17</a:t>
             </a:fld>
             <a:endParaRPr lang="en-US" dirty="0"/>
           </a:p>
@@ -5715,7 +5715,7 @@
             <a:fld id="{B61BEF0D-F0BB-DE4B-95CE-6DB70DBA9567}" type="datetimeFigureOut">
               <a:rPr lang="en-US" dirty="0"/>
               <a:pPr/>
-              <a:t>9/20/2017</a:t>
+              <a:t>20-Sep-17</a:t>
             </a:fld>
             <a:endParaRPr lang="en-US" dirty="0"/>
           </a:p>
@@ -6242,7 +6242,7 @@
             <a:fld id="{B61BEF0D-F0BB-DE4B-95CE-6DB70DBA9567}" type="datetimeFigureOut">
               <a:rPr lang="en-US" dirty="0"/>
               <a:pPr/>
-              <a:t>9/20/2017</a:t>
+              <a:t>20-Sep-17</a:t>
             </a:fld>
             <a:endParaRPr lang="en-US" dirty="0"/>
           </a:p>
@@ -6799,6 +6799,295 @@
           </a:p>
         </p:txBody>
       </p:sp>
+      <p:sp>
+        <p:nvSpPr>
+          <p:cNvPr id="3" name="Content Placeholder 2">
+            <a:extLst>
+              <a:ext uri="{FF2B5EF4-FFF2-40B4-BE49-F238E27FC236}">
+                <a16:creationId xmlns:a16="http://schemas.microsoft.com/office/drawing/2014/main" id="{2D7CE804-856D-49F2-8DE8-76713BF04233}"/>
+              </a:ext>
+            </a:extLst>
+          </p:cNvPr>
+          <p:cNvSpPr txBox="1">
+            <a:spLocks/>
+          </p:cNvSpPr>
+          <p:nvPr/>
+        </p:nvSpPr>
+        <p:spPr>
+          <a:xfrm>
+            <a:off x="1484310" y="6086765"/>
+            <a:ext cx="10018713" cy="498762"/>
+          </a:xfrm>
+          <a:prstGeom prst="rect">
+            <a:avLst/>
+          </a:prstGeom>
+        </p:spPr>
+        <p:txBody>
+          <a:bodyPr vert="horz" lIns="91440" tIns="45720" rIns="91440" bIns="45720" rtlCol="0" anchor="t">
+            <a:normAutofit/>
+          </a:bodyPr>
+          <a:lstStyle>
+            <a:lvl1pPr marL="0" indent="0" algn="r" defTabSz="457200" rtl="0" eaLnBrk="1" latinLnBrk="0" hangingPunct="1">
+              <a:spcBef>
+                <a:spcPct val="20000"/>
+              </a:spcBef>
+              <a:spcAft>
+                <a:spcPts val="600"/>
+              </a:spcAft>
+              <a:buClr>
+                <a:schemeClr val="accent1">
+                  <a:lumMod val="75000"/>
+                </a:schemeClr>
+              </a:buClr>
+              <a:buSzPct val="145000"/>
+              <a:buFont typeface="Arial"/>
+              <a:buNone/>
+              <a:defRPr sz="2100" kern="1200" cap="none">
+                <a:solidFill>
+                  <a:schemeClr val="tx1"/>
+                </a:solidFill>
+                <a:effectLst/>
+                <a:latin typeface="+mn-lt"/>
+                <a:ea typeface="+mn-ea"/>
+                <a:cs typeface="+mn-cs"/>
+              </a:defRPr>
+            </a:lvl1pPr>
+            <a:lvl2pPr marL="457200" indent="0" algn="ctr" defTabSz="457200" rtl="0" eaLnBrk="1" latinLnBrk="0" hangingPunct="1">
+              <a:spcBef>
+                <a:spcPct val="20000"/>
+              </a:spcBef>
+              <a:spcAft>
+                <a:spcPts val="600"/>
+              </a:spcAft>
+              <a:buClr>
+                <a:schemeClr val="accent1">
+                  <a:lumMod val="75000"/>
+                </a:schemeClr>
+              </a:buClr>
+              <a:buSzPct val="145000"/>
+              <a:buFont typeface="Arial"/>
+              <a:buNone/>
+              <a:defRPr sz="2000" kern="1200" cap="none">
+                <a:solidFill>
+                  <a:schemeClr val="tx1">
+                    <a:tint val="75000"/>
+                  </a:schemeClr>
+                </a:solidFill>
+                <a:effectLst/>
+                <a:latin typeface="+mn-lt"/>
+                <a:ea typeface="+mn-ea"/>
+                <a:cs typeface="+mn-cs"/>
+              </a:defRPr>
+            </a:lvl2pPr>
+            <a:lvl3pPr marL="914400" indent="0" algn="ctr" defTabSz="457200" rtl="0" eaLnBrk="1" latinLnBrk="0" hangingPunct="1">
+              <a:spcBef>
+                <a:spcPct val="20000"/>
+              </a:spcBef>
+              <a:spcAft>
+                <a:spcPts val="600"/>
+              </a:spcAft>
+              <a:buClr>
+                <a:schemeClr val="accent1">
+                  <a:lumMod val="75000"/>
+                </a:schemeClr>
+              </a:buClr>
+              <a:buSzPct val="145000"/>
+              <a:buFont typeface="Arial"/>
+              <a:buNone/>
+              <a:defRPr sz="1800" kern="1200" cap="none">
+                <a:solidFill>
+                  <a:schemeClr val="tx1">
+                    <a:tint val="75000"/>
+                  </a:schemeClr>
+                </a:solidFill>
+                <a:effectLst/>
+                <a:latin typeface="+mn-lt"/>
+                <a:ea typeface="+mn-ea"/>
+                <a:cs typeface="+mn-cs"/>
+              </a:defRPr>
+            </a:lvl3pPr>
+            <a:lvl4pPr marL="1371600" indent="0" algn="ctr" defTabSz="457200" rtl="0" eaLnBrk="1" latinLnBrk="0" hangingPunct="1">
+              <a:spcBef>
+                <a:spcPct val="20000"/>
+              </a:spcBef>
+              <a:spcAft>
+                <a:spcPts val="600"/>
+              </a:spcAft>
+              <a:buClr>
+                <a:schemeClr val="accent1">
+                  <a:lumMod val="75000"/>
+                </a:schemeClr>
+              </a:buClr>
+              <a:buSzPct val="145000"/>
+              <a:buFont typeface="Arial"/>
+              <a:buNone/>
+              <a:defRPr sz="1600" kern="1200" cap="none">
+                <a:solidFill>
+                  <a:schemeClr val="tx1">
+                    <a:tint val="75000"/>
+                  </a:schemeClr>
+                </a:solidFill>
+                <a:effectLst/>
+                <a:latin typeface="+mn-lt"/>
+                <a:ea typeface="+mn-ea"/>
+                <a:cs typeface="+mn-cs"/>
+              </a:defRPr>
+            </a:lvl4pPr>
+            <a:lvl5pPr marL="1828800" indent="0" algn="ctr" defTabSz="457200" rtl="0" eaLnBrk="1" latinLnBrk="0" hangingPunct="1">
+              <a:spcBef>
+                <a:spcPct val="20000"/>
+              </a:spcBef>
+              <a:spcAft>
+                <a:spcPts val="600"/>
+              </a:spcAft>
+              <a:buClr>
+                <a:schemeClr val="accent1">
+                  <a:lumMod val="75000"/>
+                </a:schemeClr>
+              </a:buClr>
+              <a:buSzPct val="145000"/>
+              <a:buFont typeface="Arial"/>
+              <a:buNone/>
+              <a:defRPr sz="1400" kern="1200" cap="none">
+                <a:solidFill>
+                  <a:schemeClr val="tx1">
+                    <a:tint val="75000"/>
+                  </a:schemeClr>
+                </a:solidFill>
+                <a:effectLst/>
+                <a:latin typeface="+mn-lt"/>
+                <a:ea typeface="+mn-ea"/>
+                <a:cs typeface="+mn-cs"/>
+              </a:defRPr>
+            </a:lvl5pPr>
+            <a:lvl6pPr marL="2286000" indent="0" algn="ctr" defTabSz="457200" rtl="0" eaLnBrk="1" latinLnBrk="0" hangingPunct="1">
+              <a:spcBef>
+                <a:spcPct val="20000"/>
+              </a:spcBef>
+              <a:spcAft>
+                <a:spcPts val="600"/>
+              </a:spcAft>
+              <a:buClr>
+                <a:schemeClr val="accent1">
+                  <a:lumMod val="75000"/>
+                </a:schemeClr>
+              </a:buClr>
+              <a:buSzPct val="145000"/>
+              <a:buFont typeface="Arial"/>
+              <a:buNone/>
+              <a:defRPr sz="1400" kern="1200" cap="none">
+                <a:solidFill>
+                  <a:schemeClr val="tx1">
+                    <a:tint val="75000"/>
+                  </a:schemeClr>
+                </a:solidFill>
+                <a:effectLst/>
+                <a:latin typeface="+mn-lt"/>
+                <a:ea typeface="+mn-ea"/>
+                <a:cs typeface="+mn-cs"/>
+              </a:defRPr>
+            </a:lvl6pPr>
+            <a:lvl7pPr marL="2743200" indent="0" algn="ctr" defTabSz="457200" rtl="0" eaLnBrk="1" latinLnBrk="0" hangingPunct="1">
+              <a:spcBef>
+                <a:spcPct val="20000"/>
+              </a:spcBef>
+              <a:spcAft>
+                <a:spcPts val="600"/>
+              </a:spcAft>
+              <a:buClr>
+                <a:schemeClr val="accent1">
+                  <a:lumMod val="75000"/>
+                </a:schemeClr>
+              </a:buClr>
+              <a:buSzPct val="145000"/>
+              <a:buFont typeface="Arial"/>
+              <a:buNone/>
+              <a:defRPr sz="1400" kern="1200" cap="none">
+                <a:solidFill>
+                  <a:schemeClr val="tx1">
+                    <a:tint val="75000"/>
+                  </a:schemeClr>
+                </a:solidFill>
+                <a:effectLst/>
+                <a:latin typeface="+mn-lt"/>
+                <a:ea typeface="+mn-ea"/>
+                <a:cs typeface="+mn-cs"/>
+              </a:defRPr>
+            </a:lvl7pPr>
+            <a:lvl8pPr marL="3200400" indent="0" algn="ctr" defTabSz="457200" rtl="0" eaLnBrk="1" latinLnBrk="0" hangingPunct="1">
+              <a:spcBef>
+                <a:spcPct val="20000"/>
+              </a:spcBef>
+              <a:spcAft>
+                <a:spcPts val="600"/>
+              </a:spcAft>
+              <a:buClr>
+                <a:schemeClr val="accent1">
+                  <a:lumMod val="75000"/>
+                </a:schemeClr>
+              </a:buClr>
+              <a:buSzPct val="145000"/>
+              <a:buFont typeface="Arial"/>
+              <a:buNone/>
+              <a:defRPr sz="1400" kern="1200" cap="none">
+                <a:solidFill>
+                  <a:schemeClr val="tx1">
+                    <a:tint val="75000"/>
+                  </a:schemeClr>
+                </a:solidFill>
+                <a:effectLst/>
+                <a:latin typeface="+mn-lt"/>
+                <a:ea typeface="+mn-ea"/>
+                <a:cs typeface="+mn-cs"/>
+              </a:defRPr>
+            </a:lvl8pPr>
+            <a:lvl9pPr marL="3657600" indent="0" algn="ctr" defTabSz="457200" rtl="0" eaLnBrk="1" latinLnBrk="0" hangingPunct="1">
+              <a:spcBef>
+                <a:spcPct val="20000"/>
+              </a:spcBef>
+              <a:spcAft>
+                <a:spcPts val="600"/>
+              </a:spcAft>
+              <a:buClr>
+                <a:schemeClr val="accent1">
+                  <a:lumMod val="75000"/>
+                </a:schemeClr>
+              </a:buClr>
+              <a:buSzPct val="145000"/>
+              <a:buFont typeface="Arial"/>
+              <a:buNone/>
+              <a:defRPr sz="1400" kern="1200" cap="none">
+                <a:solidFill>
+                  <a:schemeClr val="tx1">
+                    <a:tint val="75000"/>
+                  </a:schemeClr>
+                </a:solidFill>
+                <a:effectLst/>
+                <a:latin typeface="+mn-lt"/>
+                <a:ea typeface="+mn-ea"/>
+                <a:cs typeface="+mn-cs"/>
+              </a:defRPr>
+            </a:lvl9pPr>
+          </a:lstStyle>
+          <a:p>
+            <a:r>
+              <a:rPr lang="fr-FR"/>
+              <a:t>Source code: </a:t>
+            </a:r>
+            <a:r>
+              <a:rPr lang="fr-FR">
+                <a:hlinkClick r:id="rId2"/>
+              </a:rPr>
+              <a:t>https://github.com/sflusov/IISSharingAssemblies</a:t>
+            </a:r>
+            <a:r>
+              <a:rPr lang="ru-RU"/>
+              <a:t> </a:t>
+            </a:r>
+            <a:endParaRPr lang="ru-RU" dirty="0"/>
+          </a:p>
+        </p:txBody>
+      </p:sp>
     </p:spTree>
     <p:extLst>
       <p:ext uri="{BB962C8B-B14F-4D97-AF65-F5344CB8AC3E}">
@@ -6863,40 +7152,73 @@
         </p:nvSpPr>
         <p:spPr>
           <a:xfrm>
-            <a:off x="1955363" y="4837545"/>
-            <a:ext cx="10018713" cy="1424710"/>
+            <a:off x="1955363" y="4987636"/>
+            <a:ext cx="10018713" cy="1560946"/>
           </a:xfrm>
         </p:spPr>
         <p:txBody>
-          <a:bodyPr/>
+          <a:bodyPr>
+            <a:normAutofit fontScale="62500" lnSpcReduction="20000"/>
+          </a:bodyPr>
           <a:lstStyle/>
           <a:p>
-            <a:r>
-              <a:rPr lang="en-US" dirty="0"/>
-              <a:t>Recommend to read:</a:t>
-            </a:r>
-            <a:r>
-              <a:rPr lang="ru-RU" dirty="0"/>
-              <a:t> </a:t>
-            </a:r>
-            <a:r>
-              <a:rPr lang="en-US" dirty="0">
+            <a:pPr marL="0" indent="0">
+              <a:buNone/>
+            </a:pPr>
+            <a:r>
+              <a:rPr lang="fr-FR" dirty="0" err="1"/>
+              <a:t>Recommend</a:t>
+            </a:r>
+            <a:r>
+              <a:rPr lang="fr-FR" dirty="0"/>
+              <a:t> to </a:t>
+            </a:r>
+            <a:r>
+              <a:rPr lang="fr-FR" dirty="0" err="1"/>
+              <a:t>read</a:t>
+            </a:r>
+            <a:r>
+              <a:rPr lang="fr-FR" dirty="0"/>
+              <a:t>:</a:t>
+            </a:r>
+          </a:p>
+          <a:p>
+            <a:r>
+              <a:rPr lang="fr-FR" dirty="0">
                 <a:hlinkClick r:id="rId2"/>
               </a:rPr>
-              <a:t>https://blogs.msdn.microsoft.com/pfxteam</a:t>
-            </a:r>
-            <a:endParaRPr lang="ru-RU" dirty="0"/>
-          </a:p>
-          <a:p>
+              <a:t>https://www.microsoftpressstore.com/store/windows-internals-part-1-9780735648739</a:t>
+            </a:r>
             <a:r>
               <a:rPr lang="fr-FR" dirty="0"/>
-              <a:t>Source code: </a:t>
-            </a:r>
+              <a:t> </a:t>
+            </a:r>
+          </a:p>
+          <a:p>
             <a:r>
               <a:rPr lang="fr-FR" dirty="0">
                 <a:hlinkClick r:id="rId3"/>
               </a:rPr>
-              <a:t>https://github.com/sflusov/AsyncAwaitPitfalls</a:t>
+              <a:t>https://www.microsoftpressstore.com/store/windows-sysinternals-administrators-reference-9780735656727</a:t>
+            </a:r>
+            <a:r>
+              <a:rPr lang="fr-FR" dirty="0"/>
+              <a:t> </a:t>
+            </a:r>
+          </a:p>
+          <a:p>
+            <a:endParaRPr lang="fr-FR" dirty="0"/>
+          </a:p>
+          <a:p>
+            <a:r>
+              <a:rPr lang="fr-FR" dirty="0"/>
+              <a:t>Source code: </a:t>
+            </a:r>
+            <a:r>
+              <a:rPr lang="fr-FR" dirty="0">
+                <a:hlinkClick r:id="rId4"/>
+              </a:rPr>
+              <a:t>https://github.com/sflusov/IISSharingAssemblies</a:t>
             </a:r>
             <a:r>
               <a:rPr lang="ru-RU" dirty="0"/>

</xml_diff>

<commit_message>
Powershell scripts stop pools after import configuration
</commit_message>
<xml_diff>
--- a/presentation/Sharing common assemblies.pptx
+++ b/presentation/Sharing common assemblies.pptx
@@ -5,7 +5,7 @@
     <p:sldMasterId id="2147483648" r:id="rId1"/>
   </p:sldMasterIdLst>
   <p:notesMasterIdLst>
-    <p:notesMasterId r:id="rId12"/>
+    <p:notesMasterId r:id="rId13"/>
   </p:notesMasterIdLst>
   <p:sldIdLst>
     <p:sldId id="256" r:id="rId2"/>
@@ -15,9 +15,10 @@
     <p:sldId id="281" r:id="rId6"/>
     <p:sldId id="282" r:id="rId7"/>
     <p:sldId id="283" r:id="rId8"/>
-    <p:sldId id="284" r:id="rId9"/>
-    <p:sldId id="285" r:id="rId10"/>
-    <p:sldId id="277" r:id="rId11"/>
+    <p:sldId id="286" r:id="rId9"/>
+    <p:sldId id="284" r:id="rId10"/>
+    <p:sldId id="285" r:id="rId11"/>
+    <p:sldId id="277" r:id="rId12"/>
   </p:sldIdLst>
   <p:sldSz cx="12192000" cy="6858000"/>
   <p:notesSz cx="6858000" cy="9144000"/>
@@ -210,7 +211,7 @@
           <a:p>
             <a:fld id="{7F262928-0CDC-44E0-A3C2-1349897640B6}" type="datetimeFigureOut">
               <a:rPr lang="en-US" smtClean="0"/>
-              <a:t>20-Sep-17</a:t>
+              <a:t>9/25/2017</a:t>
             </a:fld>
             <a:endParaRPr lang="en-US"/>
           </a:p>
@@ -1160,7 +1161,7 @@
             <a:fld id="{B61BEF0D-F0BB-DE4B-95CE-6DB70DBA9567}" type="datetimeFigureOut">
               <a:rPr lang="en-US" dirty="0"/>
               <a:pPr/>
-              <a:t>20-Sep-17</a:t>
+              <a:t>9/25/2017</a:t>
             </a:fld>
             <a:endParaRPr lang="en-US" dirty="0"/>
           </a:p>
@@ -1453,7 +1454,7 @@
             <a:fld id="{B61BEF0D-F0BB-DE4B-95CE-6DB70DBA9567}" type="datetimeFigureOut">
               <a:rPr lang="en-US" dirty="0"/>
               <a:pPr/>
-              <a:t>20-Sep-17</a:t>
+              <a:t>9/25/2017</a:t>
             </a:fld>
             <a:endParaRPr lang="en-US" dirty="0"/>
           </a:p>
@@ -1698,7 +1699,7 @@
             <a:fld id="{B61BEF0D-F0BB-DE4B-95CE-6DB70DBA9567}" type="datetimeFigureOut">
               <a:rPr lang="en-US" dirty="0"/>
               <a:pPr/>
-              <a:t>20-Sep-17</a:t>
+              <a:t>9/25/2017</a:t>
             </a:fld>
             <a:endParaRPr lang="en-US" dirty="0"/>
           </a:p>
@@ -2235,7 +2236,7 @@
             <a:fld id="{B61BEF0D-F0BB-DE4B-95CE-6DB70DBA9567}" type="datetimeFigureOut">
               <a:rPr lang="en-US" dirty="0"/>
               <a:pPr/>
-              <a:t>20-Sep-17</a:t>
+              <a:t>9/25/2017</a:t>
             </a:fld>
             <a:endParaRPr lang="en-US" dirty="0"/>
           </a:p>
@@ -2480,7 +2481,7 @@
             <a:fld id="{B61BEF0D-F0BB-DE4B-95CE-6DB70DBA9567}" type="datetimeFigureOut">
               <a:rPr lang="en-US" dirty="0"/>
               <a:pPr/>
-              <a:t>20-Sep-17</a:t>
+              <a:t>9/25/2017</a:t>
             </a:fld>
             <a:endParaRPr lang="en-US" dirty="0"/>
           </a:p>
@@ -3009,7 +3010,7 @@
             <a:fld id="{B61BEF0D-F0BB-DE4B-95CE-6DB70DBA9567}" type="datetimeFigureOut">
               <a:rPr lang="en-US" dirty="0"/>
               <a:pPr/>
-              <a:t>20-Sep-17</a:t>
+              <a:t>9/25/2017</a:t>
             </a:fld>
             <a:endParaRPr lang="en-US" dirty="0"/>
           </a:p>
@@ -3303,7 +3304,7 @@
             <a:fld id="{B61BEF0D-F0BB-DE4B-95CE-6DB70DBA9567}" type="datetimeFigureOut">
               <a:rPr lang="en-US" dirty="0"/>
               <a:pPr/>
-              <a:t>20-Sep-17</a:t>
+              <a:t>9/25/2017</a:t>
             </a:fld>
             <a:endParaRPr lang="en-US" dirty="0"/>
           </a:p>
@@ -3474,7 +3475,7 @@
             <a:fld id="{B61BEF0D-F0BB-DE4B-95CE-6DB70DBA9567}" type="datetimeFigureOut">
               <a:rPr lang="en-US" dirty="0"/>
               <a:pPr/>
-              <a:t>20-Sep-17</a:t>
+              <a:t>9/25/2017</a:t>
             </a:fld>
             <a:endParaRPr lang="en-US" dirty="0"/>
           </a:p>
@@ -3651,7 +3652,7 @@
             <a:fld id="{B61BEF0D-F0BB-DE4B-95CE-6DB70DBA9567}" type="datetimeFigureOut">
               <a:rPr lang="en-US" dirty="0"/>
               <a:pPr/>
-              <a:t>20-Sep-17</a:t>
+              <a:t>9/25/2017</a:t>
             </a:fld>
             <a:endParaRPr lang="en-US" dirty="0"/>
           </a:p>
@@ -3859,7 +3860,7 @@
             <a:fld id="{B61BEF0D-F0BB-DE4B-95CE-6DB70DBA9567}" type="datetimeFigureOut">
               <a:rPr lang="en-US" dirty="0"/>
               <a:pPr/>
-              <a:t>20-Sep-17</a:t>
+              <a:t>9/25/2017</a:t>
             </a:fld>
             <a:endParaRPr lang="en-US" dirty="0"/>
           </a:p>
@@ -4107,7 +4108,7 @@
             <a:fld id="{B61BEF0D-F0BB-DE4B-95CE-6DB70DBA9567}" type="datetimeFigureOut">
               <a:rPr lang="en-US" dirty="0"/>
               <a:pPr/>
-              <a:t>20-Sep-17</a:t>
+              <a:t>9/25/2017</a:t>
             </a:fld>
             <a:endParaRPr lang="en-US" dirty="0"/>
           </a:p>
@@ -4451,7 +4452,7 @@
             <a:fld id="{B61BEF0D-F0BB-DE4B-95CE-6DB70DBA9567}" type="datetimeFigureOut">
               <a:rPr lang="en-US" dirty="0"/>
               <a:pPr/>
-              <a:t>20-Sep-17</a:t>
+              <a:t>9/25/2017</a:t>
             </a:fld>
             <a:endParaRPr lang="en-US" dirty="0"/>
           </a:p>
@@ -4940,7 +4941,7 @@
             <a:fld id="{B61BEF0D-F0BB-DE4B-95CE-6DB70DBA9567}" type="datetimeFigureOut">
               <a:rPr lang="en-US" dirty="0"/>
               <a:pPr/>
-              <a:t>20-Sep-17</a:t>
+              <a:t>9/25/2017</a:t>
             </a:fld>
             <a:endParaRPr lang="en-US" dirty="0"/>
           </a:p>
@@ -5055,7 +5056,7 @@
             <a:fld id="{B61BEF0D-F0BB-DE4B-95CE-6DB70DBA9567}" type="datetimeFigureOut">
               <a:rPr lang="en-US" dirty="0"/>
               <a:pPr/>
-              <a:t>20-Sep-17</a:t>
+              <a:t>9/25/2017</a:t>
             </a:fld>
             <a:endParaRPr lang="en-US" dirty="0"/>
           </a:p>
@@ -5147,7 +5148,7 @@
             <a:fld id="{B61BEF0D-F0BB-DE4B-95CE-6DB70DBA9567}" type="datetimeFigureOut">
               <a:rPr lang="en-US" dirty="0"/>
               <a:pPr/>
-              <a:t>20-Sep-17</a:t>
+              <a:t>9/25/2017</a:t>
             </a:fld>
             <a:endParaRPr lang="en-US" dirty="0"/>
           </a:p>
@@ -5427,7 +5428,7 @@
             <a:fld id="{B61BEF0D-F0BB-DE4B-95CE-6DB70DBA9567}" type="datetimeFigureOut">
               <a:rPr lang="en-US" dirty="0"/>
               <a:pPr/>
-              <a:t>20-Sep-17</a:t>
+              <a:t>9/25/2017</a:t>
             </a:fld>
             <a:endParaRPr lang="en-US" dirty="0"/>
           </a:p>
@@ -5715,7 +5716,7 @@
             <a:fld id="{B61BEF0D-F0BB-DE4B-95CE-6DB70DBA9567}" type="datetimeFigureOut">
               <a:rPr lang="en-US" dirty="0"/>
               <a:pPr/>
-              <a:t>20-Sep-17</a:t>
+              <a:t>9/25/2017</a:t>
             </a:fld>
             <a:endParaRPr lang="en-US" dirty="0"/>
           </a:p>
@@ -6242,7 +6243,7 @@
             <a:fld id="{B61BEF0D-F0BB-DE4B-95CE-6DB70DBA9567}" type="datetimeFigureOut">
               <a:rPr lang="en-US" dirty="0"/>
               <a:pPr/>
-              <a:t>20-Sep-17</a:t>
+              <a:t>9/25/2017</a:t>
             </a:fld>
             <a:endParaRPr lang="en-US" dirty="0"/>
           </a:p>
@@ -7120,6 +7121,108 @@
       </p:grpSpPr>
       <p:sp>
         <p:nvSpPr>
+          <p:cNvPr id="2" name="Title 1">
+            <a:extLst>
+              <a:ext uri="{FF2B5EF4-FFF2-40B4-BE49-F238E27FC236}">
+                <a16:creationId xmlns:a16="http://schemas.microsoft.com/office/drawing/2014/main" id="{681983DC-0BFC-4912-8AC2-40307BE36C21}"/>
+              </a:ext>
+            </a:extLst>
+          </p:cNvPr>
+          <p:cNvSpPr>
+            <a:spLocks noGrp="1"/>
+          </p:cNvSpPr>
+          <p:nvPr>
+            <p:ph type="title"/>
+          </p:nvPr>
+        </p:nvSpPr>
+        <p:spPr/>
+        <p:txBody>
+          <a:bodyPr/>
+          <a:lstStyle/>
+          <a:p>
+            <a:r>
+              <a:rPr lang="en-US" dirty="0"/>
+              <a:t>Sharing assemblies between processes. </a:t>
+            </a:r>
+            <a:br>
+              <a:rPr lang="en-US" dirty="0"/>
+            </a:br>
+            <a:r>
+              <a:rPr lang="en-US" dirty="0"/>
+              <a:t>Concept native images.</a:t>
+            </a:r>
+          </a:p>
+        </p:txBody>
+      </p:sp>
+      <p:sp>
+        <p:nvSpPr>
+          <p:cNvPr id="3" name="Content Placeholder 2">
+            <a:extLst>
+              <a:ext uri="{FF2B5EF4-FFF2-40B4-BE49-F238E27FC236}">
+                <a16:creationId xmlns:a16="http://schemas.microsoft.com/office/drawing/2014/main" id="{57DD25CA-97D9-48EE-A325-6D58C41EB68C}"/>
+              </a:ext>
+            </a:extLst>
+          </p:cNvPr>
+          <p:cNvSpPr>
+            <a:spLocks noGrp="1"/>
+          </p:cNvSpPr>
+          <p:nvPr>
+            <p:ph idx="1"/>
+          </p:nvPr>
+        </p:nvSpPr>
+        <p:spPr/>
+        <p:txBody>
+          <a:bodyPr/>
+          <a:lstStyle/>
+          <a:p>
+            <a:pPr marL="0" indent="0">
+              <a:buNone/>
+            </a:pPr>
+            <a:r>
+              <a:rPr lang="en-US" dirty="0"/>
+              <a:t>Remarks:</a:t>
+            </a:r>
+          </a:p>
+          <a:p>
+            <a:r>
+              <a:rPr lang="en-US" dirty="0"/>
+              <a:t>Always use domain-neutral code when loading the same assembly into multiple application domains. If a native image is loaded into a nonshared application domain after having been loaded into a shared domain, it cannot be used.</a:t>
+            </a:r>
+          </a:p>
+        </p:txBody>
+      </p:sp>
+    </p:spTree>
+    <p:extLst>
+      <p:ext uri="{BB962C8B-B14F-4D97-AF65-F5344CB8AC3E}">
+        <p14:creationId xmlns:p14="http://schemas.microsoft.com/office/powerpoint/2010/main" val="2700701014"/>
+      </p:ext>
+    </p:extLst>
+  </p:cSld>
+  <p:clrMapOvr>
+    <a:masterClrMapping/>
+  </p:clrMapOvr>
+</p:sld>
+</file>
+
+<file path=ppt/slides/slide11.xml><?xml version="1.0" encoding="utf-8"?>
+<p:sld xmlns:a="http://schemas.openxmlformats.org/drawingml/2006/main" xmlns:r="http://schemas.openxmlformats.org/officeDocument/2006/relationships" xmlns:p="http://schemas.openxmlformats.org/presentationml/2006/main">
+  <p:cSld>
+    <p:spTree>
+      <p:nvGrpSpPr>
+        <p:cNvPr id="1" name=""/>
+        <p:cNvGrpSpPr/>
+        <p:nvPr/>
+      </p:nvGrpSpPr>
+      <p:grpSpPr>
+        <a:xfrm>
+          <a:off x="0" y="0"/>
+          <a:ext cx="0" cy="0"/>
+          <a:chOff x="0" y="0"/>
+          <a:chExt cx="0" cy="0"/>
+        </a:xfrm>
+      </p:grpSpPr>
+      <p:sp>
+        <p:nvSpPr>
           <p:cNvPr id="2" name="Title 1"/>
           <p:cNvSpPr>
             <a:spLocks noGrp="1"/>
@@ -7152,8 +7255,8 @@
         </p:nvSpPr>
         <p:spPr>
           <a:xfrm>
-            <a:off x="1955363" y="4987636"/>
-            <a:ext cx="10018713" cy="1560946"/>
+            <a:off x="1955363" y="4692073"/>
+            <a:ext cx="10018713" cy="1856509"/>
           </a:xfrm>
         </p:spPr>
         <p:txBody>
@@ -7201,9 +7304,18 @@
               </a:rPr>
               <a:t>https://www.microsoftpressstore.com/store/windows-sysinternals-administrators-reference-9780735656727</a:t>
             </a:r>
+            <a:endParaRPr lang="fr-FR" dirty="0"/>
+          </a:p>
+          <a:p>
+            <a:r>
+              <a:rPr lang="fr-FR" dirty="0">
+                <a:hlinkClick r:id="rId4"/>
+              </a:rPr>
+              <a:t>http://www.apress.com/us/book/9781430244585</a:t>
+            </a:r>
             <a:r>
               <a:rPr lang="fr-FR" dirty="0"/>
-              <a:t> </a:t>
+              <a:t>  </a:t>
             </a:r>
           </a:p>
           <a:p>
@@ -7216,7 +7328,7 @@
             </a:r>
             <a:r>
               <a:rPr lang="fr-FR" dirty="0">
-                <a:hlinkClick r:id="rId4"/>
+                <a:hlinkClick r:id="rId5"/>
               </a:rPr>
               <a:t>https://github.com/sflusov/IISSharingAssemblies</a:t>
             </a:r>
@@ -8654,7 +8766,7 @@
           <p:cNvPr id="2" name="Title 1">
             <a:extLst>
               <a:ext uri="{FF2B5EF4-FFF2-40B4-BE49-F238E27FC236}">
-                <a16:creationId xmlns:a16="http://schemas.microsoft.com/office/drawing/2014/main" id="{A0E7C6FB-3B10-4AC3-B4B3-D5F95CDB8ACD}"/>
+                <a16:creationId xmlns:a16="http://schemas.microsoft.com/office/drawing/2014/main" id="{09619E5A-9C6F-46E0-8395-140AC3D184CD}"/>
               </a:ext>
             </a:extLst>
           </p:cNvPr>
@@ -8667,8 +8779,8 @@
         </p:nvSpPr>
         <p:spPr>
           <a:xfrm>
-            <a:off x="1484311" y="685800"/>
-            <a:ext cx="10018713" cy="923925"/>
+            <a:off x="1484311" y="685801"/>
+            <a:ext cx="10018713" cy="1066800"/>
           </a:xfrm>
         </p:spPr>
         <p:txBody>
@@ -8679,14 +8791,14 @@
           <a:p>
             <a:r>
               <a:rPr lang="en-US" dirty="0"/>
-              <a:t>Sharing assemblies between processes. </a:t>
+              <a:t>Sharing assemblies between application domains. </a:t>
             </a:r>
             <a:br>
               <a:rPr lang="en-US" dirty="0"/>
             </a:br>
             <a:r>
               <a:rPr lang="en-US" dirty="0"/>
-              <a:t>Concept native images.</a:t>
+              <a:t>Concept domain neutral assembly. </a:t>
             </a:r>
           </a:p>
         </p:txBody>
@@ -8696,7 +8808,7 @@
           <p:cNvPr id="3" name="Content Placeholder 2">
             <a:extLst>
               <a:ext uri="{FF2B5EF4-FFF2-40B4-BE49-F238E27FC236}">
-                <a16:creationId xmlns:a16="http://schemas.microsoft.com/office/drawing/2014/main" id="{52B8DBDA-8455-4186-8C64-D98E6D1C6A48}"/>
+                <a16:creationId xmlns:a16="http://schemas.microsoft.com/office/drawing/2014/main" id="{F5BF9354-5E70-4F1E-9E61-289C2FB3ED00}"/>
               </a:ext>
             </a:extLst>
           </p:cNvPr>
@@ -8709,42 +8821,59 @@
         </p:nvSpPr>
         <p:spPr>
           <a:xfrm>
-            <a:off x="1484310" y="2495549"/>
+            <a:off x="1484310" y="2242127"/>
             <a:ext cx="10018713" cy="3124201"/>
           </a:xfrm>
         </p:spPr>
         <p:txBody>
-          <a:bodyPr/>
-          <a:lstStyle/>
+          <a:bodyPr>
+            <a:normAutofit/>
+          </a:bodyPr>
+          <a:lstStyle/>
+          <a:p>
+            <a:pPr marL="0" indent="0" algn="ctr">
+              <a:buNone/>
+            </a:pPr>
+            <a:r>
+              <a:rPr lang="en-US" b="1" dirty="0"/>
+              <a:t>Strong Named Assemblies Belong in the GAC </a:t>
+            </a:r>
+          </a:p>
           <a:p>
             <a:pPr marL="0" indent="0">
               <a:buNone/>
             </a:pPr>
             <a:r>
               <a:rPr lang="en-US" dirty="0"/>
-              <a:t>Summary of usage</a:t>
-            </a:r>
-          </a:p>
-          <a:p>
-            <a:r>
-              <a:rPr lang="en-US" dirty="0"/>
-              <a:t>Native images enable code sharing between processes.</a:t>
-            </a:r>
-          </a:p>
-          <a:p>
-            <a:r>
-              <a:rPr lang="en-US" dirty="0"/>
-              <a:t>Native images require a smaller initial working set because there is no need for the JIT compiler.</a:t>
-            </a:r>
-          </a:p>
-          <a:p>
-            <a:r>
-              <a:rPr lang="en-US" dirty="0"/>
-              <a:t>Native images load faster than MSIL because they eliminate the need for many startup activities, such as JIT compilation and type-safety verification.</a:t>
-            </a:r>
-          </a:p>
-          <a:p>
-            <a:endParaRPr lang="en-US" dirty="0"/>
+              <a:t>If your assemblies have strong names, make sure to place them in the global assembly cache (GAC). </a:t>
+            </a:r>
+          </a:p>
+          <a:p>
+            <a:pPr marL="0" indent="0">
+              <a:buNone/>
+            </a:pPr>
+            <a:r>
+              <a:rPr lang="en-US" dirty="0"/>
+              <a:t>Otherwise, loading the assembly requires touching almost every page to verify its digital signature. </a:t>
+            </a:r>
+          </a:p>
+          <a:p>
+            <a:pPr marL="0" indent="0">
+              <a:buNone/>
+            </a:pPr>
+            <a:r>
+              <a:rPr lang="en-US" dirty="0"/>
+              <a:t>Verification of strong names when the assembly is not placed in the GAC will also diminish any performance gains from </a:t>
+            </a:r>
+            <a:r>
+              <a:rPr lang="en-US" dirty="0" err="1"/>
+              <a:t>NGen</a:t>
+            </a:r>
+            <a:r>
+              <a:rPr lang="en-US" dirty="0"/>
+              <a:t>.</a:t>
+            </a:r>
+            <a:endParaRPr lang="en-US" i="1" dirty="0"/>
           </a:p>
         </p:txBody>
       </p:sp>
@@ -8753,7 +8882,7 @@
           <p:cNvPr id="4" name="TextBox 3">
             <a:extLst>
               <a:ext uri="{FF2B5EF4-FFF2-40B4-BE49-F238E27FC236}">
-                <a16:creationId xmlns:a16="http://schemas.microsoft.com/office/drawing/2014/main" id="{9F770282-ED54-4DDB-AEC9-2A6F9A6B6553}"/>
+                <a16:creationId xmlns:a16="http://schemas.microsoft.com/office/drawing/2014/main" id="{A7C2A8CC-7366-4646-9717-10016A06F742}"/>
               </a:ext>
             </a:extLst>
           </p:cNvPr>
@@ -8762,8 +8891,8 @@
         </p:nvSpPr>
         <p:spPr>
           <a:xfrm>
-            <a:off x="2466975" y="6057900"/>
-            <a:ext cx="9036047" cy="646331"/>
+            <a:off x="4494070" y="5855854"/>
+            <a:ext cx="7008953" cy="646331"/>
           </a:xfrm>
           <a:prstGeom prst="rect">
             <a:avLst/>
@@ -8778,54 +8907,17 @@
           <a:p>
             <a:r>
               <a:rPr lang="en-US" dirty="0"/>
-              <a:t>See also:</a:t>
-            </a:r>
-          </a:p>
-          <a:p>
-            <a:r>
-              <a:rPr lang="en-US" dirty="0">
-                <a:hlinkClick r:id="rId2"/>
-              </a:rPr>
-              <a:t>https://docs.microsoft.com/en-us/dotnet/framework/tools/ngen-exe-native-image-generator</a:t>
-            </a:r>
-            <a:r>
-              <a:rPr lang="en-US" dirty="0"/>
-              <a:t> </a:t>
-            </a:r>
-          </a:p>
-        </p:txBody>
-      </p:sp>
-      <p:sp>
-        <p:nvSpPr>
-          <p:cNvPr id="5" name="TextBox 4">
-            <a:extLst>
-              <a:ext uri="{FF2B5EF4-FFF2-40B4-BE49-F238E27FC236}">
-                <a16:creationId xmlns:a16="http://schemas.microsoft.com/office/drawing/2014/main" id="{E68C30F3-ABD5-402C-B90F-325DDF5E4314}"/>
-              </a:ext>
-            </a:extLst>
-          </p:cNvPr>
-          <p:cNvSpPr txBox="1"/>
-          <p:nvPr/>
-        </p:nvSpPr>
-        <p:spPr>
-          <a:xfrm>
-            <a:off x="4705869" y="1819275"/>
-            <a:ext cx="4328621" cy="430887"/>
-          </a:xfrm>
-          <a:prstGeom prst="rect">
-            <a:avLst/>
-          </a:prstGeom>
-          <a:noFill/>
-        </p:spPr>
-        <p:txBody>
-          <a:bodyPr wrap="none" rtlCol="0">
-            <a:spAutoFit/>
-          </a:bodyPr>
-          <a:lstStyle/>
-          <a:p>
-            <a:r>
-              <a:rPr lang="de-DE" sz="2200" dirty="0"/>
-              <a:t>Ngen.exe (Native Image Generator)</a:t>
+              <a:t>See also: </a:t>
+            </a:r>
+          </a:p>
+          <a:p>
+            <a:pPr marL="285750" indent="-285750">
+              <a:buFont typeface="Arial" panose="020B0604020202020204" pitchFamily="34" charset="0"/>
+              <a:buChar char="•"/>
+            </a:pPr>
+            <a:r>
+              <a:rPr lang="en-US" dirty="0"/>
+              <a:t>Pro .NET Performance: Optimize Your C# Applications. Page 289</a:t>
             </a:r>
           </a:p>
         </p:txBody>
@@ -8833,7 +8925,7 @@
     </p:spTree>
     <p:extLst>
       <p:ext uri="{BB962C8B-B14F-4D97-AF65-F5344CB8AC3E}">
-        <p14:creationId xmlns:p14="http://schemas.microsoft.com/office/powerpoint/2010/main" val="2254905752"/>
+        <p14:creationId xmlns:p14="http://schemas.microsoft.com/office/powerpoint/2010/main" val="3233133832"/>
       </p:ext>
     </p:extLst>
   </p:cSld>
@@ -8865,7 +8957,7 @@
           <p:cNvPr id="2" name="Title 1">
             <a:extLst>
               <a:ext uri="{FF2B5EF4-FFF2-40B4-BE49-F238E27FC236}">
-                <a16:creationId xmlns:a16="http://schemas.microsoft.com/office/drawing/2014/main" id="{681983DC-0BFC-4912-8AC2-40307BE36C21}"/>
+                <a16:creationId xmlns:a16="http://schemas.microsoft.com/office/drawing/2014/main" id="{A0E7C6FB-3B10-4AC3-B4B3-D5F95CDB8ACD}"/>
               </a:ext>
             </a:extLst>
           </p:cNvPr>
@@ -8876,9 +8968,16 @@
             <p:ph type="title"/>
           </p:nvPr>
         </p:nvSpPr>
-        <p:spPr/>
-        <p:txBody>
-          <a:bodyPr/>
+        <p:spPr>
+          <a:xfrm>
+            <a:off x="1484311" y="685800"/>
+            <a:ext cx="10018713" cy="923925"/>
+          </a:xfrm>
+        </p:spPr>
+        <p:txBody>
+          <a:bodyPr>
+            <a:normAutofit fontScale="90000"/>
+          </a:bodyPr>
           <a:lstStyle/>
           <a:p>
             <a:r>
@@ -8900,7 +8999,7 @@
           <p:cNvPr id="3" name="Content Placeholder 2">
             <a:extLst>
               <a:ext uri="{FF2B5EF4-FFF2-40B4-BE49-F238E27FC236}">
-                <a16:creationId xmlns:a16="http://schemas.microsoft.com/office/drawing/2014/main" id="{57DD25CA-97D9-48EE-A325-6D58C41EB68C}"/>
+                <a16:creationId xmlns:a16="http://schemas.microsoft.com/office/drawing/2014/main" id="{52B8DBDA-8455-4186-8C64-D98E6D1C6A48}"/>
               </a:ext>
             </a:extLst>
           </p:cNvPr>
@@ -8911,7 +9010,12 @@
             <p:ph idx="1"/>
           </p:nvPr>
         </p:nvSpPr>
-        <p:spPr/>
+        <p:spPr>
+          <a:xfrm>
+            <a:off x="1484310" y="2495549"/>
+            <a:ext cx="10018713" cy="3124201"/>
+          </a:xfrm>
+        </p:spPr>
         <p:txBody>
           <a:bodyPr/>
           <a:lstStyle/>
@@ -8921,13 +9025,110 @@
             </a:pPr>
             <a:r>
               <a:rPr lang="en-US" dirty="0"/>
-              <a:t>Remarks:</a:t>
-            </a:r>
-          </a:p>
-          <a:p>
-            <a:r>
-              <a:rPr lang="en-US" dirty="0"/>
-              <a:t>Always use domain-neutral code when loading the same assembly into multiple application domains. If a native image is loaded into a nonshared application domain after having been loaded into a shared domain, it cannot be used.</a:t>
+              <a:t>Summary of usage</a:t>
+            </a:r>
+          </a:p>
+          <a:p>
+            <a:r>
+              <a:rPr lang="en-US" dirty="0"/>
+              <a:t>Native images enable code sharing between processes.</a:t>
+            </a:r>
+          </a:p>
+          <a:p>
+            <a:r>
+              <a:rPr lang="en-US" dirty="0"/>
+              <a:t>Native images require a smaller initial working set because there is no need for the JIT compiler.</a:t>
+            </a:r>
+          </a:p>
+          <a:p>
+            <a:r>
+              <a:rPr lang="en-US" dirty="0"/>
+              <a:t>Native images load faster than MSIL because they eliminate the need for many startup activities, such as JIT compilation and type-safety verification.</a:t>
+            </a:r>
+          </a:p>
+          <a:p>
+            <a:endParaRPr lang="en-US" dirty="0"/>
+          </a:p>
+        </p:txBody>
+      </p:sp>
+      <p:sp>
+        <p:nvSpPr>
+          <p:cNvPr id="4" name="TextBox 3">
+            <a:extLst>
+              <a:ext uri="{FF2B5EF4-FFF2-40B4-BE49-F238E27FC236}">
+                <a16:creationId xmlns:a16="http://schemas.microsoft.com/office/drawing/2014/main" id="{9F770282-ED54-4DDB-AEC9-2A6F9A6B6553}"/>
+              </a:ext>
+            </a:extLst>
+          </p:cNvPr>
+          <p:cNvSpPr txBox="1"/>
+          <p:nvPr/>
+        </p:nvSpPr>
+        <p:spPr>
+          <a:xfrm>
+            <a:off x="2466975" y="6057900"/>
+            <a:ext cx="9036047" cy="646331"/>
+          </a:xfrm>
+          <a:prstGeom prst="rect">
+            <a:avLst/>
+          </a:prstGeom>
+          <a:noFill/>
+        </p:spPr>
+        <p:txBody>
+          <a:bodyPr wrap="square" rtlCol="0">
+            <a:spAutoFit/>
+          </a:bodyPr>
+          <a:lstStyle/>
+          <a:p>
+            <a:r>
+              <a:rPr lang="en-US" dirty="0"/>
+              <a:t>See also:</a:t>
+            </a:r>
+          </a:p>
+          <a:p>
+            <a:r>
+              <a:rPr lang="en-US" dirty="0">
+                <a:hlinkClick r:id="rId2"/>
+              </a:rPr>
+              <a:t>https://docs.microsoft.com/en-us/dotnet/framework/tools/ngen-exe-native-image-generator</a:t>
+            </a:r>
+            <a:r>
+              <a:rPr lang="en-US" dirty="0"/>
+              <a:t> </a:t>
+            </a:r>
+          </a:p>
+        </p:txBody>
+      </p:sp>
+      <p:sp>
+        <p:nvSpPr>
+          <p:cNvPr id="5" name="TextBox 4">
+            <a:extLst>
+              <a:ext uri="{FF2B5EF4-FFF2-40B4-BE49-F238E27FC236}">
+                <a16:creationId xmlns:a16="http://schemas.microsoft.com/office/drawing/2014/main" id="{E68C30F3-ABD5-402C-B90F-325DDF5E4314}"/>
+              </a:ext>
+            </a:extLst>
+          </p:cNvPr>
+          <p:cNvSpPr txBox="1"/>
+          <p:nvPr/>
+        </p:nvSpPr>
+        <p:spPr>
+          <a:xfrm>
+            <a:off x="4705869" y="1819275"/>
+            <a:ext cx="4328621" cy="430887"/>
+          </a:xfrm>
+          <a:prstGeom prst="rect">
+            <a:avLst/>
+          </a:prstGeom>
+          <a:noFill/>
+        </p:spPr>
+        <p:txBody>
+          <a:bodyPr wrap="none" rtlCol="0">
+            <a:spAutoFit/>
+          </a:bodyPr>
+          <a:lstStyle/>
+          <a:p>
+            <a:r>
+              <a:rPr lang="de-DE" sz="2200" dirty="0"/>
+              <a:t>Ngen.exe (Native Image Generator)</a:t>
             </a:r>
           </a:p>
         </p:txBody>
@@ -8935,7 +9136,7 @@
     </p:spTree>
     <p:extLst>
       <p:ext uri="{BB962C8B-B14F-4D97-AF65-F5344CB8AC3E}">
-        <p14:creationId xmlns:p14="http://schemas.microsoft.com/office/powerpoint/2010/main" val="2700701014"/>
+        <p14:creationId xmlns:p14="http://schemas.microsoft.com/office/powerpoint/2010/main" val="2254905752"/>
       </p:ext>
     </p:extLst>
   </p:cSld>

</xml_diff>

<commit_message>
More details description of memory structure and types
</commit_message>
<xml_diff>
--- a/presentation/Sharing common assemblies.pptx
+++ b/presentation/Sharing common assemblies.pptx
@@ -5,20 +5,22 @@
     <p:sldMasterId id="2147483648" r:id="rId1"/>
   </p:sldMasterIdLst>
   <p:notesMasterIdLst>
-    <p:notesMasterId r:id="rId13"/>
+    <p:notesMasterId r:id="rId15"/>
   </p:notesMasterIdLst>
   <p:sldIdLst>
     <p:sldId id="256" r:id="rId2"/>
     <p:sldId id="279" r:id="rId3"/>
     <p:sldId id="257" r:id="rId4"/>
     <p:sldId id="280" r:id="rId5"/>
-    <p:sldId id="281" r:id="rId6"/>
-    <p:sldId id="282" r:id="rId7"/>
-    <p:sldId id="283" r:id="rId8"/>
-    <p:sldId id="286" r:id="rId9"/>
-    <p:sldId id="284" r:id="rId10"/>
-    <p:sldId id="285" r:id="rId11"/>
-    <p:sldId id="277" r:id="rId12"/>
+    <p:sldId id="288" r:id="rId6"/>
+    <p:sldId id="287" r:id="rId7"/>
+    <p:sldId id="290" r:id="rId8"/>
+    <p:sldId id="282" r:id="rId9"/>
+    <p:sldId id="283" r:id="rId10"/>
+    <p:sldId id="286" r:id="rId11"/>
+    <p:sldId id="284" r:id="rId12"/>
+    <p:sldId id="285" r:id="rId13"/>
+    <p:sldId id="277" r:id="rId14"/>
   </p:sldIdLst>
   <p:sldSz cx="12192000" cy="6858000"/>
   <p:notesSz cx="6858000" cy="9144000"/>
@@ -211,7 +213,7 @@
           <a:p>
             <a:fld id="{7F262928-0CDC-44E0-A3C2-1349897640B6}" type="datetimeFigureOut">
               <a:rPr lang="en-US" smtClean="0"/>
-              <a:t>9/25/2017</a:t>
+              <a:t>2/4/2018</a:t>
             </a:fld>
             <a:endParaRPr lang="en-US"/>
           </a:p>
@@ -522,7 +524,19 @@
           <a:bodyPr/>
           <a:lstStyle/>
           <a:p>
-            <a:endParaRPr lang="en-US" dirty="0"/>
+            <a:r>
+              <a:rPr lang="en-US" dirty="0"/>
+              <a:t>Have a look simulation</a:t>
+            </a:r>
+          </a:p>
+          <a:p>
+            <a:r>
+              <a:rPr lang="en-US"/>
+              <a:t>Have a look real example on MP server</a:t>
+            </a:r>
+          </a:p>
+          <a:p>
+            <a:endParaRPr lang="en-US"/>
           </a:p>
         </p:txBody>
       </p:sp>
@@ -543,103 +557,7 @@
           <a:p>
             <a:fld id="{29B3F580-F237-4B16-A8AC-FCE0BDEB942E}" type="slidenum">
               <a:rPr lang="en-US" smtClean="0"/>
-              <a:t>5</a:t>
-            </a:fld>
-            <a:endParaRPr lang="en-US"/>
-          </a:p>
-        </p:txBody>
-      </p:sp>
-    </p:spTree>
-    <p:extLst>
-      <p:ext uri="{BB962C8B-B14F-4D97-AF65-F5344CB8AC3E}">
-        <p14:creationId xmlns:p14="http://schemas.microsoft.com/office/powerpoint/2010/main" val="2235077913"/>
-      </p:ext>
-    </p:extLst>
-  </p:cSld>
-  <p:clrMapOvr>
-    <a:masterClrMapping/>
-  </p:clrMapOvr>
-</p:notes>
-</file>
-
-<file path=ppt/notesSlides/notesSlide2.xml><?xml version="1.0" encoding="utf-8"?>
-<p:notes xmlns:a="http://schemas.openxmlformats.org/drawingml/2006/main" xmlns:r="http://schemas.openxmlformats.org/officeDocument/2006/relationships" xmlns:p="http://schemas.openxmlformats.org/presentationml/2006/main">
-  <p:cSld>
-    <p:spTree>
-      <p:nvGrpSpPr>
-        <p:cNvPr id="1" name=""/>
-        <p:cNvGrpSpPr/>
-        <p:nvPr/>
-      </p:nvGrpSpPr>
-      <p:grpSpPr>
-        <a:xfrm>
-          <a:off x="0" y="0"/>
-          <a:ext cx="0" cy="0"/>
-          <a:chOff x="0" y="0"/>
-          <a:chExt cx="0" cy="0"/>
-        </a:xfrm>
-      </p:grpSpPr>
-      <p:sp>
-        <p:nvSpPr>
-          <p:cNvPr id="2" name="Slide Image Placeholder 1"/>
-          <p:cNvSpPr>
-            <a:spLocks noGrp="1" noRot="1" noChangeAspect="1"/>
-          </p:cNvSpPr>
-          <p:nvPr>
-            <p:ph type="sldImg"/>
-          </p:nvPr>
-        </p:nvSpPr>
-        <p:spPr/>
-      </p:sp>
-      <p:sp>
-        <p:nvSpPr>
-          <p:cNvPr id="3" name="Notes Placeholder 2"/>
-          <p:cNvSpPr>
-            <a:spLocks noGrp="1"/>
-          </p:cNvSpPr>
-          <p:nvPr>
-            <p:ph type="body" idx="1"/>
-          </p:nvPr>
-        </p:nvSpPr>
-        <p:spPr/>
-        <p:txBody>
-          <a:bodyPr/>
-          <a:lstStyle/>
-          <a:p>
-            <a:r>
-              <a:rPr lang="en-US" dirty="0"/>
-              <a:t>Have a look simulation</a:t>
-            </a:r>
-          </a:p>
-          <a:p>
-            <a:r>
-              <a:rPr lang="en-US"/>
-              <a:t>Have a look real example on MP server</a:t>
-            </a:r>
-          </a:p>
-          <a:p>
-            <a:endParaRPr lang="en-US"/>
-          </a:p>
-        </p:txBody>
-      </p:sp>
-      <p:sp>
-        <p:nvSpPr>
-          <p:cNvPr id="4" name="Slide Number Placeholder 3"/>
-          <p:cNvSpPr>
-            <a:spLocks noGrp="1"/>
-          </p:cNvSpPr>
-          <p:nvPr>
-            <p:ph type="sldNum" sz="quarter" idx="10"/>
-          </p:nvPr>
-        </p:nvSpPr>
-        <p:spPr/>
-        <p:txBody>
-          <a:bodyPr/>
-          <a:lstStyle/>
-          <a:p>
-            <a:fld id="{29B3F580-F237-4B16-A8AC-FCE0BDEB942E}" type="slidenum">
-              <a:rPr lang="en-US" smtClean="0"/>
-              <a:t>6</a:t>
+              <a:t>8</a:t>
             </a:fld>
             <a:endParaRPr lang="en-US"/>
           </a:p>
@@ -1158,10 +1076,9 @@
           <a:bodyPr/>
           <a:lstStyle/>
           <a:p>
-            <a:fld id="{B61BEF0D-F0BB-DE4B-95CE-6DB70DBA9567}" type="datetimeFigureOut">
-              <a:rPr lang="en-US" dirty="0"/>
-              <a:pPr/>
-              <a:t>9/25/2017</a:t>
+            <a:fld id="{224EB7CA-D7F8-4D62-9304-30BA067B3D55}" type="datetime1">
+              <a:rPr lang="en-US" smtClean="0"/>
+              <a:t>2/4/2018</a:t>
             </a:fld>
             <a:endParaRPr lang="en-US" dirty="0"/>
           </a:p>
@@ -1451,10 +1368,9 @@
           <a:bodyPr/>
           <a:lstStyle/>
           <a:p>
-            <a:fld id="{B61BEF0D-F0BB-DE4B-95CE-6DB70DBA9567}" type="datetimeFigureOut">
-              <a:rPr lang="en-US" dirty="0"/>
-              <a:pPr/>
-              <a:t>9/25/2017</a:t>
+            <a:fld id="{78594FD9-4BB0-4608-BD71-DE85AF8B0C94}" type="datetime1">
+              <a:rPr lang="en-US" smtClean="0"/>
+              <a:t>2/4/2018</a:t>
             </a:fld>
             <a:endParaRPr lang="en-US" dirty="0"/>
           </a:p>
@@ -1696,10 +1612,9 @@
           <a:bodyPr/>
           <a:lstStyle/>
           <a:p>
-            <a:fld id="{B61BEF0D-F0BB-DE4B-95CE-6DB70DBA9567}" type="datetimeFigureOut">
-              <a:rPr lang="en-US" dirty="0"/>
-              <a:pPr/>
-              <a:t>9/25/2017</a:t>
+            <a:fld id="{80F14A8D-8CB6-4DF7-BB03-9ADF328541C3}" type="datetime1">
+              <a:rPr lang="en-US" smtClean="0"/>
+              <a:t>2/4/2018</a:t>
             </a:fld>
             <a:endParaRPr lang="en-US" dirty="0"/>
           </a:p>
@@ -2233,10 +2148,9 @@
           <a:bodyPr/>
           <a:lstStyle/>
           <a:p>
-            <a:fld id="{B61BEF0D-F0BB-DE4B-95CE-6DB70DBA9567}" type="datetimeFigureOut">
-              <a:rPr lang="en-US" dirty="0"/>
-              <a:pPr/>
-              <a:t>9/25/2017</a:t>
+            <a:fld id="{12C8657D-6EFD-44FE-A6B1-FC3314E45B04}" type="datetime1">
+              <a:rPr lang="en-US" smtClean="0"/>
+              <a:t>2/4/2018</a:t>
             </a:fld>
             <a:endParaRPr lang="en-US" dirty="0"/>
           </a:p>
@@ -2478,10 +2392,9 @@
           <a:bodyPr/>
           <a:lstStyle/>
           <a:p>
-            <a:fld id="{B61BEF0D-F0BB-DE4B-95CE-6DB70DBA9567}" type="datetimeFigureOut">
-              <a:rPr lang="en-US" dirty="0"/>
-              <a:pPr/>
-              <a:t>9/25/2017</a:t>
+            <a:fld id="{3C22B71E-C0BD-47ED-A0E5-D73AF8DAABF6}" type="datetime1">
+              <a:rPr lang="en-US" smtClean="0"/>
+              <a:t>2/4/2018</a:t>
             </a:fld>
             <a:endParaRPr lang="en-US" dirty="0"/>
           </a:p>
@@ -3007,10 +2920,9 @@
           <a:bodyPr/>
           <a:lstStyle/>
           <a:p>
-            <a:fld id="{B61BEF0D-F0BB-DE4B-95CE-6DB70DBA9567}" type="datetimeFigureOut">
-              <a:rPr lang="en-US" dirty="0"/>
-              <a:pPr/>
-              <a:t>9/25/2017</a:t>
+            <a:fld id="{ABE61F29-A317-4BB7-AEDD-37E228401F6A}" type="datetime1">
+              <a:rPr lang="en-US" smtClean="0"/>
+              <a:t>2/4/2018</a:t>
             </a:fld>
             <a:endParaRPr lang="en-US" dirty="0"/>
           </a:p>
@@ -3301,10 +3213,9 @@
           <a:bodyPr/>
           <a:lstStyle/>
           <a:p>
-            <a:fld id="{B61BEF0D-F0BB-DE4B-95CE-6DB70DBA9567}" type="datetimeFigureOut">
-              <a:rPr lang="en-US" dirty="0"/>
-              <a:pPr/>
-              <a:t>9/25/2017</a:t>
+            <a:fld id="{FA7F1050-A139-4782-A1EE-67CE90110BBE}" type="datetime1">
+              <a:rPr lang="en-US" smtClean="0"/>
+              <a:t>2/4/2018</a:t>
             </a:fld>
             <a:endParaRPr lang="en-US" dirty="0"/>
           </a:p>
@@ -3472,10 +3383,9 @@
           <a:bodyPr/>
           <a:lstStyle/>
           <a:p>
-            <a:fld id="{B61BEF0D-F0BB-DE4B-95CE-6DB70DBA9567}" type="datetimeFigureOut">
-              <a:rPr lang="en-US" dirty="0"/>
-              <a:pPr/>
-              <a:t>9/25/2017</a:t>
+            <a:fld id="{F3AAD345-0762-4223-96B9-208D94F07C91}" type="datetime1">
+              <a:rPr lang="en-US" smtClean="0"/>
+              <a:t>2/4/2018</a:t>
             </a:fld>
             <a:endParaRPr lang="en-US" dirty="0"/>
           </a:p>
@@ -3649,10 +3559,9 @@
           <a:bodyPr/>
           <a:lstStyle/>
           <a:p>
-            <a:fld id="{B61BEF0D-F0BB-DE4B-95CE-6DB70DBA9567}" type="datetimeFigureOut">
-              <a:rPr lang="en-US" dirty="0"/>
-              <a:pPr/>
-              <a:t>9/25/2017</a:t>
+            <a:fld id="{203D6735-A7AF-42E2-85D0-894B50621292}" type="datetime1">
+              <a:rPr lang="en-US" smtClean="0"/>
+              <a:t>2/4/2018</a:t>
             </a:fld>
             <a:endParaRPr lang="en-US" dirty="0"/>
           </a:p>
@@ -3857,10 +3766,9 @@
           <a:bodyPr/>
           <a:lstStyle/>
           <a:p>
-            <a:fld id="{B61BEF0D-F0BB-DE4B-95CE-6DB70DBA9567}" type="datetimeFigureOut">
-              <a:rPr lang="en-US" dirty="0"/>
-              <a:pPr/>
-              <a:t>9/25/2017</a:t>
+            <a:fld id="{75176718-5527-4FAB-B437-FCE82648AEEB}" type="datetime1">
+              <a:rPr lang="en-US" smtClean="0"/>
+              <a:t>2/4/2018</a:t>
             </a:fld>
             <a:endParaRPr lang="en-US" dirty="0"/>
           </a:p>
@@ -4105,10 +4013,9 @@
           <a:bodyPr/>
           <a:lstStyle/>
           <a:p>
-            <a:fld id="{B61BEF0D-F0BB-DE4B-95CE-6DB70DBA9567}" type="datetimeFigureOut">
-              <a:rPr lang="en-US" dirty="0"/>
-              <a:pPr/>
-              <a:t>9/25/2017</a:t>
+            <a:fld id="{A2ECFFF3-0198-4D32-9ABA-0F0069AD8BC6}" type="datetime1">
+              <a:rPr lang="en-US" smtClean="0"/>
+              <a:t>2/4/2018</a:t>
             </a:fld>
             <a:endParaRPr lang="en-US" dirty="0"/>
           </a:p>
@@ -4449,10 +4356,9 @@
           <a:bodyPr/>
           <a:lstStyle/>
           <a:p>
-            <a:fld id="{B61BEF0D-F0BB-DE4B-95CE-6DB70DBA9567}" type="datetimeFigureOut">
-              <a:rPr lang="en-US" dirty="0"/>
-              <a:pPr/>
-              <a:t>9/25/2017</a:t>
+            <a:fld id="{3CB9EE01-0F27-46F0-BCC0-C0DFDC5C8A8D}" type="datetime1">
+              <a:rPr lang="en-US" smtClean="0"/>
+              <a:t>2/4/2018</a:t>
             </a:fld>
             <a:endParaRPr lang="en-US" dirty="0"/>
           </a:p>
@@ -4938,10 +4844,9 @@
           <a:bodyPr/>
           <a:lstStyle/>
           <a:p>
-            <a:fld id="{B61BEF0D-F0BB-DE4B-95CE-6DB70DBA9567}" type="datetimeFigureOut">
-              <a:rPr lang="en-US" dirty="0"/>
-              <a:pPr/>
-              <a:t>9/25/2017</a:t>
+            <a:fld id="{6B903B12-225C-4E1B-97C4-5C9BAF9747F6}" type="datetime1">
+              <a:rPr lang="en-US" smtClean="0"/>
+              <a:t>2/4/2018</a:t>
             </a:fld>
             <a:endParaRPr lang="en-US" dirty="0"/>
           </a:p>
@@ -5053,10 +4958,9 @@
           <a:bodyPr/>
           <a:lstStyle/>
           <a:p>
-            <a:fld id="{B61BEF0D-F0BB-DE4B-95CE-6DB70DBA9567}" type="datetimeFigureOut">
-              <a:rPr lang="en-US" dirty="0"/>
-              <a:pPr/>
-              <a:t>9/25/2017</a:t>
+            <a:fld id="{0DBF0E80-EEBA-4911-9FFE-EE5B4FB0B0C4}" type="datetime1">
+              <a:rPr lang="en-US" smtClean="0"/>
+              <a:t>2/4/2018</a:t>
             </a:fld>
             <a:endParaRPr lang="en-US" dirty="0"/>
           </a:p>
@@ -5145,10 +5049,9 @@
           <a:bodyPr/>
           <a:lstStyle/>
           <a:p>
-            <a:fld id="{B61BEF0D-F0BB-DE4B-95CE-6DB70DBA9567}" type="datetimeFigureOut">
-              <a:rPr lang="en-US" dirty="0"/>
-              <a:pPr/>
-              <a:t>9/25/2017</a:t>
+            <a:fld id="{802BC30E-BE77-4BD6-825A-556CCECBBD5F}" type="datetime1">
+              <a:rPr lang="en-US" smtClean="0"/>
+              <a:t>2/4/2018</a:t>
             </a:fld>
             <a:endParaRPr lang="en-US" dirty="0"/>
           </a:p>
@@ -5425,10 +5328,9 @@
           <a:bodyPr/>
           <a:lstStyle/>
           <a:p>
-            <a:fld id="{B61BEF0D-F0BB-DE4B-95CE-6DB70DBA9567}" type="datetimeFigureOut">
-              <a:rPr lang="en-US" dirty="0"/>
-              <a:pPr/>
-              <a:t>9/25/2017</a:t>
+            <a:fld id="{01AE9536-3169-430D-A3EC-03C1DAAD324C}" type="datetime1">
+              <a:rPr lang="en-US" smtClean="0"/>
+              <a:t>2/4/2018</a:t>
             </a:fld>
             <a:endParaRPr lang="en-US" dirty="0"/>
           </a:p>
@@ -5713,10 +5615,9 @@
           <a:bodyPr/>
           <a:lstStyle/>
           <a:p>
-            <a:fld id="{B61BEF0D-F0BB-DE4B-95CE-6DB70DBA9567}" type="datetimeFigureOut">
-              <a:rPr lang="en-US" dirty="0"/>
-              <a:pPr/>
-              <a:t>9/25/2017</a:t>
+            <a:fld id="{17BAD071-1EB6-4379-8228-408A106BFDF0}" type="datetime1">
+              <a:rPr lang="en-US" smtClean="0"/>
+              <a:t>2/4/2018</a:t>
             </a:fld>
             <a:endParaRPr lang="en-US" dirty="0"/>
           </a:p>
@@ -6240,10 +6141,9 @@
             </a:lvl1pPr>
           </a:lstStyle>
           <a:p>
-            <a:fld id="{B61BEF0D-F0BB-DE4B-95CE-6DB70DBA9567}" type="datetimeFigureOut">
-              <a:rPr lang="en-US" dirty="0"/>
-              <a:pPr/>
-              <a:t>9/25/2017</a:t>
+            <a:fld id="{3D2EF4AA-A067-4041-90FF-0766BB9D10CB}" type="datetime1">
+              <a:rPr lang="en-US" smtClean="0"/>
+              <a:t>2/4/2018</a:t>
             </a:fld>
             <a:endParaRPr lang="en-US" dirty="0"/>
           </a:p>
@@ -6350,6 +6250,7 @@
     <p:sldLayoutId id="2147483658" r:id="rId16"/>
     <p:sldLayoutId id="2147483659" r:id="rId17"/>
   </p:sldLayoutIdLst>
+  <p:hf hdr="0" ftr="0" dt="0"/>
   <p:txStyles>
     <p:titleStyle>
       <a:lvl1pPr algn="ctr" defTabSz="457200" rtl="0" eaLnBrk="1" latinLnBrk="0" hangingPunct="1">
@@ -6816,8 +6717,8 @@
         </p:nvSpPr>
         <p:spPr>
           <a:xfrm>
-            <a:off x="1484310" y="6086765"/>
-            <a:ext cx="10018713" cy="498762"/>
+            <a:off x="1484310" y="5763491"/>
+            <a:ext cx="10018713" cy="822036"/>
           </a:xfrm>
           <a:prstGeom prst="rect">
             <a:avLst/>
@@ -6825,7 +6726,7 @@
         </p:spPr>
         <p:txBody>
           <a:bodyPr vert="horz" lIns="91440" tIns="45720" rIns="91440" bIns="45720" rtlCol="0" anchor="t">
-            <a:normAutofit/>
+            <a:normAutofit lnSpcReduction="10000"/>
           </a:bodyPr>
           <a:lstStyle>
             <a:lvl1pPr marL="0" indent="0" algn="r" defTabSz="457200" rtl="0" eaLnBrk="1" latinLnBrk="0" hangingPunct="1">
@@ -7072,20 +6973,71 @@
           </a:lstStyle>
           <a:p>
             <a:r>
-              <a:rPr lang="fr-FR"/>
-              <a:t>Source code: </a:t>
-            </a:r>
-            <a:r>
-              <a:rPr lang="fr-FR">
+              <a:rPr lang="en-US" dirty="0"/>
+              <a:t>Article: </a:t>
+            </a:r>
+            <a:r>
+              <a:rPr lang="en-US" dirty="0">
                 <a:hlinkClick r:id="rId2"/>
               </a:rPr>
+              <a:t>https://habrahabr.ru/post/341950/</a:t>
+            </a:r>
+            <a:r>
+              <a:rPr lang="en-US" dirty="0"/>
+              <a:t> </a:t>
+            </a:r>
+            <a:endParaRPr lang="ru-RU" dirty="0"/>
+          </a:p>
+          <a:p>
+            <a:r>
+              <a:rPr lang="fr-FR" dirty="0"/>
+              <a:t>Source code: </a:t>
+            </a:r>
+            <a:r>
+              <a:rPr lang="fr-FR" dirty="0">
+                <a:hlinkClick r:id="rId3"/>
+              </a:rPr>
               <a:t>https://github.com/sflusov/IISSharingAssemblies</a:t>
             </a:r>
             <a:r>
-              <a:rPr lang="ru-RU"/>
+              <a:rPr lang="ru-RU" dirty="0"/>
               <a:t> </a:t>
             </a:r>
-            <a:endParaRPr lang="ru-RU" dirty="0"/>
+          </a:p>
+        </p:txBody>
+      </p:sp>
+      <p:sp>
+        <p:nvSpPr>
+          <p:cNvPr id="5" name="Slide Number Placeholder 4">
+            <a:extLst>
+              <a:ext uri="{FF2B5EF4-FFF2-40B4-BE49-F238E27FC236}">
+                <a16:creationId xmlns:a16="http://schemas.microsoft.com/office/drawing/2014/main" id="{CC0E791C-162E-40C8-B155-52C3743AA1BA}"/>
+              </a:ext>
+            </a:extLst>
+          </p:cNvPr>
+          <p:cNvSpPr>
+            <a:spLocks noGrp="1"/>
+          </p:cNvSpPr>
+          <p:nvPr>
+            <p:ph type="sldNum" sz="quarter" idx="12"/>
+          </p:nvPr>
+        </p:nvSpPr>
+        <p:spPr>
+          <a:xfrm>
+            <a:off x="11503023" y="6220402"/>
+            <a:ext cx="551167" cy="365125"/>
+          </a:xfrm>
+        </p:spPr>
+        <p:txBody>
+          <a:bodyPr/>
+          <a:lstStyle/>
+          <a:p>
+            <a:fld id="{D57F1E4F-1CFF-5643-939E-217C01CDF565}" type="slidenum">
+              <a:rPr lang="en-US" sz="1400" smtClean="0"/>
+              <a:pPr/>
+              <a:t>1</a:t>
+            </a:fld>
+            <a:endParaRPr lang="en-US" sz="1400" dirty="0"/>
           </a:p>
         </p:txBody>
       </p:sp>
@@ -7124,7 +7076,7 @@
           <p:cNvPr id="2" name="Title 1">
             <a:extLst>
               <a:ext uri="{FF2B5EF4-FFF2-40B4-BE49-F238E27FC236}">
-                <a16:creationId xmlns:a16="http://schemas.microsoft.com/office/drawing/2014/main" id="{681983DC-0BFC-4912-8AC2-40307BE36C21}"/>
+                <a16:creationId xmlns:a16="http://schemas.microsoft.com/office/drawing/2014/main" id="{09619E5A-9C6F-46E0-8395-140AC3D184CD}"/>
               </a:ext>
             </a:extLst>
           </p:cNvPr>
@@ -7135,21 +7087,28 @@
             <p:ph type="title"/>
           </p:nvPr>
         </p:nvSpPr>
-        <p:spPr/>
-        <p:txBody>
-          <a:bodyPr/>
+        <p:spPr>
+          <a:xfrm>
+            <a:off x="1484311" y="685801"/>
+            <a:ext cx="10018713" cy="1066800"/>
+          </a:xfrm>
+        </p:spPr>
+        <p:txBody>
+          <a:bodyPr>
+            <a:normAutofit fontScale="90000"/>
+          </a:bodyPr>
           <a:lstStyle/>
           <a:p>
             <a:r>
               <a:rPr lang="en-US" dirty="0"/>
-              <a:t>Sharing assemblies between processes. </a:t>
+              <a:t>Sharing assemblies between application domains. </a:t>
             </a:r>
             <a:br>
               <a:rPr lang="en-US" dirty="0"/>
             </a:br>
             <a:r>
               <a:rPr lang="en-US" dirty="0"/>
-              <a:t>Concept native images.</a:t>
+              <a:t>Concept domain neutral assembly. </a:t>
             </a:r>
           </a:p>
         </p:txBody>
@@ -7159,7 +7118,7 @@
           <p:cNvPr id="3" name="Content Placeholder 2">
             <a:extLst>
               <a:ext uri="{FF2B5EF4-FFF2-40B4-BE49-F238E27FC236}">
-                <a16:creationId xmlns:a16="http://schemas.microsoft.com/office/drawing/2014/main" id="{57DD25CA-97D9-48EE-A325-6D58C41EB68C}"/>
+                <a16:creationId xmlns:a16="http://schemas.microsoft.com/office/drawing/2014/main" id="{F5BF9354-5E70-4F1E-9E61-289C2FB3ED00}"/>
               </a:ext>
             </a:extLst>
           </p:cNvPr>
@@ -7170,31 +7129,143 @@
             <p:ph idx="1"/>
           </p:nvPr>
         </p:nvSpPr>
+        <p:spPr>
+          <a:xfrm>
+            <a:off x="1484310" y="2242127"/>
+            <a:ext cx="10018713" cy="3124201"/>
+          </a:xfrm>
+        </p:spPr>
+        <p:txBody>
+          <a:bodyPr>
+            <a:normAutofit/>
+          </a:bodyPr>
+          <a:lstStyle/>
+          <a:p>
+            <a:pPr marL="0" indent="0" algn="ctr">
+              <a:buNone/>
+            </a:pPr>
+            <a:r>
+              <a:rPr lang="en-US" b="1" dirty="0"/>
+              <a:t>Strong Named Assemblies Belong in the GAC </a:t>
+            </a:r>
+          </a:p>
+          <a:p>
+            <a:pPr marL="0" indent="0">
+              <a:buNone/>
+            </a:pPr>
+            <a:r>
+              <a:rPr lang="en-US" dirty="0"/>
+              <a:t>If your assemblies have strong names, make sure to place them in the global assembly cache (GAC). </a:t>
+            </a:r>
+          </a:p>
+          <a:p>
+            <a:pPr marL="0" indent="0">
+              <a:buNone/>
+            </a:pPr>
+            <a:r>
+              <a:rPr lang="en-US" dirty="0"/>
+              <a:t>Otherwise, loading the assembly requires touching almost every page to verify its digital signature. </a:t>
+            </a:r>
+          </a:p>
+          <a:p>
+            <a:pPr marL="0" indent="0">
+              <a:buNone/>
+            </a:pPr>
+            <a:r>
+              <a:rPr lang="en-US" dirty="0"/>
+              <a:t>Verification of strong names when the assembly is not placed in the GAC will also diminish any performance gains from </a:t>
+            </a:r>
+            <a:r>
+              <a:rPr lang="en-US" dirty="0" err="1"/>
+              <a:t>NGen</a:t>
+            </a:r>
+            <a:r>
+              <a:rPr lang="en-US" dirty="0"/>
+              <a:t>.</a:t>
+            </a:r>
+            <a:endParaRPr lang="en-US" i="1" dirty="0"/>
+          </a:p>
+        </p:txBody>
+      </p:sp>
+      <p:sp>
+        <p:nvSpPr>
+          <p:cNvPr id="4" name="TextBox 3">
+            <a:extLst>
+              <a:ext uri="{FF2B5EF4-FFF2-40B4-BE49-F238E27FC236}">
+                <a16:creationId xmlns:a16="http://schemas.microsoft.com/office/drawing/2014/main" id="{A7C2A8CC-7366-4646-9717-10016A06F742}"/>
+              </a:ext>
+            </a:extLst>
+          </p:cNvPr>
+          <p:cNvSpPr txBox="1"/>
+          <p:nvPr/>
+        </p:nvSpPr>
+        <p:spPr>
+          <a:xfrm>
+            <a:off x="4494070" y="5855854"/>
+            <a:ext cx="7008953" cy="646331"/>
+          </a:xfrm>
+          <a:prstGeom prst="rect">
+            <a:avLst/>
+          </a:prstGeom>
+          <a:noFill/>
+        </p:spPr>
+        <p:txBody>
+          <a:bodyPr wrap="square" rtlCol="0">
+            <a:spAutoFit/>
+          </a:bodyPr>
+          <a:lstStyle/>
+          <a:p>
+            <a:r>
+              <a:rPr lang="en-US" dirty="0"/>
+              <a:t>See also: </a:t>
+            </a:r>
+          </a:p>
+          <a:p>
+            <a:pPr marL="285750" indent="-285750">
+              <a:buFont typeface="Arial" panose="020B0604020202020204" pitchFamily="34" charset="0"/>
+              <a:buChar char="•"/>
+            </a:pPr>
+            <a:r>
+              <a:rPr lang="en-US" dirty="0"/>
+              <a:t>Pro .NET Performance: Optimize Your C# Applications. Page 289</a:t>
+            </a:r>
+          </a:p>
+        </p:txBody>
+      </p:sp>
+      <p:sp>
+        <p:nvSpPr>
+          <p:cNvPr id="6" name="Slide Number Placeholder 5">
+            <a:extLst>
+              <a:ext uri="{FF2B5EF4-FFF2-40B4-BE49-F238E27FC236}">
+                <a16:creationId xmlns:a16="http://schemas.microsoft.com/office/drawing/2014/main" id="{EB36F3E7-B493-4F15-956C-F85C1572B764}"/>
+              </a:ext>
+            </a:extLst>
+          </p:cNvPr>
+          <p:cNvSpPr>
+            <a:spLocks noGrp="1"/>
+          </p:cNvSpPr>
+          <p:nvPr>
+            <p:ph type="sldNum" sz="quarter" idx="12"/>
+          </p:nvPr>
+        </p:nvSpPr>
         <p:spPr/>
         <p:txBody>
           <a:bodyPr/>
           <a:lstStyle/>
           <a:p>
-            <a:pPr marL="0" indent="0">
-              <a:buNone/>
-            </a:pPr>
-            <a:r>
-              <a:rPr lang="en-US" dirty="0"/>
-              <a:t>Remarks:</a:t>
-            </a:r>
-          </a:p>
-          <a:p>
-            <a:r>
-              <a:rPr lang="en-US" dirty="0"/>
-              <a:t>Always use domain-neutral code when loading the same assembly into multiple application domains. If a native image is loaded into a nonshared application domain after having been loaded into a shared domain, it cannot be used.</a:t>
-            </a:r>
+            <a:fld id="{D57F1E4F-1CFF-5643-939E-217C01CDF565}" type="slidenum">
+              <a:rPr lang="en-US" sz="1400" smtClean="0"/>
+              <a:pPr/>
+              <a:t>10</a:t>
+            </a:fld>
+            <a:endParaRPr lang="en-US" sz="1400" dirty="0"/>
           </a:p>
         </p:txBody>
       </p:sp>
     </p:spTree>
     <p:extLst>
       <p:ext uri="{BB962C8B-B14F-4D97-AF65-F5344CB8AC3E}">
-        <p14:creationId xmlns:p14="http://schemas.microsoft.com/office/powerpoint/2010/main" val="2700701014"/>
+        <p14:creationId xmlns:p14="http://schemas.microsoft.com/office/powerpoint/2010/main" val="3233133832"/>
       </p:ext>
     </p:extLst>
   </p:cSld>
@@ -7223,6 +7294,379 @@
       </p:grpSpPr>
       <p:sp>
         <p:nvSpPr>
+          <p:cNvPr id="2" name="Title 1">
+            <a:extLst>
+              <a:ext uri="{FF2B5EF4-FFF2-40B4-BE49-F238E27FC236}">
+                <a16:creationId xmlns:a16="http://schemas.microsoft.com/office/drawing/2014/main" id="{A0E7C6FB-3B10-4AC3-B4B3-D5F95CDB8ACD}"/>
+              </a:ext>
+            </a:extLst>
+          </p:cNvPr>
+          <p:cNvSpPr>
+            <a:spLocks noGrp="1"/>
+          </p:cNvSpPr>
+          <p:nvPr>
+            <p:ph type="title"/>
+          </p:nvPr>
+        </p:nvSpPr>
+        <p:spPr>
+          <a:xfrm>
+            <a:off x="1484311" y="685800"/>
+            <a:ext cx="10018713" cy="923925"/>
+          </a:xfrm>
+        </p:spPr>
+        <p:txBody>
+          <a:bodyPr>
+            <a:normAutofit fontScale="90000"/>
+          </a:bodyPr>
+          <a:lstStyle/>
+          <a:p>
+            <a:r>
+              <a:rPr lang="en-US" dirty="0"/>
+              <a:t>Sharing assemblies between processes. </a:t>
+            </a:r>
+            <a:br>
+              <a:rPr lang="en-US" dirty="0"/>
+            </a:br>
+            <a:r>
+              <a:rPr lang="en-US" dirty="0"/>
+              <a:t>Concept native images.</a:t>
+            </a:r>
+          </a:p>
+        </p:txBody>
+      </p:sp>
+      <p:sp>
+        <p:nvSpPr>
+          <p:cNvPr id="3" name="Content Placeholder 2">
+            <a:extLst>
+              <a:ext uri="{FF2B5EF4-FFF2-40B4-BE49-F238E27FC236}">
+                <a16:creationId xmlns:a16="http://schemas.microsoft.com/office/drawing/2014/main" id="{52B8DBDA-8455-4186-8C64-D98E6D1C6A48}"/>
+              </a:ext>
+            </a:extLst>
+          </p:cNvPr>
+          <p:cNvSpPr>
+            <a:spLocks noGrp="1"/>
+          </p:cNvSpPr>
+          <p:nvPr>
+            <p:ph idx="1"/>
+          </p:nvPr>
+        </p:nvSpPr>
+        <p:spPr>
+          <a:xfrm>
+            <a:off x="1484310" y="2495549"/>
+            <a:ext cx="10018713" cy="3124201"/>
+          </a:xfrm>
+        </p:spPr>
+        <p:txBody>
+          <a:bodyPr/>
+          <a:lstStyle/>
+          <a:p>
+            <a:pPr marL="0" indent="0">
+              <a:buNone/>
+            </a:pPr>
+            <a:r>
+              <a:rPr lang="en-US" dirty="0"/>
+              <a:t>Summary of usage</a:t>
+            </a:r>
+          </a:p>
+          <a:p>
+            <a:r>
+              <a:rPr lang="en-US" dirty="0"/>
+              <a:t>Native images enable code sharing between processes.</a:t>
+            </a:r>
+          </a:p>
+          <a:p>
+            <a:r>
+              <a:rPr lang="en-US" dirty="0"/>
+              <a:t>Native images require a smaller initial working set because there is no need for the JIT compiler.</a:t>
+            </a:r>
+          </a:p>
+          <a:p>
+            <a:r>
+              <a:rPr lang="en-US" dirty="0"/>
+              <a:t>Native images load faster than MSIL because they eliminate the need for many startup activities, such as JIT compilation and type-safety verification.</a:t>
+            </a:r>
+          </a:p>
+          <a:p>
+            <a:endParaRPr lang="en-US" dirty="0"/>
+          </a:p>
+        </p:txBody>
+      </p:sp>
+      <p:sp>
+        <p:nvSpPr>
+          <p:cNvPr id="4" name="TextBox 3">
+            <a:extLst>
+              <a:ext uri="{FF2B5EF4-FFF2-40B4-BE49-F238E27FC236}">
+                <a16:creationId xmlns:a16="http://schemas.microsoft.com/office/drawing/2014/main" id="{9F770282-ED54-4DDB-AEC9-2A6F9A6B6553}"/>
+              </a:ext>
+            </a:extLst>
+          </p:cNvPr>
+          <p:cNvSpPr txBox="1"/>
+          <p:nvPr/>
+        </p:nvSpPr>
+        <p:spPr>
+          <a:xfrm>
+            <a:off x="2466975" y="6057900"/>
+            <a:ext cx="9036047" cy="646331"/>
+          </a:xfrm>
+          <a:prstGeom prst="rect">
+            <a:avLst/>
+          </a:prstGeom>
+          <a:noFill/>
+        </p:spPr>
+        <p:txBody>
+          <a:bodyPr wrap="square" rtlCol="0">
+            <a:spAutoFit/>
+          </a:bodyPr>
+          <a:lstStyle/>
+          <a:p>
+            <a:r>
+              <a:rPr lang="en-US" dirty="0"/>
+              <a:t>See also:</a:t>
+            </a:r>
+          </a:p>
+          <a:p>
+            <a:r>
+              <a:rPr lang="en-US" dirty="0">
+                <a:hlinkClick r:id="rId2"/>
+              </a:rPr>
+              <a:t>https://docs.microsoft.com/en-us/dotnet/framework/tools/ngen-exe-native-image-generator</a:t>
+            </a:r>
+            <a:r>
+              <a:rPr lang="en-US" dirty="0"/>
+              <a:t> </a:t>
+            </a:r>
+          </a:p>
+        </p:txBody>
+      </p:sp>
+      <p:sp>
+        <p:nvSpPr>
+          <p:cNvPr id="5" name="TextBox 4">
+            <a:extLst>
+              <a:ext uri="{FF2B5EF4-FFF2-40B4-BE49-F238E27FC236}">
+                <a16:creationId xmlns:a16="http://schemas.microsoft.com/office/drawing/2014/main" id="{E68C30F3-ABD5-402C-B90F-325DDF5E4314}"/>
+              </a:ext>
+            </a:extLst>
+          </p:cNvPr>
+          <p:cNvSpPr txBox="1"/>
+          <p:nvPr/>
+        </p:nvSpPr>
+        <p:spPr>
+          <a:xfrm>
+            <a:off x="4705869" y="1819275"/>
+            <a:ext cx="4328621" cy="430887"/>
+          </a:xfrm>
+          <a:prstGeom prst="rect">
+            <a:avLst/>
+          </a:prstGeom>
+          <a:noFill/>
+        </p:spPr>
+        <p:txBody>
+          <a:bodyPr wrap="none" rtlCol="0">
+            <a:spAutoFit/>
+          </a:bodyPr>
+          <a:lstStyle/>
+          <a:p>
+            <a:r>
+              <a:rPr lang="de-DE" sz="2200" dirty="0"/>
+              <a:t>Ngen.exe (Native Image Generator)</a:t>
+            </a:r>
+          </a:p>
+        </p:txBody>
+      </p:sp>
+      <p:sp>
+        <p:nvSpPr>
+          <p:cNvPr id="7" name="Slide Number Placeholder 6">
+            <a:extLst>
+              <a:ext uri="{FF2B5EF4-FFF2-40B4-BE49-F238E27FC236}">
+                <a16:creationId xmlns:a16="http://schemas.microsoft.com/office/drawing/2014/main" id="{1D1F79DF-CB4C-4728-8219-3A6CD6D87348}"/>
+              </a:ext>
+            </a:extLst>
+          </p:cNvPr>
+          <p:cNvSpPr>
+            <a:spLocks noGrp="1"/>
+          </p:cNvSpPr>
+          <p:nvPr>
+            <p:ph type="sldNum" sz="quarter" idx="12"/>
+          </p:nvPr>
+        </p:nvSpPr>
+        <p:spPr/>
+        <p:txBody>
+          <a:bodyPr/>
+          <a:lstStyle/>
+          <a:p>
+            <a:fld id="{D57F1E4F-1CFF-5643-939E-217C01CDF565}" type="slidenum">
+              <a:rPr lang="en-US" sz="1400" smtClean="0"/>
+              <a:pPr/>
+              <a:t>11</a:t>
+            </a:fld>
+            <a:endParaRPr lang="en-US" sz="1400" dirty="0"/>
+          </a:p>
+        </p:txBody>
+      </p:sp>
+    </p:spTree>
+    <p:extLst>
+      <p:ext uri="{BB962C8B-B14F-4D97-AF65-F5344CB8AC3E}">
+        <p14:creationId xmlns:p14="http://schemas.microsoft.com/office/powerpoint/2010/main" val="2254905752"/>
+      </p:ext>
+    </p:extLst>
+  </p:cSld>
+  <p:clrMapOvr>
+    <a:masterClrMapping/>
+  </p:clrMapOvr>
+</p:sld>
+</file>
+
+<file path=ppt/slides/slide12.xml><?xml version="1.0" encoding="utf-8"?>
+<p:sld xmlns:a="http://schemas.openxmlformats.org/drawingml/2006/main" xmlns:r="http://schemas.openxmlformats.org/officeDocument/2006/relationships" xmlns:p="http://schemas.openxmlformats.org/presentationml/2006/main">
+  <p:cSld>
+    <p:spTree>
+      <p:nvGrpSpPr>
+        <p:cNvPr id="1" name=""/>
+        <p:cNvGrpSpPr/>
+        <p:nvPr/>
+      </p:nvGrpSpPr>
+      <p:grpSpPr>
+        <a:xfrm>
+          <a:off x="0" y="0"/>
+          <a:ext cx="0" cy="0"/>
+          <a:chOff x="0" y="0"/>
+          <a:chExt cx="0" cy="0"/>
+        </a:xfrm>
+      </p:grpSpPr>
+      <p:sp>
+        <p:nvSpPr>
+          <p:cNvPr id="2" name="Title 1">
+            <a:extLst>
+              <a:ext uri="{FF2B5EF4-FFF2-40B4-BE49-F238E27FC236}">
+                <a16:creationId xmlns:a16="http://schemas.microsoft.com/office/drawing/2014/main" id="{681983DC-0BFC-4912-8AC2-40307BE36C21}"/>
+              </a:ext>
+            </a:extLst>
+          </p:cNvPr>
+          <p:cNvSpPr>
+            <a:spLocks noGrp="1"/>
+          </p:cNvSpPr>
+          <p:nvPr>
+            <p:ph type="title"/>
+          </p:nvPr>
+        </p:nvSpPr>
+        <p:spPr/>
+        <p:txBody>
+          <a:bodyPr/>
+          <a:lstStyle/>
+          <a:p>
+            <a:r>
+              <a:rPr lang="en-US" dirty="0"/>
+              <a:t>Sharing assemblies between processes. </a:t>
+            </a:r>
+            <a:br>
+              <a:rPr lang="en-US" dirty="0"/>
+            </a:br>
+            <a:r>
+              <a:rPr lang="en-US" dirty="0"/>
+              <a:t>Concept native images.</a:t>
+            </a:r>
+          </a:p>
+        </p:txBody>
+      </p:sp>
+      <p:sp>
+        <p:nvSpPr>
+          <p:cNvPr id="3" name="Content Placeholder 2">
+            <a:extLst>
+              <a:ext uri="{FF2B5EF4-FFF2-40B4-BE49-F238E27FC236}">
+                <a16:creationId xmlns:a16="http://schemas.microsoft.com/office/drawing/2014/main" id="{57DD25CA-97D9-48EE-A325-6D58C41EB68C}"/>
+              </a:ext>
+            </a:extLst>
+          </p:cNvPr>
+          <p:cNvSpPr>
+            <a:spLocks noGrp="1"/>
+          </p:cNvSpPr>
+          <p:nvPr>
+            <p:ph idx="1"/>
+          </p:nvPr>
+        </p:nvSpPr>
+        <p:spPr/>
+        <p:txBody>
+          <a:bodyPr/>
+          <a:lstStyle/>
+          <a:p>
+            <a:pPr marL="0" indent="0">
+              <a:buNone/>
+            </a:pPr>
+            <a:r>
+              <a:rPr lang="en-US" dirty="0"/>
+              <a:t>Remarks:</a:t>
+            </a:r>
+          </a:p>
+          <a:p>
+            <a:r>
+              <a:rPr lang="en-US" dirty="0"/>
+              <a:t>Always use domain-neutral code when loading the same assembly into multiple application domains. If a native image is loaded into a nonshared application domain after having been loaded into a shared domain, it cannot be used.</a:t>
+            </a:r>
+          </a:p>
+        </p:txBody>
+      </p:sp>
+      <p:sp>
+        <p:nvSpPr>
+          <p:cNvPr id="5" name="Slide Number Placeholder 4">
+            <a:extLst>
+              <a:ext uri="{FF2B5EF4-FFF2-40B4-BE49-F238E27FC236}">
+                <a16:creationId xmlns:a16="http://schemas.microsoft.com/office/drawing/2014/main" id="{C8D945B7-D9BA-443E-AB7B-734C2E93BEFD}"/>
+              </a:ext>
+            </a:extLst>
+          </p:cNvPr>
+          <p:cNvSpPr>
+            <a:spLocks noGrp="1"/>
+          </p:cNvSpPr>
+          <p:nvPr>
+            <p:ph type="sldNum" sz="quarter" idx="12"/>
+          </p:nvPr>
+        </p:nvSpPr>
+        <p:spPr/>
+        <p:txBody>
+          <a:bodyPr/>
+          <a:lstStyle/>
+          <a:p>
+            <a:fld id="{D57F1E4F-1CFF-5643-939E-217C01CDF565}" type="slidenum">
+              <a:rPr lang="en-US" sz="1400" smtClean="0"/>
+              <a:pPr/>
+              <a:t>12</a:t>
+            </a:fld>
+            <a:endParaRPr lang="en-US" sz="1400" dirty="0"/>
+          </a:p>
+        </p:txBody>
+      </p:sp>
+    </p:spTree>
+    <p:extLst>
+      <p:ext uri="{BB962C8B-B14F-4D97-AF65-F5344CB8AC3E}">
+        <p14:creationId xmlns:p14="http://schemas.microsoft.com/office/powerpoint/2010/main" val="2700701014"/>
+      </p:ext>
+    </p:extLst>
+  </p:cSld>
+  <p:clrMapOvr>
+    <a:masterClrMapping/>
+  </p:clrMapOvr>
+</p:sld>
+</file>
+
+<file path=ppt/slides/slide13.xml><?xml version="1.0" encoding="utf-8"?>
+<p:sld xmlns:a="http://schemas.openxmlformats.org/drawingml/2006/main" xmlns:r="http://schemas.openxmlformats.org/officeDocument/2006/relationships" xmlns:p="http://schemas.openxmlformats.org/presentationml/2006/main">
+  <p:cSld>
+    <p:spTree>
+      <p:nvGrpSpPr>
+        <p:cNvPr id="1" name=""/>
+        <p:cNvGrpSpPr/>
+        <p:nvPr/>
+      </p:nvGrpSpPr>
+      <p:grpSpPr>
+        <a:xfrm>
+          <a:off x="0" y="0"/>
+          <a:ext cx="0" cy="0"/>
+          <a:chOff x="0" y="0"/>
+          <a:chExt cx="0" cy="0"/>
+        </a:xfrm>
+      </p:grpSpPr>
+      <p:sp>
+        <p:nvSpPr>
           <p:cNvPr id="2" name="Title 1"/>
           <p:cNvSpPr>
             <a:spLocks noGrp="1"/>
@@ -7255,8 +7699,8 @@
         </p:nvSpPr>
         <p:spPr>
           <a:xfrm>
-            <a:off x="1955363" y="4692073"/>
-            <a:ext cx="10018713" cy="1856509"/>
+            <a:off x="1955363" y="4331855"/>
+            <a:ext cx="10018713" cy="2216727"/>
           </a:xfrm>
         </p:spPr>
         <p:txBody>
@@ -7270,20 +7714,9 @@
             </a:pPr>
             <a:r>
               <a:rPr lang="fr-FR" dirty="0" err="1"/>
-              <a:t>Recommend</a:t>
-            </a:r>
-            <a:r>
-              <a:rPr lang="fr-FR" dirty="0"/>
-              <a:t> to </a:t>
-            </a:r>
-            <a:r>
-              <a:rPr lang="fr-FR" dirty="0" err="1"/>
-              <a:t>read</a:t>
-            </a:r>
-            <a:r>
-              <a:rPr lang="fr-FR" dirty="0"/>
-              <a:t>:</a:t>
-            </a:r>
+              <a:t>References</a:t>
+            </a:r>
+            <a:endParaRPr lang="fr-FR" dirty="0"/>
           </a:p>
           <a:p>
             <a:r>
@@ -7324,18 +7757,64 @@
           <a:p>
             <a:r>
               <a:rPr lang="fr-FR" dirty="0"/>
-              <a:t>Source code: </a:t>
+              <a:t>Article: </a:t>
             </a:r>
             <a:r>
               <a:rPr lang="fr-FR" dirty="0">
                 <a:hlinkClick r:id="rId5"/>
               </a:rPr>
+              <a:t>https://habrahabr.ru/post/341950/</a:t>
+            </a:r>
+            <a:r>
+              <a:rPr lang="fr-FR" dirty="0"/>
+              <a:t> </a:t>
+            </a:r>
+          </a:p>
+          <a:p>
+            <a:r>
+              <a:rPr lang="fr-FR" dirty="0"/>
+              <a:t>Source code: </a:t>
+            </a:r>
+            <a:r>
+              <a:rPr lang="fr-FR" dirty="0">
+                <a:hlinkClick r:id="rId6"/>
+              </a:rPr>
               <a:t>https://github.com/sflusov/IISSharingAssemblies</a:t>
             </a:r>
             <a:r>
               <a:rPr lang="ru-RU" dirty="0"/>
               <a:t> </a:t>
             </a:r>
+          </a:p>
+        </p:txBody>
+      </p:sp>
+      <p:sp>
+        <p:nvSpPr>
+          <p:cNvPr id="5" name="Slide Number Placeholder 4">
+            <a:extLst>
+              <a:ext uri="{FF2B5EF4-FFF2-40B4-BE49-F238E27FC236}">
+                <a16:creationId xmlns:a16="http://schemas.microsoft.com/office/drawing/2014/main" id="{F4206AE7-057A-40BB-B37D-77C7D6B484B0}"/>
+              </a:ext>
+            </a:extLst>
+          </p:cNvPr>
+          <p:cNvSpPr>
+            <a:spLocks noGrp="1"/>
+          </p:cNvSpPr>
+          <p:nvPr>
+            <p:ph type="sldNum" sz="quarter" idx="12"/>
+          </p:nvPr>
+        </p:nvSpPr>
+        <p:spPr/>
+        <p:txBody>
+          <a:bodyPr/>
+          <a:lstStyle/>
+          <a:p>
+            <a:fld id="{D57F1E4F-1CFF-5643-939E-217C01CDF565}" type="slidenum">
+              <a:rPr lang="en-US" sz="1400" smtClean="0"/>
+              <a:pPr/>
+              <a:t>13</a:t>
+            </a:fld>
+            <a:endParaRPr lang="en-US" sz="1400" dirty="0"/>
           </a:p>
         </p:txBody>
       </p:sp>
@@ -7562,6 +8041,36 @@
           </a:p>
         </p:txBody>
       </p:sp>
+      <p:sp>
+        <p:nvSpPr>
+          <p:cNvPr id="5" name="Slide Number Placeholder 4">
+            <a:extLst>
+              <a:ext uri="{FF2B5EF4-FFF2-40B4-BE49-F238E27FC236}">
+                <a16:creationId xmlns:a16="http://schemas.microsoft.com/office/drawing/2014/main" id="{965D5273-CD4A-4167-AF3A-FBCFC1172F8A}"/>
+              </a:ext>
+            </a:extLst>
+          </p:cNvPr>
+          <p:cNvSpPr>
+            <a:spLocks noGrp="1"/>
+          </p:cNvSpPr>
+          <p:nvPr>
+            <p:ph type="sldNum" sz="quarter" idx="12"/>
+          </p:nvPr>
+        </p:nvSpPr>
+        <p:spPr/>
+        <p:txBody>
+          <a:bodyPr/>
+          <a:lstStyle/>
+          <a:p>
+            <a:fld id="{D57F1E4F-1CFF-5643-939E-217C01CDF565}" type="slidenum">
+              <a:rPr lang="en-US" sz="1400" smtClean="0"/>
+              <a:pPr/>
+              <a:t>2</a:t>
+            </a:fld>
+            <a:endParaRPr lang="en-US" sz="1400" dirty="0"/>
+          </a:p>
+        </p:txBody>
+      </p:sp>
     </p:spTree>
     <p:extLst>
       <p:ext uri="{BB962C8B-B14F-4D97-AF65-F5344CB8AC3E}">
@@ -7647,15 +8156,7 @@
           <a:p>
             <a:r>
               <a:rPr lang="en-US" dirty="0"/>
-              <a:t>Why our applications use too much memory? </a:t>
-            </a:r>
-            <a:r>
-              <a:rPr lang="ru-RU" dirty="0"/>
-              <a:t> </a:t>
-            </a:r>
-            <a:r>
-              <a:rPr lang="en-US" dirty="0"/>
-              <a:t>What is the memory structure of our application?</a:t>
+              <a:t>What do you really mean by memory? Memory structure and types.</a:t>
             </a:r>
           </a:p>
           <a:p>
@@ -7678,6 +8179,36 @@
           </a:p>
           <a:p>
             <a:endParaRPr lang="ru-RU" dirty="0"/>
+          </a:p>
+        </p:txBody>
+      </p:sp>
+      <p:sp>
+        <p:nvSpPr>
+          <p:cNvPr id="5" name="Slide Number Placeholder 4">
+            <a:extLst>
+              <a:ext uri="{FF2B5EF4-FFF2-40B4-BE49-F238E27FC236}">
+                <a16:creationId xmlns:a16="http://schemas.microsoft.com/office/drawing/2014/main" id="{F43BC381-B53D-4A5D-97F7-9D3AA2B29C4D}"/>
+              </a:ext>
+            </a:extLst>
+          </p:cNvPr>
+          <p:cNvSpPr>
+            <a:spLocks noGrp="1"/>
+          </p:cNvSpPr>
+          <p:nvPr>
+            <p:ph type="sldNum" sz="quarter" idx="12"/>
+          </p:nvPr>
+        </p:nvSpPr>
+        <p:spPr/>
+        <p:txBody>
+          <a:bodyPr/>
+          <a:lstStyle/>
+          <a:p>
+            <a:fld id="{D57F1E4F-1CFF-5643-939E-217C01CDF565}" type="slidenum">
+              <a:rPr lang="en-US" sz="1400" smtClean="0"/>
+              <a:pPr/>
+              <a:t>3</a:t>
+            </a:fld>
+            <a:endParaRPr lang="en-US" sz="1400" dirty="0"/>
           </a:p>
         </p:txBody>
       </p:sp>
@@ -7729,8 +8260,8 @@
         </p:nvSpPr>
         <p:spPr>
           <a:xfrm>
-            <a:off x="1484311" y="685801"/>
-            <a:ext cx="10018713" cy="1078344"/>
+            <a:off x="1484311" y="177801"/>
+            <a:ext cx="10018713" cy="487217"/>
           </a:xfrm>
         </p:spPr>
         <p:txBody>
@@ -7741,65 +8272,7 @@
           <a:p>
             <a:r>
               <a:rPr lang="en-US" dirty="0"/>
-              <a:t>Why our applications use too much memory? </a:t>
-            </a:r>
-            <a:r>
-              <a:rPr lang="ru-RU" dirty="0"/>
-              <a:t> </a:t>
-            </a:r>
-            <a:br>
-              <a:rPr lang="ru-RU" dirty="0"/>
-            </a:br>
-            <a:r>
-              <a:rPr lang="en-US" dirty="0"/>
-              <a:t>What is the memory structure of our application?</a:t>
-            </a:r>
-            <a:br>
-              <a:rPr lang="en-US" dirty="0"/>
-            </a:br>
-            <a:endParaRPr lang="en-US" dirty="0"/>
-          </a:p>
-        </p:txBody>
-      </p:sp>
-      <p:sp>
-        <p:nvSpPr>
-          <p:cNvPr id="6" name="TextBox 5">
-            <a:extLst>
-              <a:ext uri="{FF2B5EF4-FFF2-40B4-BE49-F238E27FC236}">
-                <a16:creationId xmlns:a16="http://schemas.microsoft.com/office/drawing/2014/main" id="{46480F8A-F9F7-45EF-BDC9-17A948074BE7}"/>
-              </a:ext>
-            </a:extLst>
-          </p:cNvPr>
-          <p:cNvSpPr txBox="1"/>
-          <p:nvPr/>
-        </p:nvSpPr>
-        <p:spPr>
-          <a:xfrm>
-            <a:off x="1484311" y="1764145"/>
-            <a:ext cx="5344989" cy="369332"/>
-          </a:xfrm>
-          <a:prstGeom prst="rect">
-            <a:avLst/>
-          </a:prstGeom>
-          <a:noFill/>
-        </p:spPr>
-        <p:txBody>
-          <a:bodyPr wrap="none" rtlCol="0">
-            <a:spAutoFit/>
-          </a:bodyPr>
-          <a:lstStyle/>
-          <a:p>
-            <a:r>
-              <a:rPr lang="en-US" dirty="0"/>
-              <a:t>Open </a:t>
-            </a:r>
-            <a:r>
-              <a:rPr lang="en-US" dirty="0" err="1"/>
-              <a:t>VMMap</a:t>
-            </a:r>
-            <a:r>
-              <a:rPr lang="en-US" dirty="0"/>
-              <a:t> and have a look of application structure.</a:t>
+              <a:t>What do you really mean by memory?</a:t>
             </a:r>
           </a:p>
         </p:txBody>
@@ -7818,8 +8291,8 @@
         </p:nvSpPr>
         <p:spPr>
           <a:xfrm>
-            <a:off x="1484311" y="5525254"/>
-            <a:ext cx="10127849" cy="923330"/>
+            <a:off x="2468618" y="6098184"/>
+            <a:ext cx="9470017" cy="646331"/>
           </a:xfrm>
           <a:prstGeom prst="rect">
             <a:avLst/>
@@ -7849,24 +8322,6 @@
               <a:t>http://blogs.microsoft.co.il/sasha/2016/01/05/windows-process-memory-usage-demystified/</a:t>
             </a:r>
             <a:endParaRPr lang="en-US" dirty="0"/>
-          </a:p>
-          <a:p>
-            <a:pPr marL="285750" indent="-285750">
-              <a:buFont typeface="Arial" panose="020B0604020202020204" pitchFamily="34" charset="0"/>
-              <a:buChar char="•"/>
-            </a:pPr>
-            <a:r>
-              <a:rPr lang="en-US" dirty="0"/>
-              <a:t>Windows® </a:t>
-            </a:r>
-            <a:r>
-              <a:rPr lang="en-US" dirty="0" err="1"/>
-              <a:t>Sysinternals</a:t>
-            </a:r>
-            <a:r>
-              <a:rPr lang="en-US" dirty="0"/>
-              <a:t> Administrator’s Reference. Pages 216-218</a:t>
-            </a:r>
           </a:p>
         </p:txBody>
       </p:sp>
@@ -7884,8 +8339,8 @@
         </p:nvSpPr>
         <p:spPr>
           <a:xfrm>
-            <a:off x="8640052" y="1557676"/>
-            <a:ext cx="2981343" cy="5632311"/>
+            <a:off x="6659420" y="1357736"/>
+            <a:ext cx="2981343" cy="923330"/>
           </a:xfrm>
           <a:prstGeom prst="rect">
             <a:avLst/>
@@ -7900,7 +8355,7 @@
           <a:p>
             <a:r>
               <a:rPr lang="en-US" dirty="0"/>
-              <a:t>Bar graphs:</a:t>
+              <a:t>Virtual memory:</a:t>
             </a:r>
           </a:p>
           <a:p>
@@ -7910,7 +8365,7 @@
             </a:pPr>
             <a:r>
               <a:rPr lang="en-US" dirty="0"/>
-              <a:t>Private Bytes - virtual memory. </a:t>
+              <a:t>32-bit - 2GB per process</a:t>
             </a:r>
           </a:p>
           <a:p>
@@ -7920,91 +8375,47 @@
             </a:pPr>
             <a:r>
               <a:rPr lang="en-US" dirty="0"/>
-              <a:t>Working set   - physical memory</a:t>
-            </a:r>
-            <a:br>
-              <a:rPr lang="en-US" dirty="0"/>
-            </a:br>
-            <a:endParaRPr lang="en-US" dirty="0"/>
-          </a:p>
-          <a:p>
-            <a:r>
-              <a:rPr lang="en-US" dirty="0"/>
-              <a:t>Columns:</a:t>
-            </a:r>
-          </a:p>
-          <a:p>
-            <a:pPr marL="285750" indent="-285750">
-              <a:buFont typeface="Arial" panose="020B0604020202020204" pitchFamily="34" charset="0"/>
-              <a:buChar char="•"/>
-            </a:pPr>
-            <a:r>
-              <a:rPr lang="en-US" dirty="0"/>
-              <a:t>Heap – memory allocated C/C++ runtime</a:t>
-            </a:r>
-          </a:p>
-          <a:p>
-            <a:pPr marL="285750" indent="-285750">
-              <a:buFont typeface="Arial" panose="020B0604020202020204" pitchFamily="34" charset="0"/>
-              <a:buChar char="•"/>
-            </a:pPr>
-            <a:r>
-              <a:rPr lang="en-US" dirty="0"/>
-              <a:t>Managed Heap - memory allocated .NET runtime</a:t>
-            </a:r>
-          </a:p>
-          <a:p>
-            <a:pPr marL="285750" indent="-285750">
-              <a:buFont typeface="Arial" panose="020B0604020202020204" pitchFamily="34" charset="0"/>
-              <a:buChar char="•"/>
-            </a:pPr>
-            <a:r>
-              <a:rPr lang="en-US" dirty="0"/>
-              <a:t>Page Table - memory associated with the process’ page tables. </a:t>
-            </a:r>
-          </a:p>
-          <a:p>
-            <a:pPr marL="285750" indent="-285750">
-              <a:buFont typeface="Arial" panose="020B0604020202020204" pitchFamily="34" charset="0"/>
-              <a:buChar char="•"/>
-            </a:pPr>
-            <a:endParaRPr lang="en-US" dirty="0"/>
-          </a:p>
-          <a:p>
-            <a:pPr marL="285750" indent="-285750">
-              <a:buFont typeface="Arial" panose="020B0604020202020204" pitchFamily="34" charset="0"/>
-              <a:buChar char="•"/>
-            </a:pPr>
-            <a:endParaRPr lang="en-US" dirty="0"/>
-          </a:p>
-          <a:p>
-            <a:pPr marL="285750" indent="-285750">
-              <a:buFont typeface="Arial" panose="020B0604020202020204" pitchFamily="34" charset="0"/>
-              <a:buChar char="•"/>
-            </a:pPr>
-            <a:endParaRPr lang="en-US" dirty="0"/>
-          </a:p>
-          <a:p>
-            <a:pPr marL="285750" indent="-285750">
-              <a:buFont typeface="Arial" panose="020B0604020202020204" pitchFamily="34" charset="0"/>
-              <a:buChar char="•"/>
-            </a:pPr>
-            <a:endParaRPr lang="en-US" dirty="0"/>
-          </a:p>
-          <a:p>
-            <a:br>
-              <a:rPr lang="en-US" dirty="0"/>
-            </a:br>
-            <a:endParaRPr lang="en-US" dirty="0"/>
+              <a:t>64-bit – 128TB per process</a:t>
+            </a:r>
+          </a:p>
+        </p:txBody>
+      </p:sp>
+      <p:sp>
+        <p:nvSpPr>
+          <p:cNvPr id="4" name="Slide Number Placeholder 3">
+            <a:extLst>
+              <a:ext uri="{FF2B5EF4-FFF2-40B4-BE49-F238E27FC236}">
+                <a16:creationId xmlns:a16="http://schemas.microsoft.com/office/drawing/2014/main" id="{AAB1DB65-03D9-4F67-9534-E6E8E0195CB1}"/>
+              </a:ext>
+            </a:extLst>
+          </p:cNvPr>
+          <p:cNvSpPr>
+            <a:spLocks noGrp="1"/>
+          </p:cNvSpPr>
+          <p:nvPr>
+            <p:ph type="sldNum" sz="quarter" idx="12"/>
+          </p:nvPr>
+        </p:nvSpPr>
+        <p:spPr/>
+        <p:txBody>
+          <a:bodyPr/>
+          <a:lstStyle/>
+          <a:p>
+            <a:fld id="{D57F1E4F-1CFF-5643-939E-217C01CDF565}" type="slidenum">
+              <a:rPr lang="en-US" sz="1400" smtClean="0"/>
+              <a:pPr/>
+              <a:t>4</a:t>
+            </a:fld>
+            <a:endParaRPr lang="en-US" sz="1400" dirty="0"/>
           </a:p>
         </p:txBody>
       </p:sp>
       <p:pic>
         <p:nvPicPr>
-          <p:cNvPr id="12" name="Picture 11">
+          <p:cNvPr id="5" name="Picture 4">
             <a:extLst>
               <a:ext uri="{FF2B5EF4-FFF2-40B4-BE49-F238E27FC236}">
-                <a16:creationId xmlns:a16="http://schemas.microsoft.com/office/drawing/2014/main" id="{8A039B81-8AE1-4508-B536-3B1B49E59504}"/>
+                <a16:creationId xmlns:a16="http://schemas.microsoft.com/office/drawing/2014/main" id="{B5B23CEE-4A24-4E44-9AF6-69D98E7046A0}"/>
               </a:ext>
             </a:extLst>
           </p:cNvPr>
@@ -8021,14 +8432,51 @@
         </p:blipFill>
         <p:spPr>
           <a:xfrm>
-            <a:off x="2223218" y="2198132"/>
-            <a:ext cx="5187077" cy="3313741"/>
+            <a:off x="2788340" y="1357736"/>
+            <a:ext cx="2744241" cy="4351014"/>
           </a:xfrm>
           <a:prstGeom prst="rect">
             <a:avLst/>
           </a:prstGeom>
         </p:spPr>
       </p:pic>
+      <p:sp>
+        <p:nvSpPr>
+          <p:cNvPr id="11" name="TextBox 10">
+            <a:extLst>
+              <a:ext uri="{FF2B5EF4-FFF2-40B4-BE49-F238E27FC236}">
+                <a16:creationId xmlns:a16="http://schemas.microsoft.com/office/drawing/2014/main" id="{EA8F18AD-9519-4EA3-928B-E6C09A7812C9}"/>
+              </a:ext>
+            </a:extLst>
+          </p:cNvPr>
+          <p:cNvSpPr txBox="1"/>
+          <p:nvPr/>
+        </p:nvSpPr>
+        <p:spPr>
+          <a:xfrm>
+            <a:off x="2688368" y="798534"/>
+            <a:ext cx="7231487" cy="369332"/>
+          </a:xfrm>
+          <a:prstGeom prst="rect">
+            <a:avLst/>
+          </a:prstGeom>
+          <a:noFill/>
+        </p:spPr>
+        <p:txBody>
+          <a:bodyPr wrap="square" rtlCol="0">
+            <a:spAutoFit/>
+          </a:bodyPr>
+          <a:lstStyle/>
+          <a:p>
+            <a:pPr algn="ctr"/>
+            <a:r>
+              <a:rPr lang="en-US" dirty="0"/>
+              <a:t>Virtual and physical memory</a:t>
+            </a:r>
+            <a:endParaRPr lang="en-US" i="1" dirty="0"/>
+          </a:p>
+        </p:txBody>
+      </p:sp>
     </p:spTree>
     <p:extLst>
       <p:ext uri="{BB962C8B-B14F-4D97-AF65-F5344CB8AC3E}">
@@ -8064,7 +8512,7 @@
           <p:cNvPr id="2" name="Title 1">
             <a:extLst>
               <a:ext uri="{FF2B5EF4-FFF2-40B4-BE49-F238E27FC236}">
-                <a16:creationId xmlns:a16="http://schemas.microsoft.com/office/drawing/2014/main" id="{B00600B4-DA4D-46C3-836C-DAB8881FC591}"/>
+                <a16:creationId xmlns:a16="http://schemas.microsoft.com/office/drawing/2014/main" id="{C22742A2-2CB0-47F6-A780-9FD6D9C090EA}"/>
               </a:ext>
             </a:extLst>
           </p:cNvPr>
@@ -8077,8 +8525,8 @@
         </p:nvSpPr>
         <p:spPr>
           <a:xfrm>
-            <a:off x="1484311" y="270163"/>
-            <a:ext cx="10018713" cy="1069109"/>
+            <a:off x="1484311" y="177801"/>
+            <a:ext cx="10018713" cy="487217"/>
           </a:xfrm>
         </p:spPr>
         <p:txBody>
@@ -8089,28 +8537,17 @@
           <a:p>
             <a:r>
               <a:rPr lang="en-US" dirty="0"/>
-              <a:t>Why our applications use too much memory? </a:t>
-            </a:r>
-            <a:r>
-              <a:rPr lang="ru-RU" dirty="0"/>
-              <a:t> </a:t>
-            </a:r>
-            <a:br>
-              <a:rPr lang="ru-RU" dirty="0"/>
-            </a:br>
-            <a:r>
-              <a:rPr lang="en-US" dirty="0"/>
-              <a:t>What is the memory structure of our application?</a:t>
-            </a:r>
-          </a:p>
-        </p:txBody>
-      </p:sp>
-      <p:sp>
-        <p:nvSpPr>
-          <p:cNvPr id="3" name="Content Placeholder 2">
+              <a:t>What do you really mean by memory?</a:t>
+            </a:r>
+          </a:p>
+        </p:txBody>
+      </p:sp>
+      <p:sp>
+        <p:nvSpPr>
+          <p:cNvPr id="4" name="Slide Number Placeholder 3">
             <a:extLst>
               <a:ext uri="{FF2B5EF4-FFF2-40B4-BE49-F238E27FC236}">
-                <a16:creationId xmlns:a16="http://schemas.microsoft.com/office/drawing/2014/main" id="{DDB0F7C2-5B65-462F-9B06-BD6818935854}"/>
+                <a16:creationId xmlns:a16="http://schemas.microsoft.com/office/drawing/2014/main" id="{AAB1DB65-03D9-4F67-9534-E6E8E0195CB1}"/>
               </a:ext>
             </a:extLst>
           </p:cNvPr>
@@ -8118,47 +8555,59 @@
             <a:spLocks noGrp="1"/>
           </p:cNvSpPr>
           <p:nvPr>
-            <p:ph idx="1"/>
-          </p:nvPr>
-        </p:nvSpPr>
+            <p:ph type="sldNum" sz="quarter" idx="12"/>
+          </p:nvPr>
+        </p:nvSpPr>
+        <p:spPr/>
+        <p:txBody>
+          <a:bodyPr/>
+          <a:lstStyle/>
+          <a:p>
+            <a:fld id="{D57F1E4F-1CFF-5643-939E-217C01CDF565}" type="slidenum">
+              <a:rPr lang="en-US" sz="1400" smtClean="0"/>
+              <a:pPr/>
+              <a:t>5</a:t>
+            </a:fld>
+            <a:endParaRPr lang="en-US" sz="1400" dirty="0"/>
+          </a:p>
+        </p:txBody>
+      </p:sp>
+      <p:pic>
+        <p:nvPicPr>
+          <p:cNvPr id="3" name="Picture 2">
+            <a:extLst>
+              <a:ext uri="{FF2B5EF4-FFF2-40B4-BE49-F238E27FC236}">
+                <a16:creationId xmlns:a16="http://schemas.microsoft.com/office/drawing/2014/main" id="{24593ECE-D13C-4C84-9662-5EA0C6045BC2}"/>
+              </a:ext>
+            </a:extLst>
+          </p:cNvPr>
+          <p:cNvPicPr>
+            <a:picLocks noChangeAspect="1"/>
+          </p:cNvPicPr>
+          <p:nvPr/>
+        </p:nvPicPr>
+        <p:blipFill>
+          <a:blip r:embed="rId2"/>
+          <a:stretch>
+            <a:fillRect/>
+          </a:stretch>
+        </p:blipFill>
         <p:spPr>
           <a:xfrm>
-            <a:off x="1484310" y="1623059"/>
-            <a:ext cx="10018713" cy="1996441"/>
+            <a:off x="359677" y="1529294"/>
+            <a:ext cx="4521839" cy="3775171"/>
           </a:xfrm>
+          <a:prstGeom prst="rect">
+            <a:avLst/>
+          </a:prstGeom>
         </p:spPr>
-        <p:txBody>
-          <a:bodyPr/>
-          <a:lstStyle/>
-          <a:p>
-            <a:pPr marL="0" indent="0">
-              <a:buNone/>
-            </a:pPr>
-            <a:r>
-              <a:rPr lang="en-US" b="1" dirty="0"/>
-              <a:t>Conclusion from slide:</a:t>
-            </a:r>
-          </a:p>
-          <a:p>
-            <a:r>
-              <a:rPr lang="en-US" dirty="0"/>
-              <a:t>61/158 – Image (loaded assembly)</a:t>
-            </a:r>
-          </a:p>
-          <a:p>
-            <a:r>
-              <a:rPr lang="en-US" dirty="0"/>
-              <a:t>40/158 – Page files (memory associated with process)</a:t>
-            </a:r>
-          </a:p>
-        </p:txBody>
-      </p:sp>
-      <p:sp>
-        <p:nvSpPr>
-          <p:cNvPr id="4" name="TextBox 3">
+      </p:pic>
+      <p:sp>
+        <p:nvSpPr>
+          <p:cNvPr id="8" name="TextBox 7">
             <a:extLst>
               <a:ext uri="{FF2B5EF4-FFF2-40B4-BE49-F238E27FC236}">
-                <a16:creationId xmlns:a16="http://schemas.microsoft.com/office/drawing/2014/main" id="{D82B27BB-6FF2-4DCC-94EB-D7B040BB9F83}"/>
+                <a16:creationId xmlns:a16="http://schemas.microsoft.com/office/drawing/2014/main" id="{CF5689F6-0FA8-43C3-BA8D-52B7CC29FB2C}"/>
               </a:ext>
             </a:extLst>
           </p:cNvPr>
@@ -8167,8 +8616,8 @@
         </p:nvSpPr>
         <p:spPr>
           <a:xfrm>
-            <a:off x="1484310" y="4800600"/>
-            <a:ext cx="10018713" cy="646331"/>
+            <a:off x="9029414" y="1529294"/>
+            <a:ext cx="2904440" cy="2308324"/>
           </a:xfrm>
           <a:prstGeom prst="rect">
             <a:avLst/>
@@ -8183,7 +8632,7 @@
           <a:p>
             <a:r>
               <a:rPr lang="en-US" dirty="0"/>
-              <a:t>Remarks:</a:t>
+              <a:t>Virtual memory:</a:t>
             </a:r>
           </a:p>
           <a:p>
@@ -8193,17 +8642,60 @@
             </a:pPr>
             <a:r>
               <a:rPr lang="en-US" dirty="0"/>
-              <a:t>JIT code included in Managed Heap, you can calculate them size as Managed Heap minus GC.</a:t>
-            </a:r>
-          </a:p>
-        </p:txBody>
-      </p:sp>
-      <p:sp>
-        <p:nvSpPr>
-          <p:cNvPr id="5" name="TextBox 4">
+              <a:t>Commit size</a:t>
+            </a:r>
+          </a:p>
+          <a:p>
+            <a:pPr marL="285750" indent="-285750">
+              <a:buFont typeface="Arial" panose="020B0604020202020204" pitchFamily="34" charset="0"/>
+              <a:buChar char="•"/>
+            </a:pPr>
+            <a:endParaRPr lang="en-US" dirty="0"/>
+          </a:p>
+          <a:p>
+            <a:r>
+              <a:rPr lang="en-US" dirty="0"/>
+              <a:t>Physical memory:</a:t>
+            </a:r>
+          </a:p>
+          <a:p>
+            <a:pPr marL="285750" indent="-285750">
+              <a:buFont typeface="Arial" panose="020B0604020202020204" pitchFamily="34" charset="0"/>
+              <a:buChar char="•"/>
+            </a:pPr>
+            <a:r>
+              <a:rPr lang="en-US" dirty="0"/>
+              <a:t>Private working set</a:t>
+            </a:r>
+          </a:p>
+          <a:p>
+            <a:pPr marL="285750" indent="-285750">
+              <a:buFont typeface="Arial" panose="020B0604020202020204" pitchFamily="34" charset="0"/>
+              <a:buChar char="•"/>
+            </a:pPr>
+            <a:r>
+              <a:rPr lang="en-US" dirty="0"/>
+              <a:t>Shared working set</a:t>
+            </a:r>
+          </a:p>
+          <a:p>
+            <a:pPr marL="285750" indent="-285750">
+              <a:buFont typeface="Arial" panose="020B0604020202020204" pitchFamily="34" charset="0"/>
+              <a:buChar char="•"/>
+            </a:pPr>
+            <a:r>
+              <a:rPr lang="en-US" dirty="0"/>
+              <a:t>Working set = Private + Shared</a:t>
+            </a:r>
+          </a:p>
+        </p:txBody>
+      </p:sp>
+      <p:sp>
+        <p:nvSpPr>
+          <p:cNvPr id="10" name="TextBox 9">
             <a:extLst>
               <a:ext uri="{FF2B5EF4-FFF2-40B4-BE49-F238E27FC236}">
-                <a16:creationId xmlns:a16="http://schemas.microsoft.com/office/drawing/2014/main" id="{24303834-47F0-477B-9AF3-DEF3AA62FE69}"/>
+                <a16:creationId xmlns:a16="http://schemas.microsoft.com/office/drawing/2014/main" id="{A0D1F22C-B886-4F74-9D2A-64FAA2178232}"/>
               </a:ext>
             </a:extLst>
           </p:cNvPr>
@@ -8212,8 +8704,8 @@
         </p:nvSpPr>
         <p:spPr>
           <a:xfrm>
-            <a:off x="1484310" y="3764280"/>
-            <a:ext cx="9176070" cy="646331"/>
+            <a:off x="2873502" y="838089"/>
+            <a:ext cx="6815264" cy="369332"/>
           </a:xfrm>
           <a:prstGeom prst="rect">
             <a:avLst/>
@@ -8221,25 +8713,165 @@
           <a:noFill/>
         </p:spPr>
         <p:txBody>
-          <a:bodyPr wrap="square" rtlCol="0">
+          <a:bodyPr wrap="none" rtlCol="0">
             <a:spAutoFit/>
           </a:bodyPr>
           <a:lstStyle/>
           <a:p>
             <a:r>
               <a:rPr lang="en-US" dirty="0"/>
-              <a:t>Goal</a:t>
-            </a:r>
-            <a:endParaRPr lang="ru-RU" dirty="0"/>
-          </a:p>
-          <a:p>
-            <a:pPr marL="285750" indent="-285750">
-              <a:buFont typeface="Arial" panose="020B0604020202020204" pitchFamily="34" charset="0"/>
-              <a:buChar char="•"/>
-            </a:pPr>
+              <a:t>Have a look on application through </a:t>
+            </a:r>
+            <a:r>
+              <a:rPr lang="en-US" i="1" dirty="0"/>
+              <a:t>Task Manager </a:t>
+            </a:r>
             <a:r>
               <a:rPr lang="en-US" dirty="0"/>
-              <a:t>Let's try to optimize them</a:t>
+              <a:t>and</a:t>
+            </a:r>
+            <a:r>
+              <a:rPr lang="en-US" i="1" dirty="0"/>
+              <a:t> Process Explorer</a:t>
+            </a:r>
+          </a:p>
+        </p:txBody>
+      </p:sp>
+      <p:pic>
+        <p:nvPicPr>
+          <p:cNvPr id="6" name="Picture 5">
+            <a:extLst>
+              <a:ext uri="{FF2B5EF4-FFF2-40B4-BE49-F238E27FC236}">
+                <a16:creationId xmlns:a16="http://schemas.microsoft.com/office/drawing/2014/main" id="{96CA94DB-D1B8-4F23-908B-D126F176DA42}"/>
+              </a:ext>
+            </a:extLst>
+          </p:cNvPr>
+          <p:cNvPicPr>
+            <a:picLocks noChangeAspect="1"/>
+          </p:cNvPicPr>
+          <p:nvPr/>
+        </p:nvPicPr>
+        <p:blipFill>
+          <a:blip r:embed="rId3"/>
+          <a:stretch>
+            <a:fillRect/>
+          </a:stretch>
+        </p:blipFill>
+        <p:spPr>
+          <a:xfrm>
+            <a:off x="5121294" y="1529294"/>
+            <a:ext cx="3673230" cy="4410887"/>
+          </a:xfrm>
+          <a:prstGeom prst="rect">
+            <a:avLst/>
+          </a:prstGeom>
+        </p:spPr>
+      </p:pic>
+      <p:sp>
+        <p:nvSpPr>
+          <p:cNvPr id="11" name="TextBox 10">
+            <a:extLst>
+              <a:ext uri="{FF2B5EF4-FFF2-40B4-BE49-F238E27FC236}">
+                <a16:creationId xmlns:a16="http://schemas.microsoft.com/office/drawing/2014/main" id="{4501EC85-E9D3-453C-A0C5-ABAAE2F52365}"/>
+              </a:ext>
+            </a:extLst>
+          </p:cNvPr>
+          <p:cNvSpPr txBox="1"/>
+          <p:nvPr/>
+        </p:nvSpPr>
+        <p:spPr>
+          <a:xfrm>
+            <a:off x="2615708" y="6389272"/>
+            <a:ext cx="7911525" cy="338554"/>
+          </a:xfrm>
+          <a:prstGeom prst="rect">
+            <a:avLst/>
+          </a:prstGeom>
+          <a:noFill/>
+        </p:spPr>
+        <p:txBody>
+          <a:bodyPr wrap="none" rtlCol="0">
+            <a:spAutoFit/>
+          </a:bodyPr>
+          <a:lstStyle/>
+          <a:p>
+            <a:r>
+              <a:rPr lang="en-US" sz="1600" dirty="0"/>
+              <a:t>Remarks: </a:t>
+            </a:r>
+            <a:r>
+              <a:rPr lang="en-US" sz="1600" i="1" dirty="0"/>
+              <a:t>* There are some deviations in values, because screenshot was made at different time</a:t>
+            </a:r>
+          </a:p>
+        </p:txBody>
+      </p:sp>
+      <p:sp>
+        <p:nvSpPr>
+          <p:cNvPr id="12" name="TextBox 11">
+            <a:extLst>
+              <a:ext uri="{FF2B5EF4-FFF2-40B4-BE49-F238E27FC236}">
+                <a16:creationId xmlns:a16="http://schemas.microsoft.com/office/drawing/2014/main" id="{DAD7D7C0-4350-4738-AF1B-CA9098270786}"/>
+              </a:ext>
+            </a:extLst>
+          </p:cNvPr>
+          <p:cNvSpPr txBox="1"/>
+          <p:nvPr/>
+        </p:nvSpPr>
+        <p:spPr>
+          <a:xfrm>
+            <a:off x="1857776" y="5384224"/>
+            <a:ext cx="1515864" cy="369332"/>
+          </a:xfrm>
+          <a:prstGeom prst="rect">
+            <a:avLst/>
+          </a:prstGeom>
+          <a:noFill/>
+        </p:spPr>
+        <p:txBody>
+          <a:bodyPr wrap="none" rtlCol="0">
+            <a:spAutoFit/>
+          </a:bodyPr>
+          <a:lstStyle/>
+          <a:p>
+            <a:r>
+              <a:rPr lang="en-US" dirty="0"/>
+              <a:t>Task manager</a:t>
+            </a:r>
+          </a:p>
+        </p:txBody>
+      </p:sp>
+      <p:sp>
+        <p:nvSpPr>
+          <p:cNvPr id="13" name="TextBox 12">
+            <a:extLst>
+              <a:ext uri="{FF2B5EF4-FFF2-40B4-BE49-F238E27FC236}">
+                <a16:creationId xmlns:a16="http://schemas.microsoft.com/office/drawing/2014/main" id="{7434BFD9-08C5-4A68-B5EC-A9F63D148FC8}"/>
+              </a:ext>
+            </a:extLst>
+          </p:cNvPr>
+          <p:cNvSpPr txBox="1"/>
+          <p:nvPr/>
+        </p:nvSpPr>
+        <p:spPr>
+          <a:xfrm>
+            <a:off x="6199977" y="5948995"/>
+            <a:ext cx="1765227" cy="369332"/>
+          </a:xfrm>
+          <a:prstGeom prst="rect">
+            <a:avLst/>
+          </a:prstGeom>
+          <a:noFill/>
+        </p:spPr>
+        <p:txBody>
+          <a:bodyPr wrap="none" rtlCol="0">
+            <a:spAutoFit/>
+          </a:bodyPr>
+          <a:lstStyle/>
+          <a:p>
+            <a:r>
+              <a:rPr lang="en-US" dirty="0"/>
+              <a:t>Process Explorer</a:t>
             </a:r>
           </a:p>
         </p:txBody>
@@ -8247,7 +8879,7 @@
     </p:spTree>
     <p:extLst>
       <p:ext uri="{BB962C8B-B14F-4D97-AF65-F5344CB8AC3E}">
-        <p14:creationId xmlns:p14="http://schemas.microsoft.com/office/powerpoint/2010/main" val="3561677064"/>
+        <p14:creationId xmlns:p14="http://schemas.microsoft.com/office/powerpoint/2010/main" val="1532401657"/>
       </p:ext>
     </p:extLst>
   </p:cSld>
@@ -8258,6 +8890,728 @@
 </file>
 
 <file path=ppt/slides/slide6.xml><?xml version="1.0" encoding="utf-8"?>
+<p:sld xmlns:a="http://schemas.openxmlformats.org/drawingml/2006/main" xmlns:r="http://schemas.openxmlformats.org/officeDocument/2006/relationships" xmlns:p="http://schemas.openxmlformats.org/presentationml/2006/main">
+  <p:cSld>
+    <p:spTree>
+      <p:nvGrpSpPr>
+        <p:cNvPr id="1" name=""/>
+        <p:cNvGrpSpPr/>
+        <p:nvPr/>
+      </p:nvGrpSpPr>
+      <p:grpSpPr>
+        <a:xfrm>
+          <a:off x="0" y="0"/>
+          <a:ext cx="0" cy="0"/>
+          <a:chOff x="0" y="0"/>
+          <a:chExt cx="0" cy="0"/>
+        </a:xfrm>
+      </p:grpSpPr>
+      <p:sp>
+        <p:nvSpPr>
+          <p:cNvPr id="6" name="TextBox 5">
+            <a:extLst>
+              <a:ext uri="{FF2B5EF4-FFF2-40B4-BE49-F238E27FC236}">
+                <a16:creationId xmlns:a16="http://schemas.microsoft.com/office/drawing/2014/main" id="{46480F8A-F9F7-45EF-BDC9-17A948074BE7}"/>
+              </a:ext>
+            </a:extLst>
+          </p:cNvPr>
+          <p:cNvSpPr txBox="1"/>
+          <p:nvPr/>
+        </p:nvSpPr>
+        <p:spPr>
+          <a:xfrm>
+            <a:off x="3875740" y="1057411"/>
+            <a:ext cx="5344989" cy="369332"/>
+          </a:xfrm>
+          <a:prstGeom prst="rect">
+            <a:avLst/>
+          </a:prstGeom>
+          <a:noFill/>
+        </p:spPr>
+        <p:txBody>
+          <a:bodyPr wrap="none" rtlCol="0">
+            <a:spAutoFit/>
+          </a:bodyPr>
+          <a:lstStyle/>
+          <a:p>
+            <a:r>
+              <a:rPr lang="en-US" dirty="0"/>
+              <a:t>Open </a:t>
+            </a:r>
+            <a:r>
+              <a:rPr lang="en-US" i="1" dirty="0" err="1"/>
+              <a:t>VMMap</a:t>
+            </a:r>
+            <a:r>
+              <a:rPr lang="en-US" dirty="0"/>
+              <a:t> and have a look of application structure</a:t>
+            </a:r>
+          </a:p>
+        </p:txBody>
+      </p:sp>
+      <p:sp>
+        <p:nvSpPr>
+          <p:cNvPr id="7" name="TextBox 6">
+            <a:extLst>
+              <a:ext uri="{FF2B5EF4-FFF2-40B4-BE49-F238E27FC236}">
+                <a16:creationId xmlns:a16="http://schemas.microsoft.com/office/drawing/2014/main" id="{32D12F80-292D-43B5-BCC6-2424A08800E9}"/>
+              </a:ext>
+            </a:extLst>
+          </p:cNvPr>
+          <p:cNvSpPr txBox="1"/>
+          <p:nvPr/>
+        </p:nvSpPr>
+        <p:spPr>
+          <a:xfrm>
+            <a:off x="1484311" y="5525254"/>
+            <a:ext cx="10127849" cy="923330"/>
+          </a:xfrm>
+          <a:prstGeom prst="rect">
+            <a:avLst/>
+          </a:prstGeom>
+          <a:noFill/>
+        </p:spPr>
+        <p:txBody>
+          <a:bodyPr wrap="square" rtlCol="0">
+            <a:spAutoFit/>
+          </a:bodyPr>
+          <a:lstStyle/>
+          <a:p>
+            <a:r>
+              <a:rPr lang="en-US" dirty="0"/>
+              <a:t>See also: </a:t>
+            </a:r>
+          </a:p>
+          <a:p>
+            <a:pPr marL="285750" indent="-285750">
+              <a:buFont typeface="Arial" panose="020B0604020202020204" pitchFamily="34" charset="0"/>
+              <a:buChar char="•"/>
+            </a:pPr>
+            <a:r>
+              <a:rPr lang="en-US" dirty="0">
+                <a:hlinkClick r:id="rId2"/>
+              </a:rPr>
+              <a:t>http://blogs.microsoft.co.il/sasha/2016/01/05/windows-process-memory-usage-demystified/</a:t>
+            </a:r>
+            <a:endParaRPr lang="en-US" dirty="0"/>
+          </a:p>
+          <a:p>
+            <a:pPr marL="285750" indent="-285750">
+              <a:buFont typeface="Arial" panose="020B0604020202020204" pitchFamily="34" charset="0"/>
+              <a:buChar char="•"/>
+            </a:pPr>
+            <a:r>
+              <a:rPr lang="en-US" dirty="0"/>
+              <a:t>Windows® </a:t>
+            </a:r>
+            <a:r>
+              <a:rPr lang="en-US" dirty="0" err="1"/>
+              <a:t>Sysinternals</a:t>
+            </a:r>
+            <a:r>
+              <a:rPr lang="en-US" dirty="0"/>
+              <a:t> Administrator’s Reference. Pages 216-218</a:t>
+            </a:r>
+          </a:p>
+        </p:txBody>
+      </p:sp>
+      <p:sp>
+        <p:nvSpPr>
+          <p:cNvPr id="9" name="TextBox 8">
+            <a:extLst>
+              <a:ext uri="{FF2B5EF4-FFF2-40B4-BE49-F238E27FC236}">
+                <a16:creationId xmlns:a16="http://schemas.microsoft.com/office/drawing/2014/main" id="{F978C187-759F-480D-BEE2-6DB4E7EF2C30}"/>
+              </a:ext>
+            </a:extLst>
+          </p:cNvPr>
+          <p:cNvSpPr txBox="1"/>
+          <p:nvPr/>
+        </p:nvSpPr>
+        <p:spPr>
+          <a:xfrm>
+            <a:off x="8640052" y="1557676"/>
+            <a:ext cx="2862971" cy="3416320"/>
+          </a:xfrm>
+          <a:prstGeom prst="rect">
+            <a:avLst/>
+          </a:prstGeom>
+          <a:noFill/>
+        </p:spPr>
+        <p:txBody>
+          <a:bodyPr wrap="square" rtlCol="0">
+            <a:spAutoFit/>
+          </a:bodyPr>
+          <a:lstStyle/>
+          <a:p>
+            <a:r>
+              <a:rPr lang="en-US" dirty="0"/>
+              <a:t>Bar graphs:</a:t>
+            </a:r>
+          </a:p>
+          <a:p>
+            <a:endParaRPr lang="en-US" dirty="0"/>
+          </a:p>
+          <a:p>
+            <a:pPr marL="285750" indent="-285750">
+              <a:buFont typeface="Arial" panose="020B0604020202020204" pitchFamily="34" charset="0"/>
+              <a:buChar char="•"/>
+            </a:pPr>
+            <a:r>
+              <a:rPr lang="en-US" dirty="0"/>
+              <a:t>Committed – virtual memory, which allocated memory, but not used</a:t>
+            </a:r>
+            <a:br>
+              <a:rPr lang="en-US" dirty="0"/>
+            </a:br>
+            <a:endParaRPr lang="en-US" dirty="0"/>
+          </a:p>
+          <a:p>
+            <a:pPr marL="285750" indent="-285750">
+              <a:buFont typeface="Arial" panose="020B0604020202020204" pitchFamily="34" charset="0"/>
+              <a:buChar char="•"/>
+            </a:pPr>
+            <a:r>
+              <a:rPr lang="en-US" dirty="0"/>
+              <a:t>Private Bytes - virtual memory, which already use </a:t>
+            </a:r>
+            <a:br>
+              <a:rPr lang="en-US" dirty="0"/>
+            </a:br>
+            <a:endParaRPr lang="en-US" dirty="0"/>
+          </a:p>
+          <a:p>
+            <a:pPr marL="285750" indent="-285750">
+              <a:buFont typeface="Arial" panose="020B0604020202020204" pitchFamily="34" charset="0"/>
+              <a:buChar char="•"/>
+            </a:pPr>
+            <a:r>
+              <a:rPr lang="en-US" dirty="0"/>
+              <a:t>Working set   - physical memory</a:t>
+            </a:r>
+          </a:p>
+        </p:txBody>
+      </p:sp>
+      <p:sp>
+        <p:nvSpPr>
+          <p:cNvPr id="4" name="Slide Number Placeholder 3">
+            <a:extLst>
+              <a:ext uri="{FF2B5EF4-FFF2-40B4-BE49-F238E27FC236}">
+                <a16:creationId xmlns:a16="http://schemas.microsoft.com/office/drawing/2014/main" id="{AAB1DB65-03D9-4F67-9534-E6E8E0195CB1}"/>
+              </a:ext>
+            </a:extLst>
+          </p:cNvPr>
+          <p:cNvSpPr>
+            <a:spLocks noGrp="1"/>
+          </p:cNvSpPr>
+          <p:nvPr>
+            <p:ph type="sldNum" sz="quarter" idx="12"/>
+          </p:nvPr>
+        </p:nvSpPr>
+        <p:spPr/>
+        <p:txBody>
+          <a:bodyPr/>
+          <a:lstStyle/>
+          <a:p>
+            <a:fld id="{D57F1E4F-1CFF-5643-939E-217C01CDF565}" type="slidenum">
+              <a:rPr lang="en-US" sz="1400" smtClean="0"/>
+              <a:pPr/>
+              <a:t>6</a:t>
+            </a:fld>
+            <a:endParaRPr lang="en-US" sz="1400" dirty="0"/>
+          </a:p>
+        </p:txBody>
+      </p:sp>
+      <p:sp>
+        <p:nvSpPr>
+          <p:cNvPr id="10" name="Title 1">
+            <a:extLst>
+              <a:ext uri="{FF2B5EF4-FFF2-40B4-BE49-F238E27FC236}">
+                <a16:creationId xmlns:a16="http://schemas.microsoft.com/office/drawing/2014/main" id="{90A2D1D6-DEA9-4257-9B34-0A6DEABF966C}"/>
+              </a:ext>
+            </a:extLst>
+          </p:cNvPr>
+          <p:cNvSpPr>
+            <a:spLocks noGrp="1"/>
+          </p:cNvSpPr>
+          <p:nvPr>
+            <p:ph type="title"/>
+          </p:nvPr>
+        </p:nvSpPr>
+        <p:spPr>
+          <a:xfrm>
+            <a:off x="1484311" y="165965"/>
+            <a:ext cx="10018712" cy="923331"/>
+          </a:xfrm>
+        </p:spPr>
+        <p:txBody>
+          <a:bodyPr>
+            <a:normAutofit fontScale="90000"/>
+          </a:bodyPr>
+          <a:lstStyle/>
+          <a:p>
+            <a:r>
+              <a:rPr lang="en-US" sz="3600" dirty="0"/>
+              <a:t>What do you really mean by memory?</a:t>
+            </a:r>
+            <a:br>
+              <a:rPr lang="en-US" sz="3600" dirty="0"/>
+            </a:br>
+            <a:r>
+              <a:rPr lang="en-US" sz="2400" dirty="0"/>
+              <a:t>Memory types</a:t>
+            </a:r>
+          </a:p>
+        </p:txBody>
+      </p:sp>
+      <p:sp>
+        <p:nvSpPr>
+          <p:cNvPr id="11" name="TextBox 10">
+            <a:extLst>
+              <a:ext uri="{FF2B5EF4-FFF2-40B4-BE49-F238E27FC236}">
+                <a16:creationId xmlns:a16="http://schemas.microsoft.com/office/drawing/2014/main" id="{B4AB1192-740A-4D97-9E58-807554BC8C71}"/>
+              </a:ext>
+            </a:extLst>
+          </p:cNvPr>
+          <p:cNvSpPr txBox="1"/>
+          <p:nvPr/>
+        </p:nvSpPr>
+        <p:spPr>
+          <a:xfrm>
+            <a:off x="4210051" y="6451907"/>
+            <a:ext cx="8108004" cy="338554"/>
+          </a:xfrm>
+          <a:prstGeom prst="rect">
+            <a:avLst/>
+          </a:prstGeom>
+          <a:noFill/>
+        </p:spPr>
+        <p:txBody>
+          <a:bodyPr wrap="square" rtlCol="0">
+            <a:spAutoFit/>
+          </a:bodyPr>
+          <a:lstStyle/>
+          <a:p>
+            <a:r>
+              <a:rPr lang="en-US" sz="1600" dirty="0"/>
+              <a:t>Remarks: *</a:t>
+            </a:r>
+            <a:r>
+              <a:rPr lang="en-US" sz="1600" i="1" dirty="0"/>
+              <a:t>There are some deviations in values, because screenshot was made at different time</a:t>
+            </a:r>
+          </a:p>
+        </p:txBody>
+      </p:sp>
+      <p:pic>
+        <p:nvPicPr>
+          <p:cNvPr id="13" name="Picture 12">
+            <a:extLst>
+              <a:ext uri="{FF2B5EF4-FFF2-40B4-BE49-F238E27FC236}">
+                <a16:creationId xmlns:a16="http://schemas.microsoft.com/office/drawing/2014/main" id="{AD456E4B-3CB4-49BE-AE7E-947E5B6E0EBE}"/>
+              </a:ext>
+            </a:extLst>
+          </p:cNvPr>
+          <p:cNvPicPr>
+            <a:picLocks noChangeAspect="1"/>
+          </p:cNvPicPr>
+          <p:nvPr/>
+        </p:nvPicPr>
+        <p:blipFill>
+          <a:blip r:embed="rId3"/>
+          <a:stretch>
+            <a:fillRect/>
+          </a:stretch>
+        </p:blipFill>
+        <p:spPr>
+          <a:xfrm>
+            <a:off x="1013905" y="1557676"/>
+            <a:ext cx="7433860" cy="3962182"/>
+          </a:xfrm>
+          <a:prstGeom prst="rect">
+            <a:avLst/>
+          </a:prstGeom>
+        </p:spPr>
+      </p:pic>
+    </p:spTree>
+    <p:extLst>
+      <p:ext uri="{BB962C8B-B14F-4D97-AF65-F5344CB8AC3E}">
+        <p14:creationId xmlns:p14="http://schemas.microsoft.com/office/powerpoint/2010/main" val="232081551"/>
+      </p:ext>
+    </p:extLst>
+  </p:cSld>
+  <p:clrMapOvr>
+    <a:masterClrMapping/>
+  </p:clrMapOvr>
+</p:sld>
+</file>
+
+<file path=ppt/slides/slide7.xml><?xml version="1.0" encoding="utf-8"?>
+<p:sld xmlns:a="http://schemas.openxmlformats.org/drawingml/2006/main" xmlns:r="http://schemas.openxmlformats.org/officeDocument/2006/relationships" xmlns:p="http://schemas.openxmlformats.org/presentationml/2006/main">
+  <p:cSld>
+    <p:spTree>
+      <p:nvGrpSpPr>
+        <p:cNvPr id="1" name=""/>
+        <p:cNvGrpSpPr/>
+        <p:nvPr/>
+      </p:nvGrpSpPr>
+      <p:grpSpPr>
+        <a:xfrm>
+          <a:off x="0" y="0"/>
+          <a:ext cx="0" cy="0"/>
+          <a:chOff x="0" y="0"/>
+          <a:chExt cx="0" cy="0"/>
+        </a:xfrm>
+      </p:grpSpPr>
+      <p:sp>
+        <p:nvSpPr>
+          <p:cNvPr id="6" name="TextBox 5">
+            <a:extLst>
+              <a:ext uri="{FF2B5EF4-FFF2-40B4-BE49-F238E27FC236}">
+                <a16:creationId xmlns:a16="http://schemas.microsoft.com/office/drawing/2014/main" id="{46480F8A-F9F7-45EF-BDC9-17A948074BE7}"/>
+              </a:ext>
+            </a:extLst>
+          </p:cNvPr>
+          <p:cNvSpPr txBox="1"/>
+          <p:nvPr/>
+        </p:nvSpPr>
+        <p:spPr>
+          <a:xfrm>
+            <a:off x="3875740" y="1057411"/>
+            <a:ext cx="5344989" cy="369332"/>
+          </a:xfrm>
+          <a:prstGeom prst="rect">
+            <a:avLst/>
+          </a:prstGeom>
+          <a:noFill/>
+        </p:spPr>
+        <p:txBody>
+          <a:bodyPr wrap="none" rtlCol="0">
+            <a:spAutoFit/>
+          </a:bodyPr>
+          <a:lstStyle/>
+          <a:p>
+            <a:r>
+              <a:rPr lang="en-US" dirty="0"/>
+              <a:t>Open </a:t>
+            </a:r>
+            <a:r>
+              <a:rPr lang="en-US" i="1" dirty="0" err="1"/>
+              <a:t>VMMap</a:t>
+            </a:r>
+            <a:r>
+              <a:rPr lang="en-US" dirty="0"/>
+              <a:t> and have a look of application structure</a:t>
+            </a:r>
+          </a:p>
+        </p:txBody>
+      </p:sp>
+      <p:sp>
+        <p:nvSpPr>
+          <p:cNvPr id="7" name="TextBox 6">
+            <a:extLst>
+              <a:ext uri="{FF2B5EF4-FFF2-40B4-BE49-F238E27FC236}">
+                <a16:creationId xmlns:a16="http://schemas.microsoft.com/office/drawing/2014/main" id="{32D12F80-292D-43B5-BCC6-2424A08800E9}"/>
+              </a:ext>
+            </a:extLst>
+          </p:cNvPr>
+          <p:cNvSpPr txBox="1"/>
+          <p:nvPr/>
+        </p:nvSpPr>
+        <p:spPr>
+          <a:xfrm>
+            <a:off x="1484311" y="5458579"/>
+            <a:ext cx="10127849" cy="923330"/>
+          </a:xfrm>
+          <a:prstGeom prst="rect">
+            <a:avLst/>
+          </a:prstGeom>
+          <a:noFill/>
+        </p:spPr>
+        <p:txBody>
+          <a:bodyPr wrap="square" rtlCol="0">
+            <a:spAutoFit/>
+          </a:bodyPr>
+          <a:lstStyle/>
+          <a:p>
+            <a:r>
+              <a:rPr lang="en-US" dirty="0"/>
+              <a:t>See also: </a:t>
+            </a:r>
+          </a:p>
+          <a:p>
+            <a:pPr marL="285750" indent="-285750">
+              <a:buFont typeface="Arial" panose="020B0604020202020204" pitchFamily="34" charset="0"/>
+              <a:buChar char="•"/>
+            </a:pPr>
+            <a:r>
+              <a:rPr lang="en-US" dirty="0">
+                <a:hlinkClick r:id="rId2"/>
+              </a:rPr>
+              <a:t>http://blogs.microsoft.co.il/sasha/2016/01/05/windows-process-memory-usage-demystified/</a:t>
+            </a:r>
+            <a:endParaRPr lang="en-US" dirty="0"/>
+          </a:p>
+          <a:p>
+            <a:pPr marL="285750" indent="-285750">
+              <a:buFont typeface="Arial" panose="020B0604020202020204" pitchFamily="34" charset="0"/>
+              <a:buChar char="•"/>
+            </a:pPr>
+            <a:r>
+              <a:rPr lang="en-US" dirty="0"/>
+              <a:t>Windows® </a:t>
+            </a:r>
+            <a:r>
+              <a:rPr lang="en-US" dirty="0" err="1"/>
+              <a:t>Sysinternals</a:t>
+            </a:r>
+            <a:r>
+              <a:rPr lang="en-US" dirty="0"/>
+              <a:t> Administrator’s Reference. Pages 216-218</a:t>
+            </a:r>
+          </a:p>
+        </p:txBody>
+      </p:sp>
+      <p:sp>
+        <p:nvSpPr>
+          <p:cNvPr id="9" name="TextBox 8">
+            <a:extLst>
+              <a:ext uri="{FF2B5EF4-FFF2-40B4-BE49-F238E27FC236}">
+                <a16:creationId xmlns:a16="http://schemas.microsoft.com/office/drawing/2014/main" id="{F978C187-759F-480D-BEE2-6DB4E7EF2C30}"/>
+              </a:ext>
+            </a:extLst>
+          </p:cNvPr>
+          <p:cNvSpPr txBox="1"/>
+          <p:nvPr/>
+        </p:nvSpPr>
+        <p:spPr>
+          <a:xfrm>
+            <a:off x="8640052" y="1557676"/>
+            <a:ext cx="2862971" cy="3416320"/>
+          </a:xfrm>
+          <a:prstGeom prst="rect">
+            <a:avLst/>
+          </a:prstGeom>
+          <a:noFill/>
+        </p:spPr>
+        <p:txBody>
+          <a:bodyPr wrap="square" rtlCol="0">
+            <a:spAutoFit/>
+          </a:bodyPr>
+          <a:lstStyle/>
+          <a:p>
+            <a:r>
+              <a:rPr lang="en-US" dirty="0"/>
+              <a:t>Columns:</a:t>
+            </a:r>
+          </a:p>
+          <a:p>
+            <a:endParaRPr lang="en-US" dirty="0"/>
+          </a:p>
+          <a:p>
+            <a:pPr marL="285750" indent="-285750">
+              <a:buFont typeface="Arial" panose="020B0604020202020204" pitchFamily="34" charset="0"/>
+              <a:buChar char="•"/>
+            </a:pPr>
+            <a:r>
+              <a:rPr lang="en-US" dirty="0"/>
+              <a:t>Image – memory represents an executable files: EXE or DLL </a:t>
+            </a:r>
+          </a:p>
+          <a:p>
+            <a:pPr marL="285750" indent="-285750">
+              <a:buFont typeface="Arial" panose="020B0604020202020204" pitchFamily="34" charset="0"/>
+              <a:buChar char="•"/>
+            </a:pPr>
+            <a:endParaRPr lang="en-US" dirty="0"/>
+          </a:p>
+          <a:p>
+            <a:pPr marL="285750" indent="-285750">
+              <a:buFont typeface="Arial" panose="020B0604020202020204" pitchFamily="34" charset="0"/>
+              <a:buChar char="•"/>
+            </a:pPr>
+            <a:r>
+              <a:rPr lang="en-US" dirty="0"/>
+              <a:t>Heap – memory allocated C/C++ runtime</a:t>
+            </a:r>
+          </a:p>
+          <a:p>
+            <a:pPr marL="285750" indent="-285750">
+              <a:buFont typeface="Arial" panose="020B0604020202020204" pitchFamily="34" charset="0"/>
+              <a:buChar char="•"/>
+            </a:pPr>
+            <a:endParaRPr lang="en-US" dirty="0"/>
+          </a:p>
+          <a:p>
+            <a:pPr marL="285750" indent="-285750">
+              <a:buFont typeface="Arial" panose="020B0604020202020204" pitchFamily="34" charset="0"/>
+              <a:buChar char="•"/>
+            </a:pPr>
+            <a:r>
+              <a:rPr lang="en-US" dirty="0"/>
+              <a:t>Managed Heap - memory allocated .NET runtime **</a:t>
+            </a:r>
+          </a:p>
+        </p:txBody>
+      </p:sp>
+      <p:sp>
+        <p:nvSpPr>
+          <p:cNvPr id="4" name="Slide Number Placeholder 3">
+            <a:extLst>
+              <a:ext uri="{FF2B5EF4-FFF2-40B4-BE49-F238E27FC236}">
+                <a16:creationId xmlns:a16="http://schemas.microsoft.com/office/drawing/2014/main" id="{AAB1DB65-03D9-4F67-9534-E6E8E0195CB1}"/>
+              </a:ext>
+            </a:extLst>
+          </p:cNvPr>
+          <p:cNvSpPr>
+            <a:spLocks noGrp="1"/>
+          </p:cNvSpPr>
+          <p:nvPr>
+            <p:ph type="sldNum" sz="quarter" idx="12"/>
+          </p:nvPr>
+        </p:nvSpPr>
+        <p:spPr/>
+        <p:txBody>
+          <a:bodyPr/>
+          <a:lstStyle/>
+          <a:p>
+            <a:fld id="{D57F1E4F-1CFF-5643-939E-217C01CDF565}" type="slidenum">
+              <a:rPr lang="en-US" sz="1400" smtClean="0"/>
+              <a:pPr/>
+              <a:t>7</a:t>
+            </a:fld>
+            <a:endParaRPr lang="en-US" sz="1400" dirty="0"/>
+          </a:p>
+        </p:txBody>
+      </p:sp>
+      <p:sp>
+        <p:nvSpPr>
+          <p:cNvPr id="10" name="Title 1">
+            <a:extLst>
+              <a:ext uri="{FF2B5EF4-FFF2-40B4-BE49-F238E27FC236}">
+                <a16:creationId xmlns:a16="http://schemas.microsoft.com/office/drawing/2014/main" id="{90A2D1D6-DEA9-4257-9B34-0A6DEABF966C}"/>
+              </a:ext>
+            </a:extLst>
+          </p:cNvPr>
+          <p:cNvSpPr>
+            <a:spLocks noGrp="1"/>
+          </p:cNvSpPr>
+          <p:nvPr>
+            <p:ph type="title"/>
+          </p:nvPr>
+        </p:nvSpPr>
+        <p:spPr>
+          <a:xfrm>
+            <a:off x="1484311" y="165965"/>
+            <a:ext cx="10018712" cy="923331"/>
+          </a:xfrm>
+        </p:spPr>
+        <p:txBody>
+          <a:bodyPr>
+            <a:normAutofit fontScale="90000"/>
+          </a:bodyPr>
+          <a:lstStyle/>
+          <a:p>
+            <a:r>
+              <a:rPr lang="en-US" sz="3600" dirty="0"/>
+              <a:t>What do you really mean by memory?</a:t>
+            </a:r>
+            <a:br>
+              <a:rPr lang="en-US" sz="3600" dirty="0"/>
+            </a:br>
+            <a:r>
+              <a:rPr lang="en-US" sz="2400" dirty="0"/>
+              <a:t>Memory types</a:t>
+            </a:r>
+          </a:p>
+        </p:txBody>
+      </p:sp>
+      <p:sp>
+        <p:nvSpPr>
+          <p:cNvPr id="11" name="TextBox 10">
+            <a:extLst>
+              <a:ext uri="{FF2B5EF4-FFF2-40B4-BE49-F238E27FC236}">
+                <a16:creationId xmlns:a16="http://schemas.microsoft.com/office/drawing/2014/main" id="{B4AB1192-740A-4D97-9E58-807554BC8C71}"/>
+              </a:ext>
+            </a:extLst>
+          </p:cNvPr>
+          <p:cNvSpPr txBox="1"/>
+          <p:nvPr/>
+        </p:nvSpPr>
+        <p:spPr>
+          <a:xfrm>
+            <a:off x="3093868" y="6404856"/>
+            <a:ext cx="9098132" cy="338554"/>
+          </a:xfrm>
+          <a:prstGeom prst="rect">
+            <a:avLst/>
+          </a:prstGeom>
+          <a:noFill/>
+        </p:spPr>
+        <p:txBody>
+          <a:bodyPr wrap="none" rtlCol="0">
+            <a:spAutoFit/>
+          </a:bodyPr>
+          <a:lstStyle/>
+          <a:p>
+            <a:r>
+              <a:rPr lang="en-US" sz="1600" dirty="0"/>
+              <a:t>Remarks </a:t>
+            </a:r>
+            <a:r>
+              <a:rPr lang="en-US" sz="1600" i="1" dirty="0"/>
+              <a:t>** </a:t>
+            </a:r>
+            <a:r>
+              <a:rPr lang="en-US" sz="1600" dirty="0"/>
+              <a:t>JIT code included in Managed Heap, you can calculate them size as Managed Heap minus GC</a:t>
+            </a:r>
+          </a:p>
+        </p:txBody>
+      </p:sp>
+      <p:pic>
+        <p:nvPicPr>
+          <p:cNvPr id="5" name="Picture 4">
+            <a:extLst>
+              <a:ext uri="{FF2B5EF4-FFF2-40B4-BE49-F238E27FC236}">
+                <a16:creationId xmlns:a16="http://schemas.microsoft.com/office/drawing/2014/main" id="{4AF94455-CBDA-4BA6-86D1-7704D41AE2AC}"/>
+              </a:ext>
+            </a:extLst>
+          </p:cNvPr>
+          <p:cNvPicPr>
+            <a:picLocks noChangeAspect="1"/>
+          </p:cNvPicPr>
+          <p:nvPr/>
+        </p:nvPicPr>
+        <p:blipFill>
+          <a:blip r:embed="rId3"/>
+          <a:stretch>
+            <a:fillRect/>
+          </a:stretch>
+        </p:blipFill>
+        <p:spPr>
+          <a:xfrm>
+            <a:off x="1037817" y="1557676"/>
+            <a:ext cx="7443984" cy="3967578"/>
+          </a:xfrm>
+          <a:prstGeom prst="rect">
+            <a:avLst/>
+          </a:prstGeom>
+        </p:spPr>
+      </p:pic>
+    </p:spTree>
+    <p:extLst>
+      <p:ext uri="{BB962C8B-B14F-4D97-AF65-F5344CB8AC3E}">
+        <p14:creationId xmlns:p14="http://schemas.microsoft.com/office/powerpoint/2010/main" val="808391843"/>
+      </p:ext>
+    </p:extLst>
+  </p:cSld>
+  <p:clrMapOvr>
+    <a:masterClrMapping/>
+  </p:clrMapOvr>
+</p:sld>
+</file>
+
+<file path=ppt/slides/slide8.xml><?xml version="1.0" encoding="utf-8"?>
 <p:sld xmlns:a="http://schemas.openxmlformats.org/drawingml/2006/main" xmlns:r="http://schemas.openxmlformats.org/officeDocument/2006/relationships" xmlns:p="http://schemas.openxmlformats.org/presentationml/2006/main">
   <p:cSld>
     <p:spTree>
@@ -8579,353 +9933,40 @@
           </a:p>
         </p:txBody>
       </p:sp>
+      <p:sp>
+        <p:nvSpPr>
+          <p:cNvPr id="5" name="Slide Number Placeholder 4">
+            <a:extLst>
+              <a:ext uri="{FF2B5EF4-FFF2-40B4-BE49-F238E27FC236}">
+                <a16:creationId xmlns:a16="http://schemas.microsoft.com/office/drawing/2014/main" id="{FDDC2F75-7AA4-48DE-AE07-C47DCCF5C4AF}"/>
+              </a:ext>
+            </a:extLst>
+          </p:cNvPr>
+          <p:cNvSpPr>
+            <a:spLocks noGrp="1"/>
+          </p:cNvSpPr>
+          <p:nvPr>
+            <p:ph type="sldNum" sz="quarter" idx="12"/>
+          </p:nvPr>
+        </p:nvSpPr>
+        <p:spPr/>
+        <p:txBody>
+          <a:bodyPr/>
+          <a:lstStyle/>
+          <a:p>
+            <a:fld id="{D57F1E4F-1CFF-5643-939E-217C01CDF565}" type="slidenum">
+              <a:rPr lang="en-US" sz="1400" smtClean="0"/>
+              <a:pPr/>
+              <a:t>8</a:t>
+            </a:fld>
+            <a:endParaRPr lang="en-US" sz="1400" dirty="0"/>
+          </a:p>
+        </p:txBody>
+      </p:sp>
     </p:spTree>
     <p:extLst>
       <p:ext uri="{BB962C8B-B14F-4D97-AF65-F5344CB8AC3E}">
         <p14:creationId xmlns:p14="http://schemas.microsoft.com/office/powerpoint/2010/main" val="3214061660"/>
-      </p:ext>
-    </p:extLst>
-  </p:cSld>
-  <p:clrMapOvr>
-    <a:masterClrMapping/>
-  </p:clrMapOvr>
-</p:sld>
-</file>
-
-<file path=ppt/slides/slide7.xml><?xml version="1.0" encoding="utf-8"?>
-<p:sld xmlns:a="http://schemas.openxmlformats.org/drawingml/2006/main" xmlns:r="http://schemas.openxmlformats.org/officeDocument/2006/relationships" xmlns:p="http://schemas.openxmlformats.org/presentationml/2006/main">
-  <p:cSld>
-    <p:spTree>
-      <p:nvGrpSpPr>
-        <p:cNvPr id="1" name=""/>
-        <p:cNvGrpSpPr/>
-        <p:nvPr/>
-      </p:nvGrpSpPr>
-      <p:grpSpPr>
-        <a:xfrm>
-          <a:off x="0" y="0"/>
-          <a:ext cx="0" cy="0"/>
-          <a:chOff x="0" y="0"/>
-          <a:chExt cx="0" cy="0"/>
-        </a:xfrm>
-      </p:grpSpPr>
-      <p:sp>
-        <p:nvSpPr>
-          <p:cNvPr id="2" name="Title 1">
-            <a:extLst>
-              <a:ext uri="{FF2B5EF4-FFF2-40B4-BE49-F238E27FC236}">
-                <a16:creationId xmlns:a16="http://schemas.microsoft.com/office/drawing/2014/main" id="{09619E5A-9C6F-46E0-8395-140AC3D184CD}"/>
-              </a:ext>
-            </a:extLst>
-          </p:cNvPr>
-          <p:cNvSpPr>
-            <a:spLocks noGrp="1"/>
-          </p:cNvSpPr>
-          <p:nvPr>
-            <p:ph type="title"/>
-          </p:nvPr>
-        </p:nvSpPr>
-        <p:spPr>
-          <a:xfrm>
-            <a:off x="1484311" y="685801"/>
-            <a:ext cx="10018713" cy="1066800"/>
-          </a:xfrm>
-        </p:spPr>
-        <p:txBody>
-          <a:bodyPr>
-            <a:normAutofit fontScale="90000"/>
-          </a:bodyPr>
-          <a:lstStyle/>
-          <a:p>
-            <a:r>
-              <a:rPr lang="en-US" dirty="0"/>
-              <a:t>Sharing assemblies between application domains. </a:t>
-            </a:r>
-            <a:br>
-              <a:rPr lang="en-US" dirty="0"/>
-            </a:br>
-            <a:r>
-              <a:rPr lang="en-US" dirty="0"/>
-              <a:t>Concept domain neutral assembly. </a:t>
-            </a:r>
-          </a:p>
-        </p:txBody>
-      </p:sp>
-      <p:sp>
-        <p:nvSpPr>
-          <p:cNvPr id="3" name="Content Placeholder 2">
-            <a:extLst>
-              <a:ext uri="{FF2B5EF4-FFF2-40B4-BE49-F238E27FC236}">
-                <a16:creationId xmlns:a16="http://schemas.microsoft.com/office/drawing/2014/main" id="{F5BF9354-5E70-4F1E-9E61-289C2FB3ED00}"/>
-              </a:ext>
-            </a:extLst>
-          </p:cNvPr>
-          <p:cNvSpPr>
-            <a:spLocks noGrp="1"/>
-          </p:cNvSpPr>
-          <p:nvPr>
-            <p:ph idx="1"/>
-          </p:nvPr>
-        </p:nvSpPr>
-        <p:spPr/>
-        <p:txBody>
-          <a:bodyPr>
-            <a:normAutofit fontScale="92500" lnSpcReduction="10000"/>
-          </a:bodyPr>
-          <a:lstStyle/>
-          <a:p>
-            <a:pPr marL="0" indent="0">
-              <a:buNone/>
-            </a:pPr>
-            <a:r>
-              <a:rPr lang="en-US" b="1" dirty="0"/>
-              <a:t>Conclusion from slide:</a:t>
-            </a:r>
-          </a:p>
-          <a:p>
-            <a:r>
-              <a:rPr lang="en-US" dirty="0"/>
-              <a:t>An assembly can be domain neutral if and only if it is in GAC, and all the assemblies in its transitive binding closure are all in GAC.</a:t>
-            </a:r>
-          </a:p>
-          <a:p>
-            <a:pPr marL="0" indent="0">
-              <a:buNone/>
-            </a:pPr>
-            <a:r>
-              <a:rPr lang="en-US" i="1" dirty="0"/>
-              <a:t>It has an unfortunate consequence that you can never update strongly named assemblies once it is loaded in domain. Remember all the </a:t>
-            </a:r>
-            <a:r>
-              <a:rPr lang="en-US" i="1" dirty="0" err="1"/>
-              <a:t>jitted</a:t>
-            </a:r>
-            <a:r>
-              <a:rPr lang="en-US" i="1" dirty="0"/>
-              <a:t> code and runtime data structures are shared between </a:t>
-            </a:r>
-            <a:r>
-              <a:rPr lang="en-US" i="1" dirty="0" err="1"/>
-              <a:t>appdomains</a:t>
-            </a:r>
-            <a:r>
-              <a:rPr lang="en-US" i="1" dirty="0"/>
-              <a:t>. This can only be done if the same native code is valid for all the </a:t>
-            </a:r>
-            <a:r>
-              <a:rPr lang="en-US" i="1" dirty="0" err="1"/>
-              <a:t>appdomains</a:t>
-            </a:r>
-            <a:r>
-              <a:rPr lang="en-US" i="1" dirty="0"/>
-              <a:t>. This is not always true. Specifically, the two </a:t>
-            </a:r>
-            <a:r>
-              <a:rPr lang="en-US" i="1" dirty="0" err="1"/>
-              <a:t>appdomains</a:t>
-            </a:r>
-            <a:r>
-              <a:rPr lang="en-US" i="1" dirty="0"/>
-              <a:t> may have different binding policies and security polices, as well as other differences.</a:t>
-            </a:r>
-          </a:p>
-        </p:txBody>
-      </p:sp>
-    </p:spTree>
-    <p:extLst>
-      <p:ext uri="{BB962C8B-B14F-4D97-AF65-F5344CB8AC3E}">
-        <p14:creationId xmlns:p14="http://schemas.microsoft.com/office/powerpoint/2010/main" val="3754122186"/>
-      </p:ext>
-    </p:extLst>
-  </p:cSld>
-  <p:clrMapOvr>
-    <a:masterClrMapping/>
-  </p:clrMapOvr>
-</p:sld>
-</file>
-
-<file path=ppt/slides/slide8.xml><?xml version="1.0" encoding="utf-8"?>
-<p:sld xmlns:a="http://schemas.openxmlformats.org/drawingml/2006/main" xmlns:r="http://schemas.openxmlformats.org/officeDocument/2006/relationships" xmlns:p="http://schemas.openxmlformats.org/presentationml/2006/main">
-  <p:cSld>
-    <p:spTree>
-      <p:nvGrpSpPr>
-        <p:cNvPr id="1" name=""/>
-        <p:cNvGrpSpPr/>
-        <p:nvPr/>
-      </p:nvGrpSpPr>
-      <p:grpSpPr>
-        <a:xfrm>
-          <a:off x="0" y="0"/>
-          <a:ext cx="0" cy="0"/>
-          <a:chOff x="0" y="0"/>
-          <a:chExt cx="0" cy="0"/>
-        </a:xfrm>
-      </p:grpSpPr>
-      <p:sp>
-        <p:nvSpPr>
-          <p:cNvPr id="2" name="Title 1">
-            <a:extLst>
-              <a:ext uri="{FF2B5EF4-FFF2-40B4-BE49-F238E27FC236}">
-                <a16:creationId xmlns:a16="http://schemas.microsoft.com/office/drawing/2014/main" id="{09619E5A-9C6F-46E0-8395-140AC3D184CD}"/>
-              </a:ext>
-            </a:extLst>
-          </p:cNvPr>
-          <p:cNvSpPr>
-            <a:spLocks noGrp="1"/>
-          </p:cNvSpPr>
-          <p:nvPr>
-            <p:ph type="title"/>
-          </p:nvPr>
-        </p:nvSpPr>
-        <p:spPr>
-          <a:xfrm>
-            <a:off x="1484311" y="685801"/>
-            <a:ext cx="10018713" cy="1066800"/>
-          </a:xfrm>
-        </p:spPr>
-        <p:txBody>
-          <a:bodyPr>
-            <a:normAutofit fontScale="90000"/>
-          </a:bodyPr>
-          <a:lstStyle/>
-          <a:p>
-            <a:r>
-              <a:rPr lang="en-US" dirty="0"/>
-              <a:t>Sharing assemblies between application domains. </a:t>
-            </a:r>
-            <a:br>
-              <a:rPr lang="en-US" dirty="0"/>
-            </a:br>
-            <a:r>
-              <a:rPr lang="en-US" dirty="0"/>
-              <a:t>Concept domain neutral assembly. </a:t>
-            </a:r>
-          </a:p>
-        </p:txBody>
-      </p:sp>
-      <p:sp>
-        <p:nvSpPr>
-          <p:cNvPr id="3" name="Content Placeholder 2">
-            <a:extLst>
-              <a:ext uri="{FF2B5EF4-FFF2-40B4-BE49-F238E27FC236}">
-                <a16:creationId xmlns:a16="http://schemas.microsoft.com/office/drawing/2014/main" id="{F5BF9354-5E70-4F1E-9E61-289C2FB3ED00}"/>
-              </a:ext>
-            </a:extLst>
-          </p:cNvPr>
-          <p:cNvSpPr>
-            <a:spLocks noGrp="1"/>
-          </p:cNvSpPr>
-          <p:nvPr>
-            <p:ph idx="1"/>
-          </p:nvPr>
-        </p:nvSpPr>
-        <p:spPr>
-          <a:xfrm>
-            <a:off x="1484310" y="2242127"/>
-            <a:ext cx="10018713" cy="3124201"/>
-          </a:xfrm>
-        </p:spPr>
-        <p:txBody>
-          <a:bodyPr>
-            <a:normAutofit/>
-          </a:bodyPr>
-          <a:lstStyle/>
-          <a:p>
-            <a:pPr marL="0" indent="0" algn="ctr">
-              <a:buNone/>
-            </a:pPr>
-            <a:r>
-              <a:rPr lang="en-US" b="1" dirty="0"/>
-              <a:t>Strong Named Assemblies Belong in the GAC </a:t>
-            </a:r>
-          </a:p>
-          <a:p>
-            <a:pPr marL="0" indent="0">
-              <a:buNone/>
-            </a:pPr>
-            <a:r>
-              <a:rPr lang="en-US" dirty="0"/>
-              <a:t>If your assemblies have strong names, make sure to place them in the global assembly cache (GAC). </a:t>
-            </a:r>
-          </a:p>
-          <a:p>
-            <a:pPr marL="0" indent="0">
-              <a:buNone/>
-            </a:pPr>
-            <a:r>
-              <a:rPr lang="en-US" dirty="0"/>
-              <a:t>Otherwise, loading the assembly requires touching almost every page to verify its digital signature. </a:t>
-            </a:r>
-          </a:p>
-          <a:p>
-            <a:pPr marL="0" indent="0">
-              <a:buNone/>
-            </a:pPr>
-            <a:r>
-              <a:rPr lang="en-US" dirty="0"/>
-              <a:t>Verification of strong names when the assembly is not placed in the GAC will also diminish any performance gains from </a:t>
-            </a:r>
-            <a:r>
-              <a:rPr lang="en-US" dirty="0" err="1"/>
-              <a:t>NGen</a:t>
-            </a:r>
-            <a:r>
-              <a:rPr lang="en-US" dirty="0"/>
-              <a:t>.</a:t>
-            </a:r>
-            <a:endParaRPr lang="en-US" i="1" dirty="0"/>
-          </a:p>
-        </p:txBody>
-      </p:sp>
-      <p:sp>
-        <p:nvSpPr>
-          <p:cNvPr id="4" name="TextBox 3">
-            <a:extLst>
-              <a:ext uri="{FF2B5EF4-FFF2-40B4-BE49-F238E27FC236}">
-                <a16:creationId xmlns:a16="http://schemas.microsoft.com/office/drawing/2014/main" id="{A7C2A8CC-7366-4646-9717-10016A06F742}"/>
-              </a:ext>
-            </a:extLst>
-          </p:cNvPr>
-          <p:cNvSpPr txBox="1"/>
-          <p:nvPr/>
-        </p:nvSpPr>
-        <p:spPr>
-          <a:xfrm>
-            <a:off x="4494070" y="5855854"/>
-            <a:ext cx="7008953" cy="646331"/>
-          </a:xfrm>
-          <a:prstGeom prst="rect">
-            <a:avLst/>
-          </a:prstGeom>
-          <a:noFill/>
-        </p:spPr>
-        <p:txBody>
-          <a:bodyPr wrap="square" rtlCol="0">
-            <a:spAutoFit/>
-          </a:bodyPr>
-          <a:lstStyle/>
-          <a:p>
-            <a:r>
-              <a:rPr lang="en-US" dirty="0"/>
-              <a:t>See also: </a:t>
-            </a:r>
-          </a:p>
-          <a:p>
-            <a:pPr marL="285750" indent="-285750">
-              <a:buFont typeface="Arial" panose="020B0604020202020204" pitchFamily="34" charset="0"/>
-              <a:buChar char="•"/>
-            </a:pPr>
-            <a:r>
-              <a:rPr lang="en-US" dirty="0"/>
-              <a:t>Pro .NET Performance: Optimize Your C# Applications. Page 289</a:t>
-            </a:r>
-          </a:p>
-        </p:txBody>
-      </p:sp>
-    </p:spTree>
-    <p:extLst>
-      <p:ext uri="{BB962C8B-B14F-4D97-AF65-F5344CB8AC3E}">
-        <p14:creationId xmlns:p14="http://schemas.microsoft.com/office/powerpoint/2010/main" val="3233133832"/>
       </p:ext>
     </p:extLst>
   </p:cSld>
@@ -8957,7 +9998,7 @@
           <p:cNvPr id="2" name="Title 1">
             <a:extLst>
               <a:ext uri="{FF2B5EF4-FFF2-40B4-BE49-F238E27FC236}">
-                <a16:creationId xmlns:a16="http://schemas.microsoft.com/office/drawing/2014/main" id="{A0E7C6FB-3B10-4AC3-B4B3-D5F95CDB8ACD}"/>
+                <a16:creationId xmlns:a16="http://schemas.microsoft.com/office/drawing/2014/main" id="{09619E5A-9C6F-46E0-8395-140AC3D184CD}"/>
               </a:ext>
             </a:extLst>
           </p:cNvPr>
@@ -8970,8 +10011,8 @@
         </p:nvSpPr>
         <p:spPr>
           <a:xfrm>
-            <a:off x="1484311" y="685800"/>
-            <a:ext cx="10018713" cy="923925"/>
+            <a:off x="1484311" y="685801"/>
+            <a:ext cx="10018713" cy="1066800"/>
           </a:xfrm>
         </p:spPr>
         <p:txBody>
@@ -8982,14 +10023,14 @@
           <a:p>
             <a:r>
               <a:rPr lang="en-US" dirty="0"/>
-              <a:t>Sharing assemblies between processes. </a:t>
+              <a:t>Sharing assemblies between application domains. </a:t>
             </a:r>
             <a:br>
               <a:rPr lang="en-US" dirty="0"/>
             </a:br>
             <a:r>
               <a:rPr lang="en-US" dirty="0"/>
-              <a:t>Concept native images.</a:t>
+              <a:t>Concept domain neutral assembly. </a:t>
             </a:r>
           </a:p>
         </p:txBody>
@@ -8999,7 +10040,7 @@
           <p:cNvPr id="3" name="Content Placeholder 2">
             <a:extLst>
               <a:ext uri="{FF2B5EF4-FFF2-40B4-BE49-F238E27FC236}">
-                <a16:creationId xmlns:a16="http://schemas.microsoft.com/office/drawing/2014/main" id="{52B8DBDA-8455-4186-8C64-D98E6D1C6A48}"/>
+                <a16:creationId xmlns:a16="http://schemas.microsoft.com/office/drawing/2014/main" id="{F5BF9354-5E70-4F1E-9E61-289C2FB3ED00}"/>
               </a:ext>
             </a:extLst>
           </p:cNvPr>
@@ -9010,133 +10051,104 @@
             <p:ph idx="1"/>
           </p:nvPr>
         </p:nvSpPr>
-        <p:spPr>
-          <a:xfrm>
-            <a:off x="1484310" y="2495549"/>
-            <a:ext cx="10018713" cy="3124201"/>
-          </a:xfrm>
-        </p:spPr>
-        <p:txBody>
-          <a:bodyPr/>
+        <p:spPr/>
+        <p:txBody>
+          <a:bodyPr>
+            <a:normAutofit fontScale="92500" lnSpcReduction="10000"/>
+          </a:bodyPr>
           <a:lstStyle/>
           <a:p>
             <a:pPr marL="0" indent="0">
               <a:buNone/>
             </a:pPr>
             <a:r>
+              <a:rPr lang="en-US" b="1" dirty="0"/>
+              <a:t>Conclusion from slide:</a:t>
+            </a:r>
+          </a:p>
+          <a:p>
+            <a:r>
               <a:rPr lang="en-US" dirty="0"/>
-              <a:t>Summary of usage</a:t>
-            </a:r>
-          </a:p>
-          <a:p>
-            <a:r>
-              <a:rPr lang="en-US" dirty="0"/>
-              <a:t>Native images enable code sharing between processes.</a:t>
-            </a:r>
-          </a:p>
-          <a:p>
-            <a:r>
-              <a:rPr lang="en-US" dirty="0"/>
-              <a:t>Native images require a smaller initial working set because there is no need for the JIT compiler.</a:t>
-            </a:r>
-          </a:p>
-          <a:p>
-            <a:r>
-              <a:rPr lang="en-US" dirty="0"/>
-              <a:t>Native images load faster than MSIL because they eliminate the need for many startup activities, such as JIT compilation and type-safety verification.</a:t>
-            </a:r>
-          </a:p>
-          <a:p>
-            <a:endParaRPr lang="en-US" dirty="0"/>
-          </a:p>
-        </p:txBody>
-      </p:sp>
-      <p:sp>
-        <p:nvSpPr>
-          <p:cNvPr id="4" name="TextBox 3">
+              <a:t>An assembly can be domain neutral if and only if it is in GAC, and all the assemblies in its transitive binding closure are all in GAC.</a:t>
+            </a:r>
+          </a:p>
+          <a:p>
+            <a:pPr marL="0" indent="0">
+              <a:buNone/>
+            </a:pPr>
+            <a:r>
+              <a:rPr lang="en-US" i="1" dirty="0"/>
+              <a:t>It has an unfortunate consequence that you can never update strongly named assemblies once it is loaded in domain. Remember all the </a:t>
+            </a:r>
+            <a:r>
+              <a:rPr lang="en-US" i="1" dirty="0" err="1"/>
+              <a:t>jitted</a:t>
+            </a:r>
+            <a:r>
+              <a:rPr lang="en-US" i="1" dirty="0"/>
+              <a:t> code and runtime data structures are shared between </a:t>
+            </a:r>
+            <a:r>
+              <a:rPr lang="en-US" i="1" dirty="0" err="1"/>
+              <a:t>appdomains</a:t>
+            </a:r>
+            <a:r>
+              <a:rPr lang="en-US" i="1" dirty="0"/>
+              <a:t>. This can only be done if the same native code is valid for all the </a:t>
+            </a:r>
+            <a:r>
+              <a:rPr lang="en-US" i="1" dirty="0" err="1"/>
+              <a:t>appdomains</a:t>
+            </a:r>
+            <a:r>
+              <a:rPr lang="en-US" i="1" dirty="0"/>
+              <a:t>. This is not always true. Specifically, the two </a:t>
+            </a:r>
+            <a:r>
+              <a:rPr lang="en-US" i="1" dirty="0" err="1"/>
+              <a:t>appdomains</a:t>
+            </a:r>
+            <a:r>
+              <a:rPr lang="en-US" i="1" dirty="0"/>
+              <a:t> may have different binding policies and security polices, as well as other differences.</a:t>
+            </a:r>
+          </a:p>
+        </p:txBody>
+      </p:sp>
+      <p:sp>
+        <p:nvSpPr>
+          <p:cNvPr id="5" name="Slide Number Placeholder 4">
             <a:extLst>
               <a:ext uri="{FF2B5EF4-FFF2-40B4-BE49-F238E27FC236}">
-                <a16:creationId xmlns:a16="http://schemas.microsoft.com/office/drawing/2014/main" id="{9F770282-ED54-4DDB-AEC9-2A6F9A6B6553}"/>
+                <a16:creationId xmlns:a16="http://schemas.microsoft.com/office/drawing/2014/main" id="{1EB71862-796C-46C8-A415-3C21CCF3B4E1}"/>
               </a:ext>
             </a:extLst>
           </p:cNvPr>
-          <p:cNvSpPr txBox="1"/>
-          <p:nvPr/>
-        </p:nvSpPr>
-        <p:spPr>
-          <a:xfrm>
-            <a:off x="2466975" y="6057900"/>
-            <a:ext cx="9036047" cy="646331"/>
-          </a:xfrm>
-          <a:prstGeom prst="rect">
-            <a:avLst/>
-          </a:prstGeom>
-          <a:noFill/>
-        </p:spPr>
-        <p:txBody>
-          <a:bodyPr wrap="square" rtlCol="0">
-            <a:spAutoFit/>
-          </a:bodyPr>
-          <a:lstStyle/>
-          <a:p>
-            <a:r>
-              <a:rPr lang="en-US" dirty="0"/>
-              <a:t>See also:</a:t>
-            </a:r>
-          </a:p>
-          <a:p>
-            <a:r>
-              <a:rPr lang="en-US" dirty="0">
-                <a:hlinkClick r:id="rId2"/>
-              </a:rPr>
-              <a:t>https://docs.microsoft.com/en-us/dotnet/framework/tools/ngen-exe-native-image-generator</a:t>
-            </a:r>
-            <a:r>
-              <a:rPr lang="en-US" dirty="0"/>
-              <a:t> </a:t>
-            </a:r>
-          </a:p>
-        </p:txBody>
-      </p:sp>
-      <p:sp>
-        <p:nvSpPr>
-          <p:cNvPr id="5" name="TextBox 4">
-            <a:extLst>
-              <a:ext uri="{FF2B5EF4-FFF2-40B4-BE49-F238E27FC236}">
-                <a16:creationId xmlns:a16="http://schemas.microsoft.com/office/drawing/2014/main" id="{E68C30F3-ABD5-402C-B90F-325DDF5E4314}"/>
-              </a:ext>
-            </a:extLst>
-          </p:cNvPr>
-          <p:cNvSpPr txBox="1"/>
-          <p:nvPr/>
-        </p:nvSpPr>
-        <p:spPr>
-          <a:xfrm>
-            <a:off x="4705869" y="1819275"/>
-            <a:ext cx="4328621" cy="430887"/>
-          </a:xfrm>
-          <a:prstGeom prst="rect">
-            <a:avLst/>
-          </a:prstGeom>
-          <a:noFill/>
-        </p:spPr>
-        <p:txBody>
-          <a:bodyPr wrap="none" rtlCol="0">
-            <a:spAutoFit/>
-          </a:bodyPr>
-          <a:lstStyle/>
-          <a:p>
-            <a:r>
-              <a:rPr lang="de-DE" sz="2200" dirty="0"/>
-              <a:t>Ngen.exe (Native Image Generator)</a:t>
-            </a:r>
+          <p:cNvSpPr>
+            <a:spLocks noGrp="1"/>
+          </p:cNvSpPr>
+          <p:nvPr>
+            <p:ph type="sldNum" sz="quarter" idx="12"/>
+          </p:nvPr>
+        </p:nvSpPr>
+        <p:spPr/>
+        <p:txBody>
+          <a:bodyPr/>
+          <a:lstStyle/>
+          <a:p>
+            <a:fld id="{D57F1E4F-1CFF-5643-939E-217C01CDF565}" type="slidenum">
+              <a:rPr lang="en-US" sz="1400" smtClean="0"/>
+              <a:pPr/>
+              <a:t>9</a:t>
+            </a:fld>
+            <a:endParaRPr lang="en-US" sz="1400" dirty="0"/>
           </a:p>
         </p:txBody>
       </p:sp>
     </p:spTree>
     <p:extLst>
       <p:ext uri="{BB962C8B-B14F-4D97-AF65-F5344CB8AC3E}">
-        <p14:creationId xmlns:p14="http://schemas.microsoft.com/office/powerpoint/2010/main" val="2254905752"/>
+        <p14:creationId xmlns:p14="http://schemas.microsoft.com/office/powerpoint/2010/main" val="3754122186"/>
       </p:ext>
     </p:extLst>
   </p:cSld>

</xml_diff>

<commit_message>
Presentation add slide with summary
</commit_message>
<xml_diff>
--- a/presentation/Sharing common assemblies.pptx
+++ b/presentation/Sharing common assemblies.pptx
@@ -5,7 +5,7 @@
     <p:sldMasterId id="2147483648" r:id="rId1"/>
   </p:sldMasterIdLst>
   <p:notesMasterIdLst>
-    <p:notesMasterId r:id="rId15"/>
+    <p:notesMasterId r:id="rId16"/>
   </p:notesMasterIdLst>
   <p:sldIdLst>
     <p:sldId id="256" r:id="rId2"/>
@@ -20,7 +20,8 @@
     <p:sldId id="286" r:id="rId11"/>
     <p:sldId id="284" r:id="rId12"/>
     <p:sldId id="285" r:id="rId13"/>
-    <p:sldId id="277" r:id="rId14"/>
+    <p:sldId id="291" r:id="rId14"/>
+    <p:sldId id="277" r:id="rId15"/>
   </p:sldIdLst>
   <p:sldSz cx="12192000" cy="6858000"/>
   <p:notesSz cx="6858000" cy="9144000"/>
@@ -213,7 +214,7 @@
           <a:p>
             <a:fld id="{7F262928-0CDC-44E0-A3C2-1349897640B6}" type="datetimeFigureOut">
               <a:rPr lang="en-US" smtClean="0"/>
-              <a:t>2/4/2018</a:t>
+              <a:t>2/5/2018</a:t>
             </a:fld>
             <a:endParaRPr lang="en-US"/>
           </a:p>
@@ -1078,7 +1079,7 @@
           <a:p>
             <a:fld id="{224EB7CA-D7F8-4D62-9304-30BA067B3D55}" type="datetime1">
               <a:rPr lang="en-US" smtClean="0"/>
-              <a:t>2/4/2018</a:t>
+              <a:t>2/5/2018</a:t>
             </a:fld>
             <a:endParaRPr lang="en-US" dirty="0"/>
           </a:p>
@@ -1370,7 +1371,7 @@
           <a:p>
             <a:fld id="{78594FD9-4BB0-4608-BD71-DE85AF8B0C94}" type="datetime1">
               <a:rPr lang="en-US" smtClean="0"/>
-              <a:t>2/4/2018</a:t>
+              <a:t>2/5/2018</a:t>
             </a:fld>
             <a:endParaRPr lang="en-US" dirty="0"/>
           </a:p>
@@ -1614,7 +1615,7 @@
           <a:p>
             <a:fld id="{80F14A8D-8CB6-4DF7-BB03-9ADF328541C3}" type="datetime1">
               <a:rPr lang="en-US" smtClean="0"/>
-              <a:t>2/4/2018</a:t>
+              <a:t>2/5/2018</a:t>
             </a:fld>
             <a:endParaRPr lang="en-US" dirty="0"/>
           </a:p>
@@ -2150,7 +2151,7 @@
           <a:p>
             <a:fld id="{12C8657D-6EFD-44FE-A6B1-FC3314E45B04}" type="datetime1">
               <a:rPr lang="en-US" smtClean="0"/>
-              <a:t>2/4/2018</a:t>
+              <a:t>2/5/2018</a:t>
             </a:fld>
             <a:endParaRPr lang="en-US" dirty="0"/>
           </a:p>
@@ -2394,7 +2395,7 @@
           <a:p>
             <a:fld id="{3C22B71E-C0BD-47ED-A0E5-D73AF8DAABF6}" type="datetime1">
               <a:rPr lang="en-US" smtClean="0"/>
-              <a:t>2/4/2018</a:t>
+              <a:t>2/5/2018</a:t>
             </a:fld>
             <a:endParaRPr lang="en-US" dirty="0"/>
           </a:p>
@@ -2922,7 +2923,7 @@
           <a:p>
             <a:fld id="{ABE61F29-A317-4BB7-AEDD-37E228401F6A}" type="datetime1">
               <a:rPr lang="en-US" smtClean="0"/>
-              <a:t>2/4/2018</a:t>
+              <a:t>2/5/2018</a:t>
             </a:fld>
             <a:endParaRPr lang="en-US" dirty="0"/>
           </a:p>
@@ -3215,7 +3216,7 @@
           <a:p>
             <a:fld id="{FA7F1050-A139-4782-A1EE-67CE90110BBE}" type="datetime1">
               <a:rPr lang="en-US" smtClean="0"/>
-              <a:t>2/4/2018</a:t>
+              <a:t>2/5/2018</a:t>
             </a:fld>
             <a:endParaRPr lang="en-US" dirty="0"/>
           </a:p>
@@ -3385,7 +3386,7 @@
           <a:p>
             <a:fld id="{F3AAD345-0762-4223-96B9-208D94F07C91}" type="datetime1">
               <a:rPr lang="en-US" smtClean="0"/>
-              <a:t>2/4/2018</a:t>
+              <a:t>2/5/2018</a:t>
             </a:fld>
             <a:endParaRPr lang="en-US" dirty="0"/>
           </a:p>
@@ -3561,7 +3562,7 @@
           <a:p>
             <a:fld id="{203D6735-A7AF-42E2-85D0-894B50621292}" type="datetime1">
               <a:rPr lang="en-US" smtClean="0"/>
-              <a:t>2/4/2018</a:t>
+              <a:t>2/5/2018</a:t>
             </a:fld>
             <a:endParaRPr lang="en-US" dirty="0"/>
           </a:p>
@@ -3768,7 +3769,7 @@
           <a:p>
             <a:fld id="{75176718-5527-4FAB-B437-FCE82648AEEB}" type="datetime1">
               <a:rPr lang="en-US" smtClean="0"/>
-              <a:t>2/4/2018</a:t>
+              <a:t>2/5/2018</a:t>
             </a:fld>
             <a:endParaRPr lang="en-US" dirty="0"/>
           </a:p>
@@ -4015,7 +4016,7 @@
           <a:p>
             <a:fld id="{A2ECFFF3-0198-4D32-9ABA-0F0069AD8BC6}" type="datetime1">
               <a:rPr lang="en-US" smtClean="0"/>
-              <a:t>2/4/2018</a:t>
+              <a:t>2/5/2018</a:t>
             </a:fld>
             <a:endParaRPr lang="en-US" dirty="0"/>
           </a:p>
@@ -4358,7 +4359,7 @@
           <a:p>
             <a:fld id="{3CB9EE01-0F27-46F0-BCC0-C0DFDC5C8A8D}" type="datetime1">
               <a:rPr lang="en-US" smtClean="0"/>
-              <a:t>2/4/2018</a:t>
+              <a:t>2/5/2018</a:t>
             </a:fld>
             <a:endParaRPr lang="en-US" dirty="0"/>
           </a:p>
@@ -4846,7 +4847,7 @@
           <a:p>
             <a:fld id="{6B903B12-225C-4E1B-97C4-5C9BAF9747F6}" type="datetime1">
               <a:rPr lang="en-US" smtClean="0"/>
-              <a:t>2/4/2018</a:t>
+              <a:t>2/5/2018</a:t>
             </a:fld>
             <a:endParaRPr lang="en-US" dirty="0"/>
           </a:p>
@@ -4960,7 +4961,7 @@
           <a:p>
             <a:fld id="{0DBF0E80-EEBA-4911-9FFE-EE5B4FB0B0C4}" type="datetime1">
               <a:rPr lang="en-US" smtClean="0"/>
-              <a:t>2/4/2018</a:t>
+              <a:t>2/5/2018</a:t>
             </a:fld>
             <a:endParaRPr lang="en-US" dirty="0"/>
           </a:p>
@@ -5051,7 +5052,7 @@
           <a:p>
             <a:fld id="{802BC30E-BE77-4BD6-825A-556CCECBBD5F}" type="datetime1">
               <a:rPr lang="en-US" smtClean="0"/>
-              <a:t>2/4/2018</a:t>
+              <a:t>2/5/2018</a:t>
             </a:fld>
             <a:endParaRPr lang="en-US" dirty="0"/>
           </a:p>
@@ -5330,7 +5331,7 @@
           <a:p>
             <a:fld id="{01AE9536-3169-430D-A3EC-03C1DAAD324C}" type="datetime1">
               <a:rPr lang="en-US" smtClean="0"/>
-              <a:t>2/4/2018</a:t>
+              <a:t>2/5/2018</a:t>
             </a:fld>
             <a:endParaRPr lang="en-US" dirty="0"/>
           </a:p>
@@ -5617,7 +5618,7 @@
           <a:p>
             <a:fld id="{17BAD071-1EB6-4379-8228-408A106BFDF0}" type="datetime1">
               <a:rPr lang="en-US" smtClean="0"/>
-              <a:t>2/4/2018</a:t>
+              <a:t>2/5/2018</a:t>
             </a:fld>
             <a:endParaRPr lang="en-US" dirty="0"/>
           </a:p>
@@ -6143,7 +6144,7 @@
           <a:p>
             <a:fld id="{3D2EF4AA-A067-4041-90FF-0766BB9D10CB}" type="datetime1">
               <a:rPr lang="en-US" smtClean="0"/>
-              <a:t>2/4/2018</a:t>
+              <a:t>2/5/2018</a:t>
             </a:fld>
             <a:endParaRPr lang="en-US" dirty="0"/>
           </a:p>
@@ -7667,6 +7668,478 @@
       </p:grpSpPr>
       <p:sp>
         <p:nvSpPr>
+          <p:cNvPr id="2" name="Title 1">
+            <a:extLst>
+              <a:ext uri="{FF2B5EF4-FFF2-40B4-BE49-F238E27FC236}">
+                <a16:creationId xmlns:a16="http://schemas.microsoft.com/office/drawing/2014/main" id="{5BA0D62C-CC82-4A24-BD6F-63900F58012F}"/>
+              </a:ext>
+            </a:extLst>
+          </p:cNvPr>
+          <p:cNvSpPr>
+            <a:spLocks noGrp="1"/>
+          </p:cNvSpPr>
+          <p:nvPr>
+            <p:ph type="title"/>
+          </p:nvPr>
+        </p:nvSpPr>
+        <p:spPr>
+          <a:xfrm>
+            <a:off x="1484311" y="685800"/>
+            <a:ext cx="10018713" cy="459509"/>
+          </a:xfrm>
+        </p:spPr>
+        <p:txBody>
+          <a:bodyPr>
+            <a:normAutofit fontScale="90000"/>
+          </a:bodyPr>
+          <a:lstStyle/>
+          <a:p>
+            <a:r>
+              <a:rPr lang="en-US" dirty="0"/>
+              <a:t>Summary</a:t>
+            </a:r>
+          </a:p>
+        </p:txBody>
+      </p:sp>
+      <p:sp>
+        <p:nvSpPr>
+          <p:cNvPr id="4" name="Slide Number Placeholder 3">
+            <a:extLst>
+              <a:ext uri="{FF2B5EF4-FFF2-40B4-BE49-F238E27FC236}">
+                <a16:creationId xmlns:a16="http://schemas.microsoft.com/office/drawing/2014/main" id="{5B2E16E3-BFCB-48D8-8196-45581CC2018E}"/>
+              </a:ext>
+            </a:extLst>
+          </p:cNvPr>
+          <p:cNvSpPr>
+            <a:spLocks noGrp="1"/>
+          </p:cNvSpPr>
+          <p:nvPr>
+            <p:ph type="sldNum" sz="quarter" idx="12"/>
+          </p:nvPr>
+        </p:nvSpPr>
+        <p:spPr/>
+        <p:txBody>
+          <a:bodyPr/>
+          <a:lstStyle/>
+          <a:p>
+            <a:fld id="{D57F1E4F-1CFF-5643-939E-217C01CDF565}" type="slidenum">
+              <a:rPr lang="en-US" smtClean="0"/>
+              <a:pPr/>
+              <a:t>13</a:t>
+            </a:fld>
+            <a:endParaRPr lang="en-US" dirty="0"/>
+          </a:p>
+        </p:txBody>
+      </p:sp>
+      <p:graphicFrame>
+        <p:nvGraphicFramePr>
+          <p:cNvPr id="5" name="Table 4">
+            <a:extLst>
+              <a:ext uri="{FF2B5EF4-FFF2-40B4-BE49-F238E27FC236}">
+                <a16:creationId xmlns:a16="http://schemas.microsoft.com/office/drawing/2014/main" id="{9A87113C-51FB-4630-9731-3458D64FC476}"/>
+              </a:ext>
+            </a:extLst>
+          </p:cNvPr>
+          <p:cNvGraphicFramePr>
+            <a:graphicFrameLocks noGrp="1"/>
+          </p:cNvGraphicFramePr>
+          <p:nvPr>
+            <p:extLst>
+              <p:ext uri="{D42A27DB-BD31-4B8C-83A1-F6EECF244321}">
+                <p14:modId xmlns:p14="http://schemas.microsoft.com/office/powerpoint/2010/main" val="1765637218"/>
+              </p:ext>
+            </p:extLst>
+          </p:nvPr>
+        </p:nvGraphicFramePr>
+        <p:xfrm>
+          <a:off x="2032000" y="1606357"/>
+          <a:ext cx="8128000" cy="3388360"/>
+        </p:xfrm>
+        <a:graphic>
+          <a:graphicData uri="http://schemas.openxmlformats.org/drawingml/2006/table">
+            <a:tbl>
+              <a:tblPr firstRow="1" bandRow="1">
+                <a:tableStyleId>{5C22544A-7EE6-4342-B048-85BDC9FD1C3A}</a:tableStyleId>
+              </a:tblPr>
+              <a:tblGrid>
+                <a:gridCol w="2133600">
+                  <a:extLst>
+                    <a:ext uri="{9D8B030D-6E8A-4147-A177-3AD203B41FA5}">
+                      <a16:colId xmlns:a16="http://schemas.microsoft.com/office/drawing/2014/main" val="1362541165"/>
+                    </a:ext>
+                  </a:extLst>
+                </a:gridCol>
+                <a:gridCol w="1930400">
+                  <a:extLst>
+                    <a:ext uri="{9D8B030D-6E8A-4147-A177-3AD203B41FA5}">
+                      <a16:colId xmlns:a16="http://schemas.microsoft.com/office/drawing/2014/main" val="3332368562"/>
+                    </a:ext>
+                  </a:extLst>
+                </a:gridCol>
+                <a:gridCol w="2032000">
+                  <a:extLst>
+                    <a:ext uri="{9D8B030D-6E8A-4147-A177-3AD203B41FA5}">
+                      <a16:colId xmlns:a16="http://schemas.microsoft.com/office/drawing/2014/main" val="3248028998"/>
+                    </a:ext>
+                  </a:extLst>
+                </a:gridCol>
+                <a:gridCol w="2032000">
+                  <a:extLst>
+                    <a:ext uri="{9D8B030D-6E8A-4147-A177-3AD203B41FA5}">
+                      <a16:colId xmlns:a16="http://schemas.microsoft.com/office/drawing/2014/main" val="1079149305"/>
+                    </a:ext>
+                  </a:extLst>
+                </a:gridCol>
+              </a:tblGrid>
+              <a:tr h="370840">
+                <a:tc>
+                  <a:txBody>
+                    <a:bodyPr/>
+                    <a:lstStyle/>
+                    <a:p>
+                      <a:pPr algn="ctr"/>
+                      <a:r>
+                        <a:rPr lang="en-US" dirty="0"/>
+                        <a:t>Step</a:t>
+                      </a:r>
+                    </a:p>
+                  </a:txBody>
+                  <a:tcPr/>
+                </a:tc>
+                <a:tc>
+                  <a:txBody>
+                    <a:bodyPr/>
+                    <a:lstStyle/>
+                    <a:p>
+                      <a:pPr algn="ctr"/>
+                      <a:r>
+                        <a:rPr lang="en-US" dirty="0"/>
+                        <a:t>Warming time</a:t>
+                      </a:r>
+                    </a:p>
+                  </a:txBody>
+                  <a:tcPr/>
+                </a:tc>
+                <a:tc>
+                  <a:txBody>
+                    <a:bodyPr/>
+                    <a:lstStyle/>
+                    <a:p>
+                      <a:pPr algn="ctr"/>
+                      <a:r>
+                        <a:rPr lang="en-US" dirty="0"/>
+                        <a:t>Total memory usage</a:t>
+                      </a:r>
+                    </a:p>
+                  </a:txBody>
+                  <a:tcPr/>
+                </a:tc>
+                <a:tc>
+                  <a:txBody>
+                    <a:bodyPr/>
+                    <a:lstStyle/>
+                    <a:p>
+                      <a:pPr algn="ctr"/>
+                      <a:r>
+                        <a:rPr lang="en-US" dirty="0"/>
+                        <a:t>Average memory usage per service</a:t>
+                      </a:r>
+                    </a:p>
+                  </a:txBody>
+                  <a:tcPr/>
+                </a:tc>
+                <a:extLst>
+                  <a:ext uri="{0D108BD9-81ED-4DB2-BD59-A6C34878D82A}">
+                    <a16:rowId xmlns:a16="http://schemas.microsoft.com/office/drawing/2014/main" val="2601219376"/>
+                  </a:ext>
+                </a:extLst>
+              </a:tr>
+              <a:tr h="370840">
+                <a:tc>
+                  <a:txBody>
+                    <a:bodyPr/>
+                    <a:lstStyle/>
+                    <a:p>
+                      <a:r>
+                        <a:rPr lang="en-US" dirty="0"/>
+                        <a:t>Initial conditions **</a:t>
+                      </a:r>
+                    </a:p>
+                  </a:txBody>
+                  <a:tcPr/>
+                </a:tc>
+                <a:tc>
+                  <a:txBody>
+                    <a:bodyPr/>
+                    <a:lstStyle/>
+                    <a:p>
+                      <a:r>
+                        <a:rPr lang="en-US" dirty="0"/>
+                        <a:t>6 min 43 sec</a:t>
+                      </a:r>
+                    </a:p>
+                  </a:txBody>
+                  <a:tcPr/>
+                </a:tc>
+                <a:tc>
+                  <a:txBody>
+                    <a:bodyPr/>
+                    <a:lstStyle/>
+                    <a:p>
+                      <a:r>
+                        <a:rPr lang="en-US" dirty="0"/>
+                        <a:t>8 GB</a:t>
+                      </a:r>
+                    </a:p>
+                  </a:txBody>
+                  <a:tcPr/>
+                </a:tc>
+                <a:tc>
+                  <a:txBody>
+                    <a:bodyPr/>
+                    <a:lstStyle/>
+                    <a:p>
+                      <a:r>
+                        <a:rPr lang="en-US" dirty="0"/>
+                        <a:t>7 GB / 47 = 152 Mb</a:t>
+                      </a:r>
+                    </a:p>
+                  </a:txBody>
+                  <a:tcPr/>
+                </a:tc>
+                <a:extLst>
+                  <a:ext uri="{0D108BD9-81ED-4DB2-BD59-A6C34878D82A}">
+                    <a16:rowId xmlns:a16="http://schemas.microsoft.com/office/drawing/2014/main" val="3922901758"/>
+                  </a:ext>
+                </a:extLst>
+              </a:tr>
+              <a:tr h="370840">
+                <a:tc>
+                  <a:txBody>
+                    <a:bodyPr/>
+                    <a:lstStyle/>
+                    <a:p>
+                      <a:r>
+                        <a:rPr lang="en-US" dirty="0"/>
+                        <a:t>1. App pools combining </a:t>
+                      </a:r>
+                    </a:p>
+                    <a:p>
+                      <a:r>
+                        <a:rPr lang="en-US" dirty="0"/>
+                        <a:t>2. load lib to GAC **</a:t>
+                      </a:r>
+                    </a:p>
+                  </a:txBody>
+                  <a:tcPr/>
+                </a:tc>
+                <a:tc>
+                  <a:txBody>
+                    <a:bodyPr/>
+                    <a:lstStyle/>
+                    <a:p>
+                      <a:r>
+                        <a:rPr lang="en-US" dirty="0"/>
+                        <a:t>2 min 33 sec</a:t>
+                      </a:r>
+                    </a:p>
+                  </a:txBody>
+                  <a:tcPr/>
+                </a:tc>
+                <a:tc>
+                  <a:txBody>
+                    <a:bodyPr/>
+                    <a:lstStyle/>
+                    <a:p>
+                      <a:r>
+                        <a:rPr lang="en-US" dirty="0"/>
+                        <a:t>4.1 GB</a:t>
+                      </a:r>
+                    </a:p>
+                  </a:txBody>
+                  <a:tcPr/>
+                </a:tc>
+                <a:tc>
+                  <a:txBody>
+                    <a:bodyPr/>
+                    <a:lstStyle/>
+                    <a:p>
+                      <a:r>
+                        <a:rPr lang="en-US" dirty="0"/>
+                        <a:t>3.1 GB / 47 = 67 Mb</a:t>
+                      </a:r>
+                    </a:p>
+                  </a:txBody>
+                  <a:tcPr/>
+                </a:tc>
+                <a:extLst>
+                  <a:ext uri="{0D108BD9-81ED-4DB2-BD59-A6C34878D82A}">
+                    <a16:rowId xmlns:a16="http://schemas.microsoft.com/office/drawing/2014/main" val="2165869157"/>
+                  </a:ext>
+                </a:extLst>
+              </a:tr>
+              <a:tr h="370840">
+                <a:tc>
+                  <a:txBody>
+                    <a:bodyPr/>
+                    <a:lstStyle/>
+                    <a:p>
+                      <a:r>
+                        <a:rPr lang="en-US" dirty="0"/>
+                        <a:t>1. App pools combining </a:t>
+                      </a:r>
+                    </a:p>
+                    <a:p>
+                      <a:r>
+                        <a:rPr lang="en-US" dirty="0"/>
+                        <a:t>2. load lib to GAC</a:t>
+                      </a:r>
+                    </a:p>
+                    <a:p>
+                      <a:r>
+                        <a:rPr lang="en-US" dirty="0"/>
+                        <a:t>3. make native images</a:t>
+                      </a:r>
+                    </a:p>
+                  </a:txBody>
+                  <a:tcPr/>
+                </a:tc>
+                <a:tc>
+                  <a:txBody>
+                    <a:bodyPr/>
+                    <a:lstStyle/>
+                    <a:p>
+                      <a:r>
+                        <a:rPr lang="en-US" dirty="0"/>
+                        <a:t>2 min 12 sec</a:t>
+                      </a:r>
+                    </a:p>
+                  </a:txBody>
+                  <a:tcPr/>
+                </a:tc>
+                <a:tc>
+                  <a:txBody>
+                    <a:bodyPr/>
+                    <a:lstStyle/>
+                    <a:p>
+                      <a:r>
+                        <a:rPr lang="en-US" dirty="0"/>
+                        <a:t>2.2 GB</a:t>
+                      </a:r>
+                    </a:p>
+                  </a:txBody>
+                  <a:tcPr/>
+                </a:tc>
+                <a:tc>
+                  <a:txBody>
+                    <a:bodyPr/>
+                    <a:lstStyle/>
+                    <a:p>
+                      <a:r>
+                        <a:rPr lang="en-US" dirty="0"/>
+                        <a:t>1.2 GB / 47 = 26 Mb</a:t>
+                      </a:r>
+                    </a:p>
+                  </a:txBody>
+                  <a:tcPr/>
+                </a:tc>
+                <a:extLst>
+                  <a:ext uri="{0D108BD9-81ED-4DB2-BD59-A6C34878D82A}">
+                    <a16:rowId xmlns:a16="http://schemas.microsoft.com/office/drawing/2014/main" val="1664331723"/>
+                  </a:ext>
+                </a:extLst>
+              </a:tr>
+            </a:tbl>
+          </a:graphicData>
+        </a:graphic>
+      </p:graphicFrame>
+      <p:sp>
+        <p:nvSpPr>
+          <p:cNvPr id="6" name="TextBox 5">
+            <a:extLst>
+              <a:ext uri="{FF2B5EF4-FFF2-40B4-BE49-F238E27FC236}">
+                <a16:creationId xmlns:a16="http://schemas.microsoft.com/office/drawing/2014/main" id="{B5D8F670-9D30-415A-85C7-463E12F13B68}"/>
+              </a:ext>
+            </a:extLst>
+          </p:cNvPr>
+          <p:cNvSpPr txBox="1"/>
+          <p:nvPr/>
+        </p:nvSpPr>
+        <p:spPr>
+          <a:xfrm>
+            <a:off x="2525759" y="5867131"/>
+            <a:ext cx="7223837" cy="830997"/>
+          </a:xfrm>
+          <a:prstGeom prst="rect">
+            <a:avLst/>
+          </a:prstGeom>
+          <a:noFill/>
+        </p:spPr>
+        <p:txBody>
+          <a:bodyPr wrap="none" rtlCol="0">
+            <a:spAutoFit/>
+          </a:bodyPr>
+          <a:lstStyle/>
+          <a:p>
+            <a:r>
+              <a:rPr lang="en-US" sz="1600" dirty="0"/>
+              <a:t>Remarks: </a:t>
+            </a:r>
+          </a:p>
+          <a:p>
+            <a:r>
+              <a:rPr lang="en-US" sz="1600" i="1" dirty="0"/>
+              <a:t>*    There are some deviations in values, because screenshot was made at different time</a:t>
+            </a:r>
+          </a:p>
+          <a:p>
+            <a:r>
+              <a:rPr lang="en-US" sz="1600" i="1" dirty="0"/>
+              <a:t>**  </a:t>
+            </a:r>
+            <a:r>
+              <a:rPr lang="en-US" sz="1600" i="1" dirty="0" err="1"/>
+              <a:t>NewRelic</a:t>
+            </a:r>
+            <a:r>
+              <a:rPr lang="en-US" sz="1600" i="1" dirty="0"/>
+              <a:t> agent installed</a:t>
+            </a:r>
+          </a:p>
+        </p:txBody>
+      </p:sp>
+    </p:spTree>
+    <p:extLst>
+      <p:ext uri="{BB962C8B-B14F-4D97-AF65-F5344CB8AC3E}">
+        <p14:creationId xmlns:p14="http://schemas.microsoft.com/office/powerpoint/2010/main" val="1252742885"/>
+      </p:ext>
+    </p:extLst>
+  </p:cSld>
+  <p:clrMapOvr>
+    <a:masterClrMapping/>
+  </p:clrMapOvr>
+</p:sld>
+</file>
+
+<file path=ppt/slides/slide14.xml><?xml version="1.0" encoding="utf-8"?>
+<p:sld xmlns:a="http://schemas.openxmlformats.org/drawingml/2006/main" xmlns:r="http://schemas.openxmlformats.org/officeDocument/2006/relationships" xmlns:p="http://schemas.openxmlformats.org/presentationml/2006/main">
+  <p:cSld>
+    <p:spTree>
+      <p:nvGrpSpPr>
+        <p:cNvPr id="1" name=""/>
+        <p:cNvGrpSpPr/>
+        <p:nvPr/>
+      </p:nvGrpSpPr>
+      <p:grpSpPr>
+        <a:xfrm>
+          <a:off x="0" y="0"/>
+          <a:ext cx="0" cy="0"/>
+          <a:chOff x="0" y="0"/>
+          <a:chExt cx="0" cy="0"/>
+        </a:xfrm>
+      </p:grpSpPr>
+      <p:sp>
+        <p:nvSpPr>
           <p:cNvPr id="2" name="Title 1"/>
           <p:cNvSpPr>
             <a:spLocks noGrp="1"/>
@@ -7812,7 +8285,7 @@
             <a:fld id="{D57F1E4F-1CFF-5643-939E-217C01CDF565}" type="slidenum">
               <a:rPr lang="en-US" sz="1400" smtClean="0"/>
               <a:pPr/>
-              <a:t>13</a:t>
+              <a:t>14</a:t>
             </a:fld>
             <a:endParaRPr lang="en-US" sz="1400" dirty="0"/>
           </a:p>

</xml_diff>

<commit_message>
Presentation add slides with memory types
</commit_message>
<xml_diff>
--- a/presentation/Sharing common assemblies.pptx
+++ b/presentation/Sharing common assemblies.pptx
@@ -5,7 +5,7 @@
     <p:sldMasterId id="2147483648" r:id="rId1"/>
   </p:sldMasterIdLst>
   <p:notesMasterIdLst>
-    <p:notesMasterId r:id="rId16"/>
+    <p:notesMasterId r:id="rId18"/>
   </p:notesMasterIdLst>
   <p:sldIdLst>
     <p:sldId id="256" r:id="rId2"/>
@@ -15,13 +15,15 @@
     <p:sldId id="288" r:id="rId6"/>
     <p:sldId id="287" r:id="rId7"/>
     <p:sldId id="290" r:id="rId8"/>
-    <p:sldId id="282" r:id="rId9"/>
-    <p:sldId id="283" r:id="rId10"/>
-    <p:sldId id="286" r:id="rId11"/>
-    <p:sldId id="284" r:id="rId12"/>
-    <p:sldId id="285" r:id="rId13"/>
-    <p:sldId id="291" r:id="rId14"/>
-    <p:sldId id="277" r:id="rId15"/>
+    <p:sldId id="294" r:id="rId9"/>
+    <p:sldId id="282" r:id="rId10"/>
+    <p:sldId id="292" r:id="rId11"/>
+    <p:sldId id="293" r:id="rId12"/>
+    <p:sldId id="283" r:id="rId13"/>
+    <p:sldId id="284" r:id="rId14"/>
+    <p:sldId id="285" r:id="rId15"/>
+    <p:sldId id="291" r:id="rId16"/>
+    <p:sldId id="277" r:id="rId17"/>
   </p:sldIdLst>
   <p:sldSz cx="12192000" cy="6858000"/>
   <p:notesSz cx="6858000" cy="9144000"/>
@@ -128,10 +130,6 @@
 </p:presentation>
 </file>
 
-<file path=ppt/revisionInfo.xml><?xml version="1.0" encoding="utf-8"?>
-<p1510:revInfo xmlns:a="http://schemas.openxmlformats.org/drawingml/2006/main" xmlns:r="http://schemas.openxmlformats.org/officeDocument/2006/relationships" xmlns:p1510="http://schemas.microsoft.com/office/powerpoint/2015/10/main"/>
-</file>
-
 <file path=ppt/notesMasters/notesMaster1.xml><?xml version="1.0" encoding="utf-8"?>
 <p:notesMaster xmlns:a="http://schemas.openxmlformats.org/drawingml/2006/main" xmlns:r="http://schemas.openxmlformats.org/officeDocument/2006/relationships" xmlns:p="http://schemas.openxmlformats.org/presentationml/2006/main">
   <p:cSld>
@@ -214,7 +212,7 @@
           <a:p>
             <a:fld id="{7F262928-0CDC-44E0-A3C2-1349897640B6}" type="datetimeFigureOut">
               <a:rPr lang="en-US" smtClean="0"/>
-              <a:t>2/5/2018</a:t>
+              <a:t>05-Feb-18</a:t>
             </a:fld>
             <a:endParaRPr lang="en-US"/>
           </a:p>
@@ -558,7 +556,7 @@
           <a:p>
             <a:fld id="{29B3F580-F237-4B16-A8AC-FCE0BDEB942E}" type="slidenum">
               <a:rPr lang="en-US" smtClean="0"/>
-              <a:t>8</a:t>
+              <a:t>9</a:t>
             </a:fld>
             <a:endParaRPr lang="en-US"/>
           </a:p>
@@ -568,6 +566,198 @@
     <p:extLst>
       <p:ext uri="{BB962C8B-B14F-4D97-AF65-F5344CB8AC3E}">
         <p14:creationId xmlns:p14="http://schemas.microsoft.com/office/powerpoint/2010/main" val="398922422"/>
+      </p:ext>
+    </p:extLst>
+  </p:cSld>
+  <p:clrMapOvr>
+    <a:masterClrMapping/>
+  </p:clrMapOvr>
+</p:notes>
+</file>
+
+<file path=ppt/notesSlides/notesSlide2.xml><?xml version="1.0" encoding="utf-8"?>
+<p:notes xmlns:a="http://schemas.openxmlformats.org/drawingml/2006/main" xmlns:r="http://schemas.openxmlformats.org/officeDocument/2006/relationships" xmlns:p="http://schemas.openxmlformats.org/presentationml/2006/main">
+  <p:cSld>
+    <p:spTree>
+      <p:nvGrpSpPr>
+        <p:cNvPr id="1" name=""/>
+        <p:cNvGrpSpPr/>
+        <p:nvPr/>
+      </p:nvGrpSpPr>
+      <p:grpSpPr>
+        <a:xfrm>
+          <a:off x="0" y="0"/>
+          <a:ext cx="0" cy="0"/>
+          <a:chOff x="0" y="0"/>
+          <a:chExt cx="0" cy="0"/>
+        </a:xfrm>
+      </p:grpSpPr>
+      <p:sp>
+        <p:nvSpPr>
+          <p:cNvPr id="2" name="Slide Image Placeholder 1"/>
+          <p:cNvSpPr>
+            <a:spLocks noGrp="1" noRot="1" noChangeAspect="1"/>
+          </p:cNvSpPr>
+          <p:nvPr>
+            <p:ph type="sldImg"/>
+          </p:nvPr>
+        </p:nvSpPr>
+        <p:spPr/>
+      </p:sp>
+      <p:sp>
+        <p:nvSpPr>
+          <p:cNvPr id="3" name="Notes Placeholder 2"/>
+          <p:cNvSpPr>
+            <a:spLocks noGrp="1"/>
+          </p:cNvSpPr>
+          <p:nvPr>
+            <p:ph type="body" idx="1"/>
+          </p:nvPr>
+        </p:nvSpPr>
+        <p:spPr/>
+        <p:txBody>
+          <a:bodyPr/>
+          <a:lstStyle/>
+          <a:p>
+            <a:r>
+              <a:rPr lang="en-US" dirty="0"/>
+              <a:t>Have a look simulation</a:t>
+            </a:r>
+          </a:p>
+          <a:p>
+            <a:r>
+              <a:rPr lang="en-US"/>
+              <a:t>Have a look real example on MP server</a:t>
+            </a:r>
+          </a:p>
+          <a:p>
+            <a:endParaRPr lang="en-US"/>
+          </a:p>
+        </p:txBody>
+      </p:sp>
+      <p:sp>
+        <p:nvSpPr>
+          <p:cNvPr id="4" name="Slide Number Placeholder 3"/>
+          <p:cNvSpPr>
+            <a:spLocks noGrp="1"/>
+          </p:cNvSpPr>
+          <p:nvPr>
+            <p:ph type="sldNum" sz="quarter" idx="10"/>
+          </p:nvPr>
+        </p:nvSpPr>
+        <p:spPr/>
+        <p:txBody>
+          <a:bodyPr/>
+          <a:lstStyle/>
+          <a:p>
+            <a:fld id="{29B3F580-F237-4B16-A8AC-FCE0BDEB942E}" type="slidenum">
+              <a:rPr lang="en-US" smtClean="0"/>
+              <a:t>10</a:t>
+            </a:fld>
+            <a:endParaRPr lang="en-US"/>
+          </a:p>
+        </p:txBody>
+      </p:sp>
+    </p:spTree>
+    <p:extLst>
+      <p:ext uri="{BB962C8B-B14F-4D97-AF65-F5344CB8AC3E}">
+        <p14:creationId xmlns:p14="http://schemas.microsoft.com/office/powerpoint/2010/main" val="145238008"/>
+      </p:ext>
+    </p:extLst>
+  </p:cSld>
+  <p:clrMapOvr>
+    <a:masterClrMapping/>
+  </p:clrMapOvr>
+</p:notes>
+</file>
+
+<file path=ppt/notesSlides/notesSlide3.xml><?xml version="1.0" encoding="utf-8"?>
+<p:notes xmlns:a="http://schemas.openxmlformats.org/drawingml/2006/main" xmlns:r="http://schemas.openxmlformats.org/officeDocument/2006/relationships" xmlns:p="http://schemas.openxmlformats.org/presentationml/2006/main">
+  <p:cSld>
+    <p:spTree>
+      <p:nvGrpSpPr>
+        <p:cNvPr id="1" name=""/>
+        <p:cNvGrpSpPr/>
+        <p:nvPr/>
+      </p:nvGrpSpPr>
+      <p:grpSpPr>
+        <a:xfrm>
+          <a:off x="0" y="0"/>
+          <a:ext cx="0" cy="0"/>
+          <a:chOff x="0" y="0"/>
+          <a:chExt cx="0" cy="0"/>
+        </a:xfrm>
+      </p:grpSpPr>
+      <p:sp>
+        <p:nvSpPr>
+          <p:cNvPr id="2" name="Slide Image Placeholder 1"/>
+          <p:cNvSpPr>
+            <a:spLocks noGrp="1" noRot="1" noChangeAspect="1"/>
+          </p:cNvSpPr>
+          <p:nvPr>
+            <p:ph type="sldImg"/>
+          </p:nvPr>
+        </p:nvSpPr>
+        <p:spPr/>
+      </p:sp>
+      <p:sp>
+        <p:nvSpPr>
+          <p:cNvPr id="3" name="Notes Placeholder 2"/>
+          <p:cNvSpPr>
+            <a:spLocks noGrp="1"/>
+          </p:cNvSpPr>
+          <p:nvPr>
+            <p:ph type="body" idx="1"/>
+          </p:nvPr>
+        </p:nvSpPr>
+        <p:spPr/>
+        <p:txBody>
+          <a:bodyPr/>
+          <a:lstStyle/>
+          <a:p>
+            <a:r>
+              <a:rPr lang="en-US" dirty="0"/>
+              <a:t>Have a look simulation</a:t>
+            </a:r>
+          </a:p>
+          <a:p>
+            <a:r>
+              <a:rPr lang="en-US"/>
+              <a:t>Have a look real example on MP server</a:t>
+            </a:r>
+          </a:p>
+          <a:p>
+            <a:endParaRPr lang="en-US"/>
+          </a:p>
+        </p:txBody>
+      </p:sp>
+      <p:sp>
+        <p:nvSpPr>
+          <p:cNvPr id="4" name="Slide Number Placeholder 3"/>
+          <p:cNvSpPr>
+            <a:spLocks noGrp="1"/>
+          </p:cNvSpPr>
+          <p:nvPr>
+            <p:ph type="sldNum" sz="quarter" idx="10"/>
+          </p:nvPr>
+        </p:nvSpPr>
+        <p:spPr/>
+        <p:txBody>
+          <a:bodyPr/>
+          <a:lstStyle/>
+          <a:p>
+            <a:fld id="{29B3F580-F237-4B16-A8AC-FCE0BDEB942E}" type="slidenum">
+              <a:rPr lang="en-US" smtClean="0"/>
+              <a:t>11</a:t>
+            </a:fld>
+            <a:endParaRPr lang="en-US"/>
+          </a:p>
+        </p:txBody>
+      </p:sp>
+    </p:spTree>
+    <p:extLst>
+      <p:ext uri="{BB962C8B-B14F-4D97-AF65-F5344CB8AC3E}">
+        <p14:creationId xmlns:p14="http://schemas.microsoft.com/office/powerpoint/2010/main" val="3151275543"/>
       </p:ext>
     </p:extLst>
   </p:cSld>
@@ -1079,7 +1269,7 @@
           <a:p>
             <a:fld id="{224EB7CA-D7F8-4D62-9304-30BA067B3D55}" type="datetime1">
               <a:rPr lang="en-US" smtClean="0"/>
-              <a:t>2/5/2018</a:t>
+              <a:t>05-Feb-18</a:t>
             </a:fld>
             <a:endParaRPr lang="en-US" dirty="0"/>
           </a:p>
@@ -1371,7 +1561,7 @@
           <a:p>
             <a:fld id="{78594FD9-4BB0-4608-BD71-DE85AF8B0C94}" type="datetime1">
               <a:rPr lang="en-US" smtClean="0"/>
-              <a:t>2/5/2018</a:t>
+              <a:t>05-Feb-18</a:t>
             </a:fld>
             <a:endParaRPr lang="en-US" dirty="0"/>
           </a:p>
@@ -1615,7 +1805,7 @@
           <a:p>
             <a:fld id="{80F14A8D-8CB6-4DF7-BB03-9ADF328541C3}" type="datetime1">
               <a:rPr lang="en-US" smtClean="0"/>
-              <a:t>2/5/2018</a:t>
+              <a:t>05-Feb-18</a:t>
             </a:fld>
             <a:endParaRPr lang="en-US" dirty="0"/>
           </a:p>
@@ -2151,7 +2341,7 @@
           <a:p>
             <a:fld id="{12C8657D-6EFD-44FE-A6B1-FC3314E45B04}" type="datetime1">
               <a:rPr lang="en-US" smtClean="0"/>
-              <a:t>2/5/2018</a:t>
+              <a:t>05-Feb-18</a:t>
             </a:fld>
             <a:endParaRPr lang="en-US" dirty="0"/>
           </a:p>
@@ -2395,7 +2585,7 @@
           <a:p>
             <a:fld id="{3C22B71E-C0BD-47ED-A0E5-D73AF8DAABF6}" type="datetime1">
               <a:rPr lang="en-US" smtClean="0"/>
-              <a:t>2/5/2018</a:t>
+              <a:t>05-Feb-18</a:t>
             </a:fld>
             <a:endParaRPr lang="en-US" dirty="0"/>
           </a:p>
@@ -2923,7 +3113,7 @@
           <a:p>
             <a:fld id="{ABE61F29-A317-4BB7-AEDD-37E228401F6A}" type="datetime1">
               <a:rPr lang="en-US" smtClean="0"/>
-              <a:t>2/5/2018</a:t>
+              <a:t>05-Feb-18</a:t>
             </a:fld>
             <a:endParaRPr lang="en-US" dirty="0"/>
           </a:p>
@@ -3216,7 +3406,7 @@
           <a:p>
             <a:fld id="{FA7F1050-A139-4782-A1EE-67CE90110BBE}" type="datetime1">
               <a:rPr lang="en-US" smtClean="0"/>
-              <a:t>2/5/2018</a:t>
+              <a:t>05-Feb-18</a:t>
             </a:fld>
             <a:endParaRPr lang="en-US" dirty="0"/>
           </a:p>
@@ -3386,7 +3576,7 @@
           <a:p>
             <a:fld id="{F3AAD345-0762-4223-96B9-208D94F07C91}" type="datetime1">
               <a:rPr lang="en-US" smtClean="0"/>
-              <a:t>2/5/2018</a:t>
+              <a:t>05-Feb-18</a:t>
             </a:fld>
             <a:endParaRPr lang="en-US" dirty="0"/>
           </a:p>
@@ -3562,7 +3752,7 @@
           <a:p>
             <a:fld id="{203D6735-A7AF-42E2-85D0-894B50621292}" type="datetime1">
               <a:rPr lang="en-US" smtClean="0"/>
-              <a:t>2/5/2018</a:t>
+              <a:t>05-Feb-18</a:t>
             </a:fld>
             <a:endParaRPr lang="en-US" dirty="0"/>
           </a:p>
@@ -3769,7 +3959,7 @@
           <a:p>
             <a:fld id="{75176718-5527-4FAB-B437-FCE82648AEEB}" type="datetime1">
               <a:rPr lang="en-US" smtClean="0"/>
-              <a:t>2/5/2018</a:t>
+              <a:t>05-Feb-18</a:t>
             </a:fld>
             <a:endParaRPr lang="en-US" dirty="0"/>
           </a:p>
@@ -4016,7 +4206,7 @@
           <a:p>
             <a:fld id="{A2ECFFF3-0198-4D32-9ABA-0F0069AD8BC6}" type="datetime1">
               <a:rPr lang="en-US" smtClean="0"/>
-              <a:t>2/5/2018</a:t>
+              <a:t>05-Feb-18</a:t>
             </a:fld>
             <a:endParaRPr lang="en-US" dirty="0"/>
           </a:p>
@@ -4359,7 +4549,7 @@
           <a:p>
             <a:fld id="{3CB9EE01-0F27-46F0-BCC0-C0DFDC5C8A8D}" type="datetime1">
               <a:rPr lang="en-US" smtClean="0"/>
-              <a:t>2/5/2018</a:t>
+              <a:t>05-Feb-18</a:t>
             </a:fld>
             <a:endParaRPr lang="en-US" dirty="0"/>
           </a:p>
@@ -4847,7 +5037,7 @@
           <a:p>
             <a:fld id="{6B903B12-225C-4E1B-97C4-5C9BAF9747F6}" type="datetime1">
               <a:rPr lang="en-US" smtClean="0"/>
-              <a:t>2/5/2018</a:t>
+              <a:t>05-Feb-18</a:t>
             </a:fld>
             <a:endParaRPr lang="en-US" dirty="0"/>
           </a:p>
@@ -4961,7 +5151,7 @@
           <a:p>
             <a:fld id="{0DBF0E80-EEBA-4911-9FFE-EE5B4FB0B0C4}" type="datetime1">
               <a:rPr lang="en-US" smtClean="0"/>
-              <a:t>2/5/2018</a:t>
+              <a:t>05-Feb-18</a:t>
             </a:fld>
             <a:endParaRPr lang="en-US" dirty="0"/>
           </a:p>
@@ -5052,7 +5242,7 @@
           <a:p>
             <a:fld id="{802BC30E-BE77-4BD6-825A-556CCECBBD5F}" type="datetime1">
               <a:rPr lang="en-US" smtClean="0"/>
-              <a:t>2/5/2018</a:t>
+              <a:t>05-Feb-18</a:t>
             </a:fld>
             <a:endParaRPr lang="en-US" dirty="0"/>
           </a:p>
@@ -5331,7 +5521,7 @@
           <a:p>
             <a:fld id="{01AE9536-3169-430D-A3EC-03C1DAAD324C}" type="datetime1">
               <a:rPr lang="en-US" smtClean="0"/>
-              <a:t>2/5/2018</a:t>
+              <a:t>05-Feb-18</a:t>
             </a:fld>
             <a:endParaRPr lang="en-US" dirty="0"/>
           </a:p>
@@ -5618,7 +5808,7 @@
           <a:p>
             <a:fld id="{17BAD071-1EB6-4379-8228-408A106BFDF0}" type="datetime1">
               <a:rPr lang="en-US" smtClean="0"/>
-              <a:t>2/5/2018</a:t>
+              <a:t>05-Feb-18</a:t>
             </a:fld>
             <a:endParaRPr lang="en-US" dirty="0"/>
           </a:p>
@@ -6144,7 +6334,7 @@
           <a:p>
             <a:fld id="{3D2EF4AA-A067-4041-90FF-0766BB9D10CB}" type="datetime1">
               <a:rPr lang="en-US" smtClean="0"/>
-              <a:t>2/5/2018</a:t>
+              <a:t>05-Feb-18</a:t>
             </a:fld>
             <a:endParaRPr lang="en-US" dirty="0"/>
           </a:p>
@@ -7077,7 +7267,7 @@
           <p:cNvPr id="2" name="Title 1">
             <a:extLst>
               <a:ext uri="{FF2B5EF4-FFF2-40B4-BE49-F238E27FC236}">
-                <a16:creationId xmlns:a16="http://schemas.microsoft.com/office/drawing/2014/main" id="{09619E5A-9C6F-46E0-8395-140AC3D184CD}"/>
+                <a16:creationId xmlns:a16="http://schemas.microsoft.com/office/drawing/2014/main" id="{7D51D6EA-8DA9-4D34-A010-29BD2BA54FF6}"/>
               </a:ext>
             </a:extLst>
           </p:cNvPr>
@@ -7090,8 +7280,8 @@
         </p:nvSpPr>
         <p:spPr>
           <a:xfrm>
-            <a:off x="1484311" y="685801"/>
-            <a:ext cx="10018713" cy="1066800"/>
+            <a:off x="1484310" y="327661"/>
+            <a:ext cx="10018713" cy="1516380"/>
           </a:xfrm>
         </p:spPr>
         <p:txBody>
@@ -7102,24 +7292,24 @@
           <a:p>
             <a:r>
               <a:rPr lang="en-US" dirty="0"/>
-              <a:t>Sharing assemblies between application domains. </a:t>
+              <a:t>Sharing assemblies between application domains </a:t>
             </a:r>
             <a:br>
               <a:rPr lang="en-US" dirty="0"/>
             </a:br>
             <a:r>
-              <a:rPr lang="en-US" dirty="0"/>
-              <a:t>Concept domain neutral assembly. </a:t>
-            </a:r>
-          </a:p>
-        </p:txBody>
-      </p:sp>
-      <p:sp>
-        <p:nvSpPr>
-          <p:cNvPr id="3" name="Content Placeholder 2">
+              <a:rPr lang="en-US" sz="2400" dirty="0"/>
+              <a:t>Concept domain neutral assembly</a:t>
+            </a:r>
+          </a:p>
+        </p:txBody>
+      </p:sp>
+      <p:sp>
+        <p:nvSpPr>
+          <p:cNvPr id="5" name="Slide Number Placeholder 4">
             <a:extLst>
               <a:ext uri="{FF2B5EF4-FFF2-40B4-BE49-F238E27FC236}">
-                <a16:creationId xmlns:a16="http://schemas.microsoft.com/office/drawing/2014/main" id="{F5BF9354-5E70-4F1E-9E61-289C2FB3ED00}"/>
+                <a16:creationId xmlns:a16="http://schemas.microsoft.com/office/drawing/2014/main" id="{FDDC2F75-7AA4-48DE-AE07-C47DCCF5C4AF}"/>
               </a:ext>
             </a:extLst>
           </p:cNvPr>
@@ -7127,73 +7317,89 @@
             <a:spLocks noGrp="1"/>
           </p:cNvSpPr>
           <p:nvPr>
-            <p:ph idx="1"/>
-          </p:nvPr>
-        </p:nvSpPr>
+            <p:ph type="sldNum" sz="quarter" idx="12"/>
+          </p:nvPr>
+        </p:nvSpPr>
+        <p:spPr/>
+        <p:txBody>
+          <a:bodyPr/>
+          <a:lstStyle/>
+          <a:p>
+            <a:fld id="{D57F1E4F-1CFF-5643-939E-217C01CDF565}" type="slidenum">
+              <a:rPr lang="en-US" sz="1400" smtClean="0"/>
+              <a:pPr/>
+              <a:t>10</a:t>
+            </a:fld>
+            <a:endParaRPr lang="en-US" sz="1400" dirty="0"/>
+          </a:p>
+        </p:txBody>
+      </p:sp>
+      <p:pic>
+        <p:nvPicPr>
+          <p:cNvPr id="3" name="Picture 2">
+            <a:extLst>
+              <a:ext uri="{FF2B5EF4-FFF2-40B4-BE49-F238E27FC236}">
+                <a16:creationId xmlns:a16="http://schemas.microsoft.com/office/drawing/2014/main" id="{53B70047-3E58-4A82-A6D9-470C4600D80A}"/>
+              </a:ext>
+            </a:extLst>
+          </p:cNvPr>
+          <p:cNvPicPr>
+            <a:picLocks noChangeAspect="1"/>
+          </p:cNvPicPr>
+          <p:nvPr/>
+        </p:nvPicPr>
+        <p:blipFill>
+          <a:blip r:embed="rId3"/>
+          <a:stretch>
+            <a:fillRect/>
+          </a:stretch>
+        </p:blipFill>
         <p:spPr>
           <a:xfrm>
-            <a:off x="1484310" y="2242127"/>
-            <a:ext cx="10018713" cy="3124201"/>
+            <a:off x="511253" y="2208349"/>
+            <a:ext cx="6754758" cy="3772678"/>
           </a:xfrm>
+          <a:prstGeom prst="rect">
+            <a:avLst/>
+          </a:prstGeom>
         </p:spPr>
-        <p:txBody>
-          <a:bodyPr>
-            <a:normAutofit/>
-          </a:bodyPr>
-          <a:lstStyle/>
-          <a:p>
-            <a:pPr marL="0" indent="0" algn="ctr">
-              <a:buNone/>
-            </a:pPr>
-            <a:r>
-              <a:rPr lang="en-US" b="1" dirty="0"/>
-              <a:t>Strong Named Assemblies Belong in the GAC </a:t>
-            </a:r>
-          </a:p>
-          <a:p>
-            <a:pPr marL="0" indent="0">
-              <a:buNone/>
-            </a:pPr>
-            <a:r>
-              <a:rPr lang="en-US" dirty="0"/>
-              <a:t>If your assemblies have strong names, make sure to place them in the global assembly cache (GAC). </a:t>
-            </a:r>
-          </a:p>
-          <a:p>
-            <a:pPr marL="0" indent="0">
-              <a:buNone/>
-            </a:pPr>
-            <a:r>
-              <a:rPr lang="en-US" dirty="0"/>
-              <a:t>Otherwise, loading the assembly requires touching almost every page to verify its digital signature. </a:t>
-            </a:r>
-          </a:p>
-          <a:p>
-            <a:pPr marL="0" indent="0">
-              <a:buNone/>
-            </a:pPr>
-            <a:r>
-              <a:rPr lang="en-US" dirty="0"/>
-              <a:t>Verification of strong names when the assembly is not placed in the GAC will also diminish any performance gains from </a:t>
-            </a:r>
-            <a:r>
-              <a:rPr lang="en-US" dirty="0" err="1"/>
-              <a:t>NGen</a:t>
-            </a:r>
-            <a:r>
-              <a:rPr lang="en-US" dirty="0"/>
-              <a:t>.</a:t>
-            </a:r>
-            <a:endParaRPr lang="en-US" i="1" dirty="0"/>
-          </a:p>
-        </p:txBody>
-      </p:sp>
-      <p:sp>
-        <p:nvSpPr>
-          <p:cNvPr id="4" name="TextBox 3">
+      </p:pic>
+      <p:pic>
+        <p:nvPicPr>
+          <p:cNvPr id="8" name="Picture 7">
             <a:extLst>
               <a:ext uri="{FF2B5EF4-FFF2-40B4-BE49-F238E27FC236}">
-                <a16:creationId xmlns:a16="http://schemas.microsoft.com/office/drawing/2014/main" id="{A7C2A8CC-7366-4646-9717-10016A06F742}"/>
+                <a16:creationId xmlns:a16="http://schemas.microsoft.com/office/drawing/2014/main" id="{33108515-CBC8-47DA-9CD2-02270134AC51}"/>
+              </a:ext>
+            </a:extLst>
+          </p:cNvPr>
+          <p:cNvPicPr>
+            <a:picLocks noChangeAspect="1"/>
+          </p:cNvPicPr>
+          <p:nvPr/>
+        </p:nvPicPr>
+        <p:blipFill>
+          <a:blip r:embed="rId4"/>
+          <a:stretch>
+            <a:fillRect/>
+          </a:stretch>
+        </p:blipFill>
+        <p:spPr>
+          <a:xfrm>
+            <a:off x="7550396" y="1542175"/>
+            <a:ext cx="4130351" cy="4836577"/>
+          </a:xfrm>
+          <a:prstGeom prst="rect">
+            <a:avLst/>
+          </a:prstGeom>
+        </p:spPr>
+      </p:pic>
+      <p:sp>
+        <p:nvSpPr>
+          <p:cNvPr id="13" name="TextBox 12">
+            <a:extLst>
+              <a:ext uri="{FF2B5EF4-FFF2-40B4-BE49-F238E27FC236}">
+                <a16:creationId xmlns:a16="http://schemas.microsoft.com/office/drawing/2014/main" id="{DFFAA7C2-5B36-4360-9470-EA20DC3FBA7D}"/>
               </a:ext>
             </a:extLst>
           </p:cNvPr>
@@ -7202,8 +7408,8 @@
         </p:nvSpPr>
         <p:spPr>
           <a:xfrm>
-            <a:off x="4494070" y="5855854"/>
-            <a:ext cx="7008953" cy="646331"/>
+            <a:off x="1484310" y="1676399"/>
+            <a:ext cx="5624232" cy="369332"/>
           </a:xfrm>
           <a:prstGeom prst="rect">
             <a:avLst/>
@@ -7211,62 +7417,57 @@
           <a:noFill/>
         </p:spPr>
         <p:txBody>
-          <a:bodyPr wrap="square" rtlCol="0">
+          <a:bodyPr wrap="none" rtlCol="0">
             <a:spAutoFit/>
           </a:bodyPr>
           <a:lstStyle/>
           <a:p>
             <a:r>
               <a:rPr lang="en-US" dirty="0"/>
-              <a:t>See also: </a:t>
-            </a:r>
-          </a:p>
-          <a:p>
-            <a:pPr marL="285750" indent="-285750">
-              <a:buFont typeface="Arial" panose="020B0604020202020204" pitchFamily="34" charset="0"/>
-              <a:buChar char="•"/>
-            </a:pPr>
-            <a:r>
-              <a:rPr lang="en-US" dirty="0"/>
-              <a:t>Pro .NET Performance: Optimize Your C# Applications. Page 289</a:t>
-            </a:r>
-          </a:p>
-        </p:txBody>
-      </p:sp>
-      <p:sp>
-        <p:nvSpPr>
-          <p:cNvPr id="6" name="Slide Number Placeholder 5">
+              <a:t>Let's combine 3 instance of the same API to one app pools</a:t>
+            </a:r>
+          </a:p>
+        </p:txBody>
+      </p:sp>
+      <p:sp>
+        <p:nvSpPr>
+          <p:cNvPr id="14" name="TextBox 13">
             <a:extLst>
               <a:ext uri="{FF2B5EF4-FFF2-40B4-BE49-F238E27FC236}">
-                <a16:creationId xmlns:a16="http://schemas.microsoft.com/office/drawing/2014/main" id="{EB36F3E7-B493-4F15-956C-F85C1572B764}"/>
+                <a16:creationId xmlns:a16="http://schemas.microsoft.com/office/drawing/2014/main" id="{38CA6D8E-58F2-45EB-A3F2-AA5BFCD14A9D}"/>
               </a:ext>
             </a:extLst>
           </p:cNvPr>
-          <p:cNvSpPr>
-            <a:spLocks noGrp="1"/>
-          </p:cNvSpPr>
-          <p:nvPr>
-            <p:ph type="sldNum" sz="quarter" idx="12"/>
-          </p:nvPr>
-        </p:nvSpPr>
-        <p:spPr/>
-        <p:txBody>
-          <a:bodyPr/>
-          <a:lstStyle/>
-          <a:p>
-            <a:fld id="{D57F1E4F-1CFF-5643-939E-217C01CDF565}" type="slidenum">
-              <a:rPr lang="en-US" sz="1400" smtClean="0"/>
-              <a:pPr/>
-              <a:t>10</a:t>
-            </a:fld>
-            <a:endParaRPr lang="en-US" sz="1400" dirty="0"/>
+          <p:cNvSpPr txBox="1"/>
+          <p:nvPr/>
+        </p:nvSpPr>
+        <p:spPr>
+          <a:xfrm>
+            <a:off x="8818718" y="6441179"/>
+            <a:ext cx="1593706" cy="338554"/>
+          </a:xfrm>
+          <a:prstGeom prst="rect">
+            <a:avLst/>
+          </a:prstGeom>
+          <a:noFill/>
+        </p:spPr>
+        <p:txBody>
+          <a:bodyPr wrap="none" rtlCol="0">
+            <a:spAutoFit/>
+          </a:bodyPr>
+          <a:lstStyle/>
+          <a:p>
+            <a:r>
+              <a:rPr lang="en-US" sz="1600" dirty="0"/>
+              <a:t>Process Explorer</a:t>
+            </a:r>
           </a:p>
         </p:txBody>
       </p:sp>
     </p:spTree>
     <p:extLst>
       <p:ext uri="{BB962C8B-B14F-4D97-AF65-F5344CB8AC3E}">
-        <p14:creationId xmlns:p14="http://schemas.microsoft.com/office/powerpoint/2010/main" val="3233133832"/>
+        <p14:creationId xmlns:p14="http://schemas.microsoft.com/office/powerpoint/2010/main" val="2307694845"/>
       </p:ext>
     </p:extLst>
   </p:cSld>
@@ -7298,7 +7499,7 @@
           <p:cNvPr id="2" name="Title 1">
             <a:extLst>
               <a:ext uri="{FF2B5EF4-FFF2-40B4-BE49-F238E27FC236}">
-                <a16:creationId xmlns:a16="http://schemas.microsoft.com/office/drawing/2014/main" id="{A0E7C6FB-3B10-4AC3-B4B3-D5F95CDB8ACD}"/>
+                <a16:creationId xmlns:a16="http://schemas.microsoft.com/office/drawing/2014/main" id="{7D51D6EA-8DA9-4D34-A010-29BD2BA54FF6}"/>
               </a:ext>
             </a:extLst>
           </p:cNvPr>
@@ -7311,8 +7512,8 @@
         </p:nvSpPr>
         <p:spPr>
           <a:xfrm>
-            <a:off x="1484311" y="685800"/>
-            <a:ext cx="10018713" cy="923925"/>
+            <a:off x="1484310" y="327661"/>
+            <a:ext cx="10018713" cy="1516380"/>
           </a:xfrm>
         </p:spPr>
         <p:txBody>
@@ -7323,24 +7524,24 @@
           <a:p>
             <a:r>
               <a:rPr lang="en-US" dirty="0"/>
-              <a:t>Sharing assemblies between processes. </a:t>
+              <a:t>Sharing assemblies between application domains </a:t>
             </a:r>
             <a:br>
               <a:rPr lang="en-US" dirty="0"/>
             </a:br>
             <a:r>
-              <a:rPr lang="en-US" dirty="0"/>
-              <a:t>Concept native images.</a:t>
-            </a:r>
-          </a:p>
-        </p:txBody>
-      </p:sp>
-      <p:sp>
-        <p:nvSpPr>
-          <p:cNvPr id="3" name="Content Placeholder 2">
+              <a:rPr lang="en-US" sz="2400" dirty="0"/>
+              <a:t>Concept domain neutral assembly</a:t>
+            </a:r>
+          </a:p>
+        </p:txBody>
+      </p:sp>
+      <p:sp>
+        <p:nvSpPr>
+          <p:cNvPr id="5" name="Slide Number Placeholder 4">
             <a:extLst>
               <a:ext uri="{FF2B5EF4-FFF2-40B4-BE49-F238E27FC236}">
-                <a16:creationId xmlns:a16="http://schemas.microsoft.com/office/drawing/2014/main" id="{52B8DBDA-8455-4186-8C64-D98E6D1C6A48}"/>
+                <a16:creationId xmlns:a16="http://schemas.microsoft.com/office/drawing/2014/main" id="{FDDC2F75-7AA4-48DE-AE07-C47DCCF5C4AF}"/>
               </a:ext>
             </a:extLst>
           </p:cNvPr>
@@ -7348,56 +7549,29 @@
             <a:spLocks noGrp="1"/>
           </p:cNvSpPr>
           <p:nvPr>
-            <p:ph idx="1"/>
-          </p:nvPr>
-        </p:nvSpPr>
-        <p:spPr>
-          <a:xfrm>
-            <a:off x="1484310" y="2495549"/>
-            <a:ext cx="10018713" cy="3124201"/>
-          </a:xfrm>
-        </p:spPr>
+            <p:ph type="sldNum" sz="quarter" idx="12"/>
+          </p:nvPr>
+        </p:nvSpPr>
+        <p:spPr/>
         <p:txBody>
           <a:bodyPr/>
           <a:lstStyle/>
           <a:p>
-            <a:pPr marL="0" indent="0">
-              <a:buNone/>
-            </a:pPr>
-            <a:r>
-              <a:rPr lang="en-US" dirty="0"/>
-              <a:t>Summary of usage</a:t>
-            </a:r>
-          </a:p>
-          <a:p>
-            <a:r>
-              <a:rPr lang="en-US" dirty="0"/>
-              <a:t>Native images enable code sharing between processes.</a:t>
-            </a:r>
-          </a:p>
-          <a:p>
-            <a:r>
-              <a:rPr lang="en-US" dirty="0"/>
-              <a:t>Native images require a smaller initial working set because there is no need for the JIT compiler.</a:t>
-            </a:r>
-          </a:p>
-          <a:p>
-            <a:r>
-              <a:rPr lang="en-US" dirty="0"/>
-              <a:t>Native images load faster than MSIL because they eliminate the need for many startup activities, such as JIT compilation and type-safety verification.</a:t>
-            </a:r>
-          </a:p>
-          <a:p>
-            <a:endParaRPr lang="en-US" dirty="0"/>
-          </a:p>
-        </p:txBody>
-      </p:sp>
-      <p:sp>
-        <p:nvSpPr>
-          <p:cNvPr id="4" name="TextBox 3">
+            <a:fld id="{D57F1E4F-1CFF-5643-939E-217C01CDF565}" type="slidenum">
+              <a:rPr lang="en-US" sz="1400" smtClean="0"/>
+              <a:pPr/>
+              <a:t>11</a:t>
+            </a:fld>
+            <a:endParaRPr lang="en-US" sz="1400" dirty="0"/>
+          </a:p>
+        </p:txBody>
+      </p:sp>
+      <p:sp>
+        <p:nvSpPr>
+          <p:cNvPr id="13" name="TextBox 12">
             <a:extLst>
               <a:ext uri="{FF2B5EF4-FFF2-40B4-BE49-F238E27FC236}">
-                <a16:creationId xmlns:a16="http://schemas.microsoft.com/office/drawing/2014/main" id="{9F770282-ED54-4DDB-AEC9-2A6F9A6B6553}"/>
+                <a16:creationId xmlns:a16="http://schemas.microsoft.com/office/drawing/2014/main" id="{DFFAA7C2-5B36-4360-9470-EA20DC3FBA7D}"/>
               </a:ext>
             </a:extLst>
           </p:cNvPr>
@@ -7406,8 +7580,8 @@
         </p:nvSpPr>
         <p:spPr>
           <a:xfrm>
-            <a:off x="2466975" y="6057900"/>
-            <a:ext cx="9036047" cy="646331"/>
+            <a:off x="2520252" y="1659375"/>
+            <a:ext cx="8431604" cy="369332"/>
           </a:xfrm>
           <a:prstGeom prst="rect">
             <a:avLst/>
@@ -7415,36 +7589,84 @@
           <a:noFill/>
         </p:spPr>
         <p:txBody>
-          <a:bodyPr wrap="square" rtlCol="0">
+          <a:bodyPr wrap="none" rtlCol="0">
             <a:spAutoFit/>
           </a:bodyPr>
           <a:lstStyle/>
           <a:p>
             <a:r>
               <a:rPr lang="en-US" dirty="0"/>
-              <a:t>See also:</a:t>
-            </a:r>
-          </a:p>
-          <a:p>
-            <a:r>
-              <a:rPr lang="en-US" dirty="0">
-                <a:hlinkClick r:id="rId2"/>
-              </a:rPr>
-              <a:t>https://docs.microsoft.com/en-us/dotnet/framework/tools/ngen-exe-native-image-generator</a:t>
-            </a:r>
-            <a:r>
-              <a:rPr lang="en-US" dirty="0"/>
-              <a:t> </a:t>
-            </a:r>
-          </a:p>
-        </p:txBody>
-      </p:sp>
-      <p:sp>
-        <p:nvSpPr>
-          <p:cNvPr id="5" name="TextBox 4">
+              <a:t>Let's combine 3 instance of the same API to one app pools and compare memory usage</a:t>
+            </a:r>
+          </a:p>
+        </p:txBody>
+      </p:sp>
+      <p:pic>
+        <p:nvPicPr>
+          <p:cNvPr id="4" name="Picture 3">
             <a:extLst>
               <a:ext uri="{FF2B5EF4-FFF2-40B4-BE49-F238E27FC236}">
-                <a16:creationId xmlns:a16="http://schemas.microsoft.com/office/drawing/2014/main" id="{E68C30F3-ABD5-402C-B90F-325DDF5E4314}"/>
+                <a16:creationId xmlns:a16="http://schemas.microsoft.com/office/drawing/2014/main" id="{B75EFA50-462A-4C5C-85F3-C7B28AB5F057}"/>
+              </a:ext>
+            </a:extLst>
+          </p:cNvPr>
+          <p:cNvPicPr>
+            <a:picLocks noChangeAspect="1"/>
+          </p:cNvPicPr>
+          <p:nvPr/>
+        </p:nvPicPr>
+        <p:blipFill>
+          <a:blip r:embed="rId3"/>
+          <a:stretch>
+            <a:fillRect/>
+          </a:stretch>
+        </p:blipFill>
+        <p:spPr>
+          <a:xfrm>
+            <a:off x="2479058" y="2124205"/>
+            <a:ext cx="3219276" cy="4065724"/>
+          </a:xfrm>
+          <a:prstGeom prst="rect">
+            <a:avLst/>
+          </a:prstGeom>
+        </p:spPr>
+      </p:pic>
+      <p:pic>
+        <p:nvPicPr>
+          <p:cNvPr id="6" name="Picture 5">
+            <a:extLst>
+              <a:ext uri="{FF2B5EF4-FFF2-40B4-BE49-F238E27FC236}">
+                <a16:creationId xmlns:a16="http://schemas.microsoft.com/office/drawing/2014/main" id="{3B796848-7E7D-47B3-AAF9-7C53E5BC84B5}"/>
+              </a:ext>
+            </a:extLst>
+          </p:cNvPr>
+          <p:cNvPicPr>
+            <a:picLocks noChangeAspect="1"/>
+          </p:cNvPicPr>
+          <p:nvPr/>
+        </p:nvPicPr>
+        <p:blipFill>
+          <a:blip r:embed="rId4"/>
+          <a:stretch>
+            <a:fillRect/>
+          </a:stretch>
+        </p:blipFill>
+        <p:spPr>
+          <a:xfrm>
+            <a:off x="6493666" y="2124205"/>
+            <a:ext cx="3219276" cy="4065724"/>
+          </a:xfrm>
+          <a:prstGeom prst="rect">
+            <a:avLst/>
+          </a:prstGeom>
+        </p:spPr>
+      </p:pic>
+      <p:sp>
+        <p:nvSpPr>
+          <p:cNvPr id="10" name="TextBox 9">
+            <a:extLst>
+              <a:ext uri="{FF2B5EF4-FFF2-40B4-BE49-F238E27FC236}">
+                <a16:creationId xmlns:a16="http://schemas.microsoft.com/office/drawing/2014/main" id="{19A1264F-1BF5-41C1-9FD6-523159C51B9A}"/>
               </a:ext>
             </a:extLst>
           </p:cNvPr>
@@ -7453,8 +7675,8 @@
         </p:nvSpPr>
         <p:spPr>
           <a:xfrm>
-            <a:off x="4705869" y="1819275"/>
-            <a:ext cx="4328621" cy="430887"/>
+            <a:off x="3064729" y="6285427"/>
+            <a:ext cx="1826719" cy="338554"/>
           </a:xfrm>
           <a:prstGeom prst="rect">
             <a:avLst/>
@@ -7468,46 +7690,61 @@
           <a:lstStyle/>
           <a:p>
             <a:r>
-              <a:rPr lang="de-DE" sz="2200" dirty="0"/>
-              <a:t>Ngen.exe (Native Image Generator)</a:t>
-            </a:r>
-          </a:p>
-        </p:txBody>
-      </p:sp>
-      <p:sp>
-        <p:nvSpPr>
-          <p:cNvPr id="7" name="Slide Number Placeholder 6">
+              <a:rPr lang="en-US" sz="1600" dirty="0"/>
+              <a:t>One site in </a:t>
+            </a:r>
+            <a:r>
+              <a:rPr lang="en-US" sz="1600" dirty="0" err="1"/>
+              <a:t>appPool</a:t>
+            </a:r>
+            <a:endParaRPr lang="en-US" sz="1600" dirty="0"/>
+          </a:p>
+        </p:txBody>
+      </p:sp>
+      <p:sp>
+        <p:nvSpPr>
+          <p:cNvPr id="11" name="TextBox 10">
             <a:extLst>
               <a:ext uri="{FF2B5EF4-FFF2-40B4-BE49-F238E27FC236}">
-                <a16:creationId xmlns:a16="http://schemas.microsoft.com/office/drawing/2014/main" id="{1D1F79DF-CB4C-4728-8219-3A6CD6D87348}"/>
+                <a16:creationId xmlns:a16="http://schemas.microsoft.com/office/drawing/2014/main" id="{50AF291E-6807-4219-B1E7-0F67F2397E13}"/>
               </a:ext>
             </a:extLst>
           </p:cNvPr>
-          <p:cNvSpPr>
-            <a:spLocks noGrp="1"/>
-          </p:cNvSpPr>
-          <p:nvPr>
-            <p:ph type="sldNum" sz="quarter" idx="12"/>
-          </p:nvPr>
-        </p:nvSpPr>
-        <p:spPr/>
-        <p:txBody>
-          <a:bodyPr/>
-          <a:lstStyle/>
-          <a:p>
-            <a:fld id="{D57F1E4F-1CFF-5643-939E-217C01CDF565}" type="slidenum">
-              <a:rPr lang="en-US" sz="1400" smtClean="0"/>
-              <a:pPr/>
-              <a:t>11</a:t>
-            </a:fld>
-            <a:endParaRPr lang="en-US" sz="1400" dirty="0"/>
+          <p:cNvSpPr txBox="1"/>
+          <p:nvPr/>
+        </p:nvSpPr>
+        <p:spPr>
+          <a:xfrm>
+            <a:off x="7080940" y="6285427"/>
+            <a:ext cx="2044727" cy="338554"/>
+          </a:xfrm>
+          <a:prstGeom prst="rect">
+            <a:avLst/>
+          </a:prstGeom>
+          <a:noFill/>
+        </p:spPr>
+        <p:txBody>
+          <a:bodyPr wrap="none" rtlCol="0">
+            <a:spAutoFit/>
+          </a:bodyPr>
+          <a:lstStyle/>
+          <a:p>
+            <a:r>
+              <a:rPr lang="en-US" sz="1600" dirty="0"/>
+              <a:t>Three sites in </a:t>
+            </a:r>
+            <a:r>
+              <a:rPr lang="en-US" sz="1600" dirty="0" err="1"/>
+              <a:t>appPool</a:t>
+            </a:r>
+            <a:endParaRPr lang="en-US" sz="1600" dirty="0"/>
           </a:p>
         </p:txBody>
       </p:sp>
     </p:spTree>
     <p:extLst>
       <p:ext uri="{BB962C8B-B14F-4D97-AF65-F5344CB8AC3E}">
-        <p14:creationId xmlns:p14="http://schemas.microsoft.com/office/powerpoint/2010/main" val="2254905752"/>
+        <p14:creationId xmlns:p14="http://schemas.microsoft.com/office/powerpoint/2010/main" val="3547861015"/>
       </p:ext>
     </p:extLst>
   </p:cSld>
@@ -7539,7 +7776,7 @@
           <p:cNvPr id="2" name="Title 1">
             <a:extLst>
               <a:ext uri="{FF2B5EF4-FFF2-40B4-BE49-F238E27FC236}">
-                <a16:creationId xmlns:a16="http://schemas.microsoft.com/office/drawing/2014/main" id="{681983DC-0BFC-4912-8AC2-40307BE36C21}"/>
+                <a16:creationId xmlns:a16="http://schemas.microsoft.com/office/drawing/2014/main" id="{09619E5A-9C6F-46E0-8395-140AC3D184CD}"/>
               </a:ext>
             </a:extLst>
           </p:cNvPr>
@@ -7550,21 +7787,28 @@
             <p:ph type="title"/>
           </p:nvPr>
         </p:nvSpPr>
-        <p:spPr/>
-        <p:txBody>
-          <a:bodyPr/>
+        <p:spPr>
+          <a:xfrm>
+            <a:off x="1484311" y="685801"/>
+            <a:ext cx="10018713" cy="1066800"/>
+          </a:xfrm>
+        </p:spPr>
+        <p:txBody>
+          <a:bodyPr>
+            <a:normAutofit fontScale="90000"/>
+          </a:bodyPr>
           <a:lstStyle/>
           <a:p>
             <a:r>
               <a:rPr lang="en-US" dirty="0"/>
-              <a:t>Sharing assemblies between processes. </a:t>
+              <a:t>Sharing assemblies between application domains </a:t>
             </a:r>
             <a:br>
               <a:rPr lang="en-US" dirty="0"/>
             </a:br>
             <a:r>
-              <a:rPr lang="en-US" dirty="0"/>
-              <a:t>Concept native images.</a:t>
+              <a:rPr lang="en-US" sz="2700" dirty="0"/>
+              <a:t>Concept domain neutral assembly</a:t>
             </a:r>
           </a:p>
         </p:txBody>
@@ -7574,7 +7818,7 @@
           <p:cNvPr id="3" name="Content Placeholder 2">
             <a:extLst>
               <a:ext uri="{FF2B5EF4-FFF2-40B4-BE49-F238E27FC236}">
-                <a16:creationId xmlns:a16="http://schemas.microsoft.com/office/drawing/2014/main" id="{57DD25CA-97D9-48EE-A325-6D58C41EB68C}"/>
+                <a16:creationId xmlns:a16="http://schemas.microsoft.com/office/drawing/2014/main" id="{F5BF9354-5E70-4F1E-9E61-289C2FB3ED00}"/>
               </a:ext>
             </a:extLst>
           </p:cNvPr>
@@ -7585,23 +7829,37 @@
             <p:ph idx="1"/>
           </p:nvPr>
         </p:nvSpPr>
-        <p:spPr/>
-        <p:txBody>
-          <a:bodyPr/>
+        <p:spPr>
+          <a:xfrm>
+            <a:off x="1484311" y="1981199"/>
+            <a:ext cx="10018713" cy="3124201"/>
+          </a:xfrm>
+        </p:spPr>
+        <p:txBody>
+          <a:bodyPr>
+            <a:normAutofit/>
+          </a:bodyPr>
           <a:lstStyle/>
           <a:p>
             <a:pPr marL="0" indent="0">
               <a:buNone/>
             </a:pPr>
             <a:r>
+              <a:rPr lang="en-US" b="1" dirty="0"/>
+              <a:t>Conclusion from a previous slide:</a:t>
+            </a:r>
+          </a:p>
+          <a:p>
+            <a:r>
               <a:rPr lang="en-US" dirty="0"/>
-              <a:t>Remarks:</a:t>
-            </a:r>
-          </a:p>
-          <a:p>
-            <a:r>
+              <a:t>An assembly can be domain neutral if and only if it is in GAC, </a:t>
+            </a:r>
+            <a:br>
               <a:rPr lang="en-US" dirty="0"/>
-              <a:t>Always use domain-neutral code when loading the same assembly into multiple application domains. If a native image is loaded into a nonshared application domain after having been loaded into a shared domain, it cannot be used.</a:t>
+            </a:br>
+            <a:r>
+              <a:rPr lang="en-US" dirty="0"/>
+              <a:t>and all the assemblies in its transitive binding closure are all in GAC.</a:t>
             </a:r>
           </a:p>
         </p:txBody>
@@ -7611,7 +7869,7 @@
           <p:cNvPr id="5" name="Slide Number Placeholder 4">
             <a:extLst>
               <a:ext uri="{FF2B5EF4-FFF2-40B4-BE49-F238E27FC236}">
-                <a16:creationId xmlns:a16="http://schemas.microsoft.com/office/drawing/2014/main" id="{C8D945B7-D9BA-443E-AB7B-734C2E93BEFD}"/>
+                <a16:creationId xmlns:a16="http://schemas.microsoft.com/office/drawing/2014/main" id="{1EB71862-796C-46C8-A415-3C21CCF3B4E1}"/>
               </a:ext>
             </a:extLst>
           </p:cNvPr>
@@ -7639,7 +7897,7 @@
     </p:spTree>
     <p:extLst>
       <p:ext uri="{BB962C8B-B14F-4D97-AF65-F5344CB8AC3E}">
-        <p14:creationId xmlns:p14="http://schemas.microsoft.com/office/powerpoint/2010/main" val="2700701014"/>
+        <p14:creationId xmlns:p14="http://schemas.microsoft.com/office/powerpoint/2010/main" val="3754122186"/>
       </p:ext>
     </p:extLst>
   </p:cSld>
@@ -7671,6 +7929,379 @@
           <p:cNvPr id="2" name="Title 1">
             <a:extLst>
               <a:ext uri="{FF2B5EF4-FFF2-40B4-BE49-F238E27FC236}">
+                <a16:creationId xmlns:a16="http://schemas.microsoft.com/office/drawing/2014/main" id="{A0E7C6FB-3B10-4AC3-B4B3-D5F95CDB8ACD}"/>
+              </a:ext>
+            </a:extLst>
+          </p:cNvPr>
+          <p:cNvSpPr>
+            <a:spLocks noGrp="1"/>
+          </p:cNvSpPr>
+          <p:nvPr>
+            <p:ph type="title"/>
+          </p:nvPr>
+        </p:nvSpPr>
+        <p:spPr>
+          <a:xfrm>
+            <a:off x="1484311" y="685800"/>
+            <a:ext cx="10018713" cy="923925"/>
+          </a:xfrm>
+        </p:spPr>
+        <p:txBody>
+          <a:bodyPr>
+            <a:normAutofit fontScale="90000"/>
+          </a:bodyPr>
+          <a:lstStyle/>
+          <a:p>
+            <a:r>
+              <a:rPr lang="en-US" dirty="0"/>
+              <a:t>Sharing assemblies between processes</a:t>
+            </a:r>
+            <a:br>
+              <a:rPr lang="en-US" dirty="0"/>
+            </a:br>
+            <a:r>
+              <a:rPr lang="en-US" sz="2700" dirty="0"/>
+              <a:t>Concept native images</a:t>
+            </a:r>
+          </a:p>
+        </p:txBody>
+      </p:sp>
+      <p:sp>
+        <p:nvSpPr>
+          <p:cNvPr id="3" name="Content Placeholder 2">
+            <a:extLst>
+              <a:ext uri="{FF2B5EF4-FFF2-40B4-BE49-F238E27FC236}">
+                <a16:creationId xmlns:a16="http://schemas.microsoft.com/office/drawing/2014/main" id="{52B8DBDA-8455-4186-8C64-D98E6D1C6A48}"/>
+              </a:ext>
+            </a:extLst>
+          </p:cNvPr>
+          <p:cNvSpPr>
+            <a:spLocks noGrp="1"/>
+          </p:cNvSpPr>
+          <p:nvPr>
+            <p:ph idx="1"/>
+          </p:nvPr>
+        </p:nvSpPr>
+        <p:spPr>
+          <a:xfrm>
+            <a:off x="1484310" y="2495549"/>
+            <a:ext cx="10018713" cy="3124201"/>
+          </a:xfrm>
+        </p:spPr>
+        <p:txBody>
+          <a:bodyPr/>
+          <a:lstStyle/>
+          <a:p>
+            <a:pPr marL="0" indent="0">
+              <a:buNone/>
+            </a:pPr>
+            <a:r>
+              <a:rPr lang="en-US" dirty="0"/>
+              <a:t>Summary of usage</a:t>
+            </a:r>
+          </a:p>
+          <a:p>
+            <a:r>
+              <a:rPr lang="en-US" dirty="0"/>
+              <a:t>Native images enable code sharing between processes</a:t>
+            </a:r>
+          </a:p>
+          <a:p>
+            <a:r>
+              <a:rPr lang="en-US" dirty="0"/>
+              <a:t>Native images require a smaller initial working set because there is no need for the JIT compiler</a:t>
+            </a:r>
+          </a:p>
+          <a:p>
+            <a:r>
+              <a:rPr lang="en-US" dirty="0"/>
+              <a:t>Native images load faster than MSIL because they eliminate the need for many startup activities, such as JIT compilation and type-safety verification</a:t>
+            </a:r>
+          </a:p>
+          <a:p>
+            <a:endParaRPr lang="en-US" dirty="0"/>
+          </a:p>
+        </p:txBody>
+      </p:sp>
+      <p:sp>
+        <p:nvSpPr>
+          <p:cNvPr id="4" name="TextBox 3">
+            <a:extLst>
+              <a:ext uri="{FF2B5EF4-FFF2-40B4-BE49-F238E27FC236}">
+                <a16:creationId xmlns:a16="http://schemas.microsoft.com/office/drawing/2014/main" id="{9F770282-ED54-4DDB-AEC9-2A6F9A6B6553}"/>
+              </a:ext>
+            </a:extLst>
+          </p:cNvPr>
+          <p:cNvSpPr txBox="1"/>
+          <p:nvPr/>
+        </p:nvSpPr>
+        <p:spPr>
+          <a:xfrm>
+            <a:off x="2466975" y="6057900"/>
+            <a:ext cx="9036047" cy="646331"/>
+          </a:xfrm>
+          <a:prstGeom prst="rect">
+            <a:avLst/>
+          </a:prstGeom>
+          <a:noFill/>
+        </p:spPr>
+        <p:txBody>
+          <a:bodyPr wrap="square" rtlCol="0">
+            <a:spAutoFit/>
+          </a:bodyPr>
+          <a:lstStyle/>
+          <a:p>
+            <a:r>
+              <a:rPr lang="en-US" dirty="0"/>
+              <a:t>See also:</a:t>
+            </a:r>
+          </a:p>
+          <a:p>
+            <a:r>
+              <a:rPr lang="en-US" dirty="0">
+                <a:hlinkClick r:id="rId2"/>
+              </a:rPr>
+              <a:t>https://docs.microsoft.com/en-us/dotnet/framework/tools/ngen-exe-native-image-generator</a:t>
+            </a:r>
+            <a:r>
+              <a:rPr lang="en-US" dirty="0"/>
+              <a:t> </a:t>
+            </a:r>
+          </a:p>
+        </p:txBody>
+      </p:sp>
+      <p:sp>
+        <p:nvSpPr>
+          <p:cNvPr id="5" name="TextBox 4">
+            <a:extLst>
+              <a:ext uri="{FF2B5EF4-FFF2-40B4-BE49-F238E27FC236}">
+                <a16:creationId xmlns:a16="http://schemas.microsoft.com/office/drawing/2014/main" id="{E68C30F3-ABD5-402C-B90F-325DDF5E4314}"/>
+              </a:ext>
+            </a:extLst>
+          </p:cNvPr>
+          <p:cNvSpPr txBox="1"/>
+          <p:nvPr/>
+        </p:nvSpPr>
+        <p:spPr>
+          <a:xfrm>
+            <a:off x="4705869" y="1819275"/>
+            <a:ext cx="4328621" cy="430887"/>
+          </a:xfrm>
+          <a:prstGeom prst="rect">
+            <a:avLst/>
+          </a:prstGeom>
+          <a:noFill/>
+        </p:spPr>
+        <p:txBody>
+          <a:bodyPr wrap="none" rtlCol="0">
+            <a:spAutoFit/>
+          </a:bodyPr>
+          <a:lstStyle/>
+          <a:p>
+            <a:r>
+              <a:rPr lang="de-DE" sz="2200" dirty="0"/>
+              <a:t>Ngen.exe (Native Image Generator)</a:t>
+            </a:r>
+          </a:p>
+        </p:txBody>
+      </p:sp>
+      <p:sp>
+        <p:nvSpPr>
+          <p:cNvPr id="7" name="Slide Number Placeholder 6">
+            <a:extLst>
+              <a:ext uri="{FF2B5EF4-FFF2-40B4-BE49-F238E27FC236}">
+                <a16:creationId xmlns:a16="http://schemas.microsoft.com/office/drawing/2014/main" id="{1D1F79DF-CB4C-4728-8219-3A6CD6D87348}"/>
+              </a:ext>
+            </a:extLst>
+          </p:cNvPr>
+          <p:cNvSpPr>
+            <a:spLocks noGrp="1"/>
+          </p:cNvSpPr>
+          <p:nvPr>
+            <p:ph type="sldNum" sz="quarter" idx="12"/>
+          </p:nvPr>
+        </p:nvSpPr>
+        <p:spPr/>
+        <p:txBody>
+          <a:bodyPr/>
+          <a:lstStyle/>
+          <a:p>
+            <a:fld id="{D57F1E4F-1CFF-5643-939E-217C01CDF565}" type="slidenum">
+              <a:rPr lang="en-US" sz="1400" smtClean="0"/>
+              <a:pPr/>
+              <a:t>13</a:t>
+            </a:fld>
+            <a:endParaRPr lang="en-US" sz="1400" dirty="0"/>
+          </a:p>
+        </p:txBody>
+      </p:sp>
+    </p:spTree>
+    <p:extLst>
+      <p:ext uri="{BB962C8B-B14F-4D97-AF65-F5344CB8AC3E}">
+        <p14:creationId xmlns:p14="http://schemas.microsoft.com/office/powerpoint/2010/main" val="2254905752"/>
+      </p:ext>
+    </p:extLst>
+  </p:cSld>
+  <p:clrMapOvr>
+    <a:masterClrMapping/>
+  </p:clrMapOvr>
+</p:sld>
+</file>
+
+<file path=ppt/slides/slide14.xml><?xml version="1.0" encoding="utf-8"?>
+<p:sld xmlns:a="http://schemas.openxmlformats.org/drawingml/2006/main" xmlns:r="http://schemas.openxmlformats.org/officeDocument/2006/relationships" xmlns:p="http://schemas.openxmlformats.org/presentationml/2006/main">
+  <p:cSld>
+    <p:spTree>
+      <p:nvGrpSpPr>
+        <p:cNvPr id="1" name=""/>
+        <p:cNvGrpSpPr/>
+        <p:nvPr/>
+      </p:nvGrpSpPr>
+      <p:grpSpPr>
+        <a:xfrm>
+          <a:off x="0" y="0"/>
+          <a:ext cx="0" cy="0"/>
+          <a:chOff x="0" y="0"/>
+          <a:chExt cx="0" cy="0"/>
+        </a:xfrm>
+      </p:grpSpPr>
+      <p:sp>
+        <p:nvSpPr>
+          <p:cNvPr id="2" name="Title 1">
+            <a:extLst>
+              <a:ext uri="{FF2B5EF4-FFF2-40B4-BE49-F238E27FC236}">
+                <a16:creationId xmlns:a16="http://schemas.microsoft.com/office/drawing/2014/main" id="{681983DC-0BFC-4912-8AC2-40307BE36C21}"/>
+              </a:ext>
+            </a:extLst>
+          </p:cNvPr>
+          <p:cNvSpPr>
+            <a:spLocks noGrp="1"/>
+          </p:cNvSpPr>
+          <p:nvPr>
+            <p:ph type="title"/>
+          </p:nvPr>
+        </p:nvSpPr>
+        <p:spPr/>
+        <p:txBody>
+          <a:bodyPr/>
+          <a:lstStyle/>
+          <a:p>
+            <a:r>
+              <a:rPr lang="en-US" dirty="0"/>
+              <a:t>Sharing assemblies between processes. </a:t>
+            </a:r>
+            <a:br>
+              <a:rPr lang="en-US" dirty="0"/>
+            </a:br>
+            <a:r>
+              <a:rPr lang="en-US" dirty="0"/>
+              <a:t>Concept native images.</a:t>
+            </a:r>
+          </a:p>
+        </p:txBody>
+      </p:sp>
+      <p:sp>
+        <p:nvSpPr>
+          <p:cNvPr id="3" name="Content Placeholder 2">
+            <a:extLst>
+              <a:ext uri="{FF2B5EF4-FFF2-40B4-BE49-F238E27FC236}">
+                <a16:creationId xmlns:a16="http://schemas.microsoft.com/office/drawing/2014/main" id="{57DD25CA-97D9-48EE-A325-6D58C41EB68C}"/>
+              </a:ext>
+            </a:extLst>
+          </p:cNvPr>
+          <p:cNvSpPr>
+            <a:spLocks noGrp="1"/>
+          </p:cNvSpPr>
+          <p:nvPr>
+            <p:ph idx="1"/>
+          </p:nvPr>
+        </p:nvSpPr>
+        <p:spPr/>
+        <p:txBody>
+          <a:bodyPr/>
+          <a:lstStyle/>
+          <a:p>
+            <a:pPr marL="0" indent="0">
+              <a:buNone/>
+            </a:pPr>
+            <a:r>
+              <a:rPr lang="en-US" dirty="0"/>
+              <a:t>Remarks:</a:t>
+            </a:r>
+          </a:p>
+          <a:p>
+            <a:r>
+              <a:rPr lang="en-US" dirty="0"/>
+              <a:t>Always use domain-neutral code when loading the same assembly into multiple application domains. If a native image is loaded into a nonshared application domain after having been loaded into a shared domain, it cannot be used.</a:t>
+            </a:r>
+          </a:p>
+        </p:txBody>
+      </p:sp>
+      <p:sp>
+        <p:nvSpPr>
+          <p:cNvPr id="5" name="Slide Number Placeholder 4">
+            <a:extLst>
+              <a:ext uri="{FF2B5EF4-FFF2-40B4-BE49-F238E27FC236}">
+                <a16:creationId xmlns:a16="http://schemas.microsoft.com/office/drawing/2014/main" id="{C8D945B7-D9BA-443E-AB7B-734C2E93BEFD}"/>
+              </a:ext>
+            </a:extLst>
+          </p:cNvPr>
+          <p:cNvSpPr>
+            <a:spLocks noGrp="1"/>
+          </p:cNvSpPr>
+          <p:nvPr>
+            <p:ph type="sldNum" sz="quarter" idx="12"/>
+          </p:nvPr>
+        </p:nvSpPr>
+        <p:spPr/>
+        <p:txBody>
+          <a:bodyPr/>
+          <a:lstStyle/>
+          <a:p>
+            <a:fld id="{D57F1E4F-1CFF-5643-939E-217C01CDF565}" type="slidenum">
+              <a:rPr lang="en-US" sz="1400" smtClean="0"/>
+              <a:pPr/>
+              <a:t>14</a:t>
+            </a:fld>
+            <a:endParaRPr lang="en-US" sz="1400" dirty="0"/>
+          </a:p>
+        </p:txBody>
+      </p:sp>
+    </p:spTree>
+    <p:extLst>
+      <p:ext uri="{BB962C8B-B14F-4D97-AF65-F5344CB8AC3E}">
+        <p14:creationId xmlns:p14="http://schemas.microsoft.com/office/powerpoint/2010/main" val="2700701014"/>
+      </p:ext>
+    </p:extLst>
+  </p:cSld>
+  <p:clrMapOvr>
+    <a:masterClrMapping/>
+  </p:clrMapOvr>
+</p:sld>
+</file>
+
+<file path=ppt/slides/slide15.xml><?xml version="1.0" encoding="utf-8"?>
+<p:sld xmlns:a="http://schemas.openxmlformats.org/drawingml/2006/main" xmlns:r="http://schemas.openxmlformats.org/officeDocument/2006/relationships" xmlns:p="http://schemas.openxmlformats.org/presentationml/2006/main">
+  <p:cSld>
+    <p:spTree>
+      <p:nvGrpSpPr>
+        <p:cNvPr id="1" name=""/>
+        <p:cNvGrpSpPr/>
+        <p:nvPr/>
+      </p:nvGrpSpPr>
+      <p:grpSpPr>
+        <a:xfrm>
+          <a:off x="0" y="0"/>
+          <a:ext cx="0" cy="0"/>
+          <a:chOff x="0" y="0"/>
+          <a:chExt cx="0" cy="0"/>
+        </a:xfrm>
+      </p:grpSpPr>
+      <p:sp>
+        <p:nvSpPr>
+          <p:cNvPr id="2" name="Title 1">
+            <a:extLst>
+              <a:ext uri="{FF2B5EF4-FFF2-40B4-BE49-F238E27FC236}">
                 <a16:creationId xmlns:a16="http://schemas.microsoft.com/office/drawing/2014/main" id="{5BA0D62C-CC82-4A24-BD6F-63900F58012F}"/>
               </a:ext>
             </a:extLst>
@@ -7725,7 +8356,7 @@
             <a:fld id="{D57F1E4F-1CFF-5643-939E-217C01CDF565}" type="slidenum">
               <a:rPr lang="en-US" smtClean="0"/>
               <a:pPr/>
-              <a:t>13</a:t>
+              <a:t>15</a:t>
             </a:fld>
             <a:endParaRPr lang="en-US" dirty="0"/>
           </a:p>
@@ -8121,7 +8752,7 @@
 </p:sld>
 </file>
 
-<file path=ppt/slides/slide14.xml><?xml version="1.0" encoding="utf-8"?>
+<file path=ppt/slides/slide16.xml><?xml version="1.0" encoding="utf-8"?>
 <p:sld xmlns:a="http://schemas.openxmlformats.org/drawingml/2006/main" xmlns:r="http://schemas.openxmlformats.org/officeDocument/2006/relationships" xmlns:p="http://schemas.openxmlformats.org/presentationml/2006/main">
   <p:cSld>
     <p:spTree>
@@ -8285,7 +8916,7 @@
             <a:fld id="{D57F1E4F-1CFF-5643-939E-217C01CDF565}" type="slidenum">
               <a:rPr lang="en-US" sz="1400" smtClean="0"/>
               <a:pPr/>
-              <a:t>14</a:t>
+              <a:t>16</a:t>
             </a:fld>
             <a:endParaRPr lang="en-US" sz="1400" dirty="0"/>
           </a:p>
@@ -9436,8 +10067,8 @@
         </p:nvSpPr>
         <p:spPr>
           <a:xfrm>
-            <a:off x="1484311" y="5525254"/>
-            <a:ext cx="10127849" cy="923330"/>
+            <a:off x="2490992" y="5885981"/>
+            <a:ext cx="9454932" cy="923330"/>
           </a:xfrm>
           <a:prstGeom prst="rect">
             <a:avLst/>
@@ -9632,45 +10263,6 @@
             <a:r>
               <a:rPr lang="en-US" sz="2400" dirty="0"/>
               <a:t>Memory types</a:t>
-            </a:r>
-          </a:p>
-        </p:txBody>
-      </p:sp>
-      <p:sp>
-        <p:nvSpPr>
-          <p:cNvPr id="11" name="TextBox 10">
-            <a:extLst>
-              <a:ext uri="{FF2B5EF4-FFF2-40B4-BE49-F238E27FC236}">
-                <a16:creationId xmlns:a16="http://schemas.microsoft.com/office/drawing/2014/main" id="{B4AB1192-740A-4D97-9E58-807554BC8C71}"/>
-              </a:ext>
-            </a:extLst>
-          </p:cNvPr>
-          <p:cNvSpPr txBox="1"/>
-          <p:nvPr/>
-        </p:nvSpPr>
-        <p:spPr>
-          <a:xfrm>
-            <a:off x="4210051" y="6451907"/>
-            <a:ext cx="8108004" cy="338554"/>
-          </a:xfrm>
-          <a:prstGeom prst="rect">
-            <a:avLst/>
-          </a:prstGeom>
-          <a:noFill/>
-        </p:spPr>
-        <p:txBody>
-          <a:bodyPr wrap="square" rtlCol="0">
-            <a:spAutoFit/>
-          </a:bodyPr>
-          <a:lstStyle/>
-          <a:p>
-            <a:r>
-              <a:rPr lang="en-US" sz="1600" dirty="0"/>
-              <a:t>Remarks: *</a:t>
-            </a:r>
-            <a:r>
-              <a:rPr lang="en-US" sz="1600" i="1" dirty="0"/>
-              <a:t>There are some deviations in values, because screenshot was made at different time</a:t>
             </a:r>
           </a:p>
         </p:txBody>
@@ -9792,8 +10384,8 @@
         </p:nvSpPr>
         <p:spPr>
           <a:xfrm>
-            <a:off x="1484311" y="5458579"/>
-            <a:ext cx="10127849" cy="923330"/>
+            <a:off x="2398713" y="5861251"/>
+            <a:ext cx="9186483" cy="923330"/>
           </a:xfrm>
           <a:prstGeom prst="rect">
             <a:avLst/>
@@ -9994,49 +10586,6 @@
             <a:r>
               <a:rPr lang="en-US" sz="2400" dirty="0"/>
               <a:t>Memory types</a:t>
-            </a:r>
-          </a:p>
-        </p:txBody>
-      </p:sp>
-      <p:sp>
-        <p:nvSpPr>
-          <p:cNvPr id="11" name="TextBox 10">
-            <a:extLst>
-              <a:ext uri="{FF2B5EF4-FFF2-40B4-BE49-F238E27FC236}">
-                <a16:creationId xmlns:a16="http://schemas.microsoft.com/office/drawing/2014/main" id="{B4AB1192-740A-4D97-9E58-807554BC8C71}"/>
-              </a:ext>
-            </a:extLst>
-          </p:cNvPr>
-          <p:cNvSpPr txBox="1"/>
-          <p:nvPr/>
-        </p:nvSpPr>
-        <p:spPr>
-          <a:xfrm>
-            <a:off x="3093868" y="6404856"/>
-            <a:ext cx="9098132" cy="338554"/>
-          </a:xfrm>
-          <a:prstGeom prst="rect">
-            <a:avLst/>
-          </a:prstGeom>
-          <a:noFill/>
-        </p:spPr>
-        <p:txBody>
-          <a:bodyPr wrap="none" rtlCol="0">
-            <a:spAutoFit/>
-          </a:bodyPr>
-          <a:lstStyle/>
-          <a:p>
-            <a:r>
-              <a:rPr lang="en-US" sz="1600" dirty="0"/>
-              <a:t>Remarks </a:t>
-            </a:r>
-            <a:r>
-              <a:rPr lang="en-US" sz="1600" i="1" dirty="0"/>
-              <a:t>** </a:t>
-            </a:r>
-            <a:r>
-              <a:rPr lang="en-US" sz="1600" dirty="0"/>
-              <a:t>JIT code included in Managed Heap, you can calculate them size as Managed Heap minus GC</a:t>
             </a:r>
           </a:p>
         </p:txBody>
@@ -10103,52 +10652,10 @@
       </p:grpSpPr>
       <p:sp>
         <p:nvSpPr>
-          <p:cNvPr id="2" name="Title 1">
+          <p:cNvPr id="6" name="TextBox 5">
             <a:extLst>
               <a:ext uri="{FF2B5EF4-FFF2-40B4-BE49-F238E27FC236}">
-                <a16:creationId xmlns:a16="http://schemas.microsoft.com/office/drawing/2014/main" id="{7D51D6EA-8DA9-4D34-A010-29BD2BA54FF6}"/>
-              </a:ext>
-            </a:extLst>
-          </p:cNvPr>
-          <p:cNvSpPr>
-            <a:spLocks noGrp="1"/>
-          </p:cNvSpPr>
-          <p:nvPr>
-            <p:ph type="title"/>
-          </p:nvPr>
-        </p:nvSpPr>
-        <p:spPr>
-          <a:xfrm>
-            <a:off x="1484310" y="327661"/>
-            <a:ext cx="10018713" cy="1516380"/>
-          </a:xfrm>
-        </p:spPr>
-        <p:txBody>
-          <a:bodyPr>
-            <a:normAutofit fontScale="90000"/>
-          </a:bodyPr>
-          <a:lstStyle/>
-          <a:p>
-            <a:r>
-              <a:rPr lang="en-US" dirty="0"/>
-              <a:t>Sharing assemblies between application domains. </a:t>
-            </a:r>
-            <a:br>
-              <a:rPr lang="en-US" dirty="0"/>
-            </a:br>
-            <a:r>
-              <a:rPr lang="en-US" dirty="0"/>
-              <a:t>Concept domain neutral assembly. </a:t>
-            </a:r>
-          </a:p>
-        </p:txBody>
-      </p:sp>
-      <p:sp>
-        <p:nvSpPr>
-          <p:cNvPr id="4" name="TextBox 3">
-            <a:extLst>
-              <a:ext uri="{FF2B5EF4-FFF2-40B4-BE49-F238E27FC236}">
-                <a16:creationId xmlns:a16="http://schemas.microsoft.com/office/drawing/2014/main" id="{D43CA325-A2AD-49DA-B300-517C652E6F72}"/>
+                <a16:creationId xmlns:a16="http://schemas.microsoft.com/office/drawing/2014/main" id="{46480F8A-F9F7-45EF-BDC9-17A948074BE7}"/>
               </a:ext>
             </a:extLst>
           </p:cNvPr>
@@ -10157,8 +10664,8 @@
         </p:nvSpPr>
         <p:spPr>
           <a:xfrm>
-            <a:off x="5353050" y="1874520"/>
-            <a:ext cx="6149973" cy="646331"/>
+            <a:off x="3875740" y="1057411"/>
+            <a:ext cx="5344989" cy="369332"/>
           </a:xfrm>
           <a:prstGeom prst="rect">
             <a:avLst/>
@@ -10166,24 +10673,161 @@
           <a:noFill/>
         </p:spPr>
         <p:txBody>
+          <a:bodyPr wrap="none" rtlCol="0">
+            <a:spAutoFit/>
+          </a:bodyPr>
+          <a:lstStyle/>
+          <a:p>
+            <a:r>
+              <a:rPr lang="en-US" dirty="0"/>
+              <a:t>Open </a:t>
+            </a:r>
+            <a:r>
+              <a:rPr lang="en-US" i="1" dirty="0" err="1"/>
+              <a:t>VMMap</a:t>
+            </a:r>
+            <a:r>
+              <a:rPr lang="en-US" dirty="0"/>
+              <a:t> and have a look of application structure</a:t>
+            </a:r>
+          </a:p>
+        </p:txBody>
+      </p:sp>
+      <p:sp>
+        <p:nvSpPr>
+          <p:cNvPr id="4" name="Slide Number Placeholder 3">
+            <a:extLst>
+              <a:ext uri="{FF2B5EF4-FFF2-40B4-BE49-F238E27FC236}">
+                <a16:creationId xmlns:a16="http://schemas.microsoft.com/office/drawing/2014/main" id="{AAB1DB65-03D9-4F67-9534-E6E8E0195CB1}"/>
+              </a:ext>
+            </a:extLst>
+          </p:cNvPr>
+          <p:cNvSpPr>
+            <a:spLocks noGrp="1"/>
+          </p:cNvSpPr>
+          <p:nvPr>
+            <p:ph type="sldNum" sz="quarter" idx="12"/>
+          </p:nvPr>
+        </p:nvSpPr>
+        <p:spPr/>
+        <p:txBody>
+          <a:bodyPr/>
+          <a:lstStyle/>
+          <a:p>
+            <a:fld id="{D57F1E4F-1CFF-5643-939E-217C01CDF565}" type="slidenum">
+              <a:rPr lang="en-US" sz="1400" smtClean="0"/>
+              <a:pPr/>
+              <a:t>8</a:t>
+            </a:fld>
+            <a:endParaRPr lang="en-US" sz="1400" dirty="0"/>
+          </a:p>
+        </p:txBody>
+      </p:sp>
+      <p:sp>
+        <p:nvSpPr>
+          <p:cNvPr id="10" name="Title 1">
+            <a:extLst>
+              <a:ext uri="{FF2B5EF4-FFF2-40B4-BE49-F238E27FC236}">
+                <a16:creationId xmlns:a16="http://schemas.microsoft.com/office/drawing/2014/main" id="{90A2D1D6-DEA9-4257-9B34-0A6DEABF966C}"/>
+              </a:ext>
+            </a:extLst>
+          </p:cNvPr>
+          <p:cNvSpPr>
+            <a:spLocks noGrp="1"/>
+          </p:cNvSpPr>
+          <p:nvPr>
+            <p:ph type="title"/>
+          </p:nvPr>
+        </p:nvSpPr>
+        <p:spPr>
+          <a:xfrm>
+            <a:off x="1484311" y="165965"/>
+            <a:ext cx="10018712" cy="923331"/>
+          </a:xfrm>
+        </p:spPr>
+        <p:txBody>
+          <a:bodyPr>
+            <a:normAutofit fontScale="90000"/>
+          </a:bodyPr>
+          <a:lstStyle/>
+          <a:p>
+            <a:r>
+              <a:rPr lang="en-US" sz="3600" dirty="0"/>
+              <a:t>What do you really mean by memory?</a:t>
+            </a:r>
+            <a:br>
+              <a:rPr lang="en-US" sz="3600" dirty="0"/>
+            </a:br>
+            <a:r>
+              <a:rPr lang="en-US" sz="2400" dirty="0"/>
+              <a:t>Memory types</a:t>
+            </a:r>
+          </a:p>
+        </p:txBody>
+      </p:sp>
+      <p:sp>
+        <p:nvSpPr>
+          <p:cNvPr id="11" name="TextBox 10">
+            <a:extLst>
+              <a:ext uri="{FF2B5EF4-FFF2-40B4-BE49-F238E27FC236}">
+                <a16:creationId xmlns:a16="http://schemas.microsoft.com/office/drawing/2014/main" id="{B4AB1192-740A-4D97-9E58-807554BC8C71}"/>
+              </a:ext>
+            </a:extLst>
+          </p:cNvPr>
+          <p:cNvSpPr txBox="1"/>
+          <p:nvPr/>
+        </p:nvSpPr>
+        <p:spPr>
+          <a:xfrm>
+            <a:off x="8196045" y="1682413"/>
+            <a:ext cx="3383559" cy="1323439"/>
+          </a:xfrm>
+          <a:prstGeom prst="rect">
+            <a:avLst/>
+          </a:prstGeom>
+          <a:noFill/>
+        </p:spPr>
+        <p:txBody>
           <a:bodyPr wrap="square" rtlCol="0">
             <a:spAutoFit/>
           </a:bodyPr>
           <a:lstStyle/>
           <a:p>
             <a:r>
-              <a:rPr lang="en-US" dirty="0"/>
-              <a:t>Open process explorer and find our application, after open tab .NET assemblies</a:t>
+              <a:rPr lang="en-US" sz="1600" dirty="0"/>
+              <a:t>Remarks</a:t>
+            </a:r>
+            <a:br>
+              <a:rPr lang="en-US" sz="1600" dirty="0"/>
+            </a:br>
+            <a:r>
+              <a:rPr lang="en-US" sz="1600" dirty="0"/>
+              <a:t> </a:t>
+            </a:r>
+            <a:endParaRPr lang="en-US" sz="1600" i="1" dirty="0"/>
+          </a:p>
+          <a:p>
+            <a:pPr marL="285750" indent="-285750">
+              <a:buFont typeface="Arial" panose="020B0604020202020204" pitchFamily="34" charset="0"/>
+              <a:buChar char="•"/>
+            </a:pPr>
+            <a:r>
+              <a:rPr lang="en-US" sz="1600" i="1" dirty="0"/>
+              <a:t> </a:t>
+            </a:r>
+            <a:r>
+              <a:rPr lang="en-US" sz="1600" dirty="0"/>
+              <a:t>JIT code included in Managed Heap, you can calculate them size as Managed Heap minus GC</a:t>
             </a:r>
           </a:p>
         </p:txBody>
       </p:sp>
       <p:pic>
         <p:nvPicPr>
-          <p:cNvPr id="6" name="Picture 5">
+          <p:cNvPr id="3" name="Picture 2">
             <a:extLst>
               <a:ext uri="{FF2B5EF4-FFF2-40B4-BE49-F238E27FC236}">
-                <a16:creationId xmlns:a16="http://schemas.microsoft.com/office/drawing/2014/main" id="{7F30EEAC-5E30-42BA-B2E3-70B7775ACED8}"/>
+                <a16:creationId xmlns:a16="http://schemas.microsoft.com/office/drawing/2014/main" id="{D4B41B64-6621-486B-A528-7386D8FA4796}"/>
               </a:ext>
             </a:extLst>
           </p:cNvPr>
@@ -10193,253 +10837,25 @@
           <p:nvPr/>
         </p:nvPicPr>
         <p:blipFill>
-          <a:blip r:embed="rId3"/>
+          <a:blip r:embed="rId2"/>
           <a:stretch>
             <a:fillRect/>
           </a:stretch>
         </p:blipFill>
         <p:spPr>
           <a:xfrm>
-            <a:off x="561261" y="1703070"/>
-            <a:ext cx="4401264" cy="4785790"/>
+            <a:off x="855676" y="1664697"/>
+            <a:ext cx="7047316" cy="4384996"/>
           </a:xfrm>
           <a:prstGeom prst="rect">
             <a:avLst/>
           </a:prstGeom>
         </p:spPr>
       </p:pic>
-      <p:sp>
-        <p:nvSpPr>
-          <p:cNvPr id="7" name="TextBox 6">
-            <a:extLst>
-              <a:ext uri="{FF2B5EF4-FFF2-40B4-BE49-F238E27FC236}">
-                <a16:creationId xmlns:a16="http://schemas.microsoft.com/office/drawing/2014/main" id="{AA30EB06-545E-4BF2-A9FC-75BE32F1FCA5}"/>
-              </a:ext>
-            </a:extLst>
-          </p:cNvPr>
-          <p:cNvSpPr txBox="1"/>
-          <p:nvPr/>
-        </p:nvSpPr>
-        <p:spPr>
-          <a:xfrm>
-            <a:off x="5353050" y="5804429"/>
-            <a:ext cx="6540498" cy="923330"/>
-          </a:xfrm>
-          <a:prstGeom prst="rect">
-            <a:avLst/>
-          </a:prstGeom>
-          <a:noFill/>
-        </p:spPr>
-        <p:txBody>
-          <a:bodyPr wrap="square" rtlCol="0">
-            <a:spAutoFit/>
-          </a:bodyPr>
-          <a:lstStyle/>
-          <a:p>
-            <a:r>
-              <a:rPr lang="en-US" dirty="0"/>
-              <a:t>See also:</a:t>
-            </a:r>
-          </a:p>
-          <a:p>
-            <a:r>
-              <a:rPr lang="en-US" dirty="0">
-                <a:hlinkClick r:id="rId4"/>
-              </a:rPr>
-              <a:t>https://blogs.msdn.microsoft.com/junfeng/2004/08/05/domain-neutral-assemblies/</a:t>
-            </a:r>
-            <a:endParaRPr lang="en-US" dirty="0"/>
-          </a:p>
-        </p:txBody>
-      </p:sp>
-      <p:sp>
-        <p:nvSpPr>
-          <p:cNvPr id="11" name="TextBox 10">
-            <a:extLst>
-              <a:ext uri="{FF2B5EF4-FFF2-40B4-BE49-F238E27FC236}">
-                <a16:creationId xmlns:a16="http://schemas.microsoft.com/office/drawing/2014/main" id="{AD189ED0-5411-4447-873B-FFBF6931C62D}"/>
-              </a:ext>
-            </a:extLst>
-          </p:cNvPr>
-          <p:cNvSpPr txBox="1"/>
-          <p:nvPr/>
-        </p:nvSpPr>
-        <p:spPr>
-          <a:xfrm>
-            <a:off x="5353050" y="3305210"/>
-            <a:ext cx="6149973" cy="2585323"/>
-          </a:xfrm>
-          <a:prstGeom prst="rect">
-            <a:avLst/>
-          </a:prstGeom>
-          <a:noFill/>
-        </p:spPr>
-        <p:txBody>
-          <a:bodyPr wrap="square" rtlCol="0">
-            <a:spAutoFit/>
-          </a:bodyPr>
-          <a:lstStyle/>
-          <a:p>
-            <a:pPr marL="285750" lvl="0" indent="-285750" defTabSz="914400">
-              <a:buFont typeface="Arial" panose="020B0604020202020204" pitchFamily="34" charset="0"/>
-              <a:buChar char="•"/>
-            </a:pPr>
-            <a:r>
-              <a:rPr lang="en-US" altLang="en-US" dirty="0"/>
-              <a:t>Conceptually, a domain neutral assembly is an assembly that lives across multiple </a:t>
-            </a:r>
-            <a:r>
-              <a:rPr lang="en-US" altLang="en-US" dirty="0" err="1"/>
-              <a:t>appdomains</a:t>
-            </a:r>
-            <a:r>
-              <a:rPr lang="en-US" altLang="en-US" dirty="0"/>
-              <a:t>. </a:t>
-            </a:r>
-            <a:br>
-              <a:rPr lang="en-US" altLang="en-US" dirty="0"/>
-            </a:br>
-            <a:endParaRPr lang="en-US" altLang="en-US" dirty="0"/>
-          </a:p>
-          <a:p>
-            <a:pPr marL="285750" lvl="0" indent="-285750" defTabSz="914400">
-              <a:buFont typeface="Arial" panose="020B0604020202020204" pitchFamily="34" charset="0"/>
-              <a:buChar char="•"/>
-            </a:pPr>
-            <a:r>
-              <a:rPr lang="en-US" altLang="en-US" dirty="0"/>
-              <a:t>Domain neutral assemblies will be </a:t>
-            </a:r>
-            <a:r>
-              <a:rPr lang="en-US" altLang="en-US" dirty="0" err="1"/>
-              <a:t>jitted</a:t>
-            </a:r>
-            <a:r>
-              <a:rPr lang="en-US" altLang="en-US" dirty="0"/>
-              <a:t> only once. </a:t>
-            </a:r>
-            <a:br>
-              <a:rPr lang="en-US" altLang="en-US" dirty="0"/>
-            </a:br>
-            <a:endParaRPr lang="en-US" altLang="en-US" dirty="0"/>
-          </a:p>
-          <a:p>
-            <a:pPr marL="285750" lvl="0" indent="-285750" defTabSz="914400">
-              <a:buFont typeface="Arial" panose="020B0604020202020204" pitchFamily="34" charset="0"/>
-              <a:buChar char="•"/>
-            </a:pPr>
-            <a:r>
-              <a:rPr lang="en-US" altLang="en-US" dirty="0"/>
-              <a:t>The </a:t>
-            </a:r>
-            <a:r>
-              <a:rPr lang="en-US" altLang="en-US" dirty="0" err="1"/>
-              <a:t>jitted</a:t>
-            </a:r>
-            <a:r>
-              <a:rPr lang="en-US" altLang="en-US" dirty="0"/>
-              <a:t> code, as well as various runtime data structures like </a:t>
-            </a:r>
-            <a:r>
-              <a:rPr lang="en-US" altLang="en-US" dirty="0" err="1"/>
-              <a:t>MethodTables</a:t>
-            </a:r>
-            <a:r>
-              <a:rPr lang="en-US" altLang="en-US" dirty="0"/>
-              <a:t>, </a:t>
-            </a:r>
-            <a:r>
-              <a:rPr lang="en-US" altLang="en-US" dirty="0" err="1"/>
-              <a:t>MethodDescs</a:t>
-            </a:r>
-            <a:r>
-              <a:rPr lang="en-US" altLang="en-US" dirty="0"/>
-              <a:t>, will be shared across </a:t>
-            </a:r>
-            <a:r>
-              <a:rPr lang="en-US" altLang="en-US" dirty="0" err="1"/>
-              <a:t>appdomains</a:t>
-            </a:r>
-            <a:r>
-              <a:rPr lang="en-US" altLang="en-US" dirty="0"/>
-              <a:t>. </a:t>
-            </a:r>
-          </a:p>
-          <a:p>
-            <a:endParaRPr lang="en-US" dirty="0"/>
-          </a:p>
-        </p:txBody>
-      </p:sp>
-      <p:sp>
-        <p:nvSpPr>
-          <p:cNvPr id="12" name="TextBox 11">
-            <a:extLst>
-              <a:ext uri="{FF2B5EF4-FFF2-40B4-BE49-F238E27FC236}">
-                <a16:creationId xmlns:a16="http://schemas.microsoft.com/office/drawing/2014/main" id="{2DB3805B-9BAF-4048-8277-BFEAF817081E}"/>
-              </a:ext>
-            </a:extLst>
-          </p:cNvPr>
-          <p:cNvSpPr txBox="1"/>
-          <p:nvPr/>
-        </p:nvSpPr>
-        <p:spPr>
-          <a:xfrm>
-            <a:off x="5353049" y="2843150"/>
-            <a:ext cx="6149973" cy="369332"/>
-          </a:xfrm>
-          <a:prstGeom prst="rect">
-            <a:avLst/>
-          </a:prstGeom>
-          <a:noFill/>
-        </p:spPr>
-        <p:txBody>
-          <a:bodyPr wrap="square" rtlCol="0">
-            <a:spAutoFit/>
-          </a:bodyPr>
-          <a:lstStyle/>
-          <a:p>
-            <a:pPr algn="ctr"/>
-            <a:r>
-              <a:rPr lang="en-US" b="1" dirty="0"/>
-              <a:t>Domain neutral assembly</a:t>
-            </a:r>
-          </a:p>
-        </p:txBody>
-      </p:sp>
-      <p:sp>
-        <p:nvSpPr>
-          <p:cNvPr id="5" name="Slide Number Placeholder 4">
-            <a:extLst>
-              <a:ext uri="{FF2B5EF4-FFF2-40B4-BE49-F238E27FC236}">
-                <a16:creationId xmlns:a16="http://schemas.microsoft.com/office/drawing/2014/main" id="{FDDC2F75-7AA4-48DE-AE07-C47DCCF5C4AF}"/>
-              </a:ext>
-            </a:extLst>
-          </p:cNvPr>
-          <p:cNvSpPr>
-            <a:spLocks noGrp="1"/>
-          </p:cNvSpPr>
-          <p:nvPr>
-            <p:ph type="sldNum" sz="quarter" idx="12"/>
-          </p:nvPr>
-        </p:nvSpPr>
-        <p:spPr/>
-        <p:txBody>
-          <a:bodyPr/>
-          <a:lstStyle/>
-          <a:p>
-            <a:fld id="{D57F1E4F-1CFF-5643-939E-217C01CDF565}" type="slidenum">
-              <a:rPr lang="en-US" sz="1400" smtClean="0"/>
-              <a:pPr/>
-              <a:t>8</a:t>
-            </a:fld>
-            <a:endParaRPr lang="en-US" sz="1400" dirty="0"/>
-          </a:p>
-        </p:txBody>
-      </p:sp>
     </p:spTree>
     <p:extLst>
       <p:ext uri="{BB962C8B-B14F-4D97-AF65-F5344CB8AC3E}">
-        <p14:creationId xmlns:p14="http://schemas.microsoft.com/office/powerpoint/2010/main" val="3214061660"/>
+        <p14:creationId xmlns:p14="http://schemas.microsoft.com/office/powerpoint/2010/main" val="3451108813"/>
       </p:ext>
     </p:extLst>
   </p:cSld>
@@ -10471,7 +10887,7 @@
           <p:cNvPr id="2" name="Title 1">
             <a:extLst>
               <a:ext uri="{FF2B5EF4-FFF2-40B4-BE49-F238E27FC236}">
-                <a16:creationId xmlns:a16="http://schemas.microsoft.com/office/drawing/2014/main" id="{09619E5A-9C6F-46E0-8395-140AC3D184CD}"/>
+                <a16:creationId xmlns:a16="http://schemas.microsoft.com/office/drawing/2014/main" id="{7D51D6EA-8DA9-4D34-A010-29BD2BA54FF6}"/>
               </a:ext>
             </a:extLst>
           </p:cNvPr>
@@ -10484,8 +10900,8 @@
         </p:nvSpPr>
         <p:spPr>
           <a:xfrm>
-            <a:off x="1484311" y="685801"/>
-            <a:ext cx="10018713" cy="1066800"/>
+            <a:off x="1484310" y="327661"/>
+            <a:ext cx="10018713" cy="1516380"/>
           </a:xfrm>
         </p:spPr>
         <p:txBody>
@@ -10496,94 +10912,277 @@
           <a:p>
             <a:r>
               <a:rPr lang="en-US" dirty="0"/>
-              <a:t>Sharing assemblies between application domains. </a:t>
+              <a:t>Sharing assemblies between application domains </a:t>
             </a:r>
             <a:br>
               <a:rPr lang="en-US" dirty="0"/>
             </a:br>
             <a:r>
-              <a:rPr lang="en-US" dirty="0"/>
-              <a:t>Concept domain neutral assembly. </a:t>
-            </a:r>
-          </a:p>
-        </p:txBody>
-      </p:sp>
-      <p:sp>
-        <p:nvSpPr>
-          <p:cNvPr id="3" name="Content Placeholder 2">
+              <a:rPr lang="en-US" sz="2400" dirty="0"/>
+              <a:t>Concept domain neutral assembly</a:t>
+            </a:r>
+          </a:p>
+        </p:txBody>
+      </p:sp>
+      <p:sp>
+        <p:nvSpPr>
+          <p:cNvPr id="4" name="TextBox 3">
             <a:extLst>
               <a:ext uri="{FF2B5EF4-FFF2-40B4-BE49-F238E27FC236}">
-                <a16:creationId xmlns:a16="http://schemas.microsoft.com/office/drawing/2014/main" id="{F5BF9354-5E70-4F1E-9E61-289C2FB3ED00}"/>
+                <a16:creationId xmlns:a16="http://schemas.microsoft.com/office/drawing/2014/main" id="{D43CA325-A2AD-49DA-B300-517C652E6F72}"/>
               </a:ext>
             </a:extLst>
           </p:cNvPr>
-          <p:cNvSpPr>
-            <a:spLocks noGrp="1"/>
-          </p:cNvSpPr>
-          <p:nvPr>
-            <p:ph idx="1"/>
-          </p:nvPr>
-        </p:nvSpPr>
-        <p:spPr/>
-        <p:txBody>
-          <a:bodyPr>
-            <a:normAutofit fontScale="92500" lnSpcReduction="10000"/>
+          <p:cNvSpPr txBox="1"/>
+          <p:nvPr/>
+        </p:nvSpPr>
+        <p:spPr>
+          <a:xfrm>
+            <a:off x="5353050" y="1874520"/>
+            <a:ext cx="6149973" cy="646331"/>
+          </a:xfrm>
+          <a:prstGeom prst="rect">
+            <a:avLst/>
+          </a:prstGeom>
+          <a:noFill/>
+        </p:spPr>
+        <p:txBody>
+          <a:bodyPr wrap="square" rtlCol="0">
+            <a:spAutoFit/>
           </a:bodyPr>
           <a:lstStyle/>
           <a:p>
-            <a:pPr marL="0" indent="0">
-              <a:buNone/>
+            <a:r>
+              <a:rPr lang="en-US" dirty="0"/>
+              <a:t>Open process explorer and find our application, after open tab .NET assemblies</a:t>
+            </a:r>
+          </a:p>
+        </p:txBody>
+      </p:sp>
+      <p:pic>
+        <p:nvPicPr>
+          <p:cNvPr id="6" name="Picture 5">
+            <a:extLst>
+              <a:ext uri="{FF2B5EF4-FFF2-40B4-BE49-F238E27FC236}">
+                <a16:creationId xmlns:a16="http://schemas.microsoft.com/office/drawing/2014/main" id="{7F30EEAC-5E30-42BA-B2E3-70B7775ACED8}"/>
+              </a:ext>
+            </a:extLst>
+          </p:cNvPr>
+          <p:cNvPicPr>
+            <a:picLocks noChangeAspect="1"/>
+          </p:cNvPicPr>
+          <p:nvPr/>
+        </p:nvPicPr>
+        <p:blipFill>
+          <a:blip r:embed="rId3"/>
+          <a:stretch>
+            <a:fillRect/>
+          </a:stretch>
+        </p:blipFill>
+        <p:spPr>
+          <a:xfrm>
+            <a:off x="561260" y="1703070"/>
+            <a:ext cx="4401264" cy="4785790"/>
+          </a:xfrm>
+          <a:prstGeom prst="rect">
+            <a:avLst/>
+          </a:prstGeom>
+        </p:spPr>
+      </p:pic>
+      <p:sp>
+        <p:nvSpPr>
+          <p:cNvPr id="7" name="TextBox 6">
+            <a:extLst>
+              <a:ext uri="{FF2B5EF4-FFF2-40B4-BE49-F238E27FC236}">
+                <a16:creationId xmlns:a16="http://schemas.microsoft.com/office/drawing/2014/main" id="{AA30EB06-545E-4BF2-A9FC-75BE32F1FCA5}"/>
+              </a:ext>
+            </a:extLst>
+          </p:cNvPr>
+          <p:cNvSpPr txBox="1"/>
+          <p:nvPr/>
+        </p:nvSpPr>
+        <p:spPr>
+          <a:xfrm>
+            <a:off x="5353050" y="5804429"/>
+            <a:ext cx="6540498" cy="923330"/>
+          </a:xfrm>
+          <a:prstGeom prst="rect">
+            <a:avLst/>
+          </a:prstGeom>
+          <a:noFill/>
+        </p:spPr>
+        <p:txBody>
+          <a:bodyPr wrap="square" rtlCol="0">
+            <a:spAutoFit/>
+          </a:bodyPr>
+          <a:lstStyle/>
+          <a:p>
+            <a:r>
+              <a:rPr lang="en-US" dirty="0"/>
+              <a:t>See also:</a:t>
+            </a:r>
+          </a:p>
+          <a:p>
+            <a:r>
+              <a:rPr lang="en-US" dirty="0">
+                <a:hlinkClick r:id="rId4"/>
+              </a:rPr>
+              <a:t>https://blogs.msdn.microsoft.com/junfeng/2004/08/05/domain-neutral-assemblies/</a:t>
+            </a:r>
+            <a:endParaRPr lang="en-US" dirty="0"/>
+          </a:p>
+        </p:txBody>
+      </p:sp>
+      <p:sp>
+        <p:nvSpPr>
+          <p:cNvPr id="11" name="TextBox 10">
+            <a:extLst>
+              <a:ext uri="{FF2B5EF4-FFF2-40B4-BE49-F238E27FC236}">
+                <a16:creationId xmlns:a16="http://schemas.microsoft.com/office/drawing/2014/main" id="{AD189ED0-5411-4447-873B-FFBF6931C62D}"/>
+              </a:ext>
+            </a:extLst>
+          </p:cNvPr>
+          <p:cNvSpPr txBox="1"/>
+          <p:nvPr/>
+        </p:nvSpPr>
+        <p:spPr>
+          <a:xfrm>
+            <a:off x="5353050" y="3305210"/>
+            <a:ext cx="6149973" cy="2585323"/>
+          </a:xfrm>
+          <a:prstGeom prst="rect">
+            <a:avLst/>
+          </a:prstGeom>
+          <a:noFill/>
+        </p:spPr>
+        <p:txBody>
+          <a:bodyPr wrap="square" rtlCol="0">
+            <a:spAutoFit/>
+          </a:bodyPr>
+          <a:lstStyle/>
+          <a:p>
+            <a:pPr marL="285750" lvl="0" indent="-285750" defTabSz="914400">
+              <a:buFont typeface="Arial" panose="020B0604020202020204" pitchFamily="34" charset="0"/>
+              <a:buChar char="•"/>
             </a:pPr>
             <a:r>
+              <a:rPr lang="en-US" altLang="en-US" dirty="0"/>
+              <a:t>Conceptually, a domain neutral assembly is an assembly that lives across multiple </a:t>
+            </a:r>
+            <a:r>
+              <a:rPr lang="en-US" altLang="en-US" dirty="0" err="1"/>
+              <a:t>appdomains</a:t>
+            </a:r>
+            <a:r>
+              <a:rPr lang="en-US" altLang="en-US" dirty="0"/>
+              <a:t>. </a:t>
+            </a:r>
+            <a:br>
+              <a:rPr lang="en-US" altLang="en-US" dirty="0"/>
+            </a:br>
+            <a:endParaRPr lang="en-US" altLang="en-US" dirty="0"/>
+          </a:p>
+          <a:p>
+            <a:pPr marL="285750" lvl="0" indent="-285750" defTabSz="914400">
+              <a:buFont typeface="Arial" panose="020B0604020202020204" pitchFamily="34" charset="0"/>
+              <a:buChar char="•"/>
+            </a:pPr>
+            <a:r>
+              <a:rPr lang="en-US" altLang="en-US" dirty="0"/>
+              <a:t>Domain neutral assemblies will be </a:t>
+            </a:r>
+            <a:r>
+              <a:rPr lang="en-US" altLang="en-US" dirty="0" err="1"/>
+              <a:t>jitted</a:t>
+            </a:r>
+            <a:r>
+              <a:rPr lang="en-US" altLang="en-US" dirty="0"/>
+              <a:t> only once. </a:t>
+            </a:r>
+            <a:br>
+              <a:rPr lang="en-US" altLang="en-US" dirty="0"/>
+            </a:br>
+            <a:endParaRPr lang="en-US" altLang="en-US" dirty="0"/>
+          </a:p>
+          <a:p>
+            <a:pPr marL="285750" lvl="0" indent="-285750" defTabSz="914400">
+              <a:buFont typeface="Arial" panose="020B0604020202020204" pitchFamily="34" charset="0"/>
+              <a:buChar char="•"/>
+            </a:pPr>
+            <a:r>
+              <a:rPr lang="en-US" altLang="en-US" dirty="0"/>
+              <a:t>The </a:t>
+            </a:r>
+            <a:r>
+              <a:rPr lang="en-US" altLang="en-US" dirty="0" err="1"/>
+              <a:t>jitted</a:t>
+            </a:r>
+            <a:r>
+              <a:rPr lang="en-US" altLang="en-US" dirty="0"/>
+              <a:t> code, as well as various runtime data structures like </a:t>
+            </a:r>
+            <a:r>
+              <a:rPr lang="en-US" altLang="en-US" dirty="0" err="1"/>
+              <a:t>MethodTables</a:t>
+            </a:r>
+            <a:r>
+              <a:rPr lang="en-US" altLang="en-US" dirty="0"/>
+              <a:t>, </a:t>
+            </a:r>
+            <a:r>
+              <a:rPr lang="en-US" altLang="en-US" dirty="0" err="1"/>
+              <a:t>MethodDescs</a:t>
+            </a:r>
+            <a:r>
+              <a:rPr lang="en-US" altLang="en-US" dirty="0"/>
+              <a:t>, will be shared across </a:t>
+            </a:r>
+            <a:r>
+              <a:rPr lang="en-US" altLang="en-US" dirty="0" err="1"/>
+              <a:t>appdomains</a:t>
+            </a:r>
+            <a:r>
+              <a:rPr lang="en-US" altLang="en-US" dirty="0"/>
+              <a:t>. </a:t>
+            </a:r>
+          </a:p>
+          <a:p>
+            <a:endParaRPr lang="en-US" dirty="0"/>
+          </a:p>
+        </p:txBody>
+      </p:sp>
+      <p:sp>
+        <p:nvSpPr>
+          <p:cNvPr id="12" name="TextBox 11">
+            <a:extLst>
+              <a:ext uri="{FF2B5EF4-FFF2-40B4-BE49-F238E27FC236}">
+                <a16:creationId xmlns:a16="http://schemas.microsoft.com/office/drawing/2014/main" id="{2DB3805B-9BAF-4048-8277-BFEAF817081E}"/>
+              </a:ext>
+            </a:extLst>
+          </p:cNvPr>
+          <p:cNvSpPr txBox="1"/>
+          <p:nvPr/>
+        </p:nvSpPr>
+        <p:spPr>
+          <a:xfrm>
+            <a:off x="5353049" y="2843150"/>
+            <a:ext cx="6149973" cy="369332"/>
+          </a:xfrm>
+          <a:prstGeom prst="rect">
+            <a:avLst/>
+          </a:prstGeom>
+          <a:noFill/>
+        </p:spPr>
+        <p:txBody>
+          <a:bodyPr wrap="square" rtlCol="0">
+            <a:spAutoFit/>
+          </a:bodyPr>
+          <a:lstStyle/>
+          <a:p>
+            <a:pPr algn="ctr"/>
+            <a:r>
               <a:rPr lang="en-US" b="1" dirty="0"/>
-              <a:t>Conclusion from slide:</a:t>
-            </a:r>
-          </a:p>
-          <a:p>
-            <a:r>
-              <a:rPr lang="en-US" dirty="0"/>
-              <a:t>An assembly can be domain neutral if and only if it is in GAC, and all the assemblies in its transitive binding closure are all in GAC.</a:t>
-            </a:r>
-          </a:p>
-          <a:p>
-            <a:pPr marL="0" indent="0">
-              <a:buNone/>
-            </a:pPr>
-            <a:r>
-              <a:rPr lang="en-US" i="1" dirty="0"/>
-              <a:t>It has an unfortunate consequence that you can never update strongly named assemblies once it is loaded in domain. Remember all the </a:t>
-            </a:r>
-            <a:r>
-              <a:rPr lang="en-US" i="1" dirty="0" err="1"/>
-              <a:t>jitted</a:t>
-            </a:r>
-            <a:r>
-              <a:rPr lang="en-US" i="1" dirty="0"/>
-              <a:t> code and runtime data structures are shared between </a:t>
-            </a:r>
-            <a:r>
-              <a:rPr lang="en-US" i="1" dirty="0" err="1"/>
-              <a:t>appdomains</a:t>
-            </a:r>
-            <a:r>
-              <a:rPr lang="en-US" i="1" dirty="0"/>
-              <a:t>. This can only be done if the same native code is valid for all the </a:t>
-            </a:r>
-            <a:r>
-              <a:rPr lang="en-US" i="1" dirty="0" err="1"/>
-              <a:t>appdomains</a:t>
-            </a:r>
-            <a:r>
-              <a:rPr lang="en-US" i="1" dirty="0"/>
-              <a:t>. This is not always true. Specifically, the two </a:t>
-            </a:r>
-            <a:r>
-              <a:rPr lang="en-US" i="1" dirty="0" err="1"/>
-              <a:t>appdomains</a:t>
-            </a:r>
-            <a:r>
-              <a:rPr lang="en-US" i="1" dirty="0"/>
-              <a:t> may have different binding policies and security polices, as well as other differences.</a:t>
+              <a:t>Domain neutral assembly</a:t>
             </a:r>
           </a:p>
         </p:txBody>
@@ -10593,7 +11192,7 @@
           <p:cNvPr id="5" name="Slide Number Placeholder 4">
             <a:extLst>
               <a:ext uri="{FF2B5EF4-FFF2-40B4-BE49-F238E27FC236}">
-                <a16:creationId xmlns:a16="http://schemas.microsoft.com/office/drawing/2014/main" id="{1EB71862-796C-46C8-A415-3C21CCF3B4E1}"/>
+                <a16:creationId xmlns:a16="http://schemas.microsoft.com/office/drawing/2014/main" id="{FDDC2F75-7AA4-48DE-AE07-C47DCCF5C4AF}"/>
               </a:ext>
             </a:extLst>
           </p:cNvPr>
@@ -10618,10 +11217,45 @@
           </a:p>
         </p:txBody>
       </p:sp>
+      <p:sp>
+        <p:nvSpPr>
+          <p:cNvPr id="9" name="TextBox 8">
+            <a:extLst>
+              <a:ext uri="{FF2B5EF4-FFF2-40B4-BE49-F238E27FC236}">
+                <a16:creationId xmlns:a16="http://schemas.microsoft.com/office/drawing/2014/main" id="{85EA38BC-F36B-4A6E-9033-05AFC1CDE3D6}"/>
+              </a:ext>
+            </a:extLst>
+          </p:cNvPr>
+          <p:cNvSpPr txBox="1"/>
+          <p:nvPr/>
+        </p:nvSpPr>
+        <p:spPr>
+          <a:xfrm>
+            <a:off x="1965039" y="6488860"/>
+            <a:ext cx="1593706" cy="338554"/>
+          </a:xfrm>
+          <a:prstGeom prst="rect">
+            <a:avLst/>
+          </a:prstGeom>
+          <a:noFill/>
+        </p:spPr>
+        <p:txBody>
+          <a:bodyPr wrap="none" rtlCol="0">
+            <a:spAutoFit/>
+          </a:bodyPr>
+          <a:lstStyle/>
+          <a:p>
+            <a:r>
+              <a:rPr lang="en-US" sz="1600" dirty="0"/>
+              <a:t>Process Explorer</a:t>
+            </a:r>
+          </a:p>
+        </p:txBody>
+      </p:sp>
     </p:spTree>
     <p:extLst>
       <p:ext uri="{BB962C8B-B14F-4D97-AF65-F5344CB8AC3E}">
-        <p14:creationId xmlns:p14="http://schemas.microsoft.com/office/powerpoint/2010/main" val="3754122186"/>
+        <p14:creationId xmlns:p14="http://schemas.microsoft.com/office/powerpoint/2010/main" val="3214061660"/>
       </p:ext>
     </p:extLst>
   </p:cSld>

</xml_diff>

<commit_message>
Presentation changing after review
</commit_message>
<xml_diff>
--- a/presentation/Sharing common assemblies.pptx
+++ b/presentation/Sharing common assemblies.pptx
@@ -5,25 +5,28 @@
     <p:sldMasterId id="2147483648" r:id="rId1"/>
   </p:sldMasterIdLst>
   <p:notesMasterIdLst>
-    <p:notesMasterId r:id="rId18"/>
+    <p:notesMasterId r:id="rId21"/>
   </p:notesMasterIdLst>
   <p:sldIdLst>
     <p:sldId id="256" r:id="rId2"/>
     <p:sldId id="279" r:id="rId3"/>
     <p:sldId id="257" r:id="rId4"/>
-    <p:sldId id="280" r:id="rId5"/>
-    <p:sldId id="288" r:id="rId6"/>
-    <p:sldId id="287" r:id="rId7"/>
-    <p:sldId id="290" r:id="rId8"/>
-    <p:sldId id="294" r:id="rId9"/>
-    <p:sldId id="282" r:id="rId10"/>
-    <p:sldId id="292" r:id="rId11"/>
-    <p:sldId id="293" r:id="rId12"/>
-    <p:sldId id="283" r:id="rId13"/>
-    <p:sldId id="284" r:id="rId14"/>
-    <p:sldId id="285" r:id="rId15"/>
-    <p:sldId id="291" r:id="rId16"/>
-    <p:sldId id="277" r:id="rId17"/>
+    <p:sldId id="298" r:id="rId5"/>
+    <p:sldId id="280" r:id="rId6"/>
+    <p:sldId id="288" r:id="rId7"/>
+    <p:sldId id="287" r:id="rId8"/>
+    <p:sldId id="296" r:id="rId9"/>
+    <p:sldId id="294" r:id="rId10"/>
+    <p:sldId id="282" r:id="rId11"/>
+    <p:sldId id="292" r:id="rId12"/>
+    <p:sldId id="293" r:id="rId13"/>
+    <p:sldId id="283" r:id="rId14"/>
+    <p:sldId id="284" r:id="rId15"/>
+    <p:sldId id="285" r:id="rId16"/>
+    <p:sldId id="297" r:id="rId17"/>
+    <p:sldId id="291" r:id="rId18"/>
+    <p:sldId id="277" r:id="rId19"/>
+    <p:sldId id="295" r:id="rId20"/>
   </p:sldIdLst>
   <p:sldSz cx="12192000" cy="6858000"/>
   <p:notesSz cx="6858000" cy="9144000"/>
@@ -212,7 +215,7 @@
           <a:p>
             <a:fld id="{7F262928-0CDC-44E0-A3C2-1349897640B6}" type="datetimeFigureOut">
               <a:rPr lang="en-US" smtClean="0"/>
-              <a:t>05-Feb-18</a:t>
+              <a:t>2/11/2018</a:t>
             </a:fld>
             <a:endParaRPr lang="en-US"/>
           </a:p>
@@ -556,7 +559,7 @@
           <a:p>
             <a:fld id="{29B3F580-F237-4B16-A8AC-FCE0BDEB942E}" type="slidenum">
               <a:rPr lang="en-US" smtClean="0"/>
-              <a:t>9</a:t>
+              <a:t>10</a:t>
             </a:fld>
             <a:endParaRPr lang="en-US"/>
           </a:p>
@@ -652,7 +655,7 @@
           <a:p>
             <a:fld id="{29B3F580-F237-4B16-A8AC-FCE0BDEB942E}" type="slidenum">
               <a:rPr lang="en-US" smtClean="0"/>
-              <a:t>10</a:t>
+              <a:t>11</a:t>
             </a:fld>
             <a:endParaRPr lang="en-US"/>
           </a:p>
@@ -748,7 +751,7 @@
           <a:p>
             <a:fld id="{29B3F580-F237-4B16-A8AC-FCE0BDEB942E}" type="slidenum">
               <a:rPr lang="en-US" smtClean="0"/>
-              <a:t>11</a:t>
+              <a:t>12</a:t>
             </a:fld>
             <a:endParaRPr lang="en-US"/>
           </a:p>
@@ -1269,7 +1272,7 @@
           <a:p>
             <a:fld id="{224EB7CA-D7F8-4D62-9304-30BA067B3D55}" type="datetime1">
               <a:rPr lang="en-US" smtClean="0"/>
-              <a:t>05-Feb-18</a:t>
+              <a:t>2/11/2018</a:t>
             </a:fld>
             <a:endParaRPr lang="en-US" dirty="0"/>
           </a:p>
@@ -1561,7 +1564,7 @@
           <a:p>
             <a:fld id="{78594FD9-4BB0-4608-BD71-DE85AF8B0C94}" type="datetime1">
               <a:rPr lang="en-US" smtClean="0"/>
-              <a:t>05-Feb-18</a:t>
+              <a:t>2/11/2018</a:t>
             </a:fld>
             <a:endParaRPr lang="en-US" dirty="0"/>
           </a:p>
@@ -1805,7 +1808,7 @@
           <a:p>
             <a:fld id="{80F14A8D-8CB6-4DF7-BB03-9ADF328541C3}" type="datetime1">
               <a:rPr lang="en-US" smtClean="0"/>
-              <a:t>05-Feb-18</a:t>
+              <a:t>2/11/2018</a:t>
             </a:fld>
             <a:endParaRPr lang="en-US" dirty="0"/>
           </a:p>
@@ -2341,7 +2344,7 @@
           <a:p>
             <a:fld id="{12C8657D-6EFD-44FE-A6B1-FC3314E45B04}" type="datetime1">
               <a:rPr lang="en-US" smtClean="0"/>
-              <a:t>05-Feb-18</a:t>
+              <a:t>2/11/2018</a:t>
             </a:fld>
             <a:endParaRPr lang="en-US" dirty="0"/>
           </a:p>
@@ -2585,7 +2588,7 @@
           <a:p>
             <a:fld id="{3C22B71E-C0BD-47ED-A0E5-D73AF8DAABF6}" type="datetime1">
               <a:rPr lang="en-US" smtClean="0"/>
-              <a:t>05-Feb-18</a:t>
+              <a:t>2/11/2018</a:t>
             </a:fld>
             <a:endParaRPr lang="en-US" dirty="0"/>
           </a:p>
@@ -3113,7 +3116,7 @@
           <a:p>
             <a:fld id="{ABE61F29-A317-4BB7-AEDD-37E228401F6A}" type="datetime1">
               <a:rPr lang="en-US" smtClean="0"/>
-              <a:t>05-Feb-18</a:t>
+              <a:t>2/11/2018</a:t>
             </a:fld>
             <a:endParaRPr lang="en-US" dirty="0"/>
           </a:p>
@@ -3406,7 +3409,7 @@
           <a:p>
             <a:fld id="{FA7F1050-A139-4782-A1EE-67CE90110BBE}" type="datetime1">
               <a:rPr lang="en-US" smtClean="0"/>
-              <a:t>05-Feb-18</a:t>
+              <a:t>2/11/2018</a:t>
             </a:fld>
             <a:endParaRPr lang="en-US" dirty="0"/>
           </a:p>
@@ -3576,7 +3579,7 @@
           <a:p>
             <a:fld id="{F3AAD345-0762-4223-96B9-208D94F07C91}" type="datetime1">
               <a:rPr lang="en-US" smtClean="0"/>
-              <a:t>05-Feb-18</a:t>
+              <a:t>2/11/2018</a:t>
             </a:fld>
             <a:endParaRPr lang="en-US" dirty="0"/>
           </a:p>
@@ -3752,7 +3755,7 @@
           <a:p>
             <a:fld id="{203D6735-A7AF-42E2-85D0-894B50621292}" type="datetime1">
               <a:rPr lang="en-US" smtClean="0"/>
-              <a:t>05-Feb-18</a:t>
+              <a:t>2/11/2018</a:t>
             </a:fld>
             <a:endParaRPr lang="en-US" dirty="0"/>
           </a:p>
@@ -3959,7 +3962,7 @@
           <a:p>
             <a:fld id="{75176718-5527-4FAB-B437-FCE82648AEEB}" type="datetime1">
               <a:rPr lang="en-US" smtClean="0"/>
-              <a:t>05-Feb-18</a:t>
+              <a:t>2/11/2018</a:t>
             </a:fld>
             <a:endParaRPr lang="en-US" dirty="0"/>
           </a:p>
@@ -4206,7 +4209,7 @@
           <a:p>
             <a:fld id="{A2ECFFF3-0198-4D32-9ABA-0F0069AD8BC6}" type="datetime1">
               <a:rPr lang="en-US" smtClean="0"/>
-              <a:t>05-Feb-18</a:t>
+              <a:t>2/11/2018</a:t>
             </a:fld>
             <a:endParaRPr lang="en-US" dirty="0"/>
           </a:p>
@@ -4549,7 +4552,7 @@
           <a:p>
             <a:fld id="{3CB9EE01-0F27-46F0-BCC0-C0DFDC5C8A8D}" type="datetime1">
               <a:rPr lang="en-US" smtClean="0"/>
-              <a:t>05-Feb-18</a:t>
+              <a:t>2/11/2018</a:t>
             </a:fld>
             <a:endParaRPr lang="en-US" dirty="0"/>
           </a:p>
@@ -5037,7 +5040,7 @@
           <a:p>
             <a:fld id="{6B903B12-225C-4E1B-97C4-5C9BAF9747F6}" type="datetime1">
               <a:rPr lang="en-US" smtClean="0"/>
-              <a:t>05-Feb-18</a:t>
+              <a:t>2/11/2018</a:t>
             </a:fld>
             <a:endParaRPr lang="en-US" dirty="0"/>
           </a:p>
@@ -5151,7 +5154,7 @@
           <a:p>
             <a:fld id="{0DBF0E80-EEBA-4911-9FFE-EE5B4FB0B0C4}" type="datetime1">
               <a:rPr lang="en-US" smtClean="0"/>
-              <a:t>05-Feb-18</a:t>
+              <a:t>2/11/2018</a:t>
             </a:fld>
             <a:endParaRPr lang="en-US" dirty="0"/>
           </a:p>
@@ -5242,7 +5245,7 @@
           <a:p>
             <a:fld id="{802BC30E-BE77-4BD6-825A-556CCECBBD5F}" type="datetime1">
               <a:rPr lang="en-US" smtClean="0"/>
-              <a:t>05-Feb-18</a:t>
+              <a:t>2/11/2018</a:t>
             </a:fld>
             <a:endParaRPr lang="en-US" dirty="0"/>
           </a:p>
@@ -5521,7 +5524,7 @@
           <a:p>
             <a:fld id="{01AE9536-3169-430D-A3EC-03C1DAAD324C}" type="datetime1">
               <a:rPr lang="en-US" smtClean="0"/>
-              <a:t>05-Feb-18</a:t>
+              <a:t>2/11/2018</a:t>
             </a:fld>
             <a:endParaRPr lang="en-US" dirty="0"/>
           </a:p>
@@ -5808,7 +5811,7 @@
           <a:p>
             <a:fld id="{17BAD071-1EB6-4379-8228-408A106BFDF0}" type="datetime1">
               <a:rPr lang="en-US" smtClean="0"/>
-              <a:t>05-Feb-18</a:t>
+              <a:t>2/11/2018</a:t>
             </a:fld>
             <a:endParaRPr lang="en-US" dirty="0"/>
           </a:p>
@@ -6334,7 +6337,7 @@
           <a:p>
             <a:fld id="{3D2EF4AA-A067-4041-90FF-0766BB9D10CB}" type="datetime1">
               <a:rPr lang="en-US" smtClean="0"/>
-              <a:t>05-Feb-18</a:t>
+              <a:t>2/11/2018</a:t>
             </a:fld>
             <a:endParaRPr lang="en-US" dirty="0"/>
           </a:p>
@@ -7262,84 +7265,12 @@
           <a:chExt cx="0" cy="0"/>
         </a:xfrm>
       </p:grpSpPr>
-      <p:sp>
-        <p:nvSpPr>
-          <p:cNvPr id="2" name="Title 1">
+      <p:pic>
+        <p:nvPicPr>
+          <p:cNvPr id="6" name="Picture 5">
             <a:extLst>
               <a:ext uri="{FF2B5EF4-FFF2-40B4-BE49-F238E27FC236}">
-                <a16:creationId xmlns:a16="http://schemas.microsoft.com/office/drawing/2014/main" id="{7D51D6EA-8DA9-4D34-A010-29BD2BA54FF6}"/>
-              </a:ext>
-            </a:extLst>
-          </p:cNvPr>
-          <p:cNvSpPr>
-            <a:spLocks noGrp="1"/>
-          </p:cNvSpPr>
-          <p:nvPr>
-            <p:ph type="title"/>
-          </p:nvPr>
-        </p:nvSpPr>
-        <p:spPr>
-          <a:xfrm>
-            <a:off x="1484310" y="327661"/>
-            <a:ext cx="10018713" cy="1516380"/>
-          </a:xfrm>
-        </p:spPr>
-        <p:txBody>
-          <a:bodyPr>
-            <a:normAutofit fontScale="90000"/>
-          </a:bodyPr>
-          <a:lstStyle/>
-          <a:p>
-            <a:r>
-              <a:rPr lang="en-US" dirty="0"/>
-              <a:t>Sharing assemblies between application domains </a:t>
-            </a:r>
-            <a:br>
-              <a:rPr lang="en-US" dirty="0"/>
-            </a:br>
-            <a:r>
-              <a:rPr lang="en-US" sz="2400" dirty="0"/>
-              <a:t>Concept domain neutral assembly</a:t>
-            </a:r>
-          </a:p>
-        </p:txBody>
-      </p:sp>
-      <p:sp>
-        <p:nvSpPr>
-          <p:cNvPr id="5" name="Slide Number Placeholder 4">
-            <a:extLst>
-              <a:ext uri="{FF2B5EF4-FFF2-40B4-BE49-F238E27FC236}">
-                <a16:creationId xmlns:a16="http://schemas.microsoft.com/office/drawing/2014/main" id="{FDDC2F75-7AA4-48DE-AE07-C47DCCF5C4AF}"/>
-              </a:ext>
-            </a:extLst>
-          </p:cNvPr>
-          <p:cNvSpPr>
-            <a:spLocks noGrp="1"/>
-          </p:cNvSpPr>
-          <p:nvPr>
-            <p:ph type="sldNum" sz="quarter" idx="12"/>
-          </p:nvPr>
-        </p:nvSpPr>
-        <p:spPr/>
-        <p:txBody>
-          <a:bodyPr/>
-          <a:lstStyle/>
-          <a:p>
-            <a:fld id="{D57F1E4F-1CFF-5643-939E-217C01CDF565}" type="slidenum">
-              <a:rPr lang="en-US" sz="1400" smtClean="0"/>
-              <a:pPr/>
-              <a:t>10</a:t>
-            </a:fld>
-            <a:endParaRPr lang="en-US" sz="1400" dirty="0"/>
-          </a:p>
-        </p:txBody>
-      </p:sp>
-      <p:pic>
-        <p:nvPicPr>
-          <p:cNvPr id="3" name="Picture 2">
-            <a:extLst>
-              <a:ext uri="{FF2B5EF4-FFF2-40B4-BE49-F238E27FC236}">
-                <a16:creationId xmlns:a16="http://schemas.microsoft.com/office/drawing/2014/main" id="{53B70047-3E58-4A82-A6D9-470C4600D80A}"/>
+                <a16:creationId xmlns:a16="http://schemas.microsoft.com/office/drawing/2014/main" id="{7F30EEAC-5E30-42BA-B2E3-70B7775ACED8}"/>
               </a:ext>
             </a:extLst>
           </p:cNvPr>
@@ -7356,50 +7287,20 @@
         </p:blipFill>
         <p:spPr>
           <a:xfrm>
-            <a:off x="511253" y="2208349"/>
-            <a:ext cx="6754758" cy="3772678"/>
+            <a:off x="1189801" y="1244555"/>
+            <a:ext cx="4737887" cy="5151823"/>
           </a:xfrm>
           <a:prstGeom prst="rect">
             <a:avLst/>
           </a:prstGeom>
         </p:spPr>
       </p:pic>
-      <p:pic>
-        <p:nvPicPr>
-          <p:cNvPr id="8" name="Picture 7">
+      <p:sp>
+        <p:nvSpPr>
+          <p:cNvPr id="7" name="TextBox 6">
             <a:extLst>
               <a:ext uri="{FF2B5EF4-FFF2-40B4-BE49-F238E27FC236}">
-                <a16:creationId xmlns:a16="http://schemas.microsoft.com/office/drawing/2014/main" id="{33108515-CBC8-47DA-9CD2-02270134AC51}"/>
-              </a:ext>
-            </a:extLst>
-          </p:cNvPr>
-          <p:cNvPicPr>
-            <a:picLocks noChangeAspect="1"/>
-          </p:cNvPicPr>
-          <p:nvPr/>
-        </p:nvPicPr>
-        <p:blipFill>
-          <a:blip r:embed="rId4"/>
-          <a:stretch>
-            <a:fillRect/>
-          </a:stretch>
-        </p:blipFill>
-        <p:spPr>
-          <a:xfrm>
-            <a:off x="7550396" y="1542175"/>
-            <a:ext cx="4130351" cy="4836577"/>
-          </a:xfrm>
-          <a:prstGeom prst="rect">
-            <a:avLst/>
-          </a:prstGeom>
-        </p:spPr>
-      </p:pic>
-      <p:sp>
-        <p:nvSpPr>
-          <p:cNvPr id="13" name="TextBox 12">
-            <a:extLst>
-              <a:ext uri="{FF2B5EF4-FFF2-40B4-BE49-F238E27FC236}">
-                <a16:creationId xmlns:a16="http://schemas.microsoft.com/office/drawing/2014/main" id="{DFFAA7C2-5B36-4360-9470-EA20DC3FBA7D}"/>
+                <a16:creationId xmlns:a16="http://schemas.microsoft.com/office/drawing/2014/main" id="{AA30EB06-545E-4BF2-A9FC-75BE32F1FCA5}"/>
               </a:ext>
             </a:extLst>
           </p:cNvPr>
@@ -7408,8 +7309,8 @@
         </p:nvSpPr>
         <p:spPr>
           <a:xfrm>
-            <a:off x="1484310" y="1676399"/>
-            <a:ext cx="5624232" cy="369332"/>
+            <a:off x="6096000" y="5804429"/>
+            <a:ext cx="5797548" cy="923330"/>
           </a:xfrm>
           <a:prstGeom prst="rect">
             <a:avLst/>
@@ -7417,24 +7318,33 @@
           <a:noFill/>
         </p:spPr>
         <p:txBody>
-          <a:bodyPr wrap="none" rtlCol="0">
+          <a:bodyPr wrap="square" rtlCol="0">
             <a:spAutoFit/>
           </a:bodyPr>
           <a:lstStyle/>
           <a:p>
             <a:r>
               <a:rPr lang="en-US" dirty="0"/>
-              <a:t>Let's combine 3 instance of the same API to one app pools</a:t>
-            </a:r>
-          </a:p>
-        </p:txBody>
-      </p:sp>
-      <p:sp>
-        <p:nvSpPr>
-          <p:cNvPr id="14" name="TextBox 13">
+              <a:t>See also:</a:t>
+            </a:r>
+          </a:p>
+          <a:p>
+            <a:r>
+              <a:rPr lang="en-US" dirty="0">
+                <a:hlinkClick r:id="rId4"/>
+              </a:rPr>
+              <a:t>https://blogs.msdn.microsoft.com/junfeng/2004/08/05/domain-neutral-assemblies/</a:t>
+            </a:r>
+            <a:endParaRPr lang="en-US" dirty="0"/>
+          </a:p>
+        </p:txBody>
+      </p:sp>
+      <p:sp>
+        <p:nvSpPr>
+          <p:cNvPr id="11" name="TextBox 10">
             <a:extLst>
               <a:ext uri="{FF2B5EF4-FFF2-40B4-BE49-F238E27FC236}">
-                <a16:creationId xmlns:a16="http://schemas.microsoft.com/office/drawing/2014/main" id="{38CA6D8E-58F2-45EB-A3F2-AA5BFCD14A9D}"/>
+                <a16:creationId xmlns:a16="http://schemas.microsoft.com/office/drawing/2014/main" id="{AD189ED0-5411-4447-873B-FFBF6931C62D}"/>
               </a:ext>
             </a:extLst>
           </p:cNvPr>
@@ -7443,8 +7353,8 @@
         </p:nvSpPr>
         <p:spPr>
           <a:xfrm>
-            <a:off x="8818718" y="6441179"/>
-            <a:ext cx="1593706" cy="338554"/>
+            <a:off x="6870700" y="2531573"/>
+            <a:ext cx="4632322" cy="2400657"/>
           </a:xfrm>
           <a:prstGeom prst="rect">
             <a:avLst/>
@@ -7452,6 +7362,177 @@
           <a:noFill/>
         </p:spPr>
         <p:txBody>
+          <a:bodyPr wrap="square" rtlCol="0">
+            <a:spAutoFit/>
+          </a:bodyPr>
+          <a:lstStyle/>
+          <a:p>
+            <a:pPr marL="285750" lvl="0" indent="-285750" defTabSz="914400">
+              <a:lnSpc>
+                <a:spcPct val="150000"/>
+              </a:lnSpc>
+              <a:buFont typeface="Arial" panose="020B0604020202020204" pitchFamily="34" charset="0"/>
+              <a:buChar char="•"/>
+            </a:pPr>
+            <a:r>
+              <a:rPr lang="en-US" altLang="en-US" sz="2200" dirty="0"/>
+              <a:t>It lives across multiple </a:t>
+            </a:r>
+            <a:r>
+              <a:rPr lang="en-US" altLang="en-US" sz="2200" dirty="0" err="1"/>
+              <a:t>appdomains</a:t>
+            </a:r>
+            <a:endParaRPr lang="en-US" altLang="en-US" sz="2200" dirty="0"/>
+          </a:p>
+          <a:p>
+            <a:pPr marL="285750" lvl="0" indent="-285750" defTabSz="914400">
+              <a:lnSpc>
+                <a:spcPct val="150000"/>
+              </a:lnSpc>
+              <a:buFont typeface="Arial" panose="020B0604020202020204" pitchFamily="34" charset="0"/>
+              <a:buChar char="•"/>
+            </a:pPr>
+            <a:r>
+              <a:rPr lang="en-US" altLang="en-US" sz="2200" dirty="0"/>
+              <a:t>It will be </a:t>
+            </a:r>
+            <a:r>
+              <a:rPr lang="en-US" altLang="en-US" sz="2200" dirty="0" err="1"/>
+              <a:t>jitted</a:t>
+            </a:r>
+            <a:r>
+              <a:rPr lang="en-US" altLang="en-US" sz="2200" dirty="0"/>
+              <a:t> only once</a:t>
+            </a:r>
+          </a:p>
+          <a:p>
+            <a:pPr marL="285750" lvl="0" indent="-285750" defTabSz="914400">
+              <a:lnSpc>
+                <a:spcPct val="150000"/>
+              </a:lnSpc>
+              <a:buFont typeface="Arial" panose="020B0604020202020204" pitchFamily="34" charset="0"/>
+              <a:buChar char="•"/>
+            </a:pPr>
+            <a:r>
+              <a:rPr lang="en-US" altLang="en-US" sz="2200" dirty="0"/>
+              <a:t>The </a:t>
+            </a:r>
+            <a:r>
+              <a:rPr lang="en-US" altLang="en-US" sz="2200" dirty="0" err="1"/>
+              <a:t>jitted</a:t>
+            </a:r>
+            <a:r>
+              <a:rPr lang="en-US" altLang="en-US" sz="2200" dirty="0"/>
+              <a:t> code will be shared across </a:t>
+            </a:r>
+            <a:r>
+              <a:rPr lang="en-US" altLang="en-US" sz="2200" dirty="0" err="1"/>
+              <a:t>appdomains</a:t>
+            </a:r>
+            <a:r>
+              <a:rPr lang="en-US" altLang="en-US" sz="2200" dirty="0"/>
+              <a:t> </a:t>
+            </a:r>
+          </a:p>
+          <a:p>
+            <a:endParaRPr lang="en-US" dirty="0"/>
+          </a:p>
+        </p:txBody>
+      </p:sp>
+      <p:sp>
+        <p:nvSpPr>
+          <p:cNvPr id="12" name="TextBox 11">
+            <a:extLst>
+              <a:ext uri="{FF2B5EF4-FFF2-40B4-BE49-F238E27FC236}">
+                <a16:creationId xmlns:a16="http://schemas.microsoft.com/office/drawing/2014/main" id="{2DB3805B-9BAF-4048-8277-BFEAF817081E}"/>
+              </a:ext>
+            </a:extLst>
+          </p:cNvPr>
+          <p:cNvSpPr txBox="1"/>
+          <p:nvPr/>
+        </p:nvSpPr>
+        <p:spPr>
+          <a:xfrm>
+            <a:off x="6985000" y="1906743"/>
+            <a:ext cx="4518023" cy="430887"/>
+          </a:xfrm>
+          <a:prstGeom prst="rect">
+            <a:avLst/>
+          </a:prstGeom>
+          <a:noFill/>
+        </p:spPr>
+        <p:txBody>
+          <a:bodyPr wrap="square" rtlCol="0">
+            <a:spAutoFit/>
+          </a:bodyPr>
+          <a:lstStyle/>
+          <a:p>
+            <a:pPr algn="ctr"/>
+            <a:r>
+              <a:rPr lang="en-US" sz="2200" b="1" dirty="0"/>
+              <a:t>Domain neutral assembly</a:t>
+            </a:r>
+          </a:p>
+        </p:txBody>
+      </p:sp>
+      <p:sp>
+        <p:nvSpPr>
+          <p:cNvPr id="5" name="Slide Number Placeholder 4">
+            <a:extLst>
+              <a:ext uri="{FF2B5EF4-FFF2-40B4-BE49-F238E27FC236}">
+                <a16:creationId xmlns:a16="http://schemas.microsoft.com/office/drawing/2014/main" id="{FDDC2F75-7AA4-48DE-AE07-C47DCCF5C4AF}"/>
+              </a:ext>
+            </a:extLst>
+          </p:cNvPr>
+          <p:cNvSpPr>
+            <a:spLocks noGrp="1"/>
+          </p:cNvSpPr>
+          <p:nvPr>
+            <p:ph type="sldNum" sz="quarter" idx="12"/>
+          </p:nvPr>
+        </p:nvSpPr>
+        <p:spPr>
+          <a:xfrm>
+            <a:off x="11227438" y="5621866"/>
+            <a:ext cx="551167" cy="365125"/>
+          </a:xfrm>
+        </p:spPr>
+        <p:txBody>
+          <a:bodyPr/>
+          <a:lstStyle/>
+          <a:p>
+            <a:fld id="{D57F1E4F-1CFF-5643-939E-217C01CDF565}" type="slidenum">
+              <a:rPr lang="en-US" sz="1400" smtClean="0"/>
+              <a:pPr/>
+              <a:t>10</a:t>
+            </a:fld>
+            <a:endParaRPr lang="en-US" sz="1400" dirty="0"/>
+          </a:p>
+        </p:txBody>
+      </p:sp>
+      <p:sp>
+        <p:nvSpPr>
+          <p:cNvPr id="9" name="TextBox 8">
+            <a:extLst>
+              <a:ext uri="{FF2B5EF4-FFF2-40B4-BE49-F238E27FC236}">
+                <a16:creationId xmlns:a16="http://schemas.microsoft.com/office/drawing/2014/main" id="{85EA38BC-F36B-4A6E-9033-05AFC1CDE3D6}"/>
+              </a:ext>
+            </a:extLst>
+          </p:cNvPr>
+          <p:cNvSpPr txBox="1"/>
+          <p:nvPr/>
+        </p:nvSpPr>
+        <p:spPr>
+          <a:xfrm>
+            <a:off x="2761892" y="6412210"/>
+            <a:ext cx="1593706" cy="338554"/>
+          </a:xfrm>
+          <a:prstGeom prst="rect">
+            <a:avLst/>
+          </a:prstGeom>
+          <a:noFill/>
+        </p:spPr>
+        <p:txBody>
           <a:bodyPr wrap="none" rtlCol="0">
             <a:spAutoFit/>
           </a:bodyPr>
@@ -7464,10 +7545,52 @@
           </a:p>
         </p:txBody>
       </p:sp>
+      <p:sp>
+        <p:nvSpPr>
+          <p:cNvPr id="14" name="Title 1">
+            <a:extLst>
+              <a:ext uri="{FF2B5EF4-FFF2-40B4-BE49-F238E27FC236}">
+                <a16:creationId xmlns:a16="http://schemas.microsoft.com/office/drawing/2014/main" id="{CDA62E26-B6DF-4809-BF61-13C69C117C69}"/>
+              </a:ext>
+            </a:extLst>
+          </p:cNvPr>
+          <p:cNvSpPr>
+            <a:spLocks noGrp="1"/>
+          </p:cNvSpPr>
+          <p:nvPr>
+            <p:ph type="title"/>
+          </p:nvPr>
+        </p:nvSpPr>
+        <p:spPr>
+          <a:xfrm>
+            <a:off x="1484310" y="175261"/>
+            <a:ext cx="10018713" cy="1053463"/>
+          </a:xfrm>
+        </p:spPr>
+        <p:txBody>
+          <a:bodyPr>
+            <a:normAutofit fontScale="90000"/>
+          </a:bodyPr>
+          <a:lstStyle/>
+          <a:p>
+            <a:r>
+              <a:rPr lang="en-US" dirty="0"/>
+              <a:t>Sharing assemblies between application domains </a:t>
+            </a:r>
+            <a:br>
+              <a:rPr lang="en-US" dirty="0"/>
+            </a:br>
+            <a:r>
+              <a:rPr lang="en-US" sz="2400" dirty="0"/>
+              <a:t>Concept domain neutral assembly</a:t>
+            </a:r>
+          </a:p>
+        </p:txBody>
+      </p:sp>
     </p:spTree>
     <p:extLst>
       <p:ext uri="{BB962C8B-B14F-4D97-AF65-F5344CB8AC3E}">
-        <p14:creationId xmlns:p14="http://schemas.microsoft.com/office/powerpoint/2010/main" val="2307694845"/>
+        <p14:creationId xmlns:p14="http://schemas.microsoft.com/office/powerpoint/2010/main" val="3214061660"/>
       </p:ext>
     </p:extLst>
   </p:cSld>
@@ -7512,8 +7635,8 @@
         </p:nvSpPr>
         <p:spPr>
           <a:xfrm>
-            <a:off x="1484310" y="327661"/>
-            <a:ext cx="10018713" cy="1516380"/>
+            <a:off x="1484310" y="118783"/>
+            <a:ext cx="10018713" cy="1087717"/>
           </a:xfrm>
         </p:spPr>
         <p:txBody>
@@ -7566,47 +7689,12 @@
           </a:p>
         </p:txBody>
       </p:sp>
-      <p:sp>
-        <p:nvSpPr>
-          <p:cNvPr id="13" name="TextBox 12">
+      <p:pic>
+        <p:nvPicPr>
+          <p:cNvPr id="3" name="Picture 2">
             <a:extLst>
               <a:ext uri="{FF2B5EF4-FFF2-40B4-BE49-F238E27FC236}">
-                <a16:creationId xmlns:a16="http://schemas.microsoft.com/office/drawing/2014/main" id="{DFFAA7C2-5B36-4360-9470-EA20DC3FBA7D}"/>
-              </a:ext>
-            </a:extLst>
-          </p:cNvPr>
-          <p:cNvSpPr txBox="1"/>
-          <p:nvPr/>
-        </p:nvSpPr>
-        <p:spPr>
-          <a:xfrm>
-            <a:off x="2520252" y="1659375"/>
-            <a:ext cx="8431604" cy="369332"/>
-          </a:xfrm>
-          <a:prstGeom prst="rect">
-            <a:avLst/>
-          </a:prstGeom>
-          <a:noFill/>
-        </p:spPr>
-        <p:txBody>
-          <a:bodyPr wrap="none" rtlCol="0">
-            <a:spAutoFit/>
-          </a:bodyPr>
-          <a:lstStyle/>
-          <a:p>
-            <a:r>
-              <a:rPr lang="en-US" dirty="0"/>
-              <a:t>Let's combine 3 instance of the same API to one app pools and compare memory usage</a:t>
-            </a:r>
-          </a:p>
-        </p:txBody>
-      </p:sp>
-      <p:pic>
-        <p:nvPicPr>
-          <p:cNvPr id="4" name="Picture 3">
-            <a:extLst>
-              <a:ext uri="{FF2B5EF4-FFF2-40B4-BE49-F238E27FC236}">
-                <a16:creationId xmlns:a16="http://schemas.microsoft.com/office/drawing/2014/main" id="{B75EFA50-462A-4C5C-85F3-C7B28AB5F057}"/>
+                <a16:creationId xmlns:a16="http://schemas.microsoft.com/office/drawing/2014/main" id="{53B70047-3E58-4A82-A6D9-470C4600D80A}"/>
               </a:ext>
             </a:extLst>
           </p:cNvPr>
@@ -7623,8 +7711,8 @@
         </p:blipFill>
         <p:spPr>
           <a:xfrm>
-            <a:off x="2479058" y="2124205"/>
-            <a:ext cx="3219276" cy="4065724"/>
+            <a:off x="182448" y="1825079"/>
+            <a:ext cx="7157323" cy="3997519"/>
           </a:xfrm>
           <a:prstGeom prst="rect">
             <a:avLst/>
@@ -7633,10 +7721,10 @@
       </p:pic>
       <p:pic>
         <p:nvPicPr>
-          <p:cNvPr id="6" name="Picture 5">
+          <p:cNvPr id="8" name="Picture 7">
             <a:extLst>
               <a:ext uri="{FF2B5EF4-FFF2-40B4-BE49-F238E27FC236}">
-                <a16:creationId xmlns:a16="http://schemas.microsoft.com/office/drawing/2014/main" id="{3B796848-7E7D-47B3-AAF9-7C53E5BC84B5}"/>
+                <a16:creationId xmlns:a16="http://schemas.microsoft.com/office/drawing/2014/main" id="{33108515-CBC8-47DA-9CD2-02270134AC51}"/>
               </a:ext>
             </a:extLst>
           </p:cNvPr>
@@ -7653,8 +7741,8 @@
         </p:blipFill>
         <p:spPr>
           <a:xfrm>
-            <a:off x="6493666" y="2124205"/>
-            <a:ext cx="3219276" cy="4065724"/>
+            <a:off x="7539229" y="1206500"/>
+            <a:ext cx="4470323" cy="5234679"/>
           </a:xfrm>
           <a:prstGeom prst="rect">
             <a:avLst/>
@@ -7663,10 +7751,10 @@
       </p:pic>
       <p:sp>
         <p:nvSpPr>
-          <p:cNvPr id="10" name="TextBox 9">
+          <p:cNvPr id="14" name="TextBox 13">
             <a:extLst>
               <a:ext uri="{FF2B5EF4-FFF2-40B4-BE49-F238E27FC236}">
-                <a16:creationId xmlns:a16="http://schemas.microsoft.com/office/drawing/2014/main" id="{19A1264F-1BF5-41C1-9FD6-523159C51B9A}"/>
+                <a16:creationId xmlns:a16="http://schemas.microsoft.com/office/drawing/2014/main" id="{38CA6D8E-58F2-45EB-A3F2-AA5BFCD14A9D}"/>
               </a:ext>
             </a:extLst>
           </p:cNvPr>
@@ -7675,8 +7763,8 @@
         </p:nvSpPr>
         <p:spPr>
           <a:xfrm>
-            <a:off x="3064729" y="6285427"/>
-            <a:ext cx="1826719" cy="338554"/>
+            <a:off x="8935392" y="6441179"/>
+            <a:ext cx="1593706" cy="338554"/>
           </a:xfrm>
           <a:prstGeom prst="rect">
             <a:avLst/>
@@ -7691,60 +7779,123 @@
           <a:p>
             <a:r>
               <a:rPr lang="en-US" sz="1600" dirty="0"/>
-              <a:t>One site in </a:t>
-            </a:r>
-            <a:r>
-              <a:rPr lang="en-US" sz="1600" dirty="0" err="1"/>
-              <a:t>appPool</a:t>
-            </a:r>
-            <a:endParaRPr lang="en-US" sz="1600" dirty="0"/>
-          </a:p>
-        </p:txBody>
-      </p:sp>
-      <p:sp>
-        <p:nvSpPr>
-          <p:cNvPr id="11" name="TextBox 10">
+              <a:t>Process Explorer</a:t>
+            </a:r>
+          </a:p>
+        </p:txBody>
+      </p:sp>
+      <p:sp>
+        <p:nvSpPr>
+          <p:cNvPr id="20" name="Rectangle 19">
             <a:extLst>
               <a:ext uri="{FF2B5EF4-FFF2-40B4-BE49-F238E27FC236}">
-                <a16:creationId xmlns:a16="http://schemas.microsoft.com/office/drawing/2014/main" id="{50AF291E-6807-4219-B1E7-0F67F2397E13}"/>
+                <a16:creationId xmlns:a16="http://schemas.microsoft.com/office/drawing/2014/main" id="{9F566708-760B-4075-B89E-A34E4A8CC2D9}"/>
               </a:ext>
             </a:extLst>
           </p:cNvPr>
-          <p:cNvSpPr txBox="1"/>
+          <p:cNvSpPr/>
           <p:nvPr/>
         </p:nvSpPr>
         <p:spPr>
           <a:xfrm>
-            <a:off x="7080940" y="6285427"/>
-            <a:ext cx="2044727" cy="338554"/>
+            <a:off x="7833360" y="2369820"/>
+            <a:ext cx="2695738" cy="365760"/>
           </a:xfrm>
           <a:prstGeom prst="rect">
             <a:avLst/>
           </a:prstGeom>
           <a:noFill/>
-        </p:spPr>
-        <p:txBody>
-          <a:bodyPr wrap="none" rtlCol="0">
-            <a:spAutoFit/>
-          </a:bodyPr>
-          <a:lstStyle/>
-          <a:p>
-            <a:r>
-              <a:rPr lang="en-US" sz="1600" dirty="0"/>
-              <a:t>Three sites in </a:t>
-            </a:r>
-            <a:r>
-              <a:rPr lang="en-US" sz="1600" dirty="0" err="1"/>
-              <a:t>appPool</a:t>
-            </a:r>
-            <a:endParaRPr lang="en-US" sz="1600" dirty="0"/>
+          <a:ln w="25400">
+            <a:solidFill>
+              <a:schemeClr val="accent2">
+                <a:lumMod val="75000"/>
+              </a:schemeClr>
+            </a:solidFill>
+          </a:ln>
+        </p:spPr>
+        <p:style>
+          <a:lnRef idx="2">
+            <a:schemeClr val="accent1">
+              <a:shade val="50000"/>
+            </a:schemeClr>
+          </a:lnRef>
+          <a:fillRef idx="1">
+            <a:schemeClr val="accent1"/>
+          </a:fillRef>
+          <a:effectRef idx="0">
+            <a:schemeClr val="accent1"/>
+          </a:effectRef>
+          <a:fontRef idx="minor">
+            <a:schemeClr val="lt1"/>
+          </a:fontRef>
+        </p:style>
+        <p:txBody>
+          <a:bodyPr rtlCol="0" anchor="ctr"/>
+          <a:lstStyle/>
+          <a:p>
+            <a:pPr algn="ctr"/>
+            <a:endParaRPr lang="en-US"/>
+          </a:p>
+        </p:txBody>
+      </p:sp>
+      <p:sp>
+        <p:nvSpPr>
+          <p:cNvPr id="21" name="Rectangle 20">
+            <a:extLst>
+              <a:ext uri="{FF2B5EF4-FFF2-40B4-BE49-F238E27FC236}">
+                <a16:creationId xmlns:a16="http://schemas.microsoft.com/office/drawing/2014/main" id="{70E07320-1E6D-420D-9CA6-32F9C9BDD166}"/>
+              </a:ext>
+            </a:extLst>
+          </p:cNvPr>
+          <p:cNvSpPr/>
+          <p:nvPr/>
+        </p:nvSpPr>
+        <p:spPr>
+          <a:xfrm>
+            <a:off x="472440" y="3353934"/>
+            <a:ext cx="868680" cy="463685"/>
+          </a:xfrm>
+          <a:prstGeom prst="rect">
+            <a:avLst/>
+          </a:prstGeom>
+          <a:noFill/>
+          <a:ln w="25400">
+            <a:solidFill>
+              <a:schemeClr val="accent2">
+                <a:lumMod val="75000"/>
+              </a:schemeClr>
+            </a:solidFill>
+          </a:ln>
+        </p:spPr>
+        <p:style>
+          <a:lnRef idx="2">
+            <a:schemeClr val="accent1">
+              <a:shade val="50000"/>
+            </a:schemeClr>
+          </a:lnRef>
+          <a:fillRef idx="1">
+            <a:schemeClr val="accent1"/>
+          </a:fillRef>
+          <a:effectRef idx="0">
+            <a:schemeClr val="accent1"/>
+          </a:effectRef>
+          <a:fontRef idx="minor">
+            <a:schemeClr val="lt1"/>
+          </a:fontRef>
+        </p:style>
+        <p:txBody>
+          <a:bodyPr rtlCol="0" anchor="ctr"/>
+          <a:lstStyle/>
+          <a:p>
+            <a:pPr algn="ctr"/>
+            <a:endParaRPr lang="en-US"/>
           </a:p>
         </p:txBody>
       </p:sp>
     </p:spTree>
     <p:extLst>
       <p:ext uri="{BB962C8B-B14F-4D97-AF65-F5344CB8AC3E}">
-        <p14:creationId xmlns:p14="http://schemas.microsoft.com/office/powerpoint/2010/main" val="3547861015"/>
+        <p14:creationId xmlns:p14="http://schemas.microsoft.com/office/powerpoint/2010/main" val="2307694845"/>
       </p:ext>
     </p:extLst>
   </p:cSld>
@@ -7776,7 +7927,7 @@
           <p:cNvPr id="2" name="Title 1">
             <a:extLst>
               <a:ext uri="{FF2B5EF4-FFF2-40B4-BE49-F238E27FC236}">
-                <a16:creationId xmlns:a16="http://schemas.microsoft.com/office/drawing/2014/main" id="{09619E5A-9C6F-46E0-8395-140AC3D184CD}"/>
+                <a16:creationId xmlns:a16="http://schemas.microsoft.com/office/drawing/2014/main" id="{7D51D6EA-8DA9-4D34-A010-29BD2BA54FF6}"/>
               </a:ext>
             </a:extLst>
           </p:cNvPr>
@@ -7789,8 +7940,8 @@
         </p:nvSpPr>
         <p:spPr>
           <a:xfrm>
-            <a:off x="1484311" y="685801"/>
-            <a:ext cx="10018713" cy="1066800"/>
+            <a:off x="1484309" y="93305"/>
+            <a:ext cx="10018713" cy="817673"/>
           </a:xfrm>
         </p:spPr>
         <p:txBody>
@@ -7807,7 +7958,7 @@
               <a:rPr lang="en-US" dirty="0"/>
             </a:br>
             <a:r>
-              <a:rPr lang="en-US" sz="2700" dirty="0"/>
+              <a:rPr lang="en-US" sz="2400" dirty="0"/>
               <a:t>Concept domain neutral assembly</a:t>
             </a:r>
           </a:p>
@@ -7815,10 +7966,10 @@
       </p:sp>
       <p:sp>
         <p:nvSpPr>
-          <p:cNvPr id="3" name="Content Placeholder 2">
+          <p:cNvPr id="5" name="Slide Number Placeholder 4">
             <a:extLst>
               <a:ext uri="{FF2B5EF4-FFF2-40B4-BE49-F238E27FC236}">
-                <a16:creationId xmlns:a16="http://schemas.microsoft.com/office/drawing/2014/main" id="{F5BF9354-5E70-4F1E-9E61-289C2FB3ED00}"/>
+                <a16:creationId xmlns:a16="http://schemas.microsoft.com/office/drawing/2014/main" id="{FDDC2F75-7AA4-48DE-AE07-C47DCCF5C4AF}"/>
               </a:ext>
             </a:extLst>
           </p:cNvPr>
@@ -7826,61 +7977,15 @@
             <a:spLocks noGrp="1"/>
           </p:cNvSpPr>
           <p:nvPr>
-            <p:ph idx="1"/>
-          </p:nvPr>
-        </p:nvSpPr>
-        <p:spPr>
-          <a:xfrm>
-            <a:off x="1484311" y="1981199"/>
-            <a:ext cx="10018713" cy="3124201"/>
-          </a:xfrm>
-        </p:spPr>
-        <p:txBody>
-          <a:bodyPr>
-            <a:normAutofit/>
-          </a:bodyPr>
-          <a:lstStyle/>
-          <a:p>
-            <a:pPr marL="0" indent="0">
-              <a:buNone/>
-            </a:pPr>
-            <a:r>
-              <a:rPr lang="en-US" b="1" dirty="0"/>
-              <a:t>Conclusion from a previous slide:</a:t>
-            </a:r>
-          </a:p>
-          <a:p>
-            <a:r>
-              <a:rPr lang="en-US" dirty="0"/>
-              <a:t>An assembly can be domain neutral if and only if it is in GAC, </a:t>
-            </a:r>
-            <a:br>
-              <a:rPr lang="en-US" dirty="0"/>
-            </a:br>
-            <a:r>
-              <a:rPr lang="en-US" dirty="0"/>
-              <a:t>and all the assemblies in its transitive binding closure are all in GAC.</a:t>
-            </a:r>
-          </a:p>
-        </p:txBody>
-      </p:sp>
-      <p:sp>
-        <p:nvSpPr>
-          <p:cNvPr id="5" name="Slide Number Placeholder 4">
-            <a:extLst>
-              <a:ext uri="{FF2B5EF4-FFF2-40B4-BE49-F238E27FC236}">
-                <a16:creationId xmlns:a16="http://schemas.microsoft.com/office/drawing/2014/main" id="{1EB71862-796C-46C8-A415-3C21CCF3B4E1}"/>
-              </a:ext>
-            </a:extLst>
-          </p:cNvPr>
-          <p:cNvSpPr>
-            <a:spLocks noGrp="1"/>
-          </p:cNvSpPr>
-          <p:nvPr>
             <p:ph type="sldNum" sz="quarter" idx="12"/>
           </p:nvPr>
         </p:nvSpPr>
-        <p:spPr/>
+        <p:spPr>
+          <a:xfrm>
+            <a:off x="11672596" y="6357722"/>
+            <a:ext cx="381592" cy="365125"/>
+          </a:xfrm>
+        </p:spPr>
         <p:txBody>
           <a:bodyPr/>
           <a:lstStyle/>
@@ -7894,10 +7999,408 @@
           </a:p>
         </p:txBody>
       </p:sp>
+      <p:pic>
+        <p:nvPicPr>
+          <p:cNvPr id="4" name="Picture 3">
+            <a:extLst>
+              <a:ext uri="{FF2B5EF4-FFF2-40B4-BE49-F238E27FC236}">
+                <a16:creationId xmlns:a16="http://schemas.microsoft.com/office/drawing/2014/main" id="{B75EFA50-462A-4C5C-85F3-C7B28AB5F057}"/>
+              </a:ext>
+            </a:extLst>
+          </p:cNvPr>
+          <p:cNvPicPr>
+            <a:picLocks noChangeAspect="1"/>
+          </p:cNvPicPr>
+          <p:nvPr/>
+        </p:nvPicPr>
+        <p:blipFill>
+          <a:blip r:embed="rId3"/>
+          <a:stretch>
+            <a:fillRect/>
+          </a:stretch>
+        </p:blipFill>
+        <p:spPr>
+          <a:xfrm>
+            <a:off x="1484309" y="1035698"/>
+            <a:ext cx="4214025" cy="5322024"/>
+          </a:xfrm>
+          <a:prstGeom prst="rect">
+            <a:avLst/>
+          </a:prstGeom>
+        </p:spPr>
+      </p:pic>
+      <p:pic>
+        <p:nvPicPr>
+          <p:cNvPr id="6" name="Picture 5">
+            <a:extLst>
+              <a:ext uri="{FF2B5EF4-FFF2-40B4-BE49-F238E27FC236}">
+                <a16:creationId xmlns:a16="http://schemas.microsoft.com/office/drawing/2014/main" id="{3B796848-7E7D-47B3-AAF9-7C53E5BC84B5}"/>
+              </a:ext>
+            </a:extLst>
+          </p:cNvPr>
+          <p:cNvPicPr>
+            <a:picLocks noChangeAspect="1"/>
+          </p:cNvPicPr>
+          <p:nvPr/>
+        </p:nvPicPr>
+        <p:blipFill>
+          <a:blip r:embed="rId4"/>
+          <a:stretch>
+            <a:fillRect/>
+          </a:stretch>
+        </p:blipFill>
+        <p:spPr>
+          <a:xfrm>
+            <a:off x="6493665" y="1035698"/>
+            <a:ext cx="4214025" cy="5322024"/>
+          </a:xfrm>
+          <a:prstGeom prst="rect">
+            <a:avLst/>
+          </a:prstGeom>
+        </p:spPr>
+      </p:pic>
+      <p:sp>
+        <p:nvSpPr>
+          <p:cNvPr id="10" name="TextBox 9">
+            <a:extLst>
+              <a:ext uri="{FF2B5EF4-FFF2-40B4-BE49-F238E27FC236}">
+                <a16:creationId xmlns:a16="http://schemas.microsoft.com/office/drawing/2014/main" id="{19A1264F-1BF5-41C1-9FD6-523159C51B9A}"/>
+              </a:ext>
+            </a:extLst>
+          </p:cNvPr>
+          <p:cNvSpPr txBox="1"/>
+          <p:nvPr/>
+        </p:nvSpPr>
+        <p:spPr>
+          <a:xfrm>
+            <a:off x="2677961" y="6426141"/>
+            <a:ext cx="1826719" cy="338554"/>
+          </a:xfrm>
+          <a:prstGeom prst="rect">
+            <a:avLst/>
+          </a:prstGeom>
+          <a:noFill/>
+        </p:spPr>
+        <p:txBody>
+          <a:bodyPr wrap="none" rtlCol="0">
+            <a:spAutoFit/>
+          </a:bodyPr>
+          <a:lstStyle/>
+          <a:p>
+            <a:r>
+              <a:rPr lang="en-US" sz="1600" dirty="0"/>
+              <a:t>One site in </a:t>
+            </a:r>
+            <a:r>
+              <a:rPr lang="en-US" sz="1600" dirty="0" err="1"/>
+              <a:t>appPool</a:t>
+            </a:r>
+            <a:endParaRPr lang="en-US" sz="1600" dirty="0"/>
+          </a:p>
+        </p:txBody>
+      </p:sp>
+      <p:sp>
+        <p:nvSpPr>
+          <p:cNvPr id="11" name="TextBox 10">
+            <a:extLst>
+              <a:ext uri="{FF2B5EF4-FFF2-40B4-BE49-F238E27FC236}">
+                <a16:creationId xmlns:a16="http://schemas.microsoft.com/office/drawing/2014/main" id="{50AF291E-6807-4219-B1E7-0F67F2397E13}"/>
+              </a:ext>
+            </a:extLst>
+          </p:cNvPr>
+          <p:cNvSpPr txBox="1"/>
+          <p:nvPr/>
+        </p:nvSpPr>
+        <p:spPr>
+          <a:xfrm>
+            <a:off x="7578313" y="6426141"/>
+            <a:ext cx="2044727" cy="338554"/>
+          </a:xfrm>
+          <a:prstGeom prst="rect">
+            <a:avLst/>
+          </a:prstGeom>
+          <a:noFill/>
+        </p:spPr>
+        <p:txBody>
+          <a:bodyPr wrap="none" rtlCol="0">
+            <a:spAutoFit/>
+          </a:bodyPr>
+          <a:lstStyle/>
+          <a:p>
+            <a:r>
+              <a:rPr lang="en-US" sz="1600" dirty="0"/>
+              <a:t>Three sites in </a:t>
+            </a:r>
+            <a:r>
+              <a:rPr lang="en-US" sz="1600" dirty="0" err="1"/>
+              <a:t>appPool</a:t>
+            </a:r>
+            <a:endParaRPr lang="en-US" sz="1600" dirty="0"/>
+          </a:p>
+        </p:txBody>
+      </p:sp>
+      <p:cxnSp>
+        <p:nvCxnSpPr>
+          <p:cNvPr id="7" name="Straight Connector 6">
+            <a:extLst>
+              <a:ext uri="{FF2B5EF4-FFF2-40B4-BE49-F238E27FC236}">
+                <a16:creationId xmlns:a16="http://schemas.microsoft.com/office/drawing/2014/main" id="{923227FD-6B69-463F-922B-70693F3B268E}"/>
+              </a:ext>
+            </a:extLst>
+          </p:cNvPr>
+          <p:cNvCxnSpPr>
+            <a:cxnSpLocks/>
+          </p:cNvCxnSpPr>
+          <p:nvPr/>
+        </p:nvCxnSpPr>
+        <p:spPr>
+          <a:xfrm>
+            <a:off x="1805940" y="3192780"/>
+            <a:ext cx="1508760" cy="0"/>
+          </a:xfrm>
+          <a:prstGeom prst="line">
+            <a:avLst/>
+          </a:prstGeom>
+          <a:ln w="25400">
+            <a:solidFill>
+              <a:srgbClr val="C00000"/>
+            </a:solidFill>
+          </a:ln>
+        </p:spPr>
+        <p:style>
+          <a:lnRef idx="1">
+            <a:schemeClr val="accent1"/>
+          </a:lnRef>
+          <a:fillRef idx="0">
+            <a:schemeClr val="accent1"/>
+          </a:fillRef>
+          <a:effectRef idx="0">
+            <a:schemeClr val="accent1"/>
+          </a:effectRef>
+          <a:fontRef idx="minor">
+            <a:schemeClr val="tx1"/>
+          </a:fontRef>
+        </p:style>
+      </p:cxnSp>
+      <p:cxnSp>
+        <p:nvCxnSpPr>
+          <p:cNvPr id="17" name="Straight Connector 16">
+            <a:extLst>
+              <a:ext uri="{FF2B5EF4-FFF2-40B4-BE49-F238E27FC236}">
+                <a16:creationId xmlns:a16="http://schemas.microsoft.com/office/drawing/2014/main" id="{E9BBE0E8-EBF1-4E5F-86BF-808945E25A16}"/>
+              </a:ext>
+            </a:extLst>
+          </p:cNvPr>
+          <p:cNvCxnSpPr>
+            <a:cxnSpLocks/>
+          </p:cNvCxnSpPr>
+          <p:nvPr/>
+        </p:nvCxnSpPr>
+        <p:spPr>
+          <a:xfrm>
+            <a:off x="6823933" y="3192780"/>
+            <a:ext cx="1508760" cy="0"/>
+          </a:xfrm>
+          <a:prstGeom prst="line">
+            <a:avLst/>
+          </a:prstGeom>
+          <a:ln w="25400">
+            <a:solidFill>
+              <a:srgbClr val="C00000"/>
+            </a:solidFill>
+          </a:ln>
+        </p:spPr>
+        <p:style>
+          <a:lnRef idx="1">
+            <a:schemeClr val="accent1"/>
+          </a:lnRef>
+          <a:fillRef idx="0">
+            <a:schemeClr val="accent1"/>
+          </a:fillRef>
+          <a:effectRef idx="0">
+            <a:schemeClr val="accent1"/>
+          </a:effectRef>
+          <a:fontRef idx="minor">
+            <a:schemeClr val="tx1"/>
+          </a:fontRef>
+        </p:style>
+      </p:cxnSp>
+      <p:cxnSp>
+        <p:nvCxnSpPr>
+          <p:cNvPr id="18" name="Straight Connector 17">
+            <a:extLst>
+              <a:ext uri="{FF2B5EF4-FFF2-40B4-BE49-F238E27FC236}">
+                <a16:creationId xmlns:a16="http://schemas.microsoft.com/office/drawing/2014/main" id="{11C58318-23C4-4BCB-AAF7-2598FE76F7DB}"/>
+              </a:ext>
+            </a:extLst>
+          </p:cNvPr>
+          <p:cNvCxnSpPr>
+            <a:cxnSpLocks/>
+          </p:cNvCxnSpPr>
+          <p:nvPr/>
+        </p:nvCxnSpPr>
+        <p:spPr>
+          <a:xfrm>
+            <a:off x="1805940" y="4480560"/>
+            <a:ext cx="1508760" cy="0"/>
+          </a:xfrm>
+          <a:prstGeom prst="line">
+            <a:avLst/>
+          </a:prstGeom>
+          <a:ln w="25400">
+            <a:solidFill>
+              <a:srgbClr val="C00000"/>
+            </a:solidFill>
+          </a:ln>
+        </p:spPr>
+        <p:style>
+          <a:lnRef idx="1">
+            <a:schemeClr val="accent1"/>
+          </a:lnRef>
+          <a:fillRef idx="0">
+            <a:schemeClr val="accent1"/>
+          </a:fillRef>
+          <a:effectRef idx="0">
+            <a:schemeClr val="accent1"/>
+          </a:effectRef>
+          <a:fontRef idx="minor">
+            <a:schemeClr val="tx1"/>
+          </a:fontRef>
+        </p:style>
+      </p:cxnSp>
+      <p:cxnSp>
+        <p:nvCxnSpPr>
+          <p:cNvPr id="19" name="Straight Connector 18">
+            <a:extLst>
+              <a:ext uri="{FF2B5EF4-FFF2-40B4-BE49-F238E27FC236}">
+                <a16:creationId xmlns:a16="http://schemas.microsoft.com/office/drawing/2014/main" id="{9400DB0D-D5B7-4AA3-9EC2-90EA5AFA3894}"/>
+              </a:ext>
+            </a:extLst>
+          </p:cNvPr>
+          <p:cNvCxnSpPr>
+            <a:cxnSpLocks/>
+          </p:cNvCxnSpPr>
+          <p:nvPr/>
+        </p:nvCxnSpPr>
+        <p:spPr>
+          <a:xfrm>
+            <a:off x="6823933" y="4480560"/>
+            <a:ext cx="1508760" cy="0"/>
+          </a:xfrm>
+          <a:prstGeom prst="line">
+            <a:avLst/>
+          </a:prstGeom>
+          <a:ln w="25400">
+            <a:solidFill>
+              <a:srgbClr val="C00000"/>
+            </a:solidFill>
+          </a:ln>
+        </p:spPr>
+        <p:style>
+          <a:lnRef idx="1">
+            <a:schemeClr val="accent1"/>
+          </a:lnRef>
+          <a:fillRef idx="0">
+            <a:schemeClr val="accent1"/>
+          </a:fillRef>
+          <a:effectRef idx="0">
+            <a:schemeClr val="accent1"/>
+          </a:effectRef>
+          <a:fontRef idx="minor">
+            <a:schemeClr val="tx1"/>
+          </a:fontRef>
+        </p:style>
+      </p:cxnSp>
+      <p:cxnSp>
+        <p:nvCxnSpPr>
+          <p:cNvPr id="20" name="Straight Connector 19">
+            <a:extLst>
+              <a:ext uri="{FF2B5EF4-FFF2-40B4-BE49-F238E27FC236}">
+                <a16:creationId xmlns:a16="http://schemas.microsoft.com/office/drawing/2014/main" id="{DCEC3F56-168C-4943-A393-58C5AE3AC812}"/>
+              </a:ext>
+            </a:extLst>
+          </p:cNvPr>
+          <p:cNvCxnSpPr>
+            <a:cxnSpLocks/>
+          </p:cNvCxnSpPr>
+          <p:nvPr/>
+        </p:nvCxnSpPr>
+        <p:spPr>
+          <a:xfrm>
+            <a:off x="1988820" y="4655820"/>
+            <a:ext cx="1325880" cy="0"/>
+          </a:xfrm>
+          <a:prstGeom prst="line">
+            <a:avLst/>
+          </a:prstGeom>
+          <a:ln w="25400">
+            <a:solidFill>
+              <a:srgbClr val="C00000"/>
+            </a:solidFill>
+          </a:ln>
+        </p:spPr>
+        <p:style>
+          <a:lnRef idx="1">
+            <a:schemeClr val="accent1"/>
+          </a:lnRef>
+          <a:fillRef idx="0">
+            <a:schemeClr val="accent1"/>
+          </a:fillRef>
+          <a:effectRef idx="0">
+            <a:schemeClr val="accent1"/>
+          </a:effectRef>
+          <a:fontRef idx="minor">
+            <a:schemeClr val="tx1"/>
+          </a:fontRef>
+        </p:style>
+      </p:cxnSp>
+      <p:cxnSp>
+        <p:nvCxnSpPr>
+          <p:cNvPr id="24" name="Straight Connector 23">
+            <a:extLst>
+              <a:ext uri="{FF2B5EF4-FFF2-40B4-BE49-F238E27FC236}">
+                <a16:creationId xmlns:a16="http://schemas.microsoft.com/office/drawing/2014/main" id="{C6AC3BCB-C99D-4143-8E38-5F64144EE0D2}"/>
+              </a:ext>
+            </a:extLst>
+          </p:cNvPr>
+          <p:cNvCxnSpPr>
+            <a:cxnSpLocks/>
+          </p:cNvCxnSpPr>
+          <p:nvPr/>
+        </p:nvCxnSpPr>
+        <p:spPr>
+          <a:xfrm>
+            <a:off x="7006813" y="4655820"/>
+            <a:ext cx="1325880" cy="0"/>
+          </a:xfrm>
+          <a:prstGeom prst="line">
+            <a:avLst/>
+          </a:prstGeom>
+          <a:ln w="25400">
+            <a:solidFill>
+              <a:srgbClr val="C00000"/>
+            </a:solidFill>
+          </a:ln>
+        </p:spPr>
+        <p:style>
+          <a:lnRef idx="1">
+            <a:schemeClr val="accent1"/>
+          </a:lnRef>
+          <a:fillRef idx="0">
+            <a:schemeClr val="accent1"/>
+          </a:fillRef>
+          <a:effectRef idx="0">
+            <a:schemeClr val="accent1"/>
+          </a:effectRef>
+          <a:fontRef idx="minor">
+            <a:schemeClr val="tx1"/>
+          </a:fontRef>
+        </p:style>
+      </p:cxnSp>
     </p:spTree>
     <p:extLst>
       <p:ext uri="{BB962C8B-B14F-4D97-AF65-F5344CB8AC3E}">
-        <p14:creationId xmlns:p14="http://schemas.microsoft.com/office/powerpoint/2010/main" val="3754122186"/>
+        <p14:creationId xmlns:p14="http://schemas.microsoft.com/office/powerpoint/2010/main" val="3547861015"/>
       </p:ext>
     </p:extLst>
   </p:cSld>
@@ -7929,7 +8432,7 @@
           <p:cNvPr id="2" name="Title 1">
             <a:extLst>
               <a:ext uri="{FF2B5EF4-FFF2-40B4-BE49-F238E27FC236}">
-                <a16:creationId xmlns:a16="http://schemas.microsoft.com/office/drawing/2014/main" id="{A0E7C6FB-3B10-4AC3-B4B3-D5F95CDB8ACD}"/>
+                <a16:creationId xmlns:a16="http://schemas.microsoft.com/office/drawing/2014/main" id="{09619E5A-9C6F-46E0-8395-140AC3D184CD}"/>
               </a:ext>
             </a:extLst>
           </p:cNvPr>
@@ -7942,8 +8445,8 @@
         </p:nvSpPr>
         <p:spPr>
           <a:xfrm>
-            <a:off x="1484311" y="685800"/>
-            <a:ext cx="10018713" cy="923925"/>
+            <a:off x="1484311" y="685801"/>
+            <a:ext cx="10018713" cy="1066800"/>
           </a:xfrm>
         </p:spPr>
         <p:txBody>
@@ -7954,163 +8457,24 @@
           <a:p>
             <a:r>
               <a:rPr lang="en-US" dirty="0"/>
-              <a:t>Sharing assemblies between processes</a:t>
+              <a:t>Sharing assemblies between application domains </a:t>
             </a:r>
             <a:br>
               <a:rPr lang="en-US" dirty="0"/>
             </a:br>
             <a:r>
               <a:rPr lang="en-US" sz="2700" dirty="0"/>
-              <a:t>Concept native images</a:t>
-            </a:r>
-          </a:p>
-        </p:txBody>
-      </p:sp>
-      <p:sp>
-        <p:nvSpPr>
-          <p:cNvPr id="3" name="Content Placeholder 2">
+              <a:t>Installing assemblies to Native Images Cache</a:t>
+            </a:r>
+          </a:p>
+        </p:txBody>
+      </p:sp>
+      <p:sp>
+        <p:nvSpPr>
+          <p:cNvPr id="5" name="Slide Number Placeholder 4">
             <a:extLst>
               <a:ext uri="{FF2B5EF4-FFF2-40B4-BE49-F238E27FC236}">
-                <a16:creationId xmlns:a16="http://schemas.microsoft.com/office/drawing/2014/main" id="{52B8DBDA-8455-4186-8C64-D98E6D1C6A48}"/>
-              </a:ext>
-            </a:extLst>
-          </p:cNvPr>
-          <p:cNvSpPr>
-            <a:spLocks noGrp="1"/>
-          </p:cNvSpPr>
-          <p:nvPr>
-            <p:ph idx="1"/>
-          </p:nvPr>
-        </p:nvSpPr>
-        <p:spPr>
-          <a:xfrm>
-            <a:off x="1484310" y="2495549"/>
-            <a:ext cx="10018713" cy="3124201"/>
-          </a:xfrm>
-        </p:spPr>
-        <p:txBody>
-          <a:bodyPr/>
-          <a:lstStyle/>
-          <a:p>
-            <a:pPr marL="0" indent="0">
-              <a:buNone/>
-            </a:pPr>
-            <a:r>
-              <a:rPr lang="en-US" dirty="0"/>
-              <a:t>Summary of usage</a:t>
-            </a:r>
-          </a:p>
-          <a:p>
-            <a:r>
-              <a:rPr lang="en-US" dirty="0"/>
-              <a:t>Native images enable code sharing between processes</a:t>
-            </a:r>
-          </a:p>
-          <a:p>
-            <a:r>
-              <a:rPr lang="en-US" dirty="0"/>
-              <a:t>Native images require a smaller initial working set because there is no need for the JIT compiler</a:t>
-            </a:r>
-          </a:p>
-          <a:p>
-            <a:r>
-              <a:rPr lang="en-US" dirty="0"/>
-              <a:t>Native images load faster than MSIL because they eliminate the need for many startup activities, such as JIT compilation and type-safety verification</a:t>
-            </a:r>
-          </a:p>
-          <a:p>
-            <a:endParaRPr lang="en-US" dirty="0"/>
-          </a:p>
-        </p:txBody>
-      </p:sp>
-      <p:sp>
-        <p:nvSpPr>
-          <p:cNvPr id="4" name="TextBox 3">
-            <a:extLst>
-              <a:ext uri="{FF2B5EF4-FFF2-40B4-BE49-F238E27FC236}">
-                <a16:creationId xmlns:a16="http://schemas.microsoft.com/office/drawing/2014/main" id="{9F770282-ED54-4DDB-AEC9-2A6F9A6B6553}"/>
-              </a:ext>
-            </a:extLst>
-          </p:cNvPr>
-          <p:cNvSpPr txBox="1"/>
-          <p:nvPr/>
-        </p:nvSpPr>
-        <p:spPr>
-          <a:xfrm>
-            <a:off x="2466975" y="6057900"/>
-            <a:ext cx="9036047" cy="646331"/>
-          </a:xfrm>
-          <a:prstGeom prst="rect">
-            <a:avLst/>
-          </a:prstGeom>
-          <a:noFill/>
-        </p:spPr>
-        <p:txBody>
-          <a:bodyPr wrap="square" rtlCol="0">
-            <a:spAutoFit/>
-          </a:bodyPr>
-          <a:lstStyle/>
-          <a:p>
-            <a:r>
-              <a:rPr lang="en-US" dirty="0"/>
-              <a:t>See also:</a:t>
-            </a:r>
-          </a:p>
-          <a:p>
-            <a:r>
-              <a:rPr lang="en-US" dirty="0">
-                <a:hlinkClick r:id="rId2"/>
-              </a:rPr>
-              <a:t>https://docs.microsoft.com/en-us/dotnet/framework/tools/ngen-exe-native-image-generator</a:t>
-            </a:r>
-            <a:r>
-              <a:rPr lang="en-US" dirty="0"/>
-              <a:t> </a:t>
-            </a:r>
-          </a:p>
-        </p:txBody>
-      </p:sp>
-      <p:sp>
-        <p:nvSpPr>
-          <p:cNvPr id="5" name="TextBox 4">
-            <a:extLst>
-              <a:ext uri="{FF2B5EF4-FFF2-40B4-BE49-F238E27FC236}">
-                <a16:creationId xmlns:a16="http://schemas.microsoft.com/office/drawing/2014/main" id="{E68C30F3-ABD5-402C-B90F-325DDF5E4314}"/>
-              </a:ext>
-            </a:extLst>
-          </p:cNvPr>
-          <p:cNvSpPr txBox="1"/>
-          <p:nvPr/>
-        </p:nvSpPr>
-        <p:spPr>
-          <a:xfrm>
-            <a:off x="4705869" y="1819275"/>
-            <a:ext cx="4328621" cy="430887"/>
-          </a:xfrm>
-          <a:prstGeom prst="rect">
-            <a:avLst/>
-          </a:prstGeom>
-          <a:noFill/>
-        </p:spPr>
-        <p:txBody>
-          <a:bodyPr wrap="none" rtlCol="0">
-            <a:spAutoFit/>
-          </a:bodyPr>
-          <a:lstStyle/>
-          <a:p>
-            <a:r>
-              <a:rPr lang="de-DE" sz="2200" dirty="0"/>
-              <a:t>Ngen.exe (Native Image Generator)</a:t>
-            </a:r>
-          </a:p>
-        </p:txBody>
-      </p:sp>
-      <p:sp>
-        <p:nvSpPr>
-          <p:cNvPr id="7" name="Slide Number Placeholder 6">
-            <a:extLst>
-              <a:ext uri="{FF2B5EF4-FFF2-40B4-BE49-F238E27FC236}">
-                <a16:creationId xmlns:a16="http://schemas.microsoft.com/office/drawing/2014/main" id="{1D1F79DF-CB4C-4728-8219-3A6CD6D87348}"/>
+                <a16:creationId xmlns:a16="http://schemas.microsoft.com/office/drawing/2014/main" id="{1EB71862-796C-46C8-A415-3C21CCF3B4E1}"/>
               </a:ext>
             </a:extLst>
           </p:cNvPr>
@@ -8135,10 +8499,40 @@
           </a:p>
         </p:txBody>
       </p:sp>
+      <p:pic>
+        <p:nvPicPr>
+          <p:cNvPr id="7" name="Picture 6">
+            <a:extLst>
+              <a:ext uri="{FF2B5EF4-FFF2-40B4-BE49-F238E27FC236}">
+                <a16:creationId xmlns:a16="http://schemas.microsoft.com/office/drawing/2014/main" id="{204EC92F-7C8A-41A4-B86F-D562F1FACFDE}"/>
+              </a:ext>
+            </a:extLst>
+          </p:cNvPr>
+          <p:cNvPicPr>
+            <a:picLocks noChangeAspect="1"/>
+          </p:cNvPicPr>
+          <p:nvPr/>
+        </p:nvPicPr>
+        <p:blipFill>
+          <a:blip r:embed="rId2"/>
+          <a:stretch>
+            <a:fillRect/>
+          </a:stretch>
+        </p:blipFill>
+        <p:spPr>
+          <a:xfrm>
+            <a:off x="195262" y="2376487"/>
+            <a:ext cx="11801475" cy="2105025"/>
+          </a:xfrm>
+          <a:prstGeom prst="rect">
+            <a:avLst/>
+          </a:prstGeom>
+        </p:spPr>
+      </p:pic>
     </p:spTree>
     <p:extLst>
       <p:ext uri="{BB962C8B-B14F-4D97-AF65-F5344CB8AC3E}">
-        <p14:creationId xmlns:p14="http://schemas.microsoft.com/office/powerpoint/2010/main" val="2254905752"/>
+        <p14:creationId xmlns:p14="http://schemas.microsoft.com/office/powerpoint/2010/main" val="3754122186"/>
       </p:ext>
     </p:extLst>
   </p:cSld>
@@ -8170,7 +8564,7 @@
           <p:cNvPr id="2" name="Title 1">
             <a:extLst>
               <a:ext uri="{FF2B5EF4-FFF2-40B4-BE49-F238E27FC236}">
-                <a16:creationId xmlns:a16="http://schemas.microsoft.com/office/drawing/2014/main" id="{681983DC-0BFC-4912-8AC2-40307BE36C21}"/>
+                <a16:creationId xmlns:a16="http://schemas.microsoft.com/office/drawing/2014/main" id="{A0E7C6FB-3B10-4AC3-B4B3-D5F95CDB8ACD}"/>
               </a:ext>
             </a:extLst>
           </p:cNvPr>
@@ -8181,21 +8575,28 @@
             <p:ph type="title"/>
           </p:nvPr>
         </p:nvSpPr>
-        <p:spPr/>
-        <p:txBody>
-          <a:bodyPr/>
+        <p:spPr>
+          <a:xfrm>
+            <a:off x="1484311" y="685800"/>
+            <a:ext cx="10018713" cy="923925"/>
+          </a:xfrm>
+        </p:spPr>
+        <p:txBody>
+          <a:bodyPr>
+            <a:normAutofit fontScale="90000"/>
+          </a:bodyPr>
           <a:lstStyle/>
           <a:p>
             <a:r>
               <a:rPr lang="en-US" dirty="0"/>
-              <a:t>Sharing assemblies between processes. </a:t>
+              <a:t>Sharing assemblies between processes</a:t>
             </a:r>
             <a:br>
               <a:rPr lang="en-US" dirty="0"/>
             </a:br>
             <a:r>
-              <a:rPr lang="en-US" dirty="0"/>
-              <a:t>Concept native images.</a:t>
+              <a:rPr lang="en-US" sz="2700" dirty="0"/>
+              <a:t>Concept native images. NGEN</a:t>
             </a:r>
           </a:p>
         </p:txBody>
@@ -8205,7 +8606,7 @@
           <p:cNvPr id="3" name="Content Placeholder 2">
             <a:extLst>
               <a:ext uri="{FF2B5EF4-FFF2-40B4-BE49-F238E27FC236}">
-                <a16:creationId xmlns:a16="http://schemas.microsoft.com/office/drawing/2014/main" id="{57DD25CA-97D9-48EE-A325-6D58C41EB68C}"/>
+                <a16:creationId xmlns:a16="http://schemas.microsoft.com/office/drawing/2014/main" id="{52B8DBDA-8455-4186-8C64-D98E6D1C6A48}"/>
               </a:ext>
             </a:extLst>
           </p:cNvPr>
@@ -8216,7 +8617,12 @@
             <p:ph idx="1"/>
           </p:nvPr>
         </p:nvSpPr>
-        <p:spPr/>
+        <p:spPr>
+          <a:xfrm>
+            <a:off x="1484311" y="2495549"/>
+            <a:ext cx="9996490" cy="2127251"/>
+          </a:xfrm>
+        </p:spPr>
         <p:txBody>
           <a:bodyPr/>
           <a:lstStyle/>
@@ -8226,23 +8632,82 @@
             </a:pPr>
             <a:r>
               <a:rPr lang="en-US" dirty="0"/>
-              <a:t>Remarks:</a:t>
+              <a:t>Summary of usage</a:t>
             </a:r>
           </a:p>
           <a:p>
             <a:r>
               <a:rPr lang="en-US" dirty="0"/>
-              <a:t>Always use domain-neutral code when loading the same assembly into multiple application domains. If a native image is loaded into a nonshared application domain after having been loaded into a shared domain, it cannot be used.</a:t>
-            </a:r>
-          </a:p>
-        </p:txBody>
-      </p:sp>
-      <p:sp>
-        <p:nvSpPr>
-          <p:cNvPr id="5" name="Slide Number Placeholder 4">
+              <a:t>Enable code sharing between processes</a:t>
+            </a:r>
+          </a:p>
+          <a:p>
+            <a:r>
+              <a:rPr lang="en-US" dirty="0"/>
+              <a:t>Require a smaller initial working set</a:t>
+            </a:r>
+          </a:p>
+          <a:p>
+            <a:r>
+              <a:rPr lang="en-US" dirty="0"/>
+              <a:t>Load faster than MSIL</a:t>
+            </a:r>
+          </a:p>
+        </p:txBody>
+      </p:sp>
+      <p:sp>
+        <p:nvSpPr>
+          <p:cNvPr id="4" name="TextBox 3">
             <a:extLst>
               <a:ext uri="{FF2B5EF4-FFF2-40B4-BE49-F238E27FC236}">
-                <a16:creationId xmlns:a16="http://schemas.microsoft.com/office/drawing/2014/main" id="{C8D945B7-D9BA-443E-AB7B-734C2E93BEFD}"/>
+                <a16:creationId xmlns:a16="http://schemas.microsoft.com/office/drawing/2014/main" id="{9F770282-ED54-4DDB-AEC9-2A6F9A6B6553}"/>
+              </a:ext>
+            </a:extLst>
+          </p:cNvPr>
+          <p:cNvSpPr txBox="1"/>
+          <p:nvPr/>
+        </p:nvSpPr>
+        <p:spPr>
+          <a:xfrm>
+            <a:off x="2466975" y="6057900"/>
+            <a:ext cx="9036047" cy="646331"/>
+          </a:xfrm>
+          <a:prstGeom prst="rect">
+            <a:avLst/>
+          </a:prstGeom>
+          <a:noFill/>
+        </p:spPr>
+        <p:txBody>
+          <a:bodyPr wrap="square" rtlCol="0">
+            <a:spAutoFit/>
+          </a:bodyPr>
+          <a:lstStyle/>
+          <a:p>
+            <a:r>
+              <a:rPr lang="en-US" dirty="0"/>
+              <a:t>See also:</a:t>
+            </a:r>
+          </a:p>
+          <a:p>
+            <a:r>
+              <a:rPr lang="en-US" dirty="0">
+                <a:hlinkClick r:id="rId2"/>
+              </a:rPr>
+              <a:t>https://docs.microsoft.com/en-us/dotnet/framework/tools/ngen-exe-native-image-generator</a:t>
+            </a:r>
+            <a:r>
+              <a:rPr lang="en-US" dirty="0"/>
+              <a:t> </a:t>
+            </a:r>
+          </a:p>
+        </p:txBody>
+      </p:sp>
+      <p:sp>
+        <p:nvSpPr>
+          <p:cNvPr id="7" name="Slide Number Placeholder 6">
+            <a:extLst>
+              <a:ext uri="{FF2B5EF4-FFF2-40B4-BE49-F238E27FC236}">
+                <a16:creationId xmlns:a16="http://schemas.microsoft.com/office/drawing/2014/main" id="{1D1F79DF-CB4C-4728-8219-3A6CD6D87348}"/>
               </a:ext>
             </a:extLst>
           </p:cNvPr>
@@ -8270,7 +8735,7 @@
     </p:spTree>
     <p:extLst>
       <p:ext uri="{BB962C8B-B14F-4D97-AF65-F5344CB8AC3E}">
-        <p14:creationId xmlns:p14="http://schemas.microsoft.com/office/powerpoint/2010/main" val="2700701014"/>
+        <p14:creationId xmlns:p14="http://schemas.microsoft.com/office/powerpoint/2010/main" val="2254905752"/>
       </p:ext>
     </p:extLst>
   </p:cSld>
@@ -8302,6 +8767,280 @@
           <p:cNvPr id="2" name="Title 1">
             <a:extLst>
               <a:ext uri="{FF2B5EF4-FFF2-40B4-BE49-F238E27FC236}">
+                <a16:creationId xmlns:a16="http://schemas.microsoft.com/office/drawing/2014/main" id="{681983DC-0BFC-4912-8AC2-40307BE36C21}"/>
+              </a:ext>
+            </a:extLst>
+          </p:cNvPr>
+          <p:cNvSpPr>
+            <a:spLocks noGrp="1"/>
+          </p:cNvSpPr>
+          <p:nvPr>
+            <p:ph type="title"/>
+          </p:nvPr>
+        </p:nvSpPr>
+        <p:spPr>
+          <a:xfrm>
+            <a:off x="1370011" y="12701"/>
+            <a:ext cx="10018713" cy="1257299"/>
+          </a:xfrm>
+        </p:spPr>
+        <p:txBody>
+          <a:bodyPr>
+            <a:normAutofit/>
+          </a:bodyPr>
+          <a:lstStyle/>
+          <a:p>
+            <a:r>
+              <a:rPr lang="en-US" sz="3600" dirty="0"/>
+              <a:t>Sharing assemblies between processes </a:t>
+            </a:r>
+            <a:br>
+              <a:rPr lang="en-US" sz="3600" dirty="0"/>
+            </a:br>
+            <a:r>
+              <a:rPr lang="en-US" sz="2400" dirty="0"/>
+              <a:t>Concept native images</a:t>
+            </a:r>
+          </a:p>
+        </p:txBody>
+      </p:sp>
+      <p:sp>
+        <p:nvSpPr>
+          <p:cNvPr id="5" name="Slide Number Placeholder 4">
+            <a:extLst>
+              <a:ext uri="{FF2B5EF4-FFF2-40B4-BE49-F238E27FC236}">
+                <a16:creationId xmlns:a16="http://schemas.microsoft.com/office/drawing/2014/main" id="{C8D945B7-D9BA-443E-AB7B-734C2E93BEFD}"/>
+              </a:ext>
+            </a:extLst>
+          </p:cNvPr>
+          <p:cNvSpPr>
+            <a:spLocks noGrp="1"/>
+          </p:cNvSpPr>
+          <p:nvPr>
+            <p:ph type="sldNum" sz="quarter" idx="12"/>
+          </p:nvPr>
+        </p:nvSpPr>
+        <p:spPr>
+          <a:xfrm>
+            <a:off x="11503024" y="6324599"/>
+            <a:ext cx="551167" cy="365125"/>
+          </a:xfrm>
+        </p:spPr>
+        <p:txBody>
+          <a:bodyPr/>
+          <a:lstStyle/>
+          <a:p>
+            <a:fld id="{D57F1E4F-1CFF-5643-939E-217C01CDF565}" type="slidenum">
+              <a:rPr lang="en-US" sz="1400" smtClean="0"/>
+              <a:pPr/>
+              <a:t>15</a:t>
+            </a:fld>
+            <a:endParaRPr lang="en-US" sz="1400" dirty="0"/>
+          </a:p>
+        </p:txBody>
+      </p:sp>
+      <p:pic>
+        <p:nvPicPr>
+          <p:cNvPr id="7" name="Picture 6">
+            <a:extLst>
+              <a:ext uri="{FF2B5EF4-FFF2-40B4-BE49-F238E27FC236}">
+                <a16:creationId xmlns:a16="http://schemas.microsoft.com/office/drawing/2014/main" id="{96E29863-79EE-4E16-ABA3-BB5D54363807}"/>
+              </a:ext>
+            </a:extLst>
+          </p:cNvPr>
+          <p:cNvPicPr>
+            <a:picLocks noChangeAspect="1"/>
+          </p:cNvPicPr>
+          <p:nvPr/>
+        </p:nvPicPr>
+        <p:blipFill>
+          <a:blip r:embed="rId2"/>
+          <a:stretch>
+            <a:fillRect/>
+          </a:stretch>
+        </p:blipFill>
+        <p:spPr>
+          <a:xfrm>
+            <a:off x="1453453" y="1270000"/>
+            <a:ext cx="9851827" cy="4953000"/>
+          </a:xfrm>
+          <a:prstGeom prst="rect">
+            <a:avLst/>
+          </a:prstGeom>
+        </p:spPr>
+      </p:pic>
+    </p:spTree>
+    <p:extLst>
+      <p:ext uri="{BB962C8B-B14F-4D97-AF65-F5344CB8AC3E}">
+        <p14:creationId xmlns:p14="http://schemas.microsoft.com/office/powerpoint/2010/main" val="2700701014"/>
+      </p:ext>
+    </p:extLst>
+  </p:cSld>
+  <p:clrMapOvr>
+    <a:masterClrMapping/>
+  </p:clrMapOvr>
+</p:sld>
+</file>
+
+<file path=ppt/slides/slide16.xml><?xml version="1.0" encoding="utf-8"?>
+<p:sld xmlns:a="http://schemas.openxmlformats.org/drawingml/2006/main" xmlns:r="http://schemas.openxmlformats.org/officeDocument/2006/relationships" xmlns:p="http://schemas.openxmlformats.org/presentationml/2006/main">
+  <p:cSld>
+    <p:spTree>
+      <p:nvGrpSpPr>
+        <p:cNvPr id="1" name=""/>
+        <p:cNvGrpSpPr/>
+        <p:nvPr/>
+      </p:nvGrpSpPr>
+      <p:grpSpPr>
+        <a:xfrm>
+          <a:off x="0" y="0"/>
+          <a:ext cx="0" cy="0"/>
+          <a:chOff x="0" y="0"/>
+          <a:chExt cx="0" cy="0"/>
+        </a:xfrm>
+      </p:grpSpPr>
+      <p:sp>
+        <p:nvSpPr>
+          <p:cNvPr id="2" name="Title 1">
+            <a:extLst>
+              <a:ext uri="{FF2B5EF4-FFF2-40B4-BE49-F238E27FC236}">
+                <a16:creationId xmlns:a16="http://schemas.microsoft.com/office/drawing/2014/main" id="{681983DC-0BFC-4912-8AC2-40307BE36C21}"/>
+              </a:ext>
+            </a:extLst>
+          </p:cNvPr>
+          <p:cNvSpPr>
+            <a:spLocks noGrp="1"/>
+          </p:cNvSpPr>
+          <p:nvPr>
+            <p:ph type="title"/>
+          </p:nvPr>
+        </p:nvSpPr>
+        <p:spPr>
+          <a:xfrm>
+            <a:off x="1484311" y="533401"/>
+            <a:ext cx="10018713" cy="1257299"/>
+          </a:xfrm>
+        </p:spPr>
+        <p:txBody>
+          <a:bodyPr>
+            <a:normAutofit/>
+          </a:bodyPr>
+          <a:lstStyle/>
+          <a:p>
+            <a:r>
+              <a:rPr lang="en-US" sz="3600" dirty="0"/>
+              <a:t>Sharing assemblies between processes </a:t>
+            </a:r>
+            <a:br>
+              <a:rPr lang="en-US" sz="3600" dirty="0"/>
+            </a:br>
+            <a:r>
+              <a:rPr lang="en-US" sz="2400" dirty="0"/>
+              <a:t>Concept native images</a:t>
+            </a:r>
+          </a:p>
+        </p:txBody>
+      </p:sp>
+      <p:sp>
+        <p:nvSpPr>
+          <p:cNvPr id="5" name="Slide Number Placeholder 4">
+            <a:extLst>
+              <a:ext uri="{FF2B5EF4-FFF2-40B4-BE49-F238E27FC236}">
+                <a16:creationId xmlns:a16="http://schemas.microsoft.com/office/drawing/2014/main" id="{C8D945B7-D9BA-443E-AB7B-734C2E93BEFD}"/>
+              </a:ext>
+            </a:extLst>
+          </p:cNvPr>
+          <p:cNvSpPr>
+            <a:spLocks noGrp="1"/>
+          </p:cNvSpPr>
+          <p:nvPr>
+            <p:ph type="sldNum" sz="quarter" idx="12"/>
+          </p:nvPr>
+        </p:nvSpPr>
+        <p:spPr>
+          <a:xfrm>
+            <a:off x="11503024" y="6324599"/>
+            <a:ext cx="551167" cy="365125"/>
+          </a:xfrm>
+        </p:spPr>
+        <p:txBody>
+          <a:bodyPr/>
+          <a:lstStyle/>
+          <a:p>
+            <a:fld id="{D57F1E4F-1CFF-5643-939E-217C01CDF565}" type="slidenum">
+              <a:rPr lang="en-US" sz="1400" smtClean="0"/>
+              <a:pPr/>
+              <a:t>16</a:t>
+            </a:fld>
+            <a:endParaRPr lang="en-US" sz="1400" dirty="0"/>
+          </a:p>
+        </p:txBody>
+      </p:sp>
+      <p:pic>
+        <p:nvPicPr>
+          <p:cNvPr id="3" name="Picture 2">
+            <a:extLst>
+              <a:ext uri="{FF2B5EF4-FFF2-40B4-BE49-F238E27FC236}">
+                <a16:creationId xmlns:a16="http://schemas.microsoft.com/office/drawing/2014/main" id="{8ADB82EB-A5C3-4A57-B408-2D822B864873}"/>
+              </a:ext>
+            </a:extLst>
+          </p:cNvPr>
+          <p:cNvPicPr>
+            <a:picLocks noChangeAspect="1"/>
+          </p:cNvPicPr>
+          <p:nvPr/>
+        </p:nvPicPr>
+        <p:blipFill>
+          <a:blip r:embed="rId2"/>
+          <a:stretch>
+            <a:fillRect/>
+          </a:stretch>
+        </p:blipFill>
+        <p:spPr>
+          <a:xfrm>
+            <a:off x="447675" y="2533649"/>
+            <a:ext cx="11744325" cy="1524000"/>
+          </a:xfrm>
+          <a:prstGeom prst="rect">
+            <a:avLst/>
+          </a:prstGeom>
+        </p:spPr>
+      </p:pic>
+    </p:spTree>
+    <p:extLst>
+      <p:ext uri="{BB962C8B-B14F-4D97-AF65-F5344CB8AC3E}">
+        <p14:creationId xmlns:p14="http://schemas.microsoft.com/office/powerpoint/2010/main" val="1195355037"/>
+      </p:ext>
+    </p:extLst>
+  </p:cSld>
+  <p:clrMapOvr>
+    <a:masterClrMapping/>
+  </p:clrMapOvr>
+</p:sld>
+</file>
+
+<file path=ppt/slides/slide17.xml><?xml version="1.0" encoding="utf-8"?>
+<p:sld xmlns:a="http://schemas.openxmlformats.org/drawingml/2006/main" xmlns:r="http://schemas.openxmlformats.org/officeDocument/2006/relationships" xmlns:p="http://schemas.openxmlformats.org/presentationml/2006/main">
+  <p:cSld>
+    <p:spTree>
+      <p:nvGrpSpPr>
+        <p:cNvPr id="1" name=""/>
+        <p:cNvGrpSpPr/>
+        <p:nvPr/>
+      </p:nvGrpSpPr>
+      <p:grpSpPr>
+        <a:xfrm>
+          <a:off x="0" y="0"/>
+          <a:ext cx="0" cy="0"/>
+          <a:chOff x="0" y="0"/>
+          <a:chExt cx="0" cy="0"/>
+        </a:xfrm>
+      </p:grpSpPr>
+      <p:sp>
+        <p:nvSpPr>
+          <p:cNvPr id="2" name="Title 1">
+            <a:extLst>
+              <a:ext uri="{FF2B5EF4-FFF2-40B4-BE49-F238E27FC236}">
                 <a16:creationId xmlns:a16="http://schemas.microsoft.com/office/drawing/2014/main" id="{5BA0D62C-CC82-4A24-BD6F-63900F58012F}"/>
               </a:ext>
             </a:extLst>
@@ -8356,7 +9095,7 @@
             <a:fld id="{D57F1E4F-1CFF-5643-939E-217C01CDF565}" type="slidenum">
               <a:rPr lang="en-US" smtClean="0"/>
               <a:pPr/>
-              <a:t>15</a:t>
+              <a:t>17</a:t>
             </a:fld>
             <a:endParaRPr lang="en-US" dirty="0"/>
           </a:p>
@@ -8752,7 +9491,7 @@
 </p:sld>
 </file>
 
-<file path=ppt/slides/slide16.xml><?xml version="1.0" encoding="utf-8"?>
+<file path=ppt/slides/slide18.xml><?xml version="1.0" encoding="utf-8"?>
 <p:sld xmlns:a="http://schemas.openxmlformats.org/drawingml/2006/main" xmlns:r="http://schemas.openxmlformats.org/officeDocument/2006/relationships" xmlns:p="http://schemas.openxmlformats.org/presentationml/2006/main">
   <p:cSld>
     <p:spTree>
@@ -8779,14 +9518,21 @@
             <p:ph type="title"/>
           </p:nvPr>
         </p:nvSpPr>
-        <p:spPr/>
-        <p:txBody>
-          <a:bodyPr/>
+        <p:spPr>
+          <a:xfrm>
+            <a:off x="1484310" y="309418"/>
+            <a:ext cx="10018713" cy="660399"/>
+          </a:xfrm>
+        </p:spPr>
+        <p:txBody>
+          <a:bodyPr>
+            <a:normAutofit fontScale="90000"/>
+          </a:bodyPr>
           <a:lstStyle/>
           <a:p>
             <a:r>
               <a:rPr lang="en-US" dirty="0"/>
-              <a:t>Thank you</a:t>
+              <a:t>Books recommended for reading</a:t>
             </a:r>
           </a:p>
         </p:txBody>
@@ -8803,13 +9549,13 @@
         </p:nvSpPr>
         <p:spPr>
           <a:xfrm>
-            <a:off x="1955363" y="4331855"/>
-            <a:ext cx="10018713" cy="2216727"/>
+            <a:off x="1955363" y="5422898"/>
+            <a:ext cx="10018713" cy="1125684"/>
           </a:xfrm>
         </p:spPr>
         <p:txBody>
           <a:bodyPr>
-            <a:normAutofit fontScale="62500" lnSpcReduction="20000"/>
+            <a:normAutofit fontScale="55000" lnSpcReduction="20000"/>
           </a:bodyPr>
           <a:lstStyle/>
           <a:p>
@@ -8853,41 +9599,6 @@
             <a:r>
               <a:rPr lang="fr-FR" dirty="0"/>
               <a:t>  </a:t>
-            </a:r>
-          </a:p>
-          <a:p>
-            <a:endParaRPr lang="fr-FR" dirty="0"/>
-          </a:p>
-          <a:p>
-            <a:r>
-              <a:rPr lang="fr-FR" dirty="0"/>
-              <a:t>Article: </a:t>
-            </a:r>
-            <a:r>
-              <a:rPr lang="fr-FR" dirty="0">
-                <a:hlinkClick r:id="rId5"/>
-              </a:rPr>
-              <a:t>https://habrahabr.ru/post/341950/</a:t>
-            </a:r>
-            <a:r>
-              <a:rPr lang="fr-FR" dirty="0"/>
-              <a:t> </a:t>
-            </a:r>
-          </a:p>
-          <a:p>
-            <a:r>
-              <a:rPr lang="fr-FR" dirty="0"/>
-              <a:t>Source code: </a:t>
-            </a:r>
-            <a:r>
-              <a:rPr lang="fr-FR" dirty="0">
-                <a:hlinkClick r:id="rId6"/>
-              </a:rPr>
-              <a:t>https://github.com/sflusov/IISSharingAssemblies</a:t>
-            </a:r>
-            <a:r>
-              <a:rPr lang="ru-RU" dirty="0"/>
-              <a:t> </a:t>
             </a:r>
           </a:p>
         </p:txBody>
@@ -8916,16 +9627,243 @@
             <a:fld id="{D57F1E4F-1CFF-5643-939E-217C01CDF565}" type="slidenum">
               <a:rPr lang="en-US" sz="1400" smtClean="0"/>
               <a:pPr/>
-              <a:t>16</a:t>
+              <a:t>18</a:t>
             </a:fld>
             <a:endParaRPr lang="en-US" sz="1400" dirty="0"/>
           </a:p>
         </p:txBody>
       </p:sp>
+      <p:pic>
+        <p:nvPicPr>
+          <p:cNvPr id="4" name="Picture 3">
+            <a:extLst>
+              <a:ext uri="{FF2B5EF4-FFF2-40B4-BE49-F238E27FC236}">
+                <a16:creationId xmlns:a16="http://schemas.microsoft.com/office/drawing/2014/main" id="{2FD3F7BD-77CB-4686-96F6-C93A553A6ACB}"/>
+              </a:ext>
+            </a:extLst>
+          </p:cNvPr>
+          <p:cNvPicPr>
+            <a:picLocks noChangeAspect="1"/>
+          </p:cNvPicPr>
+          <p:nvPr/>
+        </p:nvPicPr>
+        <p:blipFill>
+          <a:blip r:embed="rId5"/>
+          <a:stretch>
+            <a:fillRect/>
+          </a:stretch>
+        </p:blipFill>
+        <p:spPr>
+          <a:xfrm>
+            <a:off x="4525261" y="1166666"/>
+            <a:ext cx="3328595" cy="4059383"/>
+          </a:xfrm>
+          <a:prstGeom prst="rect">
+            <a:avLst/>
+          </a:prstGeom>
+        </p:spPr>
+      </p:pic>
+      <p:pic>
+        <p:nvPicPr>
+          <p:cNvPr id="6" name="Picture 5">
+            <a:extLst>
+              <a:ext uri="{FF2B5EF4-FFF2-40B4-BE49-F238E27FC236}">
+                <a16:creationId xmlns:a16="http://schemas.microsoft.com/office/drawing/2014/main" id="{30DAD877-A7A1-4F4E-A535-1055AA5DC275}"/>
+              </a:ext>
+            </a:extLst>
+          </p:cNvPr>
+          <p:cNvPicPr>
+            <a:picLocks noChangeAspect="1"/>
+          </p:cNvPicPr>
+          <p:nvPr/>
+        </p:nvPicPr>
+        <p:blipFill>
+          <a:blip r:embed="rId6"/>
+          <a:stretch>
+            <a:fillRect/>
+          </a:stretch>
+        </p:blipFill>
+        <p:spPr>
+          <a:xfrm>
+            <a:off x="696792" y="1166666"/>
+            <a:ext cx="3322593" cy="4059383"/>
+          </a:xfrm>
+          <a:prstGeom prst="rect">
+            <a:avLst/>
+          </a:prstGeom>
+        </p:spPr>
+      </p:pic>
+      <p:pic>
+        <p:nvPicPr>
+          <p:cNvPr id="7" name="Picture 6">
+            <a:extLst>
+              <a:ext uri="{FF2B5EF4-FFF2-40B4-BE49-F238E27FC236}">
+                <a16:creationId xmlns:a16="http://schemas.microsoft.com/office/drawing/2014/main" id="{66A246FC-F05D-4F1B-BEB2-145633429E44}"/>
+              </a:ext>
+            </a:extLst>
+          </p:cNvPr>
+          <p:cNvPicPr>
+            <a:picLocks noChangeAspect="1"/>
+          </p:cNvPicPr>
+          <p:nvPr/>
+        </p:nvPicPr>
+        <p:blipFill>
+          <a:blip r:embed="rId7"/>
+          <a:stretch>
+            <a:fillRect/>
+          </a:stretch>
+        </p:blipFill>
+        <p:spPr>
+          <a:xfrm>
+            <a:off x="8472899" y="1166666"/>
+            <a:ext cx="3270990" cy="4059383"/>
+          </a:xfrm>
+          <a:prstGeom prst="rect">
+            <a:avLst/>
+          </a:prstGeom>
+        </p:spPr>
+      </p:pic>
     </p:spTree>
     <p:extLst>
       <p:ext uri="{BB962C8B-B14F-4D97-AF65-F5344CB8AC3E}">
         <p14:creationId xmlns:p14="http://schemas.microsoft.com/office/powerpoint/2010/main" val="295830748"/>
+      </p:ext>
+    </p:extLst>
+  </p:cSld>
+  <p:clrMapOvr>
+    <a:masterClrMapping/>
+  </p:clrMapOvr>
+</p:sld>
+</file>
+
+<file path=ppt/slides/slide19.xml><?xml version="1.0" encoding="utf-8"?>
+<p:sld xmlns:a="http://schemas.openxmlformats.org/drawingml/2006/main" xmlns:r="http://schemas.openxmlformats.org/officeDocument/2006/relationships" xmlns:p="http://schemas.openxmlformats.org/presentationml/2006/main">
+  <p:cSld>
+    <p:spTree>
+      <p:nvGrpSpPr>
+        <p:cNvPr id="1" name=""/>
+        <p:cNvGrpSpPr/>
+        <p:nvPr/>
+      </p:nvGrpSpPr>
+      <p:grpSpPr>
+        <a:xfrm>
+          <a:off x="0" y="0"/>
+          <a:ext cx="0" cy="0"/>
+          <a:chOff x="0" y="0"/>
+          <a:chExt cx="0" cy="0"/>
+        </a:xfrm>
+      </p:grpSpPr>
+      <p:sp>
+        <p:nvSpPr>
+          <p:cNvPr id="2" name="Title 1"/>
+          <p:cNvSpPr>
+            <a:spLocks noGrp="1"/>
+          </p:cNvSpPr>
+          <p:nvPr>
+            <p:ph type="title"/>
+          </p:nvPr>
+        </p:nvSpPr>
+        <p:spPr/>
+        <p:txBody>
+          <a:bodyPr/>
+          <a:lstStyle/>
+          <a:p>
+            <a:r>
+              <a:rPr lang="en-US" dirty="0"/>
+              <a:t>Thank you</a:t>
+            </a:r>
+          </a:p>
+        </p:txBody>
+      </p:sp>
+      <p:sp>
+        <p:nvSpPr>
+          <p:cNvPr id="3" name="Content Placeholder 2"/>
+          <p:cNvSpPr>
+            <a:spLocks noGrp="1"/>
+          </p:cNvSpPr>
+          <p:nvPr>
+            <p:ph idx="1"/>
+          </p:nvPr>
+        </p:nvSpPr>
+        <p:spPr>
+          <a:xfrm>
+            <a:off x="1917263" y="5696768"/>
+            <a:ext cx="10018713" cy="705850"/>
+          </a:xfrm>
+        </p:spPr>
+        <p:txBody>
+          <a:bodyPr>
+            <a:normAutofit fontScale="77500" lnSpcReduction="20000"/>
+          </a:bodyPr>
+          <a:lstStyle/>
+          <a:p>
+            <a:r>
+              <a:rPr lang="fr-FR" dirty="0"/>
+              <a:t>Article: </a:t>
+            </a:r>
+            <a:r>
+              <a:rPr lang="fr-FR" dirty="0">
+                <a:hlinkClick r:id="rId2"/>
+              </a:rPr>
+              <a:t>https://habrahabr.ru/post/341950/</a:t>
+            </a:r>
+            <a:r>
+              <a:rPr lang="fr-FR" dirty="0"/>
+              <a:t> </a:t>
+            </a:r>
+          </a:p>
+          <a:p>
+            <a:r>
+              <a:rPr lang="fr-FR" dirty="0"/>
+              <a:t>Source code: </a:t>
+            </a:r>
+            <a:r>
+              <a:rPr lang="fr-FR" dirty="0">
+                <a:hlinkClick r:id="rId3"/>
+              </a:rPr>
+              <a:t>https://github.com/sflusov/IISSharingAssemblies</a:t>
+            </a:r>
+            <a:r>
+              <a:rPr lang="ru-RU" dirty="0"/>
+              <a:t> </a:t>
+            </a:r>
+          </a:p>
+        </p:txBody>
+      </p:sp>
+      <p:sp>
+        <p:nvSpPr>
+          <p:cNvPr id="5" name="Slide Number Placeholder 4">
+            <a:extLst>
+              <a:ext uri="{FF2B5EF4-FFF2-40B4-BE49-F238E27FC236}">
+                <a16:creationId xmlns:a16="http://schemas.microsoft.com/office/drawing/2014/main" id="{F4206AE7-057A-40BB-B37D-77C7D6B484B0}"/>
+              </a:ext>
+            </a:extLst>
+          </p:cNvPr>
+          <p:cNvSpPr>
+            <a:spLocks noGrp="1"/>
+          </p:cNvSpPr>
+          <p:nvPr>
+            <p:ph type="sldNum" sz="quarter" idx="12"/>
+          </p:nvPr>
+        </p:nvSpPr>
+        <p:spPr/>
+        <p:txBody>
+          <a:bodyPr/>
+          <a:lstStyle/>
+          <a:p>
+            <a:fld id="{D57F1E4F-1CFF-5643-939E-217C01CDF565}" type="slidenum">
+              <a:rPr lang="en-US" sz="1400" smtClean="0"/>
+              <a:pPr/>
+              <a:t>19</a:t>
+            </a:fld>
+            <a:endParaRPr lang="en-US" sz="1400" dirty="0"/>
+          </a:p>
+        </p:txBody>
+      </p:sp>
+    </p:spTree>
+    <p:extLst>
+      <p:ext uri="{BB962C8B-B14F-4D97-AF65-F5344CB8AC3E}">
+        <p14:creationId xmlns:p14="http://schemas.microsoft.com/office/powerpoint/2010/main" val="3170461859"/>
       </p:ext>
     </p:extLst>
   </p:cSld>
@@ -9348,13 +10286,7 @@
       </p:grpSpPr>
       <p:sp>
         <p:nvSpPr>
-          <p:cNvPr id="2" name="Title 1">
-            <a:extLst>
-              <a:ext uri="{FF2B5EF4-FFF2-40B4-BE49-F238E27FC236}">
-                <a16:creationId xmlns:a16="http://schemas.microsoft.com/office/drawing/2014/main" id="{C22742A2-2CB0-47F6-A780-9FD6D9C090EA}"/>
-              </a:ext>
-            </a:extLst>
-          </p:cNvPr>
+          <p:cNvPr id="2" name="Заголовок 1"/>
           <p:cNvSpPr>
             <a:spLocks noGrp="1"/>
           </p:cNvSpPr>
@@ -9364,8 +10296,8 @@
         </p:nvSpPr>
         <p:spPr>
           <a:xfrm>
-            <a:off x="1484311" y="177801"/>
-            <a:ext cx="10018713" cy="487217"/>
+            <a:off x="1484310" y="397144"/>
+            <a:ext cx="10018713" cy="457200"/>
           </a:xfrm>
         </p:spPr>
         <p:txBody>
@@ -9376,120 +10308,18 @@
           <a:p>
             <a:r>
               <a:rPr lang="en-US" dirty="0"/>
-              <a:t>What do you really mean by memory?</a:t>
-            </a:r>
-          </a:p>
-        </p:txBody>
-      </p:sp>
-      <p:sp>
-        <p:nvSpPr>
-          <p:cNvPr id="7" name="TextBox 6">
+              <a:t>The structure of typical application</a:t>
+            </a:r>
+            <a:endParaRPr lang="ru-RU" dirty="0"/>
+          </a:p>
+        </p:txBody>
+      </p:sp>
+      <p:sp>
+        <p:nvSpPr>
+          <p:cNvPr id="5" name="Slide Number Placeholder 4">
             <a:extLst>
               <a:ext uri="{FF2B5EF4-FFF2-40B4-BE49-F238E27FC236}">
-                <a16:creationId xmlns:a16="http://schemas.microsoft.com/office/drawing/2014/main" id="{32D12F80-292D-43B5-BCC6-2424A08800E9}"/>
-              </a:ext>
-            </a:extLst>
-          </p:cNvPr>
-          <p:cNvSpPr txBox="1"/>
-          <p:nvPr/>
-        </p:nvSpPr>
-        <p:spPr>
-          <a:xfrm>
-            <a:off x="2468618" y="6098184"/>
-            <a:ext cx="9470017" cy="646331"/>
-          </a:xfrm>
-          <a:prstGeom prst="rect">
-            <a:avLst/>
-          </a:prstGeom>
-          <a:noFill/>
-        </p:spPr>
-        <p:txBody>
-          <a:bodyPr wrap="square" rtlCol="0">
-            <a:spAutoFit/>
-          </a:bodyPr>
-          <a:lstStyle/>
-          <a:p>
-            <a:r>
-              <a:rPr lang="en-US" dirty="0"/>
-              <a:t>See also: </a:t>
-            </a:r>
-          </a:p>
-          <a:p>
-            <a:pPr marL="285750" indent="-285750">
-              <a:buFont typeface="Arial" panose="020B0604020202020204" pitchFamily="34" charset="0"/>
-              <a:buChar char="•"/>
-            </a:pPr>
-            <a:r>
-              <a:rPr lang="en-US" dirty="0">
-                <a:hlinkClick r:id="rId2"/>
-              </a:rPr>
-              <a:t>http://blogs.microsoft.co.il/sasha/2016/01/05/windows-process-memory-usage-demystified/</a:t>
-            </a:r>
-            <a:endParaRPr lang="en-US" dirty="0"/>
-          </a:p>
-        </p:txBody>
-      </p:sp>
-      <p:sp>
-        <p:nvSpPr>
-          <p:cNvPr id="9" name="TextBox 8">
-            <a:extLst>
-              <a:ext uri="{FF2B5EF4-FFF2-40B4-BE49-F238E27FC236}">
-                <a16:creationId xmlns:a16="http://schemas.microsoft.com/office/drawing/2014/main" id="{F978C187-759F-480D-BEE2-6DB4E7EF2C30}"/>
-              </a:ext>
-            </a:extLst>
-          </p:cNvPr>
-          <p:cNvSpPr txBox="1"/>
-          <p:nvPr/>
-        </p:nvSpPr>
-        <p:spPr>
-          <a:xfrm>
-            <a:off x="6659420" y="1357736"/>
-            <a:ext cx="2981343" cy="923330"/>
-          </a:xfrm>
-          <a:prstGeom prst="rect">
-            <a:avLst/>
-          </a:prstGeom>
-          <a:noFill/>
-        </p:spPr>
-        <p:txBody>
-          <a:bodyPr wrap="square" rtlCol="0">
-            <a:spAutoFit/>
-          </a:bodyPr>
-          <a:lstStyle/>
-          <a:p>
-            <a:r>
-              <a:rPr lang="en-US" dirty="0"/>
-              <a:t>Virtual memory:</a:t>
-            </a:r>
-          </a:p>
-          <a:p>
-            <a:pPr marL="285750" indent="-285750">
-              <a:buFont typeface="Arial" panose="020B0604020202020204" pitchFamily="34" charset="0"/>
-              <a:buChar char="•"/>
-            </a:pPr>
-            <a:r>
-              <a:rPr lang="en-US" dirty="0"/>
-              <a:t>32-bit - 2GB per process</a:t>
-            </a:r>
-          </a:p>
-          <a:p>
-            <a:pPr marL="285750" indent="-285750">
-              <a:buFont typeface="Arial" panose="020B0604020202020204" pitchFamily="34" charset="0"/>
-              <a:buChar char="•"/>
-            </a:pPr>
-            <a:r>
-              <a:rPr lang="en-US" dirty="0"/>
-              <a:t>64-bit – 128TB per process</a:t>
-            </a:r>
-          </a:p>
-        </p:txBody>
-      </p:sp>
-      <p:sp>
-        <p:nvSpPr>
-          <p:cNvPr id="4" name="Slide Number Placeholder 3">
-            <a:extLst>
-              <a:ext uri="{FF2B5EF4-FFF2-40B4-BE49-F238E27FC236}">
-                <a16:creationId xmlns:a16="http://schemas.microsoft.com/office/drawing/2014/main" id="{AAB1DB65-03D9-4F67-9534-E6E8E0195CB1}"/>
+                <a16:creationId xmlns:a16="http://schemas.microsoft.com/office/drawing/2014/main" id="{F43BC381-B53D-4A5D-97F7-9D3AA2B29C4D}"/>
               </a:ext>
             </a:extLst>
           </p:cNvPr>
@@ -9516,10 +10346,10 @@
       </p:sp>
       <p:pic>
         <p:nvPicPr>
-          <p:cNvPr id="5" name="Picture 4">
+          <p:cNvPr id="10" name="Picture 9">
             <a:extLst>
               <a:ext uri="{FF2B5EF4-FFF2-40B4-BE49-F238E27FC236}">
-                <a16:creationId xmlns:a16="http://schemas.microsoft.com/office/drawing/2014/main" id="{B5B23CEE-4A24-4E44-9AF6-69D98E7046A0}"/>
+                <a16:creationId xmlns:a16="http://schemas.microsoft.com/office/drawing/2014/main" id="{53C532B2-0DBF-4DFC-97B6-4A8B12517AE6}"/>
               </a:ext>
             </a:extLst>
           </p:cNvPr>
@@ -9529,62 +10359,25 @@
           <p:nvPr/>
         </p:nvPicPr>
         <p:blipFill>
-          <a:blip r:embed="rId3"/>
+          <a:blip r:embed="rId2"/>
           <a:stretch>
             <a:fillRect/>
           </a:stretch>
         </p:blipFill>
         <p:spPr>
           <a:xfrm>
-            <a:off x="2788340" y="1357736"/>
-            <a:ext cx="2744241" cy="4351014"/>
+            <a:off x="1564478" y="1492250"/>
+            <a:ext cx="9858375" cy="3990975"/>
           </a:xfrm>
           <a:prstGeom prst="rect">
             <a:avLst/>
           </a:prstGeom>
         </p:spPr>
       </p:pic>
-      <p:sp>
-        <p:nvSpPr>
-          <p:cNvPr id="11" name="TextBox 10">
-            <a:extLst>
-              <a:ext uri="{FF2B5EF4-FFF2-40B4-BE49-F238E27FC236}">
-                <a16:creationId xmlns:a16="http://schemas.microsoft.com/office/drawing/2014/main" id="{EA8F18AD-9519-4EA3-928B-E6C09A7812C9}"/>
-              </a:ext>
-            </a:extLst>
-          </p:cNvPr>
-          <p:cNvSpPr txBox="1"/>
-          <p:nvPr/>
-        </p:nvSpPr>
-        <p:spPr>
-          <a:xfrm>
-            <a:off x="2688368" y="798534"/>
-            <a:ext cx="7231487" cy="369332"/>
-          </a:xfrm>
-          <a:prstGeom prst="rect">
-            <a:avLst/>
-          </a:prstGeom>
-          <a:noFill/>
-        </p:spPr>
-        <p:txBody>
-          <a:bodyPr wrap="square" rtlCol="0">
-            <a:spAutoFit/>
-          </a:bodyPr>
-          <a:lstStyle/>
-          <a:p>
-            <a:pPr algn="ctr"/>
-            <a:r>
-              <a:rPr lang="en-US" dirty="0"/>
-              <a:t>Virtual and physical memory</a:t>
-            </a:r>
-            <a:endParaRPr lang="en-US" i="1" dirty="0"/>
-          </a:p>
-        </p:txBody>
-      </p:sp>
     </p:spTree>
     <p:extLst>
       <p:ext uri="{BB962C8B-B14F-4D97-AF65-F5344CB8AC3E}">
-        <p14:creationId xmlns:p14="http://schemas.microsoft.com/office/powerpoint/2010/main" val="2125317221"/>
+        <p14:creationId xmlns:p14="http://schemas.microsoft.com/office/powerpoint/2010/main" val="3627014283"/>
       </p:ext>
     </p:extLst>
   </p:cSld>
@@ -9629,8 +10422,8 @@
         </p:nvSpPr>
         <p:spPr>
           <a:xfrm>
-            <a:off x="1484311" y="177801"/>
-            <a:ext cx="10018713" cy="487217"/>
+            <a:off x="1484310" y="0"/>
+            <a:ext cx="10018713" cy="971449"/>
           </a:xfrm>
         </p:spPr>
         <p:txBody>
@@ -9642,6 +10435,116 @@
             <a:r>
               <a:rPr lang="en-US" dirty="0"/>
               <a:t>What do you really mean by memory?</a:t>
+            </a:r>
+            <a:br>
+              <a:rPr lang="en-US" dirty="0"/>
+            </a:br>
+            <a:r>
+              <a:rPr lang="en-US" sz="2700" dirty="0"/>
+              <a:t>Virtual and physical memory</a:t>
+            </a:r>
+          </a:p>
+        </p:txBody>
+      </p:sp>
+      <p:sp>
+        <p:nvSpPr>
+          <p:cNvPr id="7" name="TextBox 6">
+            <a:extLst>
+              <a:ext uri="{FF2B5EF4-FFF2-40B4-BE49-F238E27FC236}">
+                <a16:creationId xmlns:a16="http://schemas.microsoft.com/office/drawing/2014/main" id="{32D12F80-292D-43B5-BCC6-2424A08800E9}"/>
+              </a:ext>
+            </a:extLst>
+          </p:cNvPr>
+          <p:cNvSpPr txBox="1"/>
+          <p:nvPr/>
+        </p:nvSpPr>
+        <p:spPr>
+          <a:xfrm>
+            <a:off x="2468618" y="6098184"/>
+            <a:ext cx="9470017" cy="646331"/>
+          </a:xfrm>
+          <a:prstGeom prst="rect">
+            <a:avLst/>
+          </a:prstGeom>
+          <a:noFill/>
+        </p:spPr>
+        <p:txBody>
+          <a:bodyPr wrap="square" rtlCol="0">
+            <a:spAutoFit/>
+          </a:bodyPr>
+          <a:lstStyle/>
+          <a:p>
+            <a:r>
+              <a:rPr lang="en-US" dirty="0"/>
+              <a:t>See also: </a:t>
+            </a:r>
+          </a:p>
+          <a:p>
+            <a:pPr marL="285750" indent="-285750">
+              <a:buFont typeface="Arial" panose="020B0604020202020204" pitchFamily="34" charset="0"/>
+              <a:buChar char="•"/>
+            </a:pPr>
+            <a:r>
+              <a:rPr lang="en-US" dirty="0">
+                <a:hlinkClick r:id="rId2"/>
+              </a:rPr>
+              <a:t>http://blogs.microsoft.co.il/sasha/2016/01/05/windows-process-memory-usage-demystified/</a:t>
+            </a:r>
+            <a:endParaRPr lang="en-US" dirty="0"/>
+          </a:p>
+        </p:txBody>
+      </p:sp>
+      <p:sp>
+        <p:nvSpPr>
+          <p:cNvPr id="9" name="TextBox 8">
+            <a:extLst>
+              <a:ext uri="{FF2B5EF4-FFF2-40B4-BE49-F238E27FC236}">
+                <a16:creationId xmlns:a16="http://schemas.microsoft.com/office/drawing/2014/main" id="{F978C187-759F-480D-BEE2-6DB4E7EF2C30}"/>
+              </a:ext>
+            </a:extLst>
+          </p:cNvPr>
+          <p:cNvSpPr txBox="1"/>
+          <p:nvPr/>
+        </p:nvSpPr>
+        <p:spPr>
+          <a:xfrm>
+            <a:off x="7203626" y="1796274"/>
+            <a:ext cx="2981343" cy="923330"/>
+          </a:xfrm>
+          <a:prstGeom prst="rect">
+            <a:avLst/>
+          </a:prstGeom>
+          <a:noFill/>
+        </p:spPr>
+        <p:txBody>
+          <a:bodyPr wrap="square" rtlCol="0">
+            <a:spAutoFit/>
+          </a:bodyPr>
+          <a:lstStyle/>
+          <a:p>
+            <a:r>
+              <a:rPr lang="en-US" dirty="0"/>
+              <a:t>Virtual memory:</a:t>
+            </a:r>
+          </a:p>
+          <a:p>
+            <a:pPr marL="285750" indent="-285750">
+              <a:buFont typeface="Arial" panose="020B0604020202020204" pitchFamily="34" charset="0"/>
+              <a:buChar char="•"/>
+            </a:pPr>
+            <a:r>
+              <a:rPr lang="en-US" dirty="0"/>
+              <a:t>32-bit - 2GB per process</a:t>
+            </a:r>
+          </a:p>
+          <a:p>
+            <a:pPr marL="285750" indent="-285750">
+              <a:buFont typeface="Arial" panose="020B0604020202020204" pitchFamily="34" charset="0"/>
+              <a:buChar char="•"/>
+            </a:pPr>
+            <a:r>
+              <a:rPr lang="en-US" dirty="0"/>
+              <a:t>64-bit – 128TB per process</a:t>
             </a:r>
           </a:p>
         </p:txBody>
@@ -9678,175 +10581,10 @@
       </p:sp>
       <p:pic>
         <p:nvPicPr>
-          <p:cNvPr id="3" name="Picture 2">
+          <p:cNvPr id="5" name="Picture 4">
             <a:extLst>
               <a:ext uri="{FF2B5EF4-FFF2-40B4-BE49-F238E27FC236}">
-                <a16:creationId xmlns:a16="http://schemas.microsoft.com/office/drawing/2014/main" id="{24593ECE-D13C-4C84-9662-5EA0C6045BC2}"/>
-              </a:ext>
-            </a:extLst>
-          </p:cNvPr>
-          <p:cNvPicPr>
-            <a:picLocks noChangeAspect="1"/>
-          </p:cNvPicPr>
-          <p:nvPr/>
-        </p:nvPicPr>
-        <p:blipFill>
-          <a:blip r:embed="rId2"/>
-          <a:stretch>
-            <a:fillRect/>
-          </a:stretch>
-        </p:blipFill>
-        <p:spPr>
-          <a:xfrm>
-            <a:off x="359677" y="1529294"/>
-            <a:ext cx="4521839" cy="3775171"/>
-          </a:xfrm>
-          <a:prstGeom prst="rect">
-            <a:avLst/>
-          </a:prstGeom>
-        </p:spPr>
-      </p:pic>
-      <p:sp>
-        <p:nvSpPr>
-          <p:cNvPr id="8" name="TextBox 7">
-            <a:extLst>
-              <a:ext uri="{FF2B5EF4-FFF2-40B4-BE49-F238E27FC236}">
-                <a16:creationId xmlns:a16="http://schemas.microsoft.com/office/drawing/2014/main" id="{CF5689F6-0FA8-43C3-BA8D-52B7CC29FB2C}"/>
-              </a:ext>
-            </a:extLst>
-          </p:cNvPr>
-          <p:cNvSpPr txBox="1"/>
-          <p:nvPr/>
-        </p:nvSpPr>
-        <p:spPr>
-          <a:xfrm>
-            <a:off x="9029414" y="1529294"/>
-            <a:ext cx="2904440" cy="2308324"/>
-          </a:xfrm>
-          <a:prstGeom prst="rect">
-            <a:avLst/>
-          </a:prstGeom>
-          <a:noFill/>
-        </p:spPr>
-        <p:txBody>
-          <a:bodyPr wrap="square" rtlCol="0">
-            <a:spAutoFit/>
-          </a:bodyPr>
-          <a:lstStyle/>
-          <a:p>
-            <a:r>
-              <a:rPr lang="en-US" dirty="0"/>
-              <a:t>Virtual memory:</a:t>
-            </a:r>
-          </a:p>
-          <a:p>
-            <a:pPr marL="285750" indent="-285750">
-              <a:buFont typeface="Arial" panose="020B0604020202020204" pitchFamily="34" charset="0"/>
-              <a:buChar char="•"/>
-            </a:pPr>
-            <a:r>
-              <a:rPr lang="en-US" dirty="0"/>
-              <a:t>Commit size</a:t>
-            </a:r>
-          </a:p>
-          <a:p>
-            <a:pPr marL="285750" indent="-285750">
-              <a:buFont typeface="Arial" panose="020B0604020202020204" pitchFamily="34" charset="0"/>
-              <a:buChar char="•"/>
-            </a:pPr>
-            <a:endParaRPr lang="en-US" dirty="0"/>
-          </a:p>
-          <a:p>
-            <a:r>
-              <a:rPr lang="en-US" dirty="0"/>
-              <a:t>Physical memory:</a:t>
-            </a:r>
-          </a:p>
-          <a:p>
-            <a:pPr marL="285750" indent="-285750">
-              <a:buFont typeface="Arial" panose="020B0604020202020204" pitchFamily="34" charset="0"/>
-              <a:buChar char="•"/>
-            </a:pPr>
-            <a:r>
-              <a:rPr lang="en-US" dirty="0"/>
-              <a:t>Private working set</a:t>
-            </a:r>
-          </a:p>
-          <a:p>
-            <a:pPr marL="285750" indent="-285750">
-              <a:buFont typeface="Arial" panose="020B0604020202020204" pitchFamily="34" charset="0"/>
-              <a:buChar char="•"/>
-            </a:pPr>
-            <a:r>
-              <a:rPr lang="en-US" dirty="0"/>
-              <a:t>Shared working set</a:t>
-            </a:r>
-          </a:p>
-          <a:p>
-            <a:pPr marL="285750" indent="-285750">
-              <a:buFont typeface="Arial" panose="020B0604020202020204" pitchFamily="34" charset="0"/>
-              <a:buChar char="•"/>
-            </a:pPr>
-            <a:r>
-              <a:rPr lang="en-US" dirty="0"/>
-              <a:t>Working set = Private + Shared</a:t>
-            </a:r>
-          </a:p>
-        </p:txBody>
-      </p:sp>
-      <p:sp>
-        <p:nvSpPr>
-          <p:cNvPr id="10" name="TextBox 9">
-            <a:extLst>
-              <a:ext uri="{FF2B5EF4-FFF2-40B4-BE49-F238E27FC236}">
-                <a16:creationId xmlns:a16="http://schemas.microsoft.com/office/drawing/2014/main" id="{A0D1F22C-B886-4F74-9D2A-64FAA2178232}"/>
-              </a:ext>
-            </a:extLst>
-          </p:cNvPr>
-          <p:cNvSpPr txBox="1"/>
-          <p:nvPr/>
-        </p:nvSpPr>
-        <p:spPr>
-          <a:xfrm>
-            <a:off x="2873502" y="838089"/>
-            <a:ext cx="6815264" cy="369332"/>
-          </a:xfrm>
-          <a:prstGeom prst="rect">
-            <a:avLst/>
-          </a:prstGeom>
-          <a:noFill/>
-        </p:spPr>
-        <p:txBody>
-          <a:bodyPr wrap="none" rtlCol="0">
-            <a:spAutoFit/>
-          </a:bodyPr>
-          <a:lstStyle/>
-          <a:p>
-            <a:r>
-              <a:rPr lang="en-US" dirty="0"/>
-              <a:t>Have a look on application through </a:t>
-            </a:r>
-            <a:r>
-              <a:rPr lang="en-US" i="1" dirty="0"/>
-              <a:t>Task Manager </a:t>
-            </a:r>
-            <a:r>
-              <a:rPr lang="en-US" dirty="0"/>
-              <a:t>and</a:t>
-            </a:r>
-            <a:r>
-              <a:rPr lang="en-US" i="1" dirty="0"/>
-              <a:t> Process Explorer</a:t>
-            </a:r>
-          </a:p>
-        </p:txBody>
-      </p:sp>
-      <p:pic>
-        <p:nvPicPr>
-          <p:cNvPr id="6" name="Picture 5">
-            <a:extLst>
-              <a:ext uri="{FF2B5EF4-FFF2-40B4-BE49-F238E27FC236}">
-                <a16:creationId xmlns:a16="http://schemas.microsoft.com/office/drawing/2014/main" id="{96CA94DB-D1B8-4F23-908B-D126F176DA42}"/>
+                <a16:creationId xmlns:a16="http://schemas.microsoft.com/office/drawing/2014/main" id="{B5B23CEE-4A24-4E44-9AF6-69D98E7046A0}"/>
               </a:ext>
             </a:extLst>
           </p:cNvPr>
@@ -9863,127 +10601,18 @@
         </p:blipFill>
         <p:spPr>
           <a:xfrm>
-            <a:off x="5121294" y="1529294"/>
-            <a:ext cx="3673230" cy="4410887"/>
+            <a:off x="3422226" y="1228394"/>
+            <a:ext cx="3071440" cy="4869790"/>
           </a:xfrm>
           <a:prstGeom prst="rect">
             <a:avLst/>
           </a:prstGeom>
         </p:spPr>
       </p:pic>
-      <p:sp>
-        <p:nvSpPr>
-          <p:cNvPr id="11" name="TextBox 10">
-            <a:extLst>
-              <a:ext uri="{FF2B5EF4-FFF2-40B4-BE49-F238E27FC236}">
-                <a16:creationId xmlns:a16="http://schemas.microsoft.com/office/drawing/2014/main" id="{4501EC85-E9D3-453C-A0C5-ABAAE2F52365}"/>
-              </a:ext>
-            </a:extLst>
-          </p:cNvPr>
-          <p:cNvSpPr txBox="1"/>
-          <p:nvPr/>
-        </p:nvSpPr>
-        <p:spPr>
-          <a:xfrm>
-            <a:off x="2615708" y="6389272"/>
-            <a:ext cx="7911525" cy="338554"/>
-          </a:xfrm>
-          <a:prstGeom prst="rect">
-            <a:avLst/>
-          </a:prstGeom>
-          <a:noFill/>
-        </p:spPr>
-        <p:txBody>
-          <a:bodyPr wrap="none" rtlCol="0">
-            <a:spAutoFit/>
-          </a:bodyPr>
-          <a:lstStyle/>
-          <a:p>
-            <a:r>
-              <a:rPr lang="en-US" sz="1600" dirty="0"/>
-              <a:t>Remarks: </a:t>
-            </a:r>
-            <a:r>
-              <a:rPr lang="en-US" sz="1600" i="1" dirty="0"/>
-              <a:t>* There are some deviations in values, because screenshot was made at different time</a:t>
-            </a:r>
-          </a:p>
-        </p:txBody>
-      </p:sp>
-      <p:sp>
-        <p:nvSpPr>
-          <p:cNvPr id="12" name="TextBox 11">
-            <a:extLst>
-              <a:ext uri="{FF2B5EF4-FFF2-40B4-BE49-F238E27FC236}">
-                <a16:creationId xmlns:a16="http://schemas.microsoft.com/office/drawing/2014/main" id="{DAD7D7C0-4350-4738-AF1B-CA9098270786}"/>
-              </a:ext>
-            </a:extLst>
-          </p:cNvPr>
-          <p:cNvSpPr txBox="1"/>
-          <p:nvPr/>
-        </p:nvSpPr>
-        <p:spPr>
-          <a:xfrm>
-            <a:off x="1857776" y="5384224"/>
-            <a:ext cx="1515864" cy="369332"/>
-          </a:xfrm>
-          <a:prstGeom prst="rect">
-            <a:avLst/>
-          </a:prstGeom>
-          <a:noFill/>
-        </p:spPr>
-        <p:txBody>
-          <a:bodyPr wrap="none" rtlCol="0">
-            <a:spAutoFit/>
-          </a:bodyPr>
-          <a:lstStyle/>
-          <a:p>
-            <a:r>
-              <a:rPr lang="en-US" dirty="0"/>
-              <a:t>Task manager</a:t>
-            </a:r>
-          </a:p>
-        </p:txBody>
-      </p:sp>
-      <p:sp>
-        <p:nvSpPr>
-          <p:cNvPr id="13" name="TextBox 12">
-            <a:extLst>
-              <a:ext uri="{FF2B5EF4-FFF2-40B4-BE49-F238E27FC236}">
-                <a16:creationId xmlns:a16="http://schemas.microsoft.com/office/drawing/2014/main" id="{7434BFD9-08C5-4A68-B5EC-A9F63D148FC8}"/>
-              </a:ext>
-            </a:extLst>
-          </p:cNvPr>
-          <p:cNvSpPr txBox="1"/>
-          <p:nvPr/>
-        </p:nvSpPr>
-        <p:spPr>
-          <a:xfrm>
-            <a:off x="6199977" y="5948995"/>
-            <a:ext cx="1765227" cy="369332"/>
-          </a:xfrm>
-          <a:prstGeom prst="rect">
-            <a:avLst/>
-          </a:prstGeom>
-          <a:noFill/>
-        </p:spPr>
-        <p:txBody>
-          <a:bodyPr wrap="none" rtlCol="0">
-            <a:spAutoFit/>
-          </a:bodyPr>
-          <a:lstStyle/>
-          <a:p>
-            <a:r>
-              <a:rPr lang="en-US" dirty="0"/>
-              <a:t>Process Explorer</a:t>
-            </a:r>
-          </a:p>
-        </p:txBody>
-      </p:sp>
     </p:spTree>
     <p:extLst>
       <p:ext uri="{BB962C8B-B14F-4D97-AF65-F5344CB8AC3E}">
-        <p14:creationId xmlns:p14="http://schemas.microsoft.com/office/powerpoint/2010/main" val="1532401657"/>
+        <p14:creationId xmlns:p14="http://schemas.microsoft.com/office/powerpoint/2010/main" val="2125317221"/>
       </p:ext>
     </p:extLst>
   </p:cSld>
@@ -10012,185 +10641,35 @@
       </p:grpSpPr>
       <p:sp>
         <p:nvSpPr>
-          <p:cNvPr id="6" name="TextBox 5">
+          <p:cNvPr id="2" name="Title 1">
             <a:extLst>
               <a:ext uri="{FF2B5EF4-FFF2-40B4-BE49-F238E27FC236}">
-                <a16:creationId xmlns:a16="http://schemas.microsoft.com/office/drawing/2014/main" id="{46480F8A-F9F7-45EF-BDC9-17A948074BE7}"/>
+                <a16:creationId xmlns:a16="http://schemas.microsoft.com/office/drawing/2014/main" id="{C22742A2-2CB0-47F6-A780-9FD6D9C090EA}"/>
               </a:ext>
             </a:extLst>
           </p:cNvPr>
-          <p:cNvSpPr txBox="1"/>
-          <p:nvPr/>
-        </p:nvSpPr>
-        <p:spPr>
-          <a:xfrm>
-            <a:off x="3875740" y="1057411"/>
-            <a:ext cx="5344989" cy="369332"/>
-          </a:xfrm>
-          <a:prstGeom prst="rect">
-            <a:avLst/>
-          </a:prstGeom>
-          <a:noFill/>
-        </p:spPr>
-        <p:txBody>
-          <a:bodyPr wrap="none" rtlCol="0">
-            <a:spAutoFit/>
+          <p:cNvSpPr>
+            <a:spLocks noGrp="1"/>
+          </p:cNvSpPr>
+          <p:nvPr>
+            <p:ph type="title"/>
+          </p:nvPr>
+        </p:nvSpPr>
+        <p:spPr>
+          <a:xfrm>
+            <a:off x="1484311" y="177801"/>
+            <a:ext cx="10018713" cy="487217"/>
+          </a:xfrm>
+        </p:spPr>
+        <p:txBody>
+          <a:bodyPr>
+            <a:normAutofit fontScale="90000"/>
           </a:bodyPr>
           <a:lstStyle/>
           <a:p>
             <a:r>
               <a:rPr lang="en-US" dirty="0"/>
-              <a:t>Open </a:t>
-            </a:r>
-            <a:r>
-              <a:rPr lang="en-US" i="1" dirty="0" err="1"/>
-              <a:t>VMMap</a:t>
-            </a:r>
-            <a:r>
-              <a:rPr lang="en-US" dirty="0"/>
-              <a:t> and have a look of application structure</a:t>
-            </a:r>
-          </a:p>
-        </p:txBody>
-      </p:sp>
-      <p:sp>
-        <p:nvSpPr>
-          <p:cNvPr id="7" name="TextBox 6">
-            <a:extLst>
-              <a:ext uri="{FF2B5EF4-FFF2-40B4-BE49-F238E27FC236}">
-                <a16:creationId xmlns:a16="http://schemas.microsoft.com/office/drawing/2014/main" id="{32D12F80-292D-43B5-BCC6-2424A08800E9}"/>
-              </a:ext>
-            </a:extLst>
-          </p:cNvPr>
-          <p:cNvSpPr txBox="1"/>
-          <p:nvPr/>
-        </p:nvSpPr>
-        <p:spPr>
-          <a:xfrm>
-            <a:off x="2490992" y="5885981"/>
-            <a:ext cx="9454932" cy="923330"/>
-          </a:xfrm>
-          <a:prstGeom prst="rect">
-            <a:avLst/>
-          </a:prstGeom>
-          <a:noFill/>
-        </p:spPr>
-        <p:txBody>
-          <a:bodyPr wrap="square" rtlCol="0">
-            <a:spAutoFit/>
-          </a:bodyPr>
-          <a:lstStyle/>
-          <a:p>
-            <a:r>
-              <a:rPr lang="en-US" dirty="0"/>
-              <a:t>See also: </a:t>
-            </a:r>
-          </a:p>
-          <a:p>
-            <a:pPr marL="285750" indent="-285750">
-              <a:buFont typeface="Arial" panose="020B0604020202020204" pitchFamily="34" charset="0"/>
-              <a:buChar char="•"/>
-            </a:pPr>
-            <a:r>
-              <a:rPr lang="en-US" dirty="0">
-                <a:hlinkClick r:id="rId2"/>
-              </a:rPr>
-              <a:t>http://blogs.microsoft.co.il/sasha/2016/01/05/windows-process-memory-usage-demystified/</a:t>
-            </a:r>
-            <a:endParaRPr lang="en-US" dirty="0"/>
-          </a:p>
-          <a:p>
-            <a:pPr marL="285750" indent="-285750">
-              <a:buFont typeface="Arial" panose="020B0604020202020204" pitchFamily="34" charset="0"/>
-              <a:buChar char="•"/>
-            </a:pPr>
-            <a:r>
-              <a:rPr lang="en-US" dirty="0"/>
-              <a:t>Windows® </a:t>
-            </a:r>
-            <a:r>
-              <a:rPr lang="en-US" dirty="0" err="1"/>
-              <a:t>Sysinternals</a:t>
-            </a:r>
-            <a:r>
-              <a:rPr lang="en-US" dirty="0"/>
-              <a:t> Administrator’s Reference. Pages 216-218</a:t>
-            </a:r>
-          </a:p>
-        </p:txBody>
-      </p:sp>
-      <p:sp>
-        <p:nvSpPr>
-          <p:cNvPr id="9" name="TextBox 8">
-            <a:extLst>
-              <a:ext uri="{FF2B5EF4-FFF2-40B4-BE49-F238E27FC236}">
-                <a16:creationId xmlns:a16="http://schemas.microsoft.com/office/drawing/2014/main" id="{F978C187-759F-480D-BEE2-6DB4E7EF2C30}"/>
-              </a:ext>
-            </a:extLst>
-          </p:cNvPr>
-          <p:cNvSpPr txBox="1"/>
-          <p:nvPr/>
-        </p:nvSpPr>
-        <p:spPr>
-          <a:xfrm>
-            <a:off x="8640052" y="1557676"/>
-            <a:ext cx="2862971" cy="3416320"/>
-          </a:xfrm>
-          <a:prstGeom prst="rect">
-            <a:avLst/>
-          </a:prstGeom>
-          <a:noFill/>
-        </p:spPr>
-        <p:txBody>
-          <a:bodyPr wrap="square" rtlCol="0">
-            <a:spAutoFit/>
-          </a:bodyPr>
-          <a:lstStyle/>
-          <a:p>
-            <a:r>
-              <a:rPr lang="en-US" dirty="0"/>
-              <a:t>Bar graphs:</a:t>
-            </a:r>
-          </a:p>
-          <a:p>
-            <a:endParaRPr lang="en-US" dirty="0"/>
-          </a:p>
-          <a:p>
-            <a:pPr marL="285750" indent="-285750">
-              <a:buFont typeface="Arial" panose="020B0604020202020204" pitchFamily="34" charset="0"/>
-              <a:buChar char="•"/>
-            </a:pPr>
-            <a:r>
-              <a:rPr lang="en-US" dirty="0"/>
-              <a:t>Committed – virtual memory, which allocated memory, but not used</a:t>
-            </a:r>
-            <a:br>
-              <a:rPr lang="en-US" dirty="0"/>
-            </a:br>
-            <a:endParaRPr lang="en-US" dirty="0"/>
-          </a:p>
-          <a:p>
-            <a:pPr marL="285750" indent="-285750">
-              <a:buFont typeface="Arial" panose="020B0604020202020204" pitchFamily="34" charset="0"/>
-              <a:buChar char="•"/>
-            </a:pPr>
-            <a:r>
-              <a:rPr lang="en-US" dirty="0"/>
-              <a:t>Private Bytes - virtual memory, which already use </a:t>
-            </a:r>
-            <a:br>
-              <a:rPr lang="en-US" dirty="0"/>
-            </a:br>
-            <a:endParaRPr lang="en-US" dirty="0"/>
-          </a:p>
-          <a:p>
-            <a:pPr marL="285750" indent="-285750">
-              <a:buFont typeface="Arial" panose="020B0604020202020204" pitchFamily="34" charset="0"/>
-              <a:buChar char="•"/>
-            </a:pPr>
-            <a:r>
-              <a:rPr lang="en-US" dirty="0"/>
-              <a:t>Working set   - physical memory</a:t>
+              <a:t>What do you really mean by memory?</a:t>
             </a:r>
           </a:p>
         </p:txBody>
@@ -10211,7 +10690,12 @@
             <p:ph type="sldNum" sz="quarter" idx="12"/>
           </p:nvPr>
         </p:nvSpPr>
-        <p:spPr/>
+        <p:spPr>
+          <a:xfrm>
+            <a:off x="11430028" y="6391266"/>
+            <a:ext cx="551167" cy="365125"/>
+          </a:xfrm>
+        </p:spPr>
         <p:txBody>
           <a:bodyPr/>
           <a:lstStyle/>
@@ -10227,52 +10711,110 @@
       </p:sp>
       <p:sp>
         <p:nvSpPr>
-          <p:cNvPr id="10" name="Title 1">
+          <p:cNvPr id="12" name="TextBox 11">
             <a:extLst>
               <a:ext uri="{FF2B5EF4-FFF2-40B4-BE49-F238E27FC236}">
-                <a16:creationId xmlns:a16="http://schemas.microsoft.com/office/drawing/2014/main" id="{90A2D1D6-DEA9-4257-9B34-0A6DEABF966C}"/>
+                <a16:creationId xmlns:a16="http://schemas.microsoft.com/office/drawing/2014/main" id="{DAD7D7C0-4350-4738-AF1B-CA9098270786}"/>
               </a:ext>
             </a:extLst>
           </p:cNvPr>
-          <p:cNvSpPr>
-            <a:spLocks noGrp="1"/>
-          </p:cNvSpPr>
-          <p:nvPr>
-            <p:ph type="title"/>
-          </p:nvPr>
-        </p:nvSpPr>
-        <p:spPr>
-          <a:xfrm>
-            <a:off x="1484311" y="165965"/>
-            <a:ext cx="10018712" cy="923331"/>
-          </a:xfrm>
-        </p:spPr>
-        <p:txBody>
-          <a:bodyPr>
-            <a:normAutofit fontScale="90000"/>
+          <p:cNvSpPr txBox="1"/>
+          <p:nvPr/>
+        </p:nvSpPr>
+        <p:spPr>
+          <a:xfrm>
+            <a:off x="2615358" y="5972407"/>
+            <a:ext cx="1515864" cy="369332"/>
+          </a:xfrm>
+          <a:prstGeom prst="rect">
+            <a:avLst/>
+          </a:prstGeom>
+          <a:noFill/>
+        </p:spPr>
+        <p:txBody>
+          <a:bodyPr wrap="none" rtlCol="0">
+            <a:spAutoFit/>
           </a:bodyPr>
           <a:lstStyle/>
           <a:p>
             <a:r>
-              <a:rPr lang="en-US" sz="3600" dirty="0"/>
-              <a:t>What do you really mean by memory?</a:t>
-            </a:r>
-            <a:br>
-              <a:rPr lang="en-US" sz="3600" dirty="0"/>
-            </a:br>
-            <a:r>
-              <a:rPr lang="en-US" sz="2400" dirty="0"/>
-              <a:t>Memory types</a:t>
+              <a:rPr lang="en-US" dirty="0"/>
+              <a:t>Task manager</a:t>
+            </a:r>
+          </a:p>
+        </p:txBody>
+      </p:sp>
+      <p:sp>
+        <p:nvSpPr>
+          <p:cNvPr id="13" name="TextBox 12">
+            <a:extLst>
+              <a:ext uri="{FF2B5EF4-FFF2-40B4-BE49-F238E27FC236}">
+                <a16:creationId xmlns:a16="http://schemas.microsoft.com/office/drawing/2014/main" id="{7434BFD9-08C5-4A68-B5EC-A9F63D148FC8}"/>
+              </a:ext>
+            </a:extLst>
+          </p:cNvPr>
+          <p:cNvSpPr txBox="1"/>
+          <p:nvPr/>
+        </p:nvSpPr>
+        <p:spPr>
+          <a:xfrm>
+            <a:off x="8436693" y="6389162"/>
+            <a:ext cx="1765227" cy="369332"/>
+          </a:xfrm>
+          <a:prstGeom prst="rect">
+            <a:avLst/>
+          </a:prstGeom>
+          <a:noFill/>
+        </p:spPr>
+        <p:txBody>
+          <a:bodyPr wrap="none" rtlCol="0">
+            <a:spAutoFit/>
+          </a:bodyPr>
+          <a:lstStyle/>
+          <a:p>
+            <a:r>
+              <a:rPr lang="en-US" dirty="0"/>
+              <a:t>Process Explorer</a:t>
             </a:r>
           </a:p>
         </p:txBody>
       </p:sp>
       <p:pic>
         <p:nvPicPr>
-          <p:cNvPr id="13" name="Picture 12">
+          <p:cNvPr id="5" name="Picture 4">
             <a:extLst>
               <a:ext uri="{FF2B5EF4-FFF2-40B4-BE49-F238E27FC236}">
-                <a16:creationId xmlns:a16="http://schemas.microsoft.com/office/drawing/2014/main" id="{AD456E4B-3CB4-49BE-AE7E-947E5B6E0EBE}"/>
+                <a16:creationId xmlns:a16="http://schemas.microsoft.com/office/drawing/2014/main" id="{57F1F1F5-1E04-4A9A-AA0C-79C40C8A66E5}"/>
+              </a:ext>
+            </a:extLst>
+          </p:cNvPr>
+          <p:cNvPicPr>
+            <a:picLocks noChangeAspect="1"/>
+          </p:cNvPicPr>
+          <p:nvPr/>
+        </p:nvPicPr>
+        <p:blipFill>
+          <a:blip r:embed="rId2"/>
+          <a:stretch>
+            <a:fillRect/>
+          </a:stretch>
+        </p:blipFill>
+        <p:spPr>
+          <a:xfrm>
+            <a:off x="650580" y="1072971"/>
+            <a:ext cx="5445420" cy="4712058"/>
+          </a:xfrm>
+          <a:prstGeom prst="rect">
+            <a:avLst/>
+          </a:prstGeom>
+        </p:spPr>
+      </p:pic>
+      <p:pic>
+        <p:nvPicPr>
+          <p:cNvPr id="7" name="Picture 6">
+            <a:extLst>
+              <a:ext uri="{FF2B5EF4-FFF2-40B4-BE49-F238E27FC236}">
+                <a16:creationId xmlns:a16="http://schemas.microsoft.com/office/drawing/2014/main" id="{138E2697-4847-4434-A68B-B27C31B9A5C4}"/>
               </a:ext>
             </a:extLst>
           </p:cNvPr>
@@ -10289,18 +10831,395 @@
         </p:blipFill>
         <p:spPr>
           <a:xfrm>
-            <a:off x="1013905" y="1557676"/>
-            <a:ext cx="7433860" cy="3962182"/>
+            <a:off x="6786990" y="781091"/>
+            <a:ext cx="4643038" cy="5605968"/>
           </a:xfrm>
           <a:prstGeom prst="rect">
             <a:avLst/>
           </a:prstGeom>
         </p:spPr>
       </p:pic>
+      <p:cxnSp>
+        <p:nvCxnSpPr>
+          <p:cNvPr id="10" name="Straight Connector 9">
+            <a:extLst>
+              <a:ext uri="{FF2B5EF4-FFF2-40B4-BE49-F238E27FC236}">
+                <a16:creationId xmlns:a16="http://schemas.microsoft.com/office/drawing/2014/main" id="{A688BB4D-6CCE-42FA-947A-9F786F1BF6DC}"/>
+              </a:ext>
+            </a:extLst>
+          </p:cNvPr>
+          <p:cNvCxnSpPr/>
+          <p:nvPr/>
+        </p:nvCxnSpPr>
+        <p:spPr>
+          <a:xfrm>
+            <a:off x="2223083" y="2499919"/>
+            <a:ext cx="469783" cy="0"/>
+          </a:xfrm>
+          <a:prstGeom prst="line">
+            <a:avLst/>
+          </a:prstGeom>
+          <a:ln w="25400">
+            <a:solidFill>
+              <a:srgbClr val="C00000"/>
+            </a:solidFill>
+          </a:ln>
+        </p:spPr>
+        <p:style>
+          <a:lnRef idx="1">
+            <a:schemeClr val="accent1"/>
+          </a:lnRef>
+          <a:fillRef idx="0">
+            <a:schemeClr val="accent1"/>
+          </a:fillRef>
+          <a:effectRef idx="0">
+            <a:schemeClr val="accent1"/>
+          </a:effectRef>
+          <a:fontRef idx="minor">
+            <a:schemeClr val="tx1"/>
+          </a:fontRef>
+        </p:style>
+      </p:cxnSp>
+      <p:cxnSp>
+        <p:nvCxnSpPr>
+          <p:cNvPr id="14" name="Straight Connector 13">
+            <a:extLst>
+              <a:ext uri="{FF2B5EF4-FFF2-40B4-BE49-F238E27FC236}">
+                <a16:creationId xmlns:a16="http://schemas.microsoft.com/office/drawing/2014/main" id="{602B9C01-040A-49C9-8537-D123B15E4682}"/>
+              </a:ext>
+            </a:extLst>
+          </p:cNvPr>
+          <p:cNvCxnSpPr>
+            <a:cxnSpLocks/>
+          </p:cNvCxnSpPr>
+          <p:nvPr/>
+        </p:nvCxnSpPr>
+        <p:spPr>
+          <a:xfrm>
+            <a:off x="7147249" y="4406475"/>
+            <a:ext cx="1567543" cy="0"/>
+          </a:xfrm>
+          <a:prstGeom prst="line">
+            <a:avLst/>
+          </a:prstGeom>
+          <a:ln w="25400">
+            <a:solidFill>
+              <a:srgbClr val="C00000"/>
+            </a:solidFill>
+          </a:ln>
+        </p:spPr>
+        <p:style>
+          <a:lnRef idx="1">
+            <a:schemeClr val="accent1"/>
+          </a:lnRef>
+          <a:fillRef idx="0">
+            <a:schemeClr val="accent1"/>
+          </a:fillRef>
+          <a:effectRef idx="0">
+            <a:schemeClr val="accent1"/>
+          </a:effectRef>
+          <a:fontRef idx="minor">
+            <a:schemeClr val="tx1"/>
+          </a:fontRef>
+        </p:style>
+      </p:cxnSp>
+      <p:cxnSp>
+        <p:nvCxnSpPr>
+          <p:cNvPr id="16" name="Straight Connector 15">
+            <a:extLst>
+              <a:ext uri="{FF2B5EF4-FFF2-40B4-BE49-F238E27FC236}">
+                <a16:creationId xmlns:a16="http://schemas.microsoft.com/office/drawing/2014/main" id="{F3147CC1-CE12-4DD5-AD43-5570A0C0BDBD}"/>
+              </a:ext>
+            </a:extLst>
+          </p:cNvPr>
+          <p:cNvCxnSpPr>
+            <a:cxnSpLocks/>
+          </p:cNvCxnSpPr>
+          <p:nvPr/>
+        </p:nvCxnSpPr>
+        <p:spPr>
+          <a:xfrm>
+            <a:off x="5239981" y="2499919"/>
+            <a:ext cx="554329" cy="0"/>
+          </a:xfrm>
+          <a:prstGeom prst="line">
+            <a:avLst/>
+          </a:prstGeom>
+          <a:ln w="25400">
+            <a:solidFill>
+              <a:srgbClr val="002060"/>
+            </a:solidFill>
+          </a:ln>
+        </p:spPr>
+        <p:style>
+          <a:lnRef idx="1">
+            <a:schemeClr val="accent1"/>
+          </a:lnRef>
+          <a:fillRef idx="0">
+            <a:schemeClr val="accent1"/>
+          </a:fillRef>
+          <a:effectRef idx="0">
+            <a:schemeClr val="accent1"/>
+          </a:effectRef>
+          <a:fontRef idx="minor">
+            <a:schemeClr val="tx1"/>
+          </a:fontRef>
+        </p:style>
+      </p:cxnSp>
+      <p:cxnSp>
+        <p:nvCxnSpPr>
+          <p:cNvPr id="18" name="Straight Connector 17">
+            <a:extLst>
+              <a:ext uri="{FF2B5EF4-FFF2-40B4-BE49-F238E27FC236}">
+                <a16:creationId xmlns:a16="http://schemas.microsoft.com/office/drawing/2014/main" id="{9DE5F632-8318-46FD-B139-49078282F1CE}"/>
+              </a:ext>
+            </a:extLst>
+          </p:cNvPr>
+          <p:cNvCxnSpPr>
+            <a:cxnSpLocks/>
+          </p:cNvCxnSpPr>
+          <p:nvPr/>
+        </p:nvCxnSpPr>
+        <p:spPr>
+          <a:xfrm>
+            <a:off x="7128587" y="3062866"/>
+            <a:ext cx="1567543" cy="0"/>
+          </a:xfrm>
+          <a:prstGeom prst="line">
+            <a:avLst/>
+          </a:prstGeom>
+          <a:ln w="25400">
+            <a:solidFill>
+              <a:srgbClr val="002060"/>
+            </a:solidFill>
+          </a:ln>
+        </p:spPr>
+        <p:style>
+          <a:lnRef idx="1">
+            <a:schemeClr val="accent1"/>
+          </a:lnRef>
+          <a:fillRef idx="0">
+            <a:schemeClr val="accent1"/>
+          </a:fillRef>
+          <a:effectRef idx="0">
+            <a:schemeClr val="accent1"/>
+          </a:effectRef>
+          <a:fontRef idx="minor">
+            <a:schemeClr val="tx1"/>
+          </a:fontRef>
+        </p:style>
+      </p:cxnSp>
+      <p:cxnSp>
+        <p:nvCxnSpPr>
+          <p:cNvPr id="21" name="Straight Connector 20">
+            <a:extLst>
+              <a:ext uri="{FF2B5EF4-FFF2-40B4-BE49-F238E27FC236}">
+                <a16:creationId xmlns:a16="http://schemas.microsoft.com/office/drawing/2014/main" id="{1B352379-F038-41AC-A6D3-7CBC332FAE0C}"/>
+              </a:ext>
+            </a:extLst>
+          </p:cNvPr>
+          <p:cNvCxnSpPr>
+            <a:cxnSpLocks/>
+          </p:cNvCxnSpPr>
+          <p:nvPr/>
+        </p:nvCxnSpPr>
+        <p:spPr>
+          <a:xfrm>
+            <a:off x="3507598" y="2499919"/>
+            <a:ext cx="554329" cy="0"/>
+          </a:xfrm>
+          <a:prstGeom prst="line">
+            <a:avLst/>
+          </a:prstGeom>
+          <a:ln w="25400">
+            <a:solidFill>
+              <a:srgbClr val="7030A0"/>
+            </a:solidFill>
+          </a:ln>
+        </p:spPr>
+        <p:style>
+          <a:lnRef idx="1">
+            <a:schemeClr val="accent1"/>
+          </a:lnRef>
+          <a:fillRef idx="0">
+            <a:schemeClr val="accent1"/>
+          </a:fillRef>
+          <a:effectRef idx="0">
+            <a:schemeClr val="accent1"/>
+          </a:effectRef>
+          <a:fontRef idx="minor">
+            <a:schemeClr val="tx1"/>
+          </a:fontRef>
+        </p:style>
+      </p:cxnSp>
+      <p:cxnSp>
+        <p:nvCxnSpPr>
+          <p:cNvPr id="22" name="Straight Connector 21">
+            <a:extLst>
+              <a:ext uri="{FF2B5EF4-FFF2-40B4-BE49-F238E27FC236}">
+                <a16:creationId xmlns:a16="http://schemas.microsoft.com/office/drawing/2014/main" id="{0C9D14FC-EBEB-4B34-BAFE-7AF95BB6CFEA}"/>
+              </a:ext>
+            </a:extLst>
+          </p:cNvPr>
+          <p:cNvCxnSpPr>
+            <a:cxnSpLocks/>
+          </p:cNvCxnSpPr>
+          <p:nvPr/>
+        </p:nvCxnSpPr>
+        <p:spPr>
+          <a:xfrm>
+            <a:off x="7270945" y="4602417"/>
+            <a:ext cx="1434516" cy="0"/>
+          </a:xfrm>
+          <a:prstGeom prst="line">
+            <a:avLst/>
+          </a:prstGeom>
+          <a:ln w="25400">
+            <a:solidFill>
+              <a:srgbClr val="7030A0"/>
+            </a:solidFill>
+          </a:ln>
+        </p:spPr>
+        <p:style>
+          <a:lnRef idx="1">
+            <a:schemeClr val="accent1"/>
+          </a:lnRef>
+          <a:fillRef idx="0">
+            <a:schemeClr val="accent1"/>
+          </a:fillRef>
+          <a:effectRef idx="0">
+            <a:schemeClr val="accent1"/>
+          </a:effectRef>
+          <a:fontRef idx="minor">
+            <a:schemeClr val="tx1"/>
+          </a:fontRef>
+        </p:style>
+      </p:cxnSp>
+      <p:cxnSp>
+        <p:nvCxnSpPr>
+          <p:cNvPr id="24" name="Straight Connector 23">
+            <a:extLst>
+              <a:ext uri="{FF2B5EF4-FFF2-40B4-BE49-F238E27FC236}">
+                <a16:creationId xmlns:a16="http://schemas.microsoft.com/office/drawing/2014/main" id="{33E12B18-7A3D-4747-B277-534DE79163B5}"/>
+              </a:ext>
+            </a:extLst>
+          </p:cNvPr>
+          <p:cNvCxnSpPr>
+            <a:cxnSpLocks/>
+          </p:cNvCxnSpPr>
+          <p:nvPr/>
+        </p:nvCxnSpPr>
+        <p:spPr>
+          <a:xfrm>
+            <a:off x="4518414" y="2499919"/>
+            <a:ext cx="554329" cy="0"/>
+          </a:xfrm>
+          <a:prstGeom prst="line">
+            <a:avLst/>
+          </a:prstGeom>
+          <a:ln w="25400">
+            <a:solidFill>
+              <a:srgbClr val="FFC000"/>
+            </a:solidFill>
+          </a:ln>
+        </p:spPr>
+        <p:style>
+          <a:lnRef idx="1">
+            <a:schemeClr val="accent1"/>
+          </a:lnRef>
+          <a:fillRef idx="0">
+            <a:schemeClr val="accent1"/>
+          </a:fillRef>
+          <a:effectRef idx="0">
+            <a:schemeClr val="accent1"/>
+          </a:effectRef>
+          <a:fontRef idx="minor">
+            <a:schemeClr val="tx1"/>
+          </a:fontRef>
+        </p:style>
+      </p:cxnSp>
+      <p:cxnSp>
+        <p:nvCxnSpPr>
+          <p:cNvPr id="25" name="Straight Connector 24">
+            <a:extLst>
+              <a:ext uri="{FF2B5EF4-FFF2-40B4-BE49-F238E27FC236}">
+                <a16:creationId xmlns:a16="http://schemas.microsoft.com/office/drawing/2014/main" id="{E08143CA-1BD4-439C-9892-20C8A7D74103}"/>
+              </a:ext>
+            </a:extLst>
+          </p:cNvPr>
+          <p:cNvCxnSpPr>
+            <a:cxnSpLocks/>
+          </p:cNvCxnSpPr>
+          <p:nvPr/>
+        </p:nvCxnSpPr>
+        <p:spPr>
+          <a:xfrm>
+            <a:off x="7270945" y="4966311"/>
+            <a:ext cx="1443847" cy="0"/>
+          </a:xfrm>
+          <a:prstGeom prst="line">
+            <a:avLst/>
+          </a:prstGeom>
+          <a:ln w="25400">
+            <a:solidFill>
+              <a:srgbClr val="FFC000"/>
+            </a:solidFill>
+          </a:ln>
+        </p:spPr>
+        <p:style>
+          <a:lnRef idx="1">
+            <a:schemeClr val="accent1"/>
+          </a:lnRef>
+          <a:fillRef idx="0">
+            <a:schemeClr val="accent1"/>
+          </a:fillRef>
+          <a:effectRef idx="0">
+            <a:schemeClr val="accent1"/>
+          </a:effectRef>
+          <a:fontRef idx="minor">
+            <a:schemeClr val="tx1"/>
+          </a:fontRef>
+        </p:style>
+      </p:cxnSp>
+      <p:sp>
+        <p:nvSpPr>
+          <p:cNvPr id="29" name="TextBox 28">
+            <a:extLst>
+              <a:ext uri="{FF2B5EF4-FFF2-40B4-BE49-F238E27FC236}">
+                <a16:creationId xmlns:a16="http://schemas.microsoft.com/office/drawing/2014/main" id="{56D8D263-5469-4E20-A6FE-475C41264ACA}"/>
+              </a:ext>
+            </a:extLst>
+          </p:cNvPr>
+          <p:cNvSpPr txBox="1"/>
+          <p:nvPr/>
+        </p:nvSpPr>
+        <p:spPr>
+          <a:xfrm>
+            <a:off x="7335106" y="5396141"/>
+            <a:ext cx="3546805" cy="353943"/>
+          </a:xfrm>
+          <a:prstGeom prst="rect">
+            <a:avLst/>
+          </a:prstGeom>
+          <a:noFill/>
+        </p:spPr>
+        <p:txBody>
+          <a:bodyPr wrap="none" rtlCol="0">
+            <a:spAutoFit/>
+          </a:bodyPr>
+          <a:lstStyle/>
+          <a:p>
+            <a:r>
+              <a:rPr lang="en-US" sz="1700" i="1" dirty="0"/>
+              <a:t>Working Set = WS Private + WS Shared</a:t>
+            </a:r>
+          </a:p>
+        </p:txBody>
+      </p:sp>
     </p:spTree>
     <p:extLst>
       <p:ext uri="{BB962C8B-B14F-4D97-AF65-F5344CB8AC3E}">
-        <p14:creationId xmlns:p14="http://schemas.microsoft.com/office/powerpoint/2010/main" val="232081551"/>
+        <p14:creationId xmlns:p14="http://schemas.microsoft.com/office/powerpoint/2010/main" val="1532401657"/>
       </p:ext>
     </p:extLst>
   </p:cSld>
@@ -10329,49 +11248,6 @@
       </p:grpSpPr>
       <p:sp>
         <p:nvSpPr>
-          <p:cNvPr id="6" name="TextBox 5">
-            <a:extLst>
-              <a:ext uri="{FF2B5EF4-FFF2-40B4-BE49-F238E27FC236}">
-                <a16:creationId xmlns:a16="http://schemas.microsoft.com/office/drawing/2014/main" id="{46480F8A-F9F7-45EF-BDC9-17A948074BE7}"/>
-              </a:ext>
-            </a:extLst>
-          </p:cNvPr>
-          <p:cNvSpPr txBox="1"/>
-          <p:nvPr/>
-        </p:nvSpPr>
-        <p:spPr>
-          <a:xfrm>
-            <a:off x="3875740" y="1057411"/>
-            <a:ext cx="5344989" cy="369332"/>
-          </a:xfrm>
-          <a:prstGeom prst="rect">
-            <a:avLst/>
-          </a:prstGeom>
-          <a:noFill/>
-        </p:spPr>
-        <p:txBody>
-          <a:bodyPr wrap="none" rtlCol="0">
-            <a:spAutoFit/>
-          </a:bodyPr>
-          <a:lstStyle/>
-          <a:p>
-            <a:r>
-              <a:rPr lang="en-US" dirty="0"/>
-              <a:t>Open </a:t>
-            </a:r>
-            <a:r>
-              <a:rPr lang="en-US" i="1" dirty="0" err="1"/>
-              <a:t>VMMap</a:t>
-            </a:r>
-            <a:r>
-              <a:rPr lang="en-US" dirty="0"/>
-              <a:t> and have a look of application structure</a:t>
-            </a:r>
-          </a:p>
-        </p:txBody>
-      </p:sp>
-      <p:sp>
-        <p:nvSpPr>
           <p:cNvPr id="7" name="TextBox 6">
             <a:extLst>
               <a:ext uri="{FF2B5EF4-FFF2-40B4-BE49-F238E27FC236}">
@@ -10384,8 +11260,8 @@
         </p:nvSpPr>
         <p:spPr>
           <a:xfrm>
-            <a:off x="2398713" y="5861251"/>
-            <a:ext cx="9186483" cy="923330"/>
+            <a:off x="2490992" y="5885981"/>
+            <a:ext cx="9454932" cy="923330"/>
           </a:xfrm>
           <a:prstGeom prst="rect">
             <a:avLst/>
@@ -10432,88 +11308,6 @@
             <a:r>
               <a:rPr lang="en-US" dirty="0"/>
               <a:t> Administrator’s Reference. Pages 216-218</a:t>
-            </a:r>
-          </a:p>
-        </p:txBody>
-      </p:sp>
-      <p:sp>
-        <p:nvSpPr>
-          <p:cNvPr id="9" name="TextBox 8">
-            <a:extLst>
-              <a:ext uri="{FF2B5EF4-FFF2-40B4-BE49-F238E27FC236}">
-                <a16:creationId xmlns:a16="http://schemas.microsoft.com/office/drawing/2014/main" id="{F978C187-759F-480D-BEE2-6DB4E7EF2C30}"/>
-              </a:ext>
-            </a:extLst>
-          </p:cNvPr>
-          <p:cNvSpPr txBox="1"/>
-          <p:nvPr/>
-        </p:nvSpPr>
-        <p:spPr>
-          <a:xfrm>
-            <a:off x="8640052" y="1557676"/>
-            <a:ext cx="2862971" cy="3416320"/>
-          </a:xfrm>
-          <a:prstGeom prst="rect">
-            <a:avLst/>
-          </a:prstGeom>
-          <a:noFill/>
-        </p:spPr>
-        <p:txBody>
-          <a:bodyPr wrap="square" rtlCol="0">
-            <a:spAutoFit/>
-          </a:bodyPr>
-          <a:lstStyle/>
-          <a:p>
-            <a:r>
-              <a:rPr lang="en-US" dirty="0"/>
-              <a:t>Columns:</a:t>
-            </a:r>
-          </a:p>
-          <a:p>
-            <a:endParaRPr lang="en-US" dirty="0"/>
-          </a:p>
-          <a:p>
-            <a:pPr marL="285750" indent="-285750">
-              <a:buFont typeface="Arial" panose="020B0604020202020204" pitchFamily="34" charset="0"/>
-              <a:buChar char="•"/>
-            </a:pPr>
-            <a:r>
-              <a:rPr lang="en-US" dirty="0"/>
-              <a:t>Image – memory represents an executable files: EXE or DLL </a:t>
-            </a:r>
-          </a:p>
-          <a:p>
-            <a:pPr marL="285750" indent="-285750">
-              <a:buFont typeface="Arial" panose="020B0604020202020204" pitchFamily="34" charset="0"/>
-              <a:buChar char="•"/>
-            </a:pPr>
-            <a:endParaRPr lang="en-US" dirty="0"/>
-          </a:p>
-          <a:p>
-            <a:pPr marL="285750" indent="-285750">
-              <a:buFont typeface="Arial" panose="020B0604020202020204" pitchFamily="34" charset="0"/>
-              <a:buChar char="•"/>
-            </a:pPr>
-            <a:r>
-              <a:rPr lang="en-US" dirty="0"/>
-              <a:t>Heap – memory allocated C/C++ runtime</a:t>
-            </a:r>
-          </a:p>
-          <a:p>
-            <a:pPr marL="285750" indent="-285750">
-              <a:buFont typeface="Arial" panose="020B0604020202020204" pitchFamily="34" charset="0"/>
-              <a:buChar char="•"/>
-            </a:pPr>
-            <a:endParaRPr lang="en-US" dirty="0"/>
-          </a:p>
-          <a:p>
-            <a:pPr marL="285750" indent="-285750">
-              <a:buFont typeface="Arial" panose="020B0604020202020204" pitchFamily="34" charset="0"/>
-              <a:buChar char="•"/>
-            </a:pPr>
-            <a:r>
-              <a:rPr lang="en-US" dirty="0"/>
-              <a:t>Managed Heap - memory allocated .NET runtime **</a:t>
             </a:r>
           </a:p>
         </p:txBody>
@@ -10567,7 +11361,7 @@
         <p:spPr>
           <a:xfrm>
             <a:off x="1484311" y="165965"/>
-            <a:ext cx="10018712" cy="923331"/>
+            <a:ext cx="10018712" cy="760513"/>
           </a:xfrm>
         </p:spPr>
         <p:txBody>
@@ -10585,17 +11379,22 @@
             </a:br>
             <a:r>
               <a:rPr lang="en-US" sz="2400" dirty="0"/>
-              <a:t>Memory types</a:t>
-            </a:r>
+              <a:t>Welcome to </a:t>
+            </a:r>
+            <a:r>
+              <a:rPr lang="en-US" sz="2400" dirty="0" err="1"/>
+              <a:t>VMMap</a:t>
+            </a:r>
+            <a:endParaRPr lang="en-US" sz="2400" dirty="0"/>
           </a:p>
         </p:txBody>
       </p:sp>
       <p:pic>
         <p:nvPicPr>
-          <p:cNvPr id="5" name="Picture 4">
+          <p:cNvPr id="3" name="Picture 2">
             <a:extLst>
               <a:ext uri="{FF2B5EF4-FFF2-40B4-BE49-F238E27FC236}">
-                <a16:creationId xmlns:a16="http://schemas.microsoft.com/office/drawing/2014/main" id="{4AF94455-CBDA-4BA6-86D1-7704D41AE2AC}"/>
+                <a16:creationId xmlns:a16="http://schemas.microsoft.com/office/drawing/2014/main" id="{E780CFF4-571F-4028-8121-1F7574D0632B}"/>
               </a:ext>
             </a:extLst>
           </p:cNvPr>
@@ -10612,8 +11411,8 @@
         </p:blipFill>
         <p:spPr>
           <a:xfrm>
-            <a:off x="1037817" y="1557676"/>
-            <a:ext cx="7443984" cy="3967578"/>
+            <a:off x="2490992" y="1004977"/>
+            <a:ext cx="8278634" cy="4881004"/>
           </a:xfrm>
           <a:prstGeom prst="rect">
             <a:avLst/>
@@ -10623,7 +11422,7 @@
     </p:spTree>
     <p:extLst>
       <p:ext uri="{BB962C8B-B14F-4D97-AF65-F5344CB8AC3E}">
-        <p14:creationId xmlns:p14="http://schemas.microsoft.com/office/powerpoint/2010/main" val="808391843"/>
+        <p14:creationId xmlns:p14="http://schemas.microsoft.com/office/powerpoint/2010/main" val="232081551"/>
       </p:ext>
     </p:extLst>
   </p:cSld>
@@ -10652,10 +11451,10 @@
       </p:grpSpPr>
       <p:sp>
         <p:nvSpPr>
-          <p:cNvPr id="6" name="TextBox 5">
+          <p:cNvPr id="7" name="TextBox 6">
             <a:extLst>
               <a:ext uri="{FF2B5EF4-FFF2-40B4-BE49-F238E27FC236}">
-                <a16:creationId xmlns:a16="http://schemas.microsoft.com/office/drawing/2014/main" id="{46480F8A-F9F7-45EF-BDC9-17A948074BE7}"/>
+                <a16:creationId xmlns:a16="http://schemas.microsoft.com/office/drawing/2014/main" id="{32D12F80-292D-43B5-BCC6-2424A08800E9}"/>
               </a:ext>
             </a:extLst>
           </p:cNvPr>
@@ -10664,8 +11463,8 @@
         </p:nvSpPr>
         <p:spPr>
           <a:xfrm>
-            <a:off x="3875740" y="1057411"/>
-            <a:ext cx="5344989" cy="369332"/>
+            <a:off x="2490992" y="5885981"/>
+            <a:ext cx="9454932" cy="923330"/>
           </a:xfrm>
           <a:prstGeom prst="rect">
             <a:avLst/>
@@ -10673,22 +11472,45 @@
           <a:noFill/>
         </p:spPr>
         <p:txBody>
-          <a:bodyPr wrap="none" rtlCol="0">
+          <a:bodyPr wrap="square" rtlCol="0">
             <a:spAutoFit/>
           </a:bodyPr>
           <a:lstStyle/>
           <a:p>
             <a:r>
               <a:rPr lang="en-US" dirty="0"/>
-              <a:t>Open </a:t>
-            </a:r>
-            <a:r>
-              <a:rPr lang="en-US" i="1" dirty="0" err="1"/>
-              <a:t>VMMap</a:t>
-            </a:r>
+              <a:t>See also: </a:t>
+            </a:r>
+          </a:p>
+          <a:p>
+            <a:pPr marL="285750" indent="-285750">
+              <a:buFont typeface="Arial" panose="020B0604020202020204" pitchFamily="34" charset="0"/>
+              <a:buChar char="•"/>
+            </a:pPr>
+            <a:r>
+              <a:rPr lang="en-US" dirty="0">
+                <a:hlinkClick r:id="rId2"/>
+              </a:rPr>
+              <a:t>http://blogs.microsoft.co.il/sasha/2016/01/05/windows-process-memory-usage-demystified/</a:t>
+            </a:r>
+            <a:endParaRPr lang="en-US" dirty="0"/>
+          </a:p>
+          <a:p>
+            <a:pPr marL="285750" indent="-285750">
+              <a:buFont typeface="Arial" panose="020B0604020202020204" pitchFamily="34" charset="0"/>
+              <a:buChar char="•"/>
+            </a:pPr>
             <a:r>
               <a:rPr lang="en-US" dirty="0"/>
-              <a:t> and have a look of application structure</a:t>
+              <a:t>Windows® </a:t>
+            </a:r>
+            <a:r>
+              <a:rPr lang="en-US" dirty="0" err="1"/>
+              <a:t>Sysinternals</a:t>
+            </a:r>
+            <a:r>
+              <a:rPr lang="en-US" dirty="0"/>
+              <a:t> Administrator’s Reference. Pages 216-218</a:t>
             </a:r>
           </a:p>
         </p:txBody>
@@ -10742,7 +11564,7 @@
         <p:spPr>
           <a:xfrm>
             <a:off x="1484311" y="165965"/>
-            <a:ext cx="10018712" cy="923331"/>
+            <a:ext cx="10018712" cy="760513"/>
           </a:xfrm>
         </p:spPr>
         <p:txBody>
@@ -10765,69 +11587,12 @@
           </a:p>
         </p:txBody>
       </p:sp>
-      <p:sp>
-        <p:nvSpPr>
-          <p:cNvPr id="11" name="TextBox 10">
+      <p:pic>
+        <p:nvPicPr>
+          <p:cNvPr id="5" name="Picture 4">
             <a:extLst>
               <a:ext uri="{FF2B5EF4-FFF2-40B4-BE49-F238E27FC236}">
-                <a16:creationId xmlns:a16="http://schemas.microsoft.com/office/drawing/2014/main" id="{B4AB1192-740A-4D97-9E58-807554BC8C71}"/>
-              </a:ext>
-            </a:extLst>
-          </p:cNvPr>
-          <p:cNvSpPr txBox="1"/>
-          <p:nvPr/>
-        </p:nvSpPr>
-        <p:spPr>
-          <a:xfrm>
-            <a:off x="8196045" y="1682413"/>
-            <a:ext cx="3383559" cy="1323439"/>
-          </a:xfrm>
-          <a:prstGeom prst="rect">
-            <a:avLst/>
-          </a:prstGeom>
-          <a:noFill/>
-        </p:spPr>
-        <p:txBody>
-          <a:bodyPr wrap="square" rtlCol="0">
-            <a:spAutoFit/>
-          </a:bodyPr>
-          <a:lstStyle/>
-          <a:p>
-            <a:r>
-              <a:rPr lang="en-US" sz="1600" dirty="0"/>
-              <a:t>Remarks</a:t>
-            </a:r>
-            <a:br>
-              <a:rPr lang="en-US" sz="1600" dirty="0"/>
-            </a:br>
-            <a:r>
-              <a:rPr lang="en-US" sz="1600" dirty="0"/>
-              <a:t> </a:t>
-            </a:r>
-            <a:endParaRPr lang="en-US" sz="1600" i="1" dirty="0"/>
-          </a:p>
-          <a:p>
-            <a:pPr marL="285750" indent="-285750">
-              <a:buFont typeface="Arial" panose="020B0604020202020204" pitchFamily="34" charset="0"/>
-              <a:buChar char="•"/>
-            </a:pPr>
-            <a:r>
-              <a:rPr lang="en-US" sz="1600" i="1" dirty="0"/>
-              <a:t> </a:t>
-            </a:r>
-            <a:r>
-              <a:rPr lang="en-US" sz="1600" dirty="0"/>
-              <a:t>JIT code included in Managed Heap, you can calculate them size as Managed Heap minus GC</a:t>
-            </a:r>
-          </a:p>
-        </p:txBody>
-      </p:sp>
-      <p:pic>
-        <p:nvPicPr>
-          <p:cNvPr id="3" name="Picture 2">
-            <a:extLst>
-              <a:ext uri="{FF2B5EF4-FFF2-40B4-BE49-F238E27FC236}">
-                <a16:creationId xmlns:a16="http://schemas.microsoft.com/office/drawing/2014/main" id="{D4B41B64-6621-486B-A528-7386D8FA4796}"/>
+                <a16:creationId xmlns:a16="http://schemas.microsoft.com/office/drawing/2014/main" id="{CC593C1B-37AD-4106-A293-7476DA67BD33}"/>
               </a:ext>
             </a:extLst>
           </p:cNvPr>
@@ -10837,25 +11602,187 @@
           <p:nvPr/>
         </p:nvPicPr>
         <p:blipFill>
-          <a:blip r:embed="rId2"/>
+          <a:blip r:embed="rId3"/>
           <a:stretch>
             <a:fillRect/>
           </a:stretch>
         </p:blipFill>
         <p:spPr>
           <a:xfrm>
-            <a:off x="855676" y="1664697"/>
-            <a:ext cx="7047316" cy="4384996"/>
+            <a:off x="246076" y="1317491"/>
+            <a:ext cx="11698948" cy="3323907"/>
           </a:xfrm>
           <a:prstGeom prst="rect">
             <a:avLst/>
           </a:prstGeom>
         </p:spPr>
       </p:pic>
+      <p:sp>
+        <p:nvSpPr>
+          <p:cNvPr id="8" name="Rectangle 7">
+            <a:extLst>
+              <a:ext uri="{FF2B5EF4-FFF2-40B4-BE49-F238E27FC236}">
+                <a16:creationId xmlns:a16="http://schemas.microsoft.com/office/drawing/2014/main" id="{E5BB2895-638F-4A20-A84F-14DAF863E3E8}"/>
+              </a:ext>
+            </a:extLst>
+          </p:cNvPr>
+          <p:cNvSpPr/>
+          <p:nvPr/>
+        </p:nvSpPr>
+        <p:spPr>
+          <a:xfrm>
+            <a:off x="245176" y="1331745"/>
+            <a:ext cx="11698948" cy="1235286"/>
+          </a:xfrm>
+          <a:prstGeom prst="rect">
+            <a:avLst/>
+          </a:prstGeom>
+          <a:noFill/>
+          <a:ln w="25400">
+            <a:solidFill>
+              <a:schemeClr val="accent2">
+                <a:lumMod val="75000"/>
+              </a:schemeClr>
+            </a:solidFill>
+          </a:ln>
+        </p:spPr>
+        <p:style>
+          <a:lnRef idx="2">
+            <a:schemeClr val="accent1">
+              <a:shade val="50000"/>
+            </a:schemeClr>
+          </a:lnRef>
+          <a:fillRef idx="1">
+            <a:schemeClr val="accent1"/>
+          </a:fillRef>
+          <a:effectRef idx="0">
+            <a:schemeClr val="accent1"/>
+          </a:effectRef>
+          <a:fontRef idx="minor">
+            <a:schemeClr val="lt1"/>
+          </a:fontRef>
+        </p:style>
+        <p:txBody>
+          <a:bodyPr rtlCol="0" anchor="ctr"/>
+          <a:lstStyle/>
+          <a:p>
+            <a:pPr algn="ctr"/>
+            <a:endParaRPr lang="en-US"/>
+          </a:p>
+        </p:txBody>
+      </p:sp>
+      <p:sp>
+        <p:nvSpPr>
+          <p:cNvPr id="9" name="Rectangle 8">
+            <a:extLst>
+              <a:ext uri="{FF2B5EF4-FFF2-40B4-BE49-F238E27FC236}">
+                <a16:creationId xmlns:a16="http://schemas.microsoft.com/office/drawing/2014/main" id="{9E818132-6DC8-4F4D-8C7E-16CBF935E917}"/>
+              </a:ext>
+            </a:extLst>
+          </p:cNvPr>
+          <p:cNvSpPr/>
+          <p:nvPr/>
+        </p:nvSpPr>
+        <p:spPr>
+          <a:xfrm>
+            <a:off x="245176" y="2700650"/>
+            <a:ext cx="962839" cy="1590320"/>
+          </a:xfrm>
+          <a:prstGeom prst="rect">
+            <a:avLst/>
+          </a:prstGeom>
+          <a:noFill/>
+          <a:ln w="25400">
+            <a:solidFill>
+              <a:schemeClr val="accent2">
+                <a:lumMod val="75000"/>
+              </a:schemeClr>
+            </a:solidFill>
+          </a:ln>
+        </p:spPr>
+        <p:style>
+          <a:lnRef idx="2">
+            <a:schemeClr val="accent1">
+              <a:shade val="50000"/>
+            </a:schemeClr>
+          </a:lnRef>
+          <a:fillRef idx="1">
+            <a:schemeClr val="accent1"/>
+          </a:fillRef>
+          <a:effectRef idx="0">
+            <a:schemeClr val="accent1"/>
+          </a:effectRef>
+          <a:fontRef idx="minor">
+            <a:schemeClr val="lt1"/>
+          </a:fontRef>
+        </p:style>
+        <p:txBody>
+          <a:bodyPr rtlCol="0" anchor="ctr"/>
+          <a:lstStyle/>
+          <a:p>
+            <a:pPr algn="ctr"/>
+            <a:endParaRPr lang="en-US"/>
+          </a:p>
+        </p:txBody>
+      </p:sp>
+      <p:sp>
+        <p:nvSpPr>
+          <p:cNvPr id="11" name="Rectangle 10">
+            <a:extLst>
+              <a:ext uri="{FF2B5EF4-FFF2-40B4-BE49-F238E27FC236}">
+                <a16:creationId xmlns:a16="http://schemas.microsoft.com/office/drawing/2014/main" id="{70667202-1B31-464A-A971-6E84305A32B4}"/>
+              </a:ext>
+            </a:extLst>
+          </p:cNvPr>
+          <p:cNvSpPr/>
+          <p:nvPr/>
+        </p:nvSpPr>
+        <p:spPr>
+          <a:xfrm>
+            <a:off x="4531915" y="2668325"/>
+            <a:ext cx="3806742" cy="1622645"/>
+          </a:xfrm>
+          <a:prstGeom prst="rect">
+            <a:avLst/>
+          </a:prstGeom>
+          <a:noFill/>
+          <a:ln w="25400">
+            <a:solidFill>
+              <a:schemeClr val="accent2">
+                <a:lumMod val="75000"/>
+              </a:schemeClr>
+            </a:solidFill>
+          </a:ln>
+        </p:spPr>
+        <p:style>
+          <a:lnRef idx="2">
+            <a:schemeClr val="accent1">
+              <a:shade val="50000"/>
+            </a:schemeClr>
+          </a:lnRef>
+          <a:fillRef idx="1">
+            <a:schemeClr val="accent1"/>
+          </a:fillRef>
+          <a:effectRef idx="0">
+            <a:schemeClr val="accent1"/>
+          </a:effectRef>
+          <a:fontRef idx="minor">
+            <a:schemeClr val="lt1"/>
+          </a:fontRef>
+        </p:style>
+        <p:txBody>
+          <a:bodyPr rtlCol="0" anchor="ctr"/>
+          <a:lstStyle/>
+          <a:p>
+            <a:pPr algn="ctr"/>
+            <a:endParaRPr lang="en-US"/>
+          </a:p>
+        </p:txBody>
+      </p:sp>
     </p:spTree>
     <p:extLst>
       <p:ext uri="{BB962C8B-B14F-4D97-AF65-F5344CB8AC3E}">
-        <p14:creationId xmlns:p14="http://schemas.microsoft.com/office/powerpoint/2010/main" val="3451108813"/>
+        <p14:creationId xmlns:p14="http://schemas.microsoft.com/office/powerpoint/2010/main" val="4225087958"/>
       </p:ext>
     </p:extLst>
   </p:cSld>
@@ -10884,10 +11811,10 @@
       </p:grpSpPr>
       <p:sp>
         <p:nvSpPr>
-          <p:cNvPr id="2" name="Title 1">
+          <p:cNvPr id="4" name="Slide Number Placeholder 3">
             <a:extLst>
               <a:ext uri="{FF2B5EF4-FFF2-40B4-BE49-F238E27FC236}">
-                <a16:creationId xmlns:a16="http://schemas.microsoft.com/office/drawing/2014/main" id="{7D51D6EA-8DA9-4D34-A010-29BD2BA54FF6}"/>
+                <a16:creationId xmlns:a16="http://schemas.microsoft.com/office/drawing/2014/main" id="{AAB1DB65-03D9-4F67-9534-E6E8E0195CB1}"/>
               </a:ext>
             </a:extLst>
           </p:cNvPr>
@@ -10895,13 +11822,43 @@
             <a:spLocks noGrp="1"/>
           </p:cNvSpPr>
           <p:nvPr>
+            <p:ph type="sldNum" sz="quarter" idx="12"/>
+          </p:nvPr>
+        </p:nvSpPr>
+        <p:spPr/>
+        <p:txBody>
+          <a:bodyPr/>
+          <a:lstStyle/>
+          <a:p>
+            <a:fld id="{D57F1E4F-1CFF-5643-939E-217C01CDF565}" type="slidenum">
+              <a:rPr lang="en-US" sz="1400" smtClean="0"/>
+              <a:pPr/>
+              <a:t>9</a:t>
+            </a:fld>
+            <a:endParaRPr lang="en-US" sz="1400" dirty="0"/>
+          </a:p>
+        </p:txBody>
+      </p:sp>
+      <p:sp>
+        <p:nvSpPr>
+          <p:cNvPr id="10" name="Title 1">
+            <a:extLst>
+              <a:ext uri="{FF2B5EF4-FFF2-40B4-BE49-F238E27FC236}">
+                <a16:creationId xmlns:a16="http://schemas.microsoft.com/office/drawing/2014/main" id="{90A2D1D6-DEA9-4257-9B34-0A6DEABF966C}"/>
+              </a:ext>
+            </a:extLst>
+          </p:cNvPr>
+          <p:cNvSpPr>
+            <a:spLocks noGrp="1"/>
+          </p:cNvSpPr>
+          <p:nvPr>
             <p:ph type="title"/>
           </p:nvPr>
         </p:nvSpPr>
         <p:spPr>
           <a:xfrm>
-            <a:off x="1484310" y="327661"/>
-            <a:ext cx="10018713" cy="1516380"/>
+            <a:off x="1484311" y="165965"/>
+            <a:ext cx="10018712" cy="923331"/>
           </a:xfrm>
         </p:spPr>
         <p:txBody>
@@ -10911,25 +11868,25 @@
           <a:lstStyle/>
           <a:p>
             <a:r>
-              <a:rPr lang="en-US" dirty="0"/>
-              <a:t>Sharing assemblies between application domains </a:t>
+              <a:rPr lang="en-US" sz="3600" dirty="0"/>
+              <a:t>What do you really mean by memory?</a:t>
             </a:r>
             <a:br>
-              <a:rPr lang="en-US" dirty="0"/>
+              <a:rPr lang="en-US" sz="3600" dirty="0"/>
             </a:br>
             <a:r>
               <a:rPr lang="en-US" sz="2400" dirty="0"/>
-              <a:t>Concept domain neutral assembly</a:t>
-            </a:r>
-          </a:p>
-        </p:txBody>
-      </p:sp>
-      <p:sp>
-        <p:nvSpPr>
-          <p:cNvPr id="4" name="TextBox 3">
+              <a:t>Memory types</a:t>
+            </a:r>
+          </a:p>
+        </p:txBody>
+      </p:sp>
+      <p:sp>
+        <p:nvSpPr>
+          <p:cNvPr id="11" name="TextBox 10">
             <a:extLst>
               <a:ext uri="{FF2B5EF4-FFF2-40B4-BE49-F238E27FC236}">
-                <a16:creationId xmlns:a16="http://schemas.microsoft.com/office/drawing/2014/main" id="{D43CA325-A2AD-49DA-B300-517C652E6F72}"/>
+                <a16:creationId xmlns:a16="http://schemas.microsoft.com/office/drawing/2014/main" id="{B4AB1192-740A-4D97-9E58-807554BC8C71}"/>
               </a:ext>
             </a:extLst>
           </p:cNvPr>
@@ -10938,8 +11895,8 @@
         </p:nvSpPr>
         <p:spPr>
           <a:xfrm>
-            <a:off x="5353050" y="1874520"/>
-            <a:ext cx="6149973" cy="646331"/>
+            <a:off x="2021747" y="6232256"/>
+            <a:ext cx="8422547" cy="584775"/>
           </a:xfrm>
           <a:prstGeom prst="rect">
             <a:avLst/>
@@ -10953,18 +11910,33 @@
           <a:lstStyle/>
           <a:p>
             <a:r>
-              <a:rPr lang="en-US" dirty="0"/>
-              <a:t>Open process explorer and find our application, after open tab .NET assemblies</a:t>
+              <a:rPr lang="en-US" sz="1600" dirty="0"/>
+              <a:t>Remarks</a:t>
+            </a:r>
+            <a:br>
+              <a:rPr lang="en-US" sz="1600" dirty="0"/>
+            </a:br>
+            <a:r>
+              <a:rPr lang="en-US" sz="1600" dirty="0"/>
+              <a:t> </a:t>
+            </a:r>
+            <a:r>
+              <a:rPr lang="en-US" sz="1600" i="1" dirty="0"/>
+              <a:t> </a:t>
+            </a:r>
+            <a:r>
+              <a:rPr lang="en-US" sz="1600" dirty="0"/>
+              <a:t>JIT code included in Managed Heap, you can calculate them size as Managed Heap minus GC</a:t>
             </a:r>
           </a:p>
         </p:txBody>
       </p:sp>
       <p:pic>
         <p:nvPicPr>
-          <p:cNvPr id="6" name="Picture 5">
+          <p:cNvPr id="3" name="Picture 2">
             <a:extLst>
               <a:ext uri="{FF2B5EF4-FFF2-40B4-BE49-F238E27FC236}">
-                <a16:creationId xmlns:a16="http://schemas.microsoft.com/office/drawing/2014/main" id="{7F30EEAC-5E30-42BA-B2E3-70B7775ACED8}"/>
+                <a16:creationId xmlns:a16="http://schemas.microsoft.com/office/drawing/2014/main" id="{D4B41B64-6621-486B-A528-7386D8FA4796}"/>
               </a:ext>
             </a:extLst>
           </p:cNvPr>
@@ -10974,288 +11946,25 @@
           <p:nvPr/>
         </p:nvPicPr>
         <p:blipFill>
-          <a:blip r:embed="rId3"/>
+          <a:blip r:embed="rId2"/>
           <a:stretch>
             <a:fillRect/>
           </a:stretch>
         </p:blipFill>
         <p:spPr>
           <a:xfrm>
-            <a:off x="561260" y="1703070"/>
-            <a:ext cx="4401264" cy="4785790"/>
+            <a:off x="2072080" y="1071748"/>
+            <a:ext cx="8321879" cy="5178057"/>
           </a:xfrm>
           <a:prstGeom prst="rect">
             <a:avLst/>
           </a:prstGeom>
         </p:spPr>
       </p:pic>
-      <p:sp>
-        <p:nvSpPr>
-          <p:cNvPr id="7" name="TextBox 6">
-            <a:extLst>
-              <a:ext uri="{FF2B5EF4-FFF2-40B4-BE49-F238E27FC236}">
-                <a16:creationId xmlns:a16="http://schemas.microsoft.com/office/drawing/2014/main" id="{AA30EB06-545E-4BF2-A9FC-75BE32F1FCA5}"/>
-              </a:ext>
-            </a:extLst>
-          </p:cNvPr>
-          <p:cNvSpPr txBox="1"/>
-          <p:nvPr/>
-        </p:nvSpPr>
-        <p:spPr>
-          <a:xfrm>
-            <a:off x="5353050" y="5804429"/>
-            <a:ext cx="6540498" cy="923330"/>
-          </a:xfrm>
-          <a:prstGeom prst="rect">
-            <a:avLst/>
-          </a:prstGeom>
-          <a:noFill/>
-        </p:spPr>
-        <p:txBody>
-          <a:bodyPr wrap="square" rtlCol="0">
-            <a:spAutoFit/>
-          </a:bodyPr>
-          <a:lstStyle/>
-          <a:p>
-            <a:r>
-              <a:rPr lang="en-US" dirty="0"/>
-              <a:t>See also:</a:t>
-            </a:r>
-          </a:p>
-          <a:p>
-            <a:r>
-              <a:rPr lang="en-US" dirty="0">
-                <a:hlinkClick r:id="rId4"/>
-              </a:rPr>
-              <a:t>https://blogs.msdn.microsoft.com/junfeng/2004/08/05/domain-neutral-assemblies/</a:t>
-            </a:r>
-            <a:endParaRPr lang="en-US" dirty="0"/>
-          </a:p>
-        </p:txBody>
-      </p:sp>
-      <p:sp>
-        <p:nvSpPr>
-          <p:cNvPr id="11" name="TextBox 10">
-            <a:extLst>
-              <a:ext uri="{FF2B5EF4-FFF2-40B4-BE49-F238E27FC236}">
-                <a16:creationId xmlns:a16="http://schemas.microsoft.com/office/drawing/2014/main" id="{AD189ED0-5411-4447-873B-FFBF6931C62D}"/>
-              </a:ext>
-            </a:extLst>
-          </p:cNvPr>
-          <p:cNvSpPr txBox="1"/>
-          <p:nvPr/>
-        </p:nvSpPr>
-        <p:spPr>
-          <a:xfrm>
-            <a:off x="5353050" y="3305210"/>
-            <a:ext cx="6149973" cy="2585323"/>
-          </a:xfrm>
-          <a:prstGeom prst="rect">
-            <a:avLst/>
-          </a:prstGeom>
-          <a:noFill/>
-        </p:spPr>
-        <p:txBody>
-          <a:bodyPr wrap="square" rtlCol="0">
-            <a:spAutoFit/>
-          </a:bodyPr>
-          <a:lstStyle/>
-          <a:p>
-            <a:pPr marL="285750" lvl="0" indent="-285750" defTabSz="914400">
-              <a:buFont typeface="Arial" panose="020B0604020202020204" pitchFamily="34" charset="0"/>
-              <a:buChar char="•"/>
-            </a:pPr>
-            <a:r>
-              <a:rPr lang="en-US" altLang="en-US" dirty="0"/>
-              <a:t>Conceptually, a domain neutral assembly is an assembly that lives across multiple </a:t>
-            </a:r>
-            <a:r>
-              <a:rPr lang="en-US" altLang="en-US" dirty="0" err="1"/>
-              <a:t>appdomains</a:t>
-            </a:r>
-            <a:r>
-              <a:rPr lang="en-US" altLang="en-US" dirty="0"/>
-              <a:t>. </a:t>
-            </a:r>
-            <a:br>
-              <a:rPr lang="en-US" altLang="en-US" dirty="0"/>
-            </a:br>
-            <a:endParaRPr lang="en-US" altLang="en-US" dirty="0"/>
-          </a:p>
-          <a:p>
-            <a:pPr marL="285750" lvl="0" indent="-285750" defTabSz="914400">
-              <a:buFont typeface="Arial" panose="020B0604020202020204" pitchFamily="34" charset="0"/>
-              <a:buChar char="•"/>
-            </a:pPr>
-            <a:r>
-              <a:rPr lang="en-US" altLang="en-US" dirty="0"/>
-              <a:t>Domain neutral assemblies will be </a:t>
-            </a:r>
-            <a:r>
-              <a:rPr lang="en-US" altLang="en-US" dirty="0" err="1"/>
-              <a:t>jitted</a:t>
-            </a:r>
-            <a:r>
-              <a:rPr lang="en-US" altLang="en-US" dirty="0"/>
-              <a:t> only once. </a:t>
-            </a:r>
-            <a:br>
-              <a:rPr lang="en-US" altLang="en-US" dirty="0"/>
-            </a:br>
-            <a:endParaRPr lang="en-US" altLang="en-US" dirty="0"/>
-          </a:p>
-          <a:p>
-            <a:pPr marL="285750" lvl="0" indent="-285750" defTabSz="914400">
-              <a:buFont typeface="Arial" panose="020B0604020202020204" pitchFamily="34" charset="0"/>
-              <a:buChar char="•"/>
-            </a:pPr>
-            <a:r>
-              <a:rPr lang="en-US" altLang="en-US" dirty="0"/>
-              <a:t>The </a:t>
-            </a:r>
-            <a:r>
-              <a:rPr lang="en-US" altLang="en-US" dirty="0" err="1"/>
-              <a:t>jitted</a:t>
-            </a:r>
-            <a:r>
-              <a:rPr lang="en-US" altLang="en-US" dirty="0"/>
-              <a:t> code, as well as various runtime data structures like </a:t>
-            </a:r>
-            <a:r>
-              <a:rPr lang="en-US" altLang="en-US" dirty="0" err="1"/>
-              <a:t>MethodTables</a:t>
-            </a:r>
-            <a:r>
-              <a:rPr lang="en-US" altLang="en-US" dirty="0"/>
-              <a:t>, </a:t>
-            </a:r>
-            <a:r>
-              <a:rPr lang="en-US" altLang="en-US" dirty="0" err="1"/>
-              <a:t>MethodDescs</a:t>
-            </a:r>
-            <a:r>
-              <a:rPr lang="en-US" altLang="en-US" dirty="0"/>
-              <a:t>, will be shared across </a:t>
-            </a:r>
-            <a:r>
-              <a:rPr lang="en-US" altLang="en-US" dirty="0" err="1"/>
-              <a:t>appdomains</a:t>
-            </a:r>
-            <a:r>
-              <a:rPr lang="en-US" altLang="en-US" dirty="0"/>
-              <a:t>. </a:t>
-            </a:r>
-          </a:p>
-          <a:p>
-            <a:endParaRPr lang="en-US" dirty="0"/>
-          </a:p>
-        </p:txBody>
-      </p:sp>
-      <p:sp>
-        <p:nvSpPr>
-          <p:cNvPr id="12" name="TextBox 11">
-            <a:extLst>
-              <a:ext uri="{FF2B5EF4-FFF2-40B4-BE49-F238E27FC236}">
-                <a16:creationId xmlns:a16="http://schemas.microsoft.com/office/drawing/2014/main" id="{2DB3805B-9BAF-4048-8277-BFEAF817081E}"/>
-              </a:ext>
-            </a:extLst>
-          </p:cNvPr>
-          <p:cNvSpPr txBox="1"/>
-          <p:nvPr/>
-        </p:nvSpPr>
-        <p:spPr>
-          <a:xfrm>
-            <a:off x="5353049" y="2843150"/>
-            <a:ext cx="6149973" cy="369332"/>
-          </a:xfrm>
-          <a:prstGeom prst="rect">
-            <a:avLst/>
-          </a:prstGeom>
-          <a:noFill/>
-        </p:spPr>
-        <p:txBody>
-          <a:bodyPr wrap="square" rtlCol="0">
-            <a:spAutoFit/>
-          </a:bodyPr>
-          <a:lstStyle/>
-          <a:p>
-            <a:pPr algn="ctr"/>
-            <a:r>
-              <a:rPr lang="en-US" b="1" dirty="0"/>
-              <a:t>Domain neutral assembly</a:t>
-            </a:r>
-          </a:p>
-        </p:txBody>
-      </p:sp>
-      <p:sp>
-        <p:nvSpPr>
-          <p:cNvPr id="5" name="Slide Number Placeholder 4">
-            <a:extLst>
-              <a:ext uri="{FF2B5EF4-FFF2-40B4-BE49-F238E27FC236}">
-                <a16:creationId xmlns:a16="http://schemas.microsoft.com/office/drawing/2014/main" id="{FDDC2F75-7AA4-48DE-AE07-C47DCCF5C4AF}"/>
-              </a:ext>
-            </a:extLst>
-          </p:cNvPr>
-          <p:cNvSpPr>
-            <a:spLocks noGrp="1"/>
-          </p:cNvSpPr>
-          <p:nvPr>
-            <p:ph type="sldNum" sz="quarter" idx="12"/>
-          </p:nvPr>
-        </p:nvSpPr>
-        <p:spPr/>
-        <p:txBody>
-          <a:bodyPr/>
-          <a:lstStyle/>
-          <a:p>
-            <a:fld id="{D57F1E4F-1CFF-5643-939E-217C01CDF565}" type="slidenum">
-              <a:rPr lang="en-US" sz="1400" smtClean="0"/>
-              <a:pPr/>
-              <a:t>9</a:t>
-            </a:fld>
-            <a:endParaRPr lang="en-US" sz="1400" dirty="0"/>
-          </a:p>
-        </p:txBody>
-      </p:sp>
-      <p:sp>
-        <p:nvSpPr>
-          <p:cNvPr id="9" name="TextBox 8">
-            <a:extLst>
-              <a:ext uri="{FF2B5EF4-FFF2-40B4-BE49-F238E27FC236}">
-                <a16:creationId xmlns:a16="http://schemas.microsoft.com/office/drawing/2014/main" id="{85EA38BC-F36B-4A6E-9033-05AFC1CDE3D6}"/>
-              </a:ext>
-            </a:extLst>
-          </p:cNvPr>
-          <p:cNvSpPr txBox="1"/>
-          <p:nvPr/>
-        </p:nvSpPr>
-        <p:spPr>
-          <a:xfrm>
-            <a:off x="1965039" y="6488860"/>
-            <a:ext cx="1593706" cy="338554"/>
-          </a:xfrm>
-          <a:prstGeom prst="rect">
-            <a:avLst/>
-          </a:prstGeom>
-          <a:noFill/>
-        </p:spPr>
-        <p:txBody>
-          <a:bodyPr wrap="none" rtlCol="0">
-            <a:spAutoFit/>
-          </a:bodyPr>
-          <a:lstStyle/>
-          <a:p>
-            <a:r>
-              <a:rPr lang="en-US" sz="1600" dirty="0"/>
-              <a:t>Process Explorer</a:t>
-            </a:r>
-          </a:p>
-        </p:txBody>
-      </p:sp>
     </p:spTree>
     <p:extLst>
       <p:ext uri="{BB962C8B-B14F-4D97-AF65-F5344CB8AC3E}">
-        <p14:creationId xmlns:p14="http://schemas.microsoft.com/office/powerpoint/2010/main" val="3214061660"/>
+        <p14:creationId xmlns:p14="http://schemas.microsoft.com/office/powerpoint/2010/main" val="3451108813"/>
       </p:ext>
     </p:extLst>
   </p:cSld>

</xml_diff>

<commit_message>
The final version of a presentation
</commit_message>
<xml_diff>
--- a/presentation/Sharing common assemblies.pptx
+++ b/presentation/Sharing common assemblies.pptx
@@ -5,30 +5,31 @@
     <p:sldMasterId id="2147483648" r:id="rId1"/>
   </p:sldMasterIdLst>
   <p:notesMasterIdLst>
-    <p:notesMasterId r:id="rId23"/>
+    <p:notesMasterId r:id="rId24"/>
   </p:notesMasterIdLst>
   <p:sldIdLst>
     <p:sldId id="256" r:id="rId2"/>
     <p:sldId id="279" r:id="rId3"/>
     <p:sldId id="257" r:id="rId4"/>
-    <p:sldId id="298" r:id="rId5"/>
-    <p:sldId id="280" r:id="rId6"/>
-    <p:sldId id="288" r:id="rId7"/>
-    <p:sldId id="287" r:id="rId8"/>
-    <p:sldId id="296" r:id="rId9"/>
-    <p:sldId id="294" r:id="rId10"/>
-    <p:sldId id="299" r:id="rId11"/>
-    <p:sldId id="282" r:id="rId12"/>
-    <p:sldId id="292" r:id="rId13"/>
-    <p:sldId id="293" r:id="rId14"/>
-    <p:sldId id="283" r:id="rId15"/>
-    <p:sldId id="284" r:id="rId16"/>
-    <p:sldId id="285" r:id="rId17"/>
-    <p:sldId id="297" r:id="rId18"/>
+    <p:sldId id="280" r:id="rId5"/>
+    <p:sldId id="288" r:id="rId6"/>
+    <p:sldId id="287" r:id="rId7"/>
+    <p:sldId id="296" r:id="rId8"/>
+    <p:sldId id="294" r:id="rId9"/>
+    <p:sldId id="298" r:id="rId10"/>
+    <p:sldId id="282" r:id="rId11"/>
+    <p:sldId id="292" r:id="rId12"/>
+    <p:sldId id="293" r:id="rId13"/>
+    <p:sldId id="283" r:id="rId14"/>
+    <p:sldId id="284" r:id="rId15"/>
+    <p:sldId id="285" r:id="rId16"/>
+    <p:sldId id="297" r:id="rId17"/>
+    <p:sldId id="299" r:id="rId18"/>
     <p:sldId id="291" r:id="rId19"/>
-    <p:sldId id="277" r:id="rId20"/>
-    <p:sldId id="300" r:id="rId21"/>
-    <p:sldId id="295" r:id="rId22"/>
+    <p:sldId id="300" r:id="rId20"/>
+    <p:sldId id="301" r:id="rId21"/>
+    <p:sldId id="277" r:id="rId22"/>
+    <p:sldId id="295" r:id="rId23"/>
   </p:sldIdLst>
   <p:sldSz cx="12192000" cy="6858000"/>
   <p:notesSz cx="6858000" cy="9144000"/>
@@ -217,7 +218,7 @@
           <a:p>
             <a:fld id="{7F262928-0CDC-44E0-A3C2-1349897640B6}" type="datetimeFigureOut">
               <a:rPr lang="en-US" smtClean="0"/>
-              <a:t>2/12/2018</a:t>
+              <a:t>2/24/2018</a:t>
             </a:fld>
             <a:endParaRPr lang="en-US"/>
           </a:p>
@@ -561,7 +562,7 @@
           <a:p>
             <a:fld id="{29B3F580-F237-4B16-A8AC-FCE0BDEB942E}" type="slidenum">
               <a:rPr lang="en-US" smtClean="0"/>
-              <a:t>11</a:t>
+              <a:t>10</a:t>
             </a:fld>
             <a:endParaRPr lang="en-US"/>
           </a:p>
@@ -657,7 +658,7 @@
           <a:p>
             <a:fld id="{29B3F580-F237-4B16-A8AC-FCE0BDEB942E}" type="slidenum">
               <a:rPr lang="en-US" smtClean="0"/>
-              <a:t>12</a:t>
+              <a:t>11</a:t>
             </a:fld>
             <a:endParaRPr lang="en-US"/>
           </a:p>
@@ -753,7 +754,7 @@
           <a:p>
             <a:fld id="{29B3F580-F237-4B16-A8AC-FCE0BDEB942E}" type="slidenum">
               <a:rPr lang="en-US" smtClean="0"/>
-              <a:t>13</a:t>
+              <a:t>12</a:t>
             </a:fld>
             <a:endParaRPr lang="en-US"/>
           </a:p>
@@ -849,7 +850,7 @@
           <a:p>
             <a:fld id="{29B3F580-F237-4B16-A8AC-FCE0BDEB942E}" type="slidenum">
               <a:rPr lang="en-US" smtClean="0"/>
-              <a:t>20</a:t>
+              <a:t>19</a:t>
             </a:fld>
             <a:endParaRPr lang="en-US"/>
           </a:p>
@@ -859,6 +860,102 @@
     <p:extLst>
       <p:ext uri="{BB962C8B-B14F-4D97-AF65-F5344CB8AC3E}">
         <p14:creationId xmlns:p14="http://schemas.microsoft.com/office/powerpoint/2010/main" val="3620786315"/>
+      </p:ext>
+    </p:extLst>
+  </p:cSld>
+  <p:clrMapOvr>
+    <a:masterClrMapping/>
+  </p:clrMapOvr>
+</p:notes>
+</file>
+
+<file path=ppt/notesSlides/notesSlide5.xml><?xml version="1.0" encoding="utf-8"?>
+<p:notes xmlns:a="http://schemas.openxmlformats.org/drawingml/2006/main" xmlns:r="http://schemas.openxmlformats.org/officeDocument/2006/relationships" xmlns:p="http://schemas.openxmlformats.org/presentationml/2006/main">
+  <p:cSld>
+    <p:spTree>
+      <p:nvGrpSpPr>
+        <p:cNvPr id="1" name=""/>
+        <p:cNvGrpSpPr/>
+        <p:nvPr/>
+      </p:nvGrpSpPr>
+      <p:grpSpPr>
+        <a:xfrm>
+          <a:off x="0" y="0"/>
+          <a:ext cx="0" cy="0"/>
+          <a:chOff x="0" y="0"/>
+          <a:chExt cx="0" cy="0"/>
+        </a:xfrm>
+      </p:grpSpPr>
+      <p:sp>
+        <p:nvSpPr>
+          <p:cNvPr id="2" name="Slide Image Placeholder 1"/>
+          <p:cNvSpPr>
+            <a:spLocks noGrp="1" noRot="1" noChangeAspect="1"/>
+          </p:cNvSpPr>
+          <p:nvPr>
+            <p:ph type="sldImg"/>
+          </p:nvPr>
+        </p:nvSpPr>
+        <p:spPr/>
+      </p:sp>
+      <p:sp>
+        <p:nvSpPr>
+          <p:cNvPr id="3" name="Notes Placeholder 2"/>
+          <p:cNvSpPr>
+            <a:spLocks noGrp="1"/>
+          </p:cNvSpPr>
+          <p:nvPr>
+            <p:ph type="body" idx="1"/>
+          </p:nvPr>
+        </p:nvSpPr>
+        <p:spPr/>
+        <p:txBody>
+          <a:bodyPr/>
+          <a:lstStyle/>
+          <a:p>
+            <a:r>
+              <a:rPr lang="en-US" dirty="0"/>
+              <a:t>Have a look simulation</a:t>
+            </a:r>
+          </a:p>
+          <a:p>
+            <a:r>
+              <a:rPr lang="en-US"/>
+              <a:t>Have a look real example on MP server</a:t>
+            </a:r>
+          </a:p>
+          <a:p>
+            <a:endParaRPr lang="en-US"/>
+          </a:p>
+        </p:txBody>
+      </p:sp>
+      <p:sp>
+        <p:nvSpPr>
+          <p:cNvPr id="4" name="Slide Number Placeholder 3"/>
+          <p:cNvSpPr>
+            <a:spLocks noGrp="1"/>
+          </p:cNvSpPr>
+          <p:nvPr>
+            <p:ph type="sldNum" sz="quarter" idx="10"/>
+          </p:nvPr>
+        </p:nvSpPr>
+        <p:spPr/>
+        <p:txBody>
+          <a:bodyPr/>
+          <a:lstStyle/>
+          <a:p>
+            <a:fld id="{29B3F580-F237-4B16-A8AC-FCE0BDEB942E}" type="slidenum">
+              <a:rPr lang="en-US" smtClean="0"/>
+              <a:t>20</a:t>
+            </a:fld>
+            <a:endParaRPr lang="en-US"/>
+          </a:p>
+        </p:txBody>
+      </p:sp>
+    </p:spTree>
+    <p:extLst>
+      <p:ext uri="{BB962C8B-B14F-4D97-AF65-F5344CB8AC3E}">
+        <p14:creationId xmlns:p14="http://schemas.microsoft.com/office/powerpoint/2010/main" val="3312695314"/>
       </p:ext>
     </p:extLst>
   </p:cSld>
@@ -1370,7 +1467,7 @@
           <a:p>
             <a:fld id="{224EB7CA-D7F8-4D62-9304-30BA067B3D55}" type="datetime1">
               <a:rPr lang="en-US" smtClean="0"/>
-              <a:t>2/12/2018</a:t>
+              <a:t>2/24/2018</a:t>
             </a:fld>
             <a:endParaRPr lang="en-US" dirty="0"/>
           </a:p>
@@ -1662,7 +1759,7 @@
           <a:p>
             <a:fld id="{78594FD9-4BB0-4608-BD71-DE85AF8B0C94}" type="datetime1">
               <a:rPr lang="en-US" smtClean="0"/>
-              <a:t>2/12/2018</a:t>
+              <a:t>2/24/2018</a:t>
             </a:fld>
             <a:endParaRPr lang="en-US" dirty="0"/>
           </a:p>
@@ -1906,7 +2003,7 @@
           <a:p>
             <a:fld id="{80F14A8D-8CB6-4DF7-BB03-9ADF328541C3}" type="datetime1">
               <a:rPr lang="en-US" smtClean="0"/>
-              <a:t>2/12/2018</a:t>
+              <a:t>2/24/2018</a:t>
             </a:fld>
             <a:endParaRPr lang="en-US" dirty="0"/>
           </a:p>
@@ -2442,7 +2539,7 @@
           <a:p>
             <a:fld id="{12C8657D-6EFD-44FE-A6B1-FC3314E45B04}" type="datetime1">
               <a:rPr lang="en-US" smtClean="0"/>
-              <a:t>2/12/2018</a:t>
+              <a:t>2/24/2018</a:t>
             </a:fld>
             <a:endParaRPr lang="en-US" dirty="0"/>
           </a:p>
@@ -2686,7 +2783,7 @@
           <a:p>
             <a:fld id="{3C22B71E-C0BD-47ED-A0E5-D73AF8DAABF6}" type="datetime1">
               <a:rPr lang="en-US" smtClean="0"/>
-              <a:t>2/12/2018</a:t>
+              <a:t>2/24/2018</a:t>
             </a:fld>
             <a:endParaRPr lang="en-US" dirty="0"/>
           </a:p>
@@ -3214,7 +3311,7 @@
           <a:p>
             <a:fld id="{ABE61F29-A317-4BB7-AEDD-37E228401F6A}" type="datetime1">
               <a:rPr lang="en-US" smtClean="0"/>
-              <a:t>2/12/2018</a:t>
+              <a:t>2/24/2018</a:t>
             </a:fld>
             <a:endParaRPr lang="en-US" dirty="0"/>
           </a:p>
@@ -3507,7 +3604,7 @@
           <a:p>
             <a:fld id="{FA7F1050-A139-4782-A1EE-67CE90110BBE}" type="datetime1">
               <a:rPr lang="en-US" smtClean="0"/>
-              <a:t>2/12/2018</a:t>
+              <a:t>2/24/2018</a:t>
             </a:fld>
             <a:endParaRPr lang="en-US" dirty="0"/>
           </a:p>
@@ -3677,7 +3774,7 @@
           <a:p>
             <a:fld id="{F3AAD345-0762-4223-96B9-208D94F07C91}" type="datetime1">
               <a:rPr lang="en-US" smtClean="0"/>
-              <a:t>2/12/2018</a:t>
+              <a:t>2/24/2018</a:t>
             </a:fld>
             <a:endParaRPr lang="en-US" dirty="0"/>
           </a:p>
@@ -3853,7 +3950,7 @@
           <a:p>
             <a:fld id="{203D6735-A7AF-42E2-85D0-894B50621292}" type="datetime1">
               <a:rPr lang="en-US" smtClean="0"/>
-              <a:t>2/12/2018</a:t>
+              <a:t>2/24/2018</a:t>
             </a:fld>
             <a:endParaRPr lang="en-US" dirty="0"/>
           </a:p>
@@ -4060,7 +4157,7 @@
           <a:p>
             <a:fld id="{75176718-5527-4FAB-B437-FCE82648AEEB}" type="datetime1">
               <a:rPr lang="en-US" smtClean="0"/>
-              <a:t>2/12/2018</a:t>
+              <a:t>2/24/2018</a:t>
             </a:fld>
             <a:endParaRPr lang="en-US" dirty="0"/>
           </a:p>
@@ -4307,7 +4404,7 @@
           <a:p>
             <a:fld id="{A2ECFFF3-0198-4D32-9ABA-0F0069AD8BC6}" type="datetime1">
               <a:rPr lang="en-US" smtClean="0"/>
-              <a:t>2/12/2018</a:t>
+              <a:t>2/24/2018</a:t>
             </a:fld>
             <a:endParaRPr lang="en-US" dirty="0"/>
           </a:p>
@@ -4650,7 +4747,7 @@
           <a:p>
             <a:fld id="{3CB9EE01-0F27-46F0-BCC0-C0DFDC5C8A8D}" type="datetime1">
               <a:rPr lang="en-US" smtClean="0"/>
-              <a:t>2/12/2018</a:t>
+              <a:t>2/24/2018</a:t>
             </a:fld>
             <a:endParaRPr lang="en-US" dirty="0"/>
           </a:p>
@@ -5138,7 +5235,7 @@
           <a:p>
             <a:fld id="{6B903B12-225C-4E1B-97C4-5C9BAF9747F6}" type="datetime1">
               <a:rPr lang="en-US" smtClean="0"/>
-              <a:t>2/12/2018</a:t>
+              <a:t>2/24/2018</a:t>
             </a:fld>
             <a:endParaRPr lang="en-US" dirty="0"/>
           </a:p>
@@ -5252,7 +5349,7 @@
           <a:p>
             <a:fld id="{0DBF0E80-EEBA-4911-9FFE-EE5B4FB0B0C4}" type="datetime1">
               <a:rPr lang="en-US" smtClean="0"/>
-              <a:t>2/12/2018</a:t>
+              <a:t>2/24/2018</a:t>
             </a:fld>
             <a:endParaRPr lang="en-US" dirty="0"/>
           </a:p>
@@ -5343,7 +5440,7 @@
           <a:p>
             <a:fld id="{802BC30E-BE77-4BD6-825A-556CCECBBD5F}" type="datetime1">
               <a:rPr lang="en-US" smtClean="0"/>
-              <a:t>2/12/2018</a:t>
+              <a:t>2/24/2018</a:t>
             </a:fld>
             <a:endParaRPr lang="en-US" dirty="0"/>
           </a:p>
@@ -5622,7 +5719,7 @@
           <a:p>
             <a:fld id="{01AE9536-3169-430D-A3EC-03C1DAAD324C}" type="datetime1">
               <a:rPr lang="en-US" smtClean="0"/>
-              <a:t>2/12/2018</a:t>
+              <a:t>2/24/2018</a:t>
             </a:fld>
             <a:endParaRPr lang="en-US" dirty="0"/>
           </a:p>
@@ -5909,7 +6006,7 @@
           <a:p>
             <a:fld id="{17BAD071-1EB6-4379-8228-408A106BFDF0}" type="datetime1">
               <a:rPr lang="en-US" smtClean="0"/>
-              <a:t>2/12/2018</a:t>
+              <a:t>2/24/2018</a:t>
             </a:fld>
             <a:endParaRPr lang="en-US" dirty="0"/>
           </a:p>
@@ -6435,7 +6532,7 @@
           <a:p>
             <a:fld id="{3D2EF4AA-A067-4041-90FF-0766BB9D10CB}" type="datetime1">
               <a:rPr lang="en-US" smtClean="0"/>
-              <a:t>2/12/2018</a:t>
+              <a:t>2/24/2018</a:t>
             </a:fld>
             <a:endParaRPr lang="en-US" dirty="0"/>
           </a:p>
@@ -7363,149 +7460,6 @@
           <a:chExt cx="0" cy="0"/>
         </a:xfrm>
       </p:grpSpPr>
-      <p:sp>
-        <p:nvSpPr>
-          <p:cNvPr id="4" name="Slide Number Placeholder 3">
-            <a:extLst>
-              <a:ext uri="{FF2B5EF4-FFF2-40B4-BE49-F238E27FC236}">
-                <a16:creationId xmlns:a16="http://schemas.microsoft.com/office/drawing/2014/main" id="{AAB1DB65-03D9-4F67-9534-E6E8E0195CB1}"/>
-              </a:ext>
-            </a:extLst>
-          </p:cNvPr>
-          <p:cNvSpPr>
-            <a:spLocks noGrp="1"/>
-          </p:cNvSpPr>
-          <p:nvPr>
-            <p:ph type="sldNum" sz="quarter" idx="12"/>
-          </p:nvPr>
-        </p:nvSpPr>
-        <p:spPr/>
-        <p:txBody>
-          <a:bodyPr/>
-          <a:lstStyle/>
-          <a:p>
-            <a:fld id="{D57F1E4F-1CFF-5643-939E-217C01CDF565}" type="slidenum">
-              <a:rPr lang="en-US" sz="1400" smtClean="0"/>
-              <a:pPr/>
-              <a:t>10</a:t>
-            </a:fld>
-            <a:endParaRPr lang="en-US" sz="1400" dirty="0"/>
-          </a:p>
-        </p:txBody>
-      </p:sp>
-      <p:pic>
-        <p:nvPicPr>
-          <p:cNvPr id="1026" name="Picture 2" descr="https://docs.newrelic.com/sites/default/files/styles/full_size/public/thumbnails/image/screen-dotnet-overview-page_0.png?itok=KgP33kt1">
-            <a:extLst>
-              <a:ext uri="{FF2B5EF4-FFF2-40B4-BE49-F238E27FC236}">
-                <a16:creationId xmlns:a16="http://schemas.microsoft.com/office/drawing/2014/main" id="{FF485114-DF57-47DE-8E1F-CB0FDC726C2F}"/>
-              </a:ext>
-            </a:extLst>
-          </p:cNvPr>
-          <p:cNvPicPr>
-            <a:picLocks noChangeAspect="1" noChangeArrowheads="1"/>
-          </p:cNvPicPr>
-          <p:nvPr/>
-        </p:nvPicPr>
-        <p:blipFill>
-          <a:blip r:embed="rId2">
-            <a:extLst>
-              <a:ext uri="{28A0092B-C50C-407E-A947-70E740481C1C}">
-                <a14:useLocalDpi xmlns:a14="http://schemas.microsoft.com/office/drawing/2010/main" val="0"/>
-              </a:ext>
-            </a:extLst>
-          </a:blip>
-          <a:srcRect/>
-          <a:stretch>
-            <a:fillRect/>
-          </a:stretch>
-        </p:blipFill>
-        <p:spPr bwMode="auto">
-          <a:xfrm>
-            <a:off x="1543573" y="721360"/>
-            <a:ext cx="9269835" cy="6019193"/>
-          </a:xfrm>
-          <a:prstGeom prst="rect">
-            <a:avLst/>
-          </a:prstGeom>
-          <a:noFill/>
-          <a:extLst>
-            <a:ext uri="{909E8E84-426E-40DD-AFC4-6F175D3DCCD1}">
-              <a14:hiddenFill xmlns:a14="http://schemas.microsoft.com/office/drawing/2010/main">
-                <a:solidFill>
-                  <a:srgbClr val="FFFFFF"/>
-                </a:solidFill>
-              </a14:hiddenFill>
-            </a:ext>
-          </a:extLst>
-        </p:spPr>
-      </p:pic>
-      <p:sp>
-        <p:nvSpPr>
-          <p:cNvPr id="5" name="Title 1">
-            <a:extLst>
-              <a:ext uri="{FF2B5EF4-FFF2-40B4-BE49-F238E27FC236}">
-                <a16:creationId xmlns:a16="http://schemas.microsoft.com/office/drawing/2014/main" id="{52EF8F1A-F346-45E3-AF34-081F08E0A1D7}"/>
-              </a:ext>
-            </a:extLst>
-          </p:cNvPr>
-          <p:cNvSpPr>
-            <a:spLocks noGrp="1"/>
-          </p:cNvSpPr>
-          <p:nvPr>
-            <p:ph type="title"/>
-          </p:nvPr>
-        </p:nvSpPr>
-        <p:spPr>
-          <a:xfrm>
-            <a:off x="859011" y="30150"/>
-            <a:ext cx="10739625" cy="640876"/>
-          </a:xfrm>
-        </p:spPr>
-        <p:txBody>
-          <a:bodyPr>
-            <a:normAutofit fontScale="90000"/>
-          </a:bodyPr>
-          <a:lstStyle/>
-          <a:p>
-            <a:r>
-              <a:rPr lang="en-US" sz="3600" dirty="0"/>
-              <a:t>New Relic: Digital Performance Monitoring and Management</a:t>
-            </a:r>
-            <a:endParaRPr lang="en-US" sz="2400" dirty="0"/>
-          </a:p>
-        </p:txBody>
-      </p:sp>
-    </p:spTree>
-    <p:extLst>
-      <p:ext uri="{BB962C8B-B14F-4D97-AF65-F5344CB8AC3E}">
-        <p14:creationId xmlns:p14="http://schemas.microsoft.com/office/powerpoint/2010/main" val="3992331336"/>
-      </p:ext>
-    </p:extLst>
-  </p:cSld>
-  <p:clrMapOvr>
-    <a:masterClrMapping/>
-  </p:clrMapOvr>
-</p:sld>
-</file>
-
-<file path=ppt/slides/slide11.xml><?xml version="1.0" encoding="utf-8"?>
-<p:sld xmlns:a="http://schemas.openxmlformats.org/drawingml/2006/main" xmlns:r="http://schemas.openxmlformats.org/officeDocument/2006/relationships" xmlns:p="http://schemas.openxmlformats.org/presentationml/2006/main">
-  <p:cSld>
-    <p:spTree>
-      <p:nvGrpSpPr>
-        <p:cNvPr id="1" name=""/>
-        <p:cNvGrpSpPr/>
-        <p:nvPr/>
-      </p:nvGrpSpPr>
-      <p:grpSpPr>
-        <a:xfrm>
-          <a:off x="0" y="0"/>
-          <a:ext cx="0" cy="0"/>
-          <a:chOff x="0" y="0"/>
-          <a:chExt cx="0" cy="0"/>
-        </a:xfrm>
-      </p:grpSpPr>
       <p:pic>
         <p:nvPicPr>
           <p:cNvPr id="6" name="Picture 5">
@@ -7745,7 +7699,7 @@
             <a:fld id="{D57F1E4F-1CFF-5643-939E-217C01CDF565}" type="slidenum">
               <a:rPr lang="en-US" sz="1400" smtClean="0"/>
               <a:pPr/>
-              <a:t>11</a:t>
+              <a:t>10</a:t>
             </a:fld>
             <a:endParaRPr lang="en-US" sz="1400" dirty="0"/>
           </a:p>
@@ -7800,7 +7754,7 @@
 </p:sld>
 </file>
 
-<file path=ppt/slides/slide12.xml><?xml version="1.0" encoding="utf-8"?>
+<file path=ppt/slides/slide11.xml><?xml version="1.0" encoding="utf-8"?>
 <p:sld xmlns:a="http://schemas.openxmlformats.org/drawingml/2006/main" xmlns:r="http://schemas.openxmlformats.org/officeDocument/2006/relationships" xmlns:p="http://schemas.openxmlformats.org/presentationml/2006/main">
   <p:cSld>
     <p:spTree>
@@ -7877,7 +7831,7 @@
             <a:fld id="{D57F1E4F-1CFF-5643-939E-217C01CDF565}" type="slidenum">
               <a:rPr lang="en-US" sz="1400" smtClean="0"/>
               <a:pPr/>
-              <a:t>12</a:t>
+              <a:t>11</a:t>
             </a:fld>
             <a:endParaRPr lang="en-US" sz="1400" dirty="0"/>
           </a:p>
@@ -8106,7 +8060,7 @@
 </p:sld>
 </file>
 
-<file path=ppt/slides/slide13.xml><?xml version="1.0" encoding="utf-8"?>
+<file path=ppt/slides/slide12.xml><?xml version="1.0" encoding="utf-8"?>
 <p:sld xmlns:a="http://schemas.openxmlformats.org/drawingml/2006/main" xmlns:r="http://schemas.openxmlformats.org/officeDocument/2006/relationships" xmlns:p="http://schemas.openxmlformats.org/presentationml/2006/main">
   <p:cSld>
     <p:spTree>
@@ -8188,7 +8142,7 @@
             <a:fld id="{D57F1E4F-1CFF-5643-939E-217C01CDF565}" type="slidenum">
               <a:rPr lang="en-US" sz="1400" smtClean="0"/>
               <a:pPr/>
-              <a:t>13</a:t>
+              <a:t>12</a:t>
             </a:fld>
             <a:endParaRPr lang="en-US" sz="1400" dirty="0"/>
           </a:p>
@@ -8647,7 +8601,7 @@
 </p:sld>
 </file>
 
-<file path=ppt/slides/slide14.xml><?xml version="1.0" encoding="utf-8"?>
+<file path=ppt/slides/slide13.xml><?xml version="1.0" encoding="utf-8"?>
 <p:sld xmlns:a="http://schemas.openxmlformats.org/drawingml/2006/main" xmlns:r="http://schemas.openxmlformats.org/officeDocument/2006/relationships" xmlns:p="http://schemas.openxmlformats.org/presentationml/2006/main">
   <p:cSld>
     <p:spTree>
@@ -8701,7 +8655,7 @@
             </a:br>
             <a:r>
               <a:rPr lang="en-US" sz="2700" dirty="0"/>
-              <a:t>Installing assemblies to Native Images Cache</a:t>
+              <a:t>Installing assemblies to GAC</a:t>
             </a:r>
           </a:p>
         </p:txBody>
@@ -8730,7 +8684,7 @@
             <a:fld id="{D57F1E4F-1CFF-5643-939E-217C01CDF565}" type="slidenum">
               <a:rPr lang="en-US" sz="1400" smtClean="0"/>
               <a:pPr/>
-              <a:t>14</a:t>
+              <a:t>13</a:t>
             </a:fld>
             <a:endParaRPr lang="en-US" sz="1400" dirty="0"/>
           </a:p>
@@ -8779,7 +8733,7 @@
 </p:sld>
 </file>
 
-<file path=ppt/slides/slide15.xml><?xml version="1.0" encoding="utf-8"?>
+<file path=ppt/slides/slide14.xml><?xml version="1.0" encoding="utf-8"?>
 <p:sld xmlns:a="http://schemas.openxmlformats.org/drawingml/2006/main" xmlns:r="http://schemas.openxmlformats.org/officeDocument/2006/relationships" xmlns:p="http://schemas.openxmlformats.org/presentationml/2006/main">
   <p:cSld>
     <p:spTree>
@@ -8960,7 +8914,7 @@
             <a:fld id="{D57F1E4F-1CFF-5643-939E-217C01CDF565}" type="slidenum">
               <a:rPr lang="en-US" sz="1400" smtClean="0"/>
               <a:pPr/>
-              <a:t>15</a:t>
+              <a:t>14</a:t>
             </a:fld>
             <a:endParaRPr lang="en-US" sz="1400" dirty="0"/>
           </a:p>
@@ -8979,7 +8933,7 @@
 </p:sld>
 </file>
 
-<file path=ppt/slides/slide16.xml><?xml version="1.0" encoding="utf-8"?>
+<file path=ppt/slides/slide15.xml><?xml version="1.0" encoding="utf-8"?>
 <p:sld xmlns:a="http://schemas.openxmlformats.org/drawingml/2006/main" xmlns:r="http://schemas.openxmlformats.org/officeDocument/2006/relationships" xmlns:p="http://schemas.openxmlformats.org/presentationml/2006/main">
   <p:cSld>
     <p:spTree>
@@ -9091,7 +9045,7 @@
             <a:fld id="{D57F1E4F-1CFF-5643-939E-217C01CDF565}" type="slidenum">
               <a:rPr lang="en-US" sz="1400" smtClean="0"/>
               <a:pPr/>
-              <a:t>16</a:t>
+              <a:t>15</a:t>
             </a:fld>
             <a:endParaRPr lang="en-US" sz="1400" dirty="0"/>
           </a:p>
@@ -9101,6 +9055,137 @@
     <p:extLst>
       <p:ext uri="{BB962C8B-B14F-4D97-AF65-F5344CB8AC3E}">
         <p14:creationId xmlns:p14="http://schemas.microsoft.com/office/powerpoint/2010/main" val="2700701014"/>
+      </p:ext>
+    </p:extLst>
+  </p:cSld>
+  <p:clrMapOvr>
+    <a:masterClrMapping/>
+  </p:clrMapOvr>
+</p:sld>
+</file>
+
+<file path=ppt/slides/slide16.xml><?xml version="1.0" encoding="utf-8"?>
+<p:sld xmlns:a="http://schemas.openxmlformats.org/drawingml/2006/main" xmlns:r="http://schemas.openxmlformats.org/officeDocument/2006/relationships" xmlns:p="http://schemas.openxmlformats.org/presentationml/2006/main">
+  <p:cSld>
+    <p:spTree>
+      <p:nvGrpSpPr>
+        <p:cNvPr id="1" name=""/>
+        <p:cNvGrpSpPr/>
+        <p:nvPr/>
+      </p:nvGrpSpPr>
+      <p:grpSpPr>
+        <a:xfrm>
+          <a:off x="0" y="0"/>
+          <a:ext cx="0" cy="0"/>
+          <a:chOff x="0" y="0"/>
+          <a:chExt cx="0" cy="0"/>
+        </a:xfrm>
+      </p:grpSpPr>
+      <p:sp>
+        <p:nvSpPr>
+          <p:cNvPr id="2" name="Title 1">
+            <a:extLst>
+              <a:ext uri="{FF2B5EF4-FFF2-40B4-BE49-F238E27FC236}">
+                <a16:creationId xmlns:a16="http://schemas.microsoft.com/office/drawing/2014/main" id="{681983DC-0BFC-4912-8AC2-40307BE36C21}"/>
+              </a:ext>
+            </a:extLst>
+          </p:cNvPr>
+          <p:cNvSpPr>
+            <a:spLocks noGrp="1"/>
+          </p:cNvSpPr>
+          <p:nvPr>
+            <p:ph type="title"/>
+          </p:nvPr>
+        </p:nvSpPr>
+        <p:spPr>
+          <a:xfrm>
+            <a:off x="1484311" y="266699"/>
+            <a:ext cx="10018713" cy="679579"/>
+          </a:xfrm>
+        </p:spPr>
+        <p:txBody>
+          <a:bodyPr>
+            <a:normAutofit/>
+          </a:bodyPr>
+          <a:lstStyle/>
+          <a:p>
+            <a:r>
+              <a:rPr lang="en-US" sz="3600" dirty="0"/>
+              <a:t>Sharing assemblies between processes </a:t>
+            </a:r>
+            <a:endParaRPr lang="en-US" sz="2400" dirty="0"/>
+          </a:p>
+        </p:txBody>
+      </p:sp>
+      <p:sp>
+        <p:nvSpPr>
+          <p:cNvPr id="5" name="Slide Number Placeholder 4">
+            <a:extLst>
+              <a:ext uri="{FF2B5EF4-FFF2-40B4-BE49-F238E27FC236}">
+                <a16:creationId xmlns:a16="http://schemas.microsoft.com/office/drawing/2014/main" id="{C8D945B7-D9BA-443E-AB7B-734C2E93BEFD}"/>
+              </a:ext>
+            </a:extLst>
+          </p:cNvPr>
+          <p:cNvSpPr>
+            <a:spLocks noGrp="1"/>
+          </p:cNvSpPr>
+          <p:nvPr>
+            <p:ph type="sldNum" sz="quarter" idx="12"/>
+          </p:nvPr>
+        </p:nvSpPr>
+        <p:spPr>
+          <a:xfrm>
+            <a:off x="11503024" y="6324599"/>
+            <a:ext cx="551167" cy="365125"/>
+          </a:xfrm>
+        </p:spPr>
+        <p:txBody>
+          <a:bodyPr/>
+          <a:lstStyle/>
+          <a:p>
+            <a:fld id="{D57F1E4F-1CFF-5643-939E-217C01CDF565}" type="slidenum">
+              <a:rPr lang="en-US" sz="1400" smtClean="0"/>
+              <a:pPr/>
+              <a:t>16</a:t>
+            </a:fld>
+            <a:endParaRPr lang="en-US" sz="1400" dirty="0"/>
+          </a:p>
+        </p:txBody>
+      </p:sp>
+      <p:pic>
+        <p:nvPicPr>
+          <p:cNvPr id="6" name="Picture 5">
+            <a:extLst>
+              <a:ext uri="{FF2B5EF4-FFF2-40B4-BE49-F238E27FC236}">
+                <a16:creationId xmlns:a16="http://schemas.microsoft.com/office/drawing/2014/main" id="{E0AC4265-D748-4239-8728-75B2E05AC6A8}"/>
+              </a:ext>
+            </a:extLst>
+          </p:cNvPr>
+          <p:cNvPicPr>
+            <a:picLocks noChangeAspect="1"/>
+          </p:cNvPicPr>
+          <p:nvPr/>
+        </p:nvPicPr>
+        <p:blipFill>
+          <a:blip r:embed="rId2"/>
+          <a:stretch>
+            <a:fillRect/>
+          </a:stretch>
+        </p:blipFill>
+        <p:spPr>
+          <a:xfrm>
+            <a:off x="2521742" y="1317171"/>
+            <a:ext cx="7943850" cy="4876800"/>
+          </a:xfrm>
+          <a:prstGeom prst="rect">
+            <a:avLst/>
+          </a:prstGeom>
+        </p:spPr>
+      </p:pic>
+    </p:spTree>
+    <p:extLst>
+      <p:ext uri="{BB962C8B-B14F-4D97-AF65-F5344CB8AC3E}">
+        <p14:creationId xmlns:p14="http://schemas.microsoft.com/office/powerpoint/2010/main" val="1195355037"/>
       </p:ext>
     </p:extLst>
   </p:cSld>
@@ -9129,10 +9214,10 @@
       </p:grpSpPr>
       <p:sp>
         <p:nvSpPr>
-          <p:cNvPr id="2" name="Title 1">
+          <p:cNvPr id="4" name="Slide Number Placeholder 3">
             <a:extLst>
               <a:ext uri="{FF2B5EF4-FFF2-40B4-BE49-F238E27FC236}">
-                <a16:creationId xmlns:a16="http://schemas.microsoft.com/office/drawing/2014/main" id="{681983DC-0BFC-4912-8AC2-40307BE36C21}"/>
+                <a16:creationId xmlns:a16="http://schemas.microsoft.com/office/drawing/2014/main" id="{AAB1DB65-03D9-4F67-9534-E6E8E0195CB1}"/>
               </a:ext>
             </a:extLst>
           </p:cNvPr>
@@ -9140,51 +9225,10 @@
             <a:spLocks noGrp="1"/>
           </p:cNvSpPr>
           <p:nvPr>
-            <p:ph type="title"/>
-          </p:nvPr>
-        </p:nvSpPr>
-        <p:spPr>
-          <a:xfrm>
-            <a:off x="1484311" y="266699"/>
-            <a:ext cx="10018713" cy="679579"/>
-          </a:xfrm>
-        </p:spPr>
-        <p:txBody>
-          <a:bodyPr>
-            <a:normAutofit/>
-          </a:bodyPr>
-          <a:lstStyle/>
-          <a:p>
-            <a:r>
-              <a:rPr lang="en-US" sz="3600" dirty="0"/>
-              <a:t>Sharing assemblies between processes </a:t>
-            </a:r>
-            <a:endParaRPr lang="en-US" sz="2400" dirty="0"/>
-          </a:p>
-        </p:txBody>
-      </p:sp>
-      <p:sp>
-        <p:nvSpPr>
-          <p:cNvPr id="5" name="Slide Number Placeholder 4">
-            <a:extLst>
-              <a:ext uri="{FF2B5EF4-FFF2-40B4-BE49-F238E27FC236}">
-                <a16:creationId xmlns:a16="http://schemas.microsoft.com/office/drawing/2014/main" id="{C8D945B7-D9BA-443E-AB7B-734C2E93BEFD}"/>
-              </a:ext>
-            </a:extLst>
-          </p:cNvPr>
-          <p:cNvSpPr>
-            <a:spLocks noGrp="1"/>
-          </p:cNvSpPr>
-          <p:nvPr>
             <p:ph type="sldNum" sz="quarter" idx="12"/>
           </p:nvPr>
         </p:nvSpPr>
-        <p:spPr>
-          <a:xfrm>
-            <a:off x="11503024" y="6324599"/>
-            <a:ext cx="551167" cy="365125"/>
-          </a:xfrm>
-        </p:spPr>
+        <p:spPr/>
         <p:txBody>
           <a:bodyPr/>
           <a:lstStyle/>
@@ -9200,38 +9244,91 @@
       </p:sp>
       <p:pic>
         <p:nvPicPr>
-          <p:cNvPr id="3" name="Picture 2">
+          <p:cNvPr id="1026" name="Picture 2" descr="https://docs.newrelic.com/sites/default/files/styles/full_size/public/thumbnails/image/screen-dotnet-overview-page_0.png?itok=KgP33kt1">
             <a:extLst>
               <a:ext uri="{FF2B5EF4-FFF2-40B4-BE49-F238E27FC236}">
-                <a16:creationId xmlns:a16="http://schemas.microsoft.com/office/drawing/2014/main" id="{8ADB82EB-A5C3-4A57-B408-2D822B864873}"/>
+                <a16:creationId xmlns:a16="http://schemas.microsoft.com/office/drawing/2014/main" id="{FF485114-DF57-47DE-8E1F-CB0FDC726C2F}"/>
               </a:ext>
             </a:extLst>
           </p:cNvPr>
           <p:cNvPicPr>
-            <a:picLocks noChangeAspect="1"/>
+            <a:picLocks noChangeAspect="1" noChangeArrowheads="1"/>
           </p:cNvPicPr>
           <p:nvPr/>
         </p:nvPicPr>
         <p:blipFill>
-          <a:blip r:embed="rId2"/>
+          <a:blip r:embed="rId2">
+            <a:extLst>
+              <a:ext uri="{28A0092B-C50C-407E-A947-70E740481C1C}">
+                <a14:useLocalDpi xmlns:a14="http://schemas.microsoft.com/office/drawing/2010/main" val="0"/>
+              </a:ext>
+            </a:extLst>
+          </a:blip>
+          <a:srcRect/>
           <a:stretch>
             <a:fillRect/>
           </a:stretch>
         </p:blipFill>
-        <p:spPr>
+        <p:spPr bwMode="auto">
           <a:xfrm>
-            <a:off x="223837" y="2533649"/>
-            <a:ext cx="11744325" cy="1524000"/>
+            <a:off x="1543573" y="721360"/>
+            <a:ext cx="9269835" cy="6019193"/>
           </a:xfrm>
           <a:prstGeom prst="rect">
             <a:avLst/>
           </a:prstGeom>
+          <a:noFill/>
+          <a:extLst>
+            <a:ext uri="{909E8E84-426E-40DD-AFC4-6F175D3DCCD1}">
+              <a14:hiddenFill xmlns:a14="http://schemas.microsoft.com/office/drawing/2010/main">
+                <a:solidFill>
+                  <a:srgbClr val="FFFFFF"/>
+                </a:solidFill>
+              </a14:hiddenFill>
+            </a:ext>
+          </a:extLst>
         </p:spPr>
       </p:pic>
+      <p:sp>
+        <p:nvSpPr>
+          <p:cNvPr id="5" name="Title 1">
+            <a:extLst>
+              <a:ext uri="{FF2B5EF4-FFF2-40B4-BE49-F238E27FC236}">
+                <a16:creationId xmlns:a16="http://schemas.microsoft.com/office/drawing/2014/main" id="{52EF8F1A-F346-45E3-AF34-081F08E0A1D7}"/>
+              </a:ext>
+            </a:extLst>
+          </p:cNvPr>
+          <p:cNvSpPr>
+            <a:spLocks noGrp="1"/>
+          </p:cNvSpPr>
+          <p:nvPr>
+            <p:ph type="title"/>
+          </p:nvPr>
+        </p:nvSpPr>
+        <p:spPr>
+          <a:xfrm>
+            <a:off x="859011" y="30150"/>
+            <a:ext cx="10739625" cy="640876"/>
+          </a:xfrm>
+        </p:spPr>
+        <p:txBody>
+          <a:bodyPr>
+            <a:normAutofit fontScale="90000"/>
+          </a:bodyPr>
+          <a:lstStyle/>
+          <a:p>
+            <a:r>
+              <a:rPr lang="en-US" sz="3600" dirty="0"/>
+              <a:t>New Relic: Digital Performance Monitoring and Management</a:t>
+            </a:r>
+            <a:endParaRPr lang="en-US" sz="2400" dirty="0"/>
+          </a:p>
+        </p:txBody>
+      </p:sp>
     </p:spTree>
     <p:extLst>
       <p:ext uri="{BB962C8B-B14F-4D97-AF65-F5344CB8AC3E}">
-        <p14:creationId xmlns:p14="http://schemas.microsoft.com/office/powerpoint/2010/main" val="1195355037"/>
+        <p14:creationId xmlns:p14="http://schemas.microsoft.com/office/powerpoint/2010/main" val="3992331336"/>
       </p:ext>
     </p:extLst>
   </p:cSld>
@@ -9338,7 +9435,7 @@
           <p:nvPr>
             <p:extLst>
               <p:ext uri="{D42A27DB-BD31-4B8C-83A1-F6EECF244321}">
-                <p14:modId xmlns:p14="http://schemas.microsoft.com/office/powerpoint/2010/main" val="1705458256"/>
+                <p14:modId xmlns:p14="http://schemas.microsoft.com/office/powerpoint/2010/main" val="3035786977"/>
               </p:ext>
             </p:extLst>
           </p:nvPr>
@@ -9539,7 +9636,7 @@
                       <a:pPr algn="ctr"/>
                       <a:r>
                         <a:rPr lang="en-US" sz="1900" dirty="0"/>
-                        <a:t>2 min 33 sec</a:t>
+                        <a:t>3 min 20 sec</a:t>
                       </a:r>
                     </a:p>
                   </a:txBody>
@@ -9553,7 +9650,7 @@
                       <a:pPr algn="ctr"/>
                       <a:r>
                         <a:rPr lang="en-US" sz="1900" dirty="0"/>
-                        <a:t>4.1 GB</a:t>
+                        <a:t>3.5 GB</a:t>
                       </a:r>
                     </a:p>
                   </a:txBody>
@@ -9567,7 +9664,7 @@
                       <a:pPr algn="ctr"/>
                       <a:r>
                         <a:rPr lang="en-US" sz="1900" dirty="0"/>
-                        <a:t>3.1 GB / 47 = 67 Mb</a:t>
+                        <a:t>2.5 GB / 47 = 54 Mb</a:t>
                       </a:r>
                     </a:p>
                   </a:txBody>
@@ -9616,7 +9713,7 @@
                       <a:pPr algn="ctr"/>
                       <a:r>
                         <a:rPr lang="en-US" sz="1900" dirty="0"/>
-                        <a:t>2 min 12 sec</a:t>
+                        <a:t>1 min 57 sec</a:t>
                       </a:r>
                     </a:p>
                   </a:txBody>
@@ -9630,7 +9727,7 @@
                       <a:pPr algn="ctr"/>
                       <a:r>
                         <a:rPr lang="en-US" sz="1900" dirty="0"/>
-                        <a:t>2.2 GB</a:t>
+                        <a:t>2.0 GB</a:t>
                       </a:r>
                     </a:p>
                   </a:txBody>
@@ -9643,8 +9740,20 @@
                     <a:p>
                       <a:pPr algn="ctr"/>
                       <a:r>
+                        <a:rPr lang="en-US" sz="1900"/>
+                        <a:t>1.0 GB </a:t>
+                      </a:r>
+                      <a:r>
                         <a:rPr lang="en-US" sz="1900" dirty="0"/>
-                        <a:t>1.2 GB / 47 = 26 Mb</a:t>
+                        <a:t>/ 47 </a:t>
+                      </a:r>
+                      <a:r>
+                        <a:rPr lang="en-US" sz="1900"/>
+                        <a:t>= 22 </a:t>
+                      </a:r>
+                      <a:r>
+                        <a:rPr lang="en-US" sz="1900" dirty="0"/>
+                        <a:t>Mb</a:t>
                       </a:r>
                     </a:p>
                   </a:txBody>
@@ -9747,6 +9856,695 @@
       </p:grpSpPr>
       <p:sp>
         <p:nvSpPr>
+          <p:cNvPr id="5" name="Slide Number Placeholder 4">
+            <a:extLst>
+              <a:ext uri="{FF2B5EF4-FFF2-40B4-BE49-F238E27FC236}">
+                <a16:creationId xmlns:a16="http://schemas.microsoft.com/office/drawing/2014/main" id="{FDDC2F75-7AA4-48DE-AE07-C47DCCF5C4AF}"/>
+              </a:ext>
+            </a:extLst>
+          </p:cNvPr>
+          <p:cNvSpPr>
+            <a:spLocks noGrp="1"/>
+          </p:cNvSpPr>
+          <p:nvPr>
+            <p:ph type="sldNum" sz="quarter" idx="12"/>
+          </p:nvPr>
+        </p:nvSpPr>
+        <p:spPr>
+          <a:xfrm>
+            <a:off x="11515632" y="6351753"/>
+            <a:ext cx="551167" cy="365125"/>
+          </a:xfrm>
+        </p:spPr>
+        <p:txBody>
+          <a:bodyPr/>
+          <a:lstStyle/>
+          <a:p>
+            <a:fld id="{D57F1E4F-1CFF-5643-939E-217C01CDF565}" type="slidenum">
+              <a:rPr lang="en-US" sz="1400" smtClean="0"/>
+              <a:pPr/>
+              <a:t>19</a:t>
+            </a:fld>
+            <a:endParaRPr lang="en-US" sz="1400" dirty="0"/>
+          </a:p>
+        </p:txBody>
+      </p:sp>
+      <p:sp>
+        <p:nvSpPr>
+          <p:cNvPr id="14" name="Title 1">
+            <a:extLst>
+              <a:ext uri="{FF2B5EF4-FFF2-40B4-BE49-F238E27FC236}">
+                <a16:creationId xmlns:a16="http://schemas.microsoft.com/office/drawing/2014/main" id="{CDA62E26-B6DF-4809-BF61-13C69C117C69}"/>
+              </a:ext>
+            </a:extLst>
+          </p:cNvPr>
+          <p:cNvSpPr>
+            <a:spLocks noGrp="1"/>
+          </p:cNvSpPr>
+          <p:nvPr>
+            <p:ph type="title"/>
+          </p:nvPr>
+        </p:nvSpPr>
+        <p:spPr>
+          <a:xfrm>
+            <a:off x="1484310" y="44582"/>
+            <a:ext cx="9743128" cy="695748"/>
+          </a:xfrm>
+        </p:spPr>
+        <p:txBody>
+          <a:bodyPr>
+            <a:normAutofit fontScale="90000"/>
+          </a:bodyPr>
+          <a:lstStyle/>
+          <a:p>
+            <a:r>
+              <a:rPr lang="en-US" dirty="0"/>
+              <a:t>.NET Core &amp; .NET Standard</a:t>
+            </a:r>
+            <a:endParaRPr lang="en-US" sz="2400" dirty="0"/>
+          </a:p>
+        </p:txBody>
+      </p:sp>
+      <p:sp>
+        <p:nvSpPr>
+          <p:cNvPr id="8" name="TextBox 7">
+            <a:extLst>
+              <a:ext uri="{FF2B5EF4-FFF2-40B4-BE49-F238E27FC236}">
+                <a16:creationId xmlns:a16="http://schemas.microsoft.com/office/drawing/2014/main" id="{B31FD97B-DEC5-4073-B473-7716BCF62A3C}"/>
+              </a:ext>
+            </a:extLst>
+          </p:cNvPr>
+          <p:cNvSpPr txBox="1"/>
+          <p:nvPr/>
+        </p:nvSpPr>
+        <p:spPr>
+          <a:xfrm>
+            <a:off x="2048089" y="5890088"/>
+            <a:ext cx="9454932" cy="923330"/>
+          </a:xfrm>
+          <a:prstGeom prst="rect">
+            <a:avLst/>
+          </a:prstGeom>
+          <a:noFill/>
+        </p:spPr>
+        <p:txBody>
+          <a:bodyPr wrap="square" rtlCol="0">
+            <a:spAutoFit/>
+          </a:bodyPr>
+          <a:lstStyle/>
+          <a:p>
+            <a:r>
+              <a:rPr lang="en-US" dirty="0"/>
+              <a:t>See also: </a:t>
+            </a:r>
+          </a:p>
+          <a:p>
+            <a:pPr marL="285750" indent="-285750">
+              <a:buFont typeface="Arial" panose="020B0604020202020204" pitchFamily="34" charset="0"/>
+              <a:buChar char="•"/>
+            </a:pPr>
+            <a:r>
+              <a:rPr lang="en-US" dirty="0">
+                <a:hlinkClick r:id="rId3"/>
+              </a:rPr>
+              <a:t>https://github.com/dotnet/standard/blob/23ee76bbcd4997c199472a95a9d01f1a74f98e94/docs/faq.md</a:t>
+            </a:r>
+            <a:r>
+              <a:rPr lang="en-US" dirty="0"/>
+              <a:t> </a:t>
+            </a:r>
+          </a:p>
+        </p:txBody>
+      </p:sp>
+      <p:pic>
+        <p:nvPicPr>
+          <p:cNvPr id="2" name="Picture 1">
+            <a:extLst>
+              <a:ext uri="{FF2B5EF4-FFF2-40B4-BE49-F238E27FC236}">
+                <a16:creationId xmlns:a16="http://schemas.microsoft.com/office/drawing/2014/main" id="{1D6A109A-D425-414D-86EF-6C5B1C640DA8}"/>
+              </a:ext>
+            </a:extLst>
+          </p:cNvPr>
+          <p:cNvPicPr>
+            <a:picLocks noChangeAspect="1"/>
+          </p:cNvPicPr>
+          <p:nvPr/>
+        </p:nvPicPr>
+        <p:blipFill>
+          <a:blip r:embed="rId4"/>
+          <a:stretch>
+            <a:fillRect/>
+          </a:stretch>
+        </p:blipFill>
+        <p:spPr>
+          <a:xfrm>
+            <a:off x="275271" y="3928203"/>
+            <a:ext cx="11791527" cy="1126397"/>
+          </a:xfrm>
+          <a:prstGeom prst="rect">
+            <a:avLst/>
+          </a:prstGeom>
+        </p:spPr>
+      </p:pic>
+      <p:pic>
+        <p:nvPicPr>
+          <p:cNvPr id="6" name="Picture 5">
+            <a:extLst>
+              <a:ext uri="{FF2B5EF4-FFF2-40B4-BE49-F238E27FC236}">
+                <a16:creationId xmlns:a16="http://schemas.microsoft.com/office/drawing/2014/main" id="{11425682-FBB6-4F76-89FD-96695DC90C35}"/>
+              </a:ext>
+            </a:extLst>
+          </p:cNvPr>
+          <p:cNvPicPr>
+            <a:picLocks noChangeAspect="1"/>
+          </p:cNvPicPr>
+          <p:nvPr/>
+        </p:nvPicPr>
+        <p:blipFill>
+          <a:blip r:embed="rId5"/>
+          <a:stretch>
+            <a:fillRect/>
+          </a:stretch>
+        </p:blipFill>
+        <p:spPr>
+          <a:xfrm>
+            <a:off x="275271" y="1164056"/>
+            <a:ext cx="11791527" cy="1564269"/>
+          </a:xfrm>
+          <a:prstGeom prst="rect">
+            <a:avLst/>
+          </a:prstGeom>
+        </p:spPr>
+      </p:pic>
+    </p:spTree>
+    <p:extLst>
+      <p:ext uri="{BB962C8B-B14F-4D97-AF65-F5344CB8AC3E}">
+        <p14:creationId xmlns:p14="http://schemas.microsoft.com/office/powerpoint/2010/main" val="3294703118"/>
+      </p:ext>
+    </p:extLst>
+  </p:cSld>
+  <p:clrMapOvr>
+    <a:masterClrMapping/>
+  </p:clrMapOvr>
+</p:sld>
+</file>
+
+<file path=ppt/slides/slide2.xml><?xml version="1.0" encoding="utf-8"?>
+<p:sld xmlns:a="http://schemas.openxmlformats.org/drawingml/2006/main" xmlns:r="http://schemas.openxmlformats.org/officeDocument/2006/relationships" xmlns:p="http://schemas.openxmlformats.org/presentationml/2006/main">
+  <p:cSld>
+    <p:spTree>
+      <p:nvGrpSpPr>
+        <p:cNvPr id="1" name=""/>
+        <p:cNvGrpSpPr/>
+        <p:nvPr/>
+      </p:nvGrpSpPr>
+      <p:grpSpPr>
+        <a:xfrm>
+          <a:off x="0" y="0"/>
+          <a:ext cx="0" cy="0"/>
+          <a:chOff x="0" y="0"/>
+          <a:chExt cx="0" cy="0"/>
+        </a:xfrm>
+      </p:grpSpPr>
+      <p:sp>
+        <p:nvSpPr>
+          <p:cNvPr id="2" name="Title 1">
+            <a:extLst>
+              <a:ext uri="{FF2B5EF4-FFF2-40B4-BE49-F238E27FC236}">
+                <a16:creationId xmlns:a16="http://schemas.microsoft.com/office/drawing/2014/main" id="{B02AB487-2F5B-49F7-8C3D-67F15393C0D0}"/>
+              </a:ext>
+            </a:extLst>
+          </p:cNvPr>
+          <p:cNvSpPr>
+            <a:spLocks noGrp="1"/>
+          </p:cNvSpPr>
+          <p:nvPr>
+            <p:ph type="title"/>
+          </p:nvPr>
+        </p:nvSpPr>
+        <p:spPr>
+          <a:xfrm>
+            <a:off x="1484307" y="550183"/>
+            <a:ext cx="10018713" cy="562232"/>
+          </a:xfrm>
+        </p:spPr>
+        <p:txBody>
+          <a:bodyPr>
+            <a:normAutofit fontScale="90000"/>
+          </a:bodyPr>
+          <a:lstStyle/>
+          <a:p>
+            <a:r>
+              <a:rPr lang="en-US" dirty="0"/>
+              <a:t>The presentation target</a:t>
+            </a:r>
+          </a:p>
+        </p:txBody>
+      </p:sp>
+      <p:sp>
+        <p:nvSpPr>
+          <p:cNvPr id="3" name="Content Placeholder 2">
+            <a:extLst>
+              <a:ext uri="{FF2B5EF4-FFF2-40B4-BE49-F238E27FC236}">
+                <a16:creationId xmlns:a16="http://schemas.microsoft.com/office/drawing/2014/main" id="{35A16442-C7CD-4B18-B0C7-A04AA674A774}"/>
+              </a:ext>
+            </a:extLst>
+          </p:cNvPr>
+          <p:cNvSpPr>
+            <a:spLocks noGrp="1"/>
+          </p:cNvSpPr>
+          <p:nvPr>
+            <p:ph idx="1"/>
+          </p:nvPr>
+        </p:nvSpPr>
+        <p:spPr>
+          <a:xfrm>
+            <a:off x="1484308" y="1458102"/>
+            <a:ext cx="10018713" cy="1316854"/>
+          </a:xfrm>
+        </p:spPr>
+        <p:txBody>
+          <a:bodyPr>
+            <a:normAutofit/>
+          </a:bodyPr>
+          <a:lstStyle/>
+          <a:p>
+            <a:r>
+              <a:rPr lang="en-US" sz="3000" dirty="0"/>
+              <a:t>Optimization path</a:t>
+            </a:r>
+            <a:endParaRPr lang="ru-RU" sz="3000" dirty="0"/>
+          </a:p>
+          <a:p>
+            <a:r>
+              <a:rPr lang="en-US" sz="3000" dirty="0"/>
+              <a:t>Tools for analyzing</a:t>
+            </a:r>
+          </a:p>
+        </p:txBody>
+      </p:sp>
+      <p:sp>
+        <p:nvSpPr>
+          <p:cNvPr id="10" name="TextBox 9">
+            <a:extLst>
+              <a:ext uri="{FF2B5EF4-FFF2-40B4-BE49-F238E27FC236}">
+                <a16:creationId xmlns:a16="http://schemas.microsoft.com/office/drawing/2014/main" id="{3C4A5FE6-11E7-4E7D-B9B4-099E145BB778}"/>
+              </a:ext>
+            </a:extLst>
+          </p:cNvPr>
+          <p:cNvSpPr txBox="1"/>
+          <p:nvPr/>
+        </p:nvSpPr>
+        <p:spPr>
+          <a:xfrm>
+            <a:off x="1484306" y="3176446"/>
+            <a:ext cx="10018713" cy="646331"/>
+          </a:xfrm>
+          <a:prstGeom prst="rect">
+            <a:avLst/>
+          </a:prstGeom>
+          <a:noFill/>
+        </p:spPr>
+        <p:txBody>
+          <a:bodyPr wrap="square" rtlCol="0">
+            <a:spAutoFit/>
+          </a:bodyPr>
+          <a:lstStyle/>
+          <a:p>
+            <a:pPr algn="ctr"/>
+            <a:r>
+              <a:rPr lang="en-US" sz="3600" dirty="0">
+                <a:latin typeface="+mj-lt"/>
+              </a:rPr>
+              <a:t>Used tools</a:t>
+            </a:r>
+          </a:p>
+        </p:txBody>
+      </p:sp>
+      <p:sp>
+        <p:nvSpPr>
+          <p:cNvPr id="11" name="TextBox 10">
+            <a:extLst>
+              <a:ext uri="{FF2B5EF4-FFF2-40B4-BE49-F238E27FC236}">
+                <a16:creationId xmlns:a16="http://schemas.microsoft.com/office/drawing/2014/main" id="{4E2F5036-7630-4C8F-A70A-7138B7C13F7F}"/>
+              </a:ext>
+            </a:extLst>
+          </p:cNvPr>
+          <p:cNvSpPr txBox="1"/>
+          <p:nvPr/>
+        </p:nvSpPr>
+        <p:spPr>
+          <a:xfrm>
+            <a:off x="1484306" y="4233654"/>
+            <a:ext cx="9757349" cy="1015663"/>
+          </a:xfrm>
+          <a:prstGeom prst="rect">
+            <a:avLst/>
+          </a:prstGeom>
+          <a:noFill/>
+        </p:spPr>
+        <p:txBody>
+          <a:bodyPr wrap="square" rtlCol="0">
+            <a:spAutoFit/>
+          </a:bodyPr>
+          <a:lstStyle/>
+          <a:p>
+            <a:pPr marL="285750" indent="-285750">
+              <a:buFont typeface="Arial" panose="020B0604020202020204" pitchFamily="34" charset="0"/>
+              <a:buChar char="•"/>
+            </a:pPr>
+            <a:r>
+              <a:rPr lang="en-US" sz="3000" dirty="0" err="1">
+                <a:hlinkClick r:id="rId2"/>
+              </a:rPr>
+              <a:t>Sysinternals</a:t>
+            </a:r>
+            <a:r>
+              <a:rPr lang="en-US" sz="3000" dirty="0">
+                <a:hlinkClick r:id="rId2"/>
+              </a:rPr>
+              <a:t> Process Explorer v16.21</a:t>
+            </a:r>
+            <a:endParaRPr lang="en-US" sz="3000" dirty="0"/>
+          </a:p>
+          <a:p>
+            <a:pPr marL="285750" indent="-285750">
+              <a:buFont typeface="Arial" panose="020B0604020202020204" pitchFamily="34" charset="0"/>
+              <a:buChar char="•"/>
+            </a:pPr>
+            <a:r>
+              <a:rPr lang="en-US" sz="3000" dirty="0" err="1">
+                <a:hlinkClick r:id="rId3"/>
+              </a:rPr>
+              <a:t>Sysinternals</a:t>
+            </a:r>
+            <a:r>
+              <a:rPr lang="en-US" sz="3000" dirty="0">
+                <a:hlinkClick r:id="rId3"/>
+              </a:rPr>
+              <a:t> </a:t>
+            </a:r>
+            <a:r>
+              <a:rPr lang="en-US" sz="3000" dirty="0" err="1">
+                <a:hlinkClick r:id="rId3"/>
+              </a:rPr>
+              <a:t>VMMap</a:t>
+            </a:r>
+            <a:r>
+              <a:rPr lang="en-US" sz="3000" dirty="0">
+                <a:hlinkClick r:id="rId3"/>
+              </a:rPr>
+              <a:t> v3.21 </a:t>
+            </a:r>
+            <a:endParaRPr lang="en-US" sz="3000" dirty="0"/>
+          </a:p>
+        </p:txBody>
+      </p:sp>
+      <p:sp>
+        <p:nvSpPr>
+          <p:cNvPr id="5" name="Slide Number Placeholder 4">
+            <a:extLst>
+              <a:ext uri="{FF2B5EF4-FFF2-40B4-BE49-F238E27FC236}">
+                <a16:creationId xmlns:a16="http://schemas.microsoft.com/office/drawing/2014/main" id="{965D5273-CD4A-4167-AF3A-FBCFC1172F8A}"/>
+              </a:ext>
+            </a:extLst>
+          </p:cNvPr>
+          <p:cNvSpPr>
+            <a:spLocks noGrp="1"/>
+          </p:cNvSpPr>
+          <p:nvPr>
+            <p:ph type="sldNum" sz="quarter" idx="12"/>
+          </p:nvPr>
+        </p:nvSpPr>
+        <p:spPr/>
+        <p:txBody>
+          <a:bodyPr/>
+          <a:lstStyle/>
+          <a:p>
+            <a:fld id="{D57F1E4F-1CFF-5643-939E-217C01CDF565}" type="slidenum">
+              <a:rPr lang="en-US" sz="1400" smtClean="0"/>
+              <a:pPr/>
+              <a:t>2</a:t>
+            </a:fld>
+            <a:endParaRPr lang="en-US" sz="1400" dirty="0"/>
+          </a:p>
+        </p:txBody>
+      </p:sp>
+    </p:spTree>
+    <p:extLst>
+      <p:ext uri="{BB962C8B-B14F-4D97-AF65-F5344CB8AC3E}">
+        <p14:creationId xmlns:p14="http://schemas.microsoft.com/office/powerpoint/2010/main" val="7031892"/>
+      </p:ext>
+    </p:extLst>
+  </p:cSld>
+  <p:clrMapOvr>
+    <a:masterClrMapping/>
+  </p:clrMapOvr>
+</p:sld>
+</file>
+
+<file path=ppt/slides/slide20.xml><?xml version="1.0" encoding="utf-8"?>
+<p:sld xmlns:a="http://schemas.openxmlformats.org/drawingml/2006/main" xmlns:r="http://schemas.openxmlformats.org/officeDocument/2006/relationships" xmlns:p="http://schemas.openxmlformats.org/presentationml/2006/main">
+  <p:cSld>
+    <p:spTree>
+      <p:nvGrpSpPr>
+        <p:cNvPr id="1" name=""/>
+        <p:cNvGrpSpPr/>
+        <p:nvPr/>
+      </p:nvGrpSpPr>
+      <p:grpSpPr>
+        <a:xfrm>
+          <a:off x="0" y="0"/>
+          <a:ext cx="0" cy="0"/>
+          <a:chOff x="0" y="0"/>
+          <a:chExt cx="0" cy="0"/>
+        </a:xfrm>
+      </p:grpSpPr>
+      <p:sp>
+        <p:nvSpPr>
+          <p:cNvPr id="5" name="Slide Number Placeholder 4">
+            <a:extLst>
+              <a:ext uri="{FF2B5EF4-FFF2-40B4-BE49-F238E27FC236}">
+                <a16:creationId xmlns:a16="http://schemas.microsoft.com/office/drawing/2014/main" id="{FDDC2F75-7AA4-48DE-AE07-C47DCCF5C4AF}"/>
+              </a:ext>
+            </a:extLst>
+          </p:cNvPr>
+          <p:cNvSpPr>
+            <a:spLocks noGrp="1"/>
+          </p:cNvSpPr>
+          <p:nvPr>
+            <p:ph type="sldNum" sz="quarter" idx="12"/>
+          </p:nvPr>
+        </p:nvSpPr>
+        <p:spPr>
+          <a:xfrm>
+            <a:off x="11515632" y="6351753"/>
+            <a:ext cx="551167" cy="365125"/>
+          </a:xfrm>
+        </p:spPr>
+        <p:txBody>
+          <a:bodyPr/>
+          <a:lstStyle/>
+          <a:p>
+            <a:fld id="{D57F1E4F-1CFF-5643-939E-217C01CDF565}" type="slidenum">
+              <a:rPr lang="en-US" sz="1400" smtClean="0"/>
+              <a:pPr/>
+              <a:t>20</a:t>
+            </a:fld>
+            <a:endParaRPr lang="en-US" sz="1400" dirty="0"/>
+          </a:p>
+        </p:txBody>
+      </p:sp>
+      <p:sp>
+        <p:nvSpPr>
+          <p:cNvPr id="14" name="Title 1">
+            <a:extLst>
+              <a:ext uri="{FF2B5EF4-FFF2-40B4-BE49-F238E27FC236}">
+                <a16:creationId xmlns:a16="http://schemas.microsoft.com/office/drawing/2014/main" id="{CDA62E26-B6DF-4809-BF61-13C69C117C69}"/>
+              </a:ext>
+            </a:extLst>
+          </p:cNvPr>
+          <p:cNvSpPr>
+            <a:spLocks noGrp="1"/>
+          </p:cNvSpPr>
+          <p:nvPr>
+            <p:ph type="title"/>
+          </p:nvPr>
+        </p:nvSpPr>
+        <p:spPr>
+          <a:xfrm>
+            <a:off x="1484310" y="44582"/>
+            <a:ext cx="9743128" cy="695748"/>
+          </a:xfrm>
+        </p:spPr>
+        <p:txBody>
+          <a:bodyPr>
+            <a:normAutofit fontScale="90000"/>
+          </a:bodyPr>
+          <a:lstStyle/>
+          <a:p>
+            <a:r>
+              <a:rPr lang="en-US" dirty="0"/>
+              <a:t>.NET Core &amp; .NET Standard</a:t>
+            </a:r>
+            <a:endParaRPr lang="en-US" sz="2400" dirty="0"/>
+          </a:p>
+        </p:txBody>
+      </p:sp>
+      <p:sp>
+        <p:nvSpPr>
+          <p:cNvPr id="8" name="TextBox 7">
+            <a:extLst>
+              <a:ext uri="{FF2B5EF4-FFF2-40B4-BE49-F238E27FC236}">
+                <a16:creationId xmlns:a16="http://schemas.microsoft.com/office/drawing/2014/main" id="{B31FD97B-DEC5-4073-B473-7716BCF62A3C}"/>
+              </a:ext>
+            </a:extLst>
+          </p:cNvPr>
+          <p:cNvSpPr txBox="1"/>
+          <p:nvPr/>
+        </p:nvSpPr>
+        <p:spPr>
+          <a:xfrm>
+            <a:off x="2048089" y="5890088"/>
+            <a:ext cx="9454932" cy="923330"/>
+          </a:xfrm>
+          <a:prstGeom prst="rect">
+            <a:avLst/>
+          </a:prstGeom>
+          <a:noFill/>
+        </p:spPr>
+        <p:txBody>
+          <a:bodyPr wrap="square" rtlCol="0">
+            <a:spAutoFit/>
+          </a:bodyPr>
+          <a:lstStyle/>
+          <a:p>
+            <a:r>
+              <a:rPr lang="en-US" dirty="0"/>
+              <a:t>See also: </a:t>
+            </a:r>
+          </a:p>
+          <a:p>
+            <a:pPr marL="285750" indent="-285750">
+              <a:buFont typeface="Arial" panose="020B0604020202020204" pitchFamily="34" charset="0"/>
+              <a:buChar char="•"/>
+            </a:pPr>
+            <a:r>
+              <a:rPr lang="en-US" dirty="0">
+                <a:hlinkClick r:id="rId3"/>
+              </a:rPr>
+              <a:t>https://github.com/dotnet/standard/blob/23ee76bbcd4997c199472a95a9d01f1a74f98e94/docs/faq.md</a:t>
+            </a:r>
+            <a:r>
+              <a:rPr lang="en-US" dirty="0"/>
+              <a:t> </a:t>
+            </a:r>
+          </a:p>
+        </p:txBody>
+      </p:sp>
+      <p:pic>
+        <p:nvPicPr>
+          <p:cNvPr id="3" name="Picture 2">
+            <a:extLst>
+              <a:ext uri="{FF2B5EF4-FFF2-40B4-BE49-F238E27FC236}">
+                <a16:creationId xmlns:a16="http://schemas.microsoft.com/office/drawing/2014/main" id="{409CBB54-CA20-46E7-A805-9349DF6B9289}"/>
+              </a:ext>
+            </a:extLst>
+          </p:cNvPr>
+          <p:cNvPicPr>
+            <a:picLocks noChangeAspect="1"/>
+          </p:cNvPicPr>
+          <p:nvPr/>
+        </p:nvPicPr>
+        <p:blipFill>
+          <a:blip r:embed="rId4"/>
+          <a:stretch>
+            <a:fillRect/>
+          </a:stretch>
+        </p:blipFill>
+        <p:spPr>
+          <a:xfrm>
+            <a:off x="1720201" y="829531"/>
+            <a:ext cx="9554200" cy="4871473"/>
+          </a:xfrm>
+          <a:prstGeom prst="rect">
+            <a:avLst/>
+          </a:prstGeom>
+        </p:spPr>
+      </p:pic>
+      <p:cxnSp>
+        <p:nvCxnSpPr>
+          <p:cNvPr id="10" name="Straight Connector 9">
+            <a:extLst>
+              <a:ext uri="{FF2B5EF4-FFF2-40B4-BE49-F238E27FC236}">
+                <a16:creationId xmlns:a16="http://schemas.microsoft.com/office/drawing/2014/main" id="{E0241BDA-E1E7-4592-8FCB-8043517CC2F5}"/>
+              </a:ext>
+            </a:extLst>
+          </p:cNvPr>
+          <p:cNvCxnSpPr/>
+          <p:nvPr/>
+        </p:nvCxnSpPr>
+        <p:spPr>
+          <a:xfrm>
+            <a:off x="3387012" y="4049486"/>
+            <a:ext cx="6774025" cy="0"/>
+          </a:xfrm>
+          <a:prstGeom prst="line">
+            <a:avLst/>
+          </a:prstGeom>
+          <a:ln w="38100">
+            <a:solidFill>
+              <a:srgbClr val="C00000"/>
+            </a:solidFill>
+          </a:ln>
+        </p:spPr>
+        <p:style>
+          <a:lnRef idx="1">
+            <a:schemeClr val="accent1"/>
+          </a:lnRef>
+          <a:fillRef idx="0">
+            <a:schemeClr val="accent1"/>
+          </a:fillRef>
+          <a:effectRef idx="0">
+            <a:schemeClr val="accent1"/>
+          </a:effectRef>
+          <a:fontRef idx="minor">
+            <a:schemeClr val="tx1"/>
+          </a:fontRef>
+        </p:style>
+      </p:cxnSp>
+    </p:spTree>
+    <p:extLst>
+      <p:ext uri="{BB962C8B-B14F-4D97-AF65-F5344CB8AC3E}">
+        <p14:creationId xmlns:p14="http://schemas.microsoft.com/office/powerpoint/2010/main" val="3779231215"/>
+      </p:ext>
+    </p:extLst>
+  </p:cSld>
+  <p:clrMapOvr>
+    <a:masterClrMapping/>
+  </p:clrMapOvr>
+</p:sld>
+</file>
+
+<file path=ppt/slides/slide21.xml><?xml version="1.0" encoding="utf-8"?>
+<p:sld xmlns:a="http://schemas.openxmlformats.org/drawingml/2006/main" xmlns:r="http://schemas.openxmlformats.org/officeDocument/2006/relationships" xmlns:p="http://schemas.openxmlformats.org/presentationml/2006/main">
+  <p:cSld>
+    <p:spTree>
+      <p:nvGrpSpPr>
+        <p:cNvPr id="1" name=""/>
+        <p:cNvGrpSpPr/>
+        <p:nvPr/>
+      </p:nvGrpSpPr>
+      <p:grpSpPr>
+        <a:xfrm>
+          <a:off x="0" y="0"/>
+          <a:ext cx="0" cy="0"/>
+          <a:chOff x="0" y="0"/>
+          <a:chExt cx="0" cy="0"/>
+        </a:xfrm>
+      </p:grpSpPr>
+      <p:sp>
+        <p:nvSpPr>
           <p:cNvPr id="2" name="Title 1"/>
           <p:cNvSpPr>
             <a:spLocks noGrp="1"/>
@@ -9864,7 +10662,7 @@
             <a:fld id="{D57F1E4F-1CFF-5643-939E-217C01CDF565}" type="slidenum">
               <a:rPr lang="en-US" sz="1400" smtClean="0"/>
               <a:pPr/>
-              <a:t>19</a:t>
+              <a:t>21</a:t>
             </a:fld>
             <a:endParaRPr lang="en-US" sz="1400" dirty="0"/>
           </a:p>
@@ -9973,7 +10771,7 @@
 </p:sld>
 </file>
 
-<file path=ppt/slides/slide2.xml><?xml version="1.0" encoding="utf-8"?>
+<file path=ppt/slides/slide22.xml><?xml version="1.0" encoding="utf-8"?>
 <p:sld xmlns:a="http://schemas.openxmlformats.org/drawingml/2006/main" xmlns:r="http://schemas.openxmlformats.org/officeDocument/2006/relationships" xmlns:p="http://schemas.openxmlformats.org/presentationml/2006/main">
   <p:cSld>
     <p:spTree>
@@ -9992,483 +10790,6 @@
       </p:grpSpPr>
       <p:sp>
         <p:nvSpPr>
-          <p:cNvPr id="2" name="Title 1">
-            <a:extLst>
-              <a:ext uri="{FF2B5EF4-FFF2-40B4-BE49-F238E27FC236}">
-                <a16:creationId xmlns:a16="http://schemas.microsoft.com/office/drawing/2014/main" id="{B02AB487-2F5B-49F7-8C3D-67F15393C0D0}"/>
-              </a:ext>
-            </a:extLst>
-          </p:cNvPr>
-          <p:cNvSpPr>
-            <a:spLocks noGrp="1"/>
-          </p:cNvSpPr>
-          <p:nvPr>
-            <p:ph type="title"/>
-          </p:nvPr>
-        </p:nvSpPr>
-        <p:spPr>
-          <a:xfrm>
-            <a:off x="1484307" y="550183"/>
-            <a:ext cx="10018713" cy="562232"/>
-          </a:xfrm>
-        </p:spPr>
-        <p:txBody>
-          <a:bodyPr>
-            <a:normAutofit fontScale="90000"/>
-          </a:bodyPr>
-          <a:lstStyle/>
-          <a:p>
-            <a:r>
-              <a:rPr lang="en-US" dirty="0"/>
-              <a:t>The presentation target</a:t>
-            </a:r>
-          </a:p>
-        </p:txBody>
-      </p:sp>
-      <p:sp>
-        <p:nvSpPr>
-          <p:cNvPr id="3" name="Content Placeholder 2">
-            <a:extLst>
-              <a:ext uri="{FF2B5EF4-FFF2-40B4-BE49-F238E27FC236}">
-                <a16:creationId xmlns:a16="http://schemas.microsoft.com/office/drawing/2014/main" id="{35A16442-C7CD-4B18-B0C7-A04AA674A774}"/>
-              </a:ext>
-            </a:extLst>
-          </p:cNvPr>
-          <p:cNvSpPr>
-            <a:spLocks noGrp="1"/>
-          </p:cNvSpPr>
-          <p:nvPr>
-            <p:ph idx="1"/>
-          </p:nvPr>
-        </p:nvSpPr>
-        <p:spPr>
-          <a:xfrm>
-            <a:off x="1484308" y="1458102"/>
-            <a:ext cx="10018713" cy="1316854"/>
-          </a:xfrm>
-        </p:spPr>
-        <p:txBody>
-          <a:bodyPr>
-            <a:normAutofit/>
-          </a:bodyPr>
-          <a:lstStyle/>
-          <a:p>
-            <a:r>
-              <a:rPr lang="en-US" sz="3000" dirty="0"/>
-              <a:t>Optimization path</a:t>
-            </a:r>
-            <a:endParaRPr lang="ru-RU" sz="3000" dirty="0"/>
-          </a:p>
-          <a:p>
-            <a:r>
-              <a:rPr lang="en-US" sz="3000" dirty="0"/>
-              <a:t>Tools for analyzing</a:t>
-            </a:r>
-          </a:p>
-        </p:txBody>
-      </p:sp>
-      <p:sp>
-        <p:nvSpPr>
-          <p:cNvPr id="10" name="TextBox 9">
-            <a:extLst>
-              <a:ext uri="{FF2B5EF4-FFF2-40B4-BE49-F238E27FC236}">
-                <a16:creationId xmlns:a16="http://schemas.microsoft.com/office/drawing/2014/main" id="{3C4A5FE6-11E7-4E7D-B9B4-099E145BB778}"/>
-              </a:ext>
-            </a:extLst>
-          </p:cNvPr>
-          <p:cNvSpPr txBox="1"/>
-          <p:nvPr/>
-        </p:nvSpPr>
-        <p:spPr>
-          <a:xfrm>
-            <a:off x="1484306" y="3176446"/>
-            <a:ext cx="10018713" cy="646331"/>
-          </a:xfrm>
-          <a:prstGeom prst="rect">
-            <a:avLst/>
-          </a:prstGeom>
-          <a:noFill/>
-        </p:spPr>
-        <p:txBody>
-          <a:bodyPr wrap="square" rtlCol="0">
-            <a:spAutoFit/>
-          </a:bodyPr>
-          <a:lstStyle/>
-          <a:p>
-            <a:pPr algn="ctr"/>
-            <a:r>
-              <a:rPr lang="en-US" sz="3600" dirty="0">
-                <a:latin typeface="+mj-lt"/>
-              </a:rPr>
-              <a:t>Used tools</a:t>
-            </a:r>
-          </a:p>
-        </p:txBody>
-      </p:sp>
-      <p:sp>
-        <p:nvSpPr>
-          <p:cNvPr id="11" name="TextBox 10">
-            <a:extLst>
-              <a:ext uri="{FF2B5EF4-FFF2-40B4-BE49-F238E27FC236}">
-                <a16:creationId xmlns:a16="http://schemas.microsoft.com/office/drawing/2014/main" id="{4E2F5036-7630-4C8F-A70A-7138B7C13F7F}"/>
-              </a:ext>
-            </a:extLst>
-          </p:cNvPr>
-          <p:cNvSpPr txBox="1"/>
-          <p:nvPr/>
-        </p:nvSpPr>
-        <p:spPr>
-          <a:xfrm>
-            <a:off x="1484306" y="4233654"/>
-            <a:ext cx="9757349" cy="1015663"/>
-          </a:xfrm>
-          <a:prstGeom prst="rect">
-            <a:avLst/>
-          </a:prstGeom>
-          <a:noFill/>
-        </p:spPr>
-        <p:txBody>
-          <a:bodyPr wrap="square" rtlCol="0">
-            <a:spAutoFit/>
-          </a:bodyPr>
-          <a:lstStyle/>
-          <a:p>
-            <a:pPr marL="285750" indent="-285750">
-              <a:buFont typeface="Arial" panose="020B0604020202020204" pitchFamily="34" charset="0"/>
-              <a:buChar char="•"/>
-            </a:pPr>
-            <a:r>
-              <a:rPr lang="en-US" sz="3000" dirty="0" err="1">
-                <a:hlinkClick r:id="rId2"/>
-              </a:rPr>
-              <a:t>Sysinternals</a:t>
-            </a:r>
-            <a:r>
-              <a:rPr lang="en-US" sz="3000" dirty="0">
-                <a:hlinkClick r:id="rId2"/>
-              </a:rPr>
-              <a:t> Process Explorer v16.21</a:t>
-            </a:r>
-            <a:endParaRPr lang="en-US" sz="3000" dirty="0"/>
-          </a:p>
-          <a:p>
-            <a:pPr marL="285750" indent="-285750">
-              <a:buFont typeface="Arial" panose="020B0604020202020204" pitchFamily="34" charset="0"/>
-              <a:buChar char="•"/>
-            </a:pPr>
-            <a:r>
-              <a:rPr lang="en-US" sz="3000" dirty="0" err="1">
-                <a:hlinkClick r:id="rId3"/>
-              </a:rPr>
-              <a:t>Sysinternals</a:t>
-            </a:r>
-            <a:r>
-              <a:rPr lang="en-US" sz="3000" dirty="0">
-                <a:hlinkClick r:id="rId3"/>
-              </a:rPr>
-              <a:t> </a:t>
-            </a:r>
-            <a:r>
-              <a:rPr lang="en-US" sz="3000" dirty="0" err="1">
-                <a:hlinkClick r:id="rId3"/>
-              </a:rPr>
-              <a:t>VMMap</a:t>
-            </a:r>
-            <a:r>
-              <a:rPr lang="en-US" sz="3000" dirty="0">
-                <a:hlinkClick r:id="rId3"/>
-              </a:rPr>
-              <a:t> v3.21 </a:t>
-            </a:r>
-            <a:endParaRPr lang="en-US" sz="3000" dirty="0"/>
-          </a:p>
-        </p:txBody>
-      </p:sp>
-      <p:sp>
-        <p:nvSpPr>
-          <p:cNvPr id="5" name="Slide Number Placeholder 4">
-            <a:extLst>
-              <a:ext uri="{FF2B5EF4-FFF2-40B4-BE49-F238E27FC236}">
-                <a16:creationId xmlns:a16="http://schemas.microsoft.com/office/drawing/2014/main" id="{965D5273-CD4A-4167-AF3A-FBCFC1172F8A}"/>
-              </a:ext>
-            </a:extLst>
-          </p:cNvPr>
-          <p:cNvSpPr>
-            <a:spLocks noGrp="1"/>
-          </p:cNvSpPr>
-          <p:nvPr>
-            <p:ph type="sldNum" sz="quarter" idx="12"/>
-          </p:nvPr>
-        </p:nvSpPr>
-        <p:spPr/>
-        <p:txBody>
-          <a:bodyPr/>
-          <a:lstStyle/>
-          <a:p>
-            <a:fld id="{D57F1E4F-1CFF-5643-939E-217C01CDF565}" type="slidenum">
-              <a:rPr lang="en-US" sz="1400" smtClean="0"/>
-              <a:pPr/>
-              <a:t>2</a:t>
-            </a:fld>
-            <a:endParaRPr lang="en-US" sz="1400" dirty="0"/>
-          </a:p>
-        </p:txBody>
-      </p:sp>
-    </p:spTree>
-    <p:extLst>
-      <p:ext uri="{BB962C8B-B14F-4D97-AF65-F5344CB8AC3E}">
-        <p14:creationId xmlns:p14="http://schemas.microsoft.com/office/powerpoint/2010/main" val="7031892"/>
-      </p:ext>
-    </p:extLst>
-  </p:cSld>
-  <p:clrMapOvr>
-    <a:masterClrMapping/>
-  </p:clrMapOvr>
-</p:sld>
-</file>
-
-<file path=ppt/slides/slide20.xml><?xml version="1.0" encoding="utf-8"?>
-<p:sld xmlns:a="http://schemas.openxmlformats.org/drawingml/2006/main" xmlns:r="http://schemas.openxmlformats.org/officeDocument/2006/relationships" xmlns:p="http://schemas.openxmlformats.org/presentationml/2006/main">
-  <p:cSld>
-    <p:spTree>
-      <p:nvGrpSpPr>
-        <p:cNvPr id="1" name=""/>
-        <p:cNvGrpSpPr/>
-        <p:nvPr/>
-      </p:nvGrpSpPr>
-      <p:grpSpPr>
-        <a:xfrm>
-          <a:off x="0" y="0"/>
-          <a:ext cx="0" cy="0"/>
-          <a:chOff x="0" y="0"/>
-          <a:chExt cx="0" cy="0"/>
-        </a:xfrm>
-      </p:grpSpPr>
-      <p:sp>
-        <p:nvSpPr>
-          <p:cNvPr id="5" name="Slide Number Placeholder 4">
-            <a:extLst>
-              <a:ext uri="{FF2B5EF4-FFF2-40B4-BE49-F238E27FC236}">
-                <a16:creationId xmlns:a16="http://schemas.microsoft.com/office/drawing/2014/main" id="{FDDC2F75-7AA4-48DE-AE07-C47DCCF5C4AF}"/>
-              </a:ext>
-            </a:extLst>
-          </p:cNvPr>
-          <p:cNvSpPr>
-            <a:spLocks noGrp="1"/>
-          </p:cNvSpPr>
-          <p:nvPr>
-            <p:ph type="sldNum" sz="quarter" idx="12"/>
-          </p:nvPr>
-        </p:nvSpPr>
-        <p:spPr>
-          <a:xfrm>
-            <a:off x="11515632" y="6351753"/>
-            <a:ext cx="551167" cy="365125"/>
-          </a:xfrm>
-        </p:spPr>
-        <p:txBody>
-          <a:bodyPr/>
-          <a:lstStyle/>
-          <a:p>
-            <a:fld id="{D57F1E4F-1CFF-5643-939E-217C01CDF565}" type="slidenum">
-              <a:rPr lang="en-US" sz="1400" smtClean="0"/>
-              <a:pPr/>
-              <a:t>20</a:t>
-            </a:fld>
-            <a:endParaRPr lang="en-US" sz="1400" dirty="0"/>
-          </a:p>
-        </p:txBody>
-      </p:sp>
-      <p:sp>
-        <p:nvSpPr>
-          <p:cNvPr id="14" name="Title 1">
-            <a:extLst>
-              <a:ext uri="{FF2B5EF4-FFF2-40B4-BE49-F238E27FC236}">
-                <a16:creationId xmlns:a16="http://schemas.microsoft.com/office/drawing/2014/main" id="{CDA62E26-B6DF-4809-BF61-13C69C117C69}"/>
-              </a:ext>
-            </a:extLst>
-          </p:cNvPr>
-          <p:cNvSpPr>
-            <a:spLocks noGrp="1"/>
-          </p:cNvSpPr>
-          <p:nvPr>
-            <p:ph type="title"/>
-          </p:nvPr>
-        </p:nvSpPr>
-        <p:spPr>
-          <a:xfrm>
-            <a:off x="1484310" y="44582"/>
-            <a:ext cx="9743128" cy="695748"/>
-          </a:xfrm>
-        </p:spPr>
-        <p:txBody>
-          <a:bodyPr>
-            <a:normAutofit fontScale="90000"/>
-          </a:bodyPr>
-          <a:lstStyle/>
-          <a:p>
-            <a:r>
-              <a:rPr lang="en-US" dirty="0"/>
-              <a:t>.NET Core &amp; .NET Standard</a:t>
-            </a:r>
-            <a:endParaRPr lang="en-US" sz="2400" dirty="0"/>
-          </a:p>
-        </p:txBody>
-      </p:sp>
-      <p:sp>
-        <p:nvSpPr>
-          <p:cNvPr id="8" name="TextBox 7">
-            <a:extLst>
-              <a:ext uri="{FF2B5EF4-FFF2-40B4-BE49-F238E27FC236}">
-                <a16:creationId xmlns:a16="http://schemas.microsoft.com/office/drawing/2014/main" id="{B31FD97B-DEC5-4073-B473-7716BCF62A3C}"/>
-              </a:ext>
-            </a:extLst>
-          </p:cNvPr>
-          <p:cNvSpPr txBox="1"/>
-          <p:nvPr/>
-        </p:nvSpPr>
-        <p:spPr>
-          <a:xfrm>
-            <a:off x="2048089" y="5890088"/>
-            <a:ext cx="9454932" cy="923330"/>
-          </a:xfrm>
-          <a:prstGeom prst="rect">
-            <a:avLst/>
-          </a:prstGeom>
-          <a:noFill/>
-        </p:spPr>
-        <p:txBody>
-          <a:bodyPr wrap="square" rtlCol="0">
-            <a:spAutoFit/>
-          </a:bodyPr>
-          <a:lstStyle/>
-          <a:p>
-            <a:r>
-              <a:rPr lang="en-US" dirty="0"/>
-              <a:t>See also: </a:t>
-            </a:r>
-          </a:p>
-          <a:p>
-            <a:pPr marL="285750" indent="-285750">
-              <a:buFont typeface="Arial" panose="020B0604020202020204" pitchFamily="34" charset="0"/>
-              <a:buChar char="•"/>
-            </a:pPr>
-            <a:r>
-              <a:rPr lang="en-US" dirty="0">
-                <a:hlinkClick r:id="rId3"/>
-              </a:rPr>
-              <a:t>https://github.com/dotnet/standard/blob/23ee76bbcd4997c199472a95a9d01f1a74f98e94/docs/faq.md</a:t>
-            </a:r>
-            <a:r>
-              <a:rPr lang="en-US" dirty="0"/>
-              <a:t> </a:t>
-            </a:r>
-          </a:p>
-        </p:txBody>
-      </p:sp>
-      <p:pic>
-        <p:nvPicPr>
-          <p:cNvPr id="3" name="Picture 2">
-            <a:extLst>
-              <a:ext uri="{FF2B5EF4-FFF2-40B4-BE49-F238E27FC236}">
-                <a16:creationId xmlns:a16="http://schemas.microsoft.com/office/drawing/2014/main" id="{409CBB54-CA20-46E7-A805-9349DF6B9289}"/>
-              </a:ext>
-            </a:extLst>
-          </p:cNvPr>
-          <p:cNvPicPr>
-            <a:picLocks noChangeAspect="1"/>
-          </p:cNvPicPr>
-          <p:nvPr/>
-        </p:nvPicPr>
-        <p:blipFill>
-          <a:blip r:embed="rId4"/>
-          <a:stretch>
-            <a:fillRect/>
-          </a:stretch>
-        </p:blipFill>
-        <p:spPr>
-          <a:xfrm>
-            <a:off x="1720201" y="829531"/>
-            <a:ext cx="9554200" cy="4871473"/>
-          </a:xfrm>
-          <a:prstGeom prst="rect">
-            <a:avLst/>
-          </a:prstGeom>
-        </p:spPr>
-      </p:pic>
-      <p:cxnSp>
-        <p:nvCxnSpPr>
-          <p:cNvPr id="10" name="Straight Connector 9">
-            <a:extLst>
-              <a:ext uri="{FF2B5EF4-FFF2-40B4-BE49-F238E27FC236}">
-                <a16:creationId xmlns:a16="http://schemas.microsoft.com/office/drawing/2014/main" id="{E0241BDA-E1E7-4592-8FCB-8043517CC2F5}"/>
-              </a:ext>
-            </a:extLst>
-          </p:cNvPr>
-          <p:cNvCxnSpPr/>
-          <p:nvPr/>
-        </p:nvCxnSpPr>
-        <p:spPr>
-          <a:xfrm>
-            <a:off x="3387012" y="4049486"/>
-            <a:ext cx="6774025" cy="0"/>
-          </a:xfrm>
-          <a:prstGeom prst="line">
-            <a:avLst/>
-          </a:prstGeom>
-          <a:ln w="38100">
-            <a:solidFill>
-              <a:srgbClr val="C00000"/>
-            </a:solidFill>
-          </a:ln>
-        </p:spPr>
-        <p:style>
-          <a:lnRef idx="1">
-            <a:schemeClr val="accent1"/>
-          </a:lnRef>
-          <a:fillRef idx="0">
-            <a:schemeClr val="accent1"/>
-          </a:fillRef>
-          <a:effectRef idx="0">
-            <a:schemeClr val="accent1"/>
-          </a:effectRef>
-          <a:fontRef idx="minor">
-            <a:schemeClr val="tx1"/>
-          </a:fontRef>
-        </p:style>
-      </p:cxnSp>
-    </p:spTree>
-    <p:extLst>
-      <p:ext uri="{BB962C8B-B14F-4D97-AF65-F5344CB8AC3E}">
-        <p14:creationId xmlns:p14="http://schemas.microsoft.com/office/powerpoint/2010/main" val="3294703118"/>
-      </p:ext>
-    </p:extLst>
-  </p:cSld>
-  <p:clrMapOvr>
-    <a:masterClrMapping/>
-  </p:clrMapOvr>
-</p:sld>
-</file>
-
-<file path=ppt/slides/slide21.xml><?xml version="1.0" encoding="utf-8"?>
-<p:sld xmlns:a="http://schemas.openxmlformats.org/drawingml/2006/main" xmlns:r="http://schemas.openxmlformats.org/officeDocument/2006/relationships" xmlns:p="http://schemas.openxmlformats.org/presentationml/2006/main">
-  <p:cSld>
-    <p:spTree>
-      <p:nvGrpSpPr>
-        <p:cNvPr id="1" name=""/>
-        <p:cNvGrpSpPr/>
-        <p:nvPr/>
-      </p:nvGrpSpPr>
-      <p:grpSpPr>
-        <a:xfrm>
-          <a:off x="0" y="0"/>
-          <a:ext cx="0" cy="0"/>
-          <a:chOff x="0" y="0"/>
-          <a:chExt cx="0" cy="0"/>
-        </a:xfrm>
-      </p:grpSpPr>
-      <p:sp>
-        <p:nvSpPr>
           <p:cNvPr id="2" name="Title 1"/>
           <p:cNvSpPr>
             <a:spLocks noGrp="1"/>
@@ -10585,7 +10906,7 @@
             <a:fld id="{D57F1E4F-1CFF-5643-939E-217C01CDF565}" type="slidenum">
               <a:rPr lang="en-US" sz="1400" smtClean="0"/>
               <a:pPr/>
-              <a:t>21</a:t>
+              <a:t>22</a:t>
             </a:fld>
             <a:endParaRPr lang="en-US" sz="1400" dirty="0"/>
           </a:p>
@@ -10761,126 +11082,6 @@
       </p:grpSpPr>
       <p:sp>
         <p:nvSpPr>
-          <p:cNvPr id="2" name="Заголовок 1"/>
-          <p:cNvSpPr>
-            <a:spLocks noGrp="1"/>
-          </p:cNvSpPr>
-          <p:nvPr>
-            <p:ph type="title"/>
-          </p:nvPr>
-        </p:nvSpPr>
-        <p:spPr>
-          <a:xfrm>
-            <a:off x="1484310" y="330032"/>
-            <a:ext cx="10018713" cy="457200"/>
-          </a:xfrm>
-        </p:spPr>
-        <p:txBody>
-          <a:bodyPr>
-            <a:normAutofit fontScale="90000"/>
-          </a:bodyPr>
-          <a:lstStyle/>
-          <a:p>
-            <a:r>
-              <a:rPr lang="en-US" dirty="0"/>
-              <a:t>The structure of typical application</a:t>
-            </a:r>
-            <a:endParaRPr lang="ru-RU" dirty="0"/>
-          </a:p>
-        </p:txBody>
-      </p:sp>
-      <p:sp>
-        <p:nvSpPr>
-          <p:cNvPr id="5" name="Slide Number Placeholder 4">
-            <a:extLst>
-              <a:ext uri="{FF2B5EF4-FFF2-40B4-BE49-F238E27FC236}">
-                <a16:creationId xmlns:a16="http://schemas.microsoft.com/office/drawing/2014/main" id="{F43BC381-B53D-4A5D-97F7-9D3AA2B29C4D}"/>
-              </a:ext>
-            </a:extLst>
-          </p:cNvPr>
-          <p:cNvSpPr>
-            <a:spLocks noGrp="1"/>
-          </p:cNvSpPr>
-          <p:nvPr>
-            <p:ph type="sldNum" sz="quarter" idx="12"/>
-          </p:nvPr>
-        </p:nvSpPr>
-        <p:spPr/>
-        <p:txBody>
-          <a:bodyPr/>
-          <a:lstStyle/>
-          <a:p>
-            <a:fld id="{D57F1E4F-1CFF-5643-939E-217C01CDF565}" type="slidenum">
-              <a:rPr lang="en-US" sz="1400" smtClean="0"/>
-              <a:pPr/>
-              <a:t>4</a:t>
-            </a:fld>
-            <a:endParaRPr lang="en-US" sz="1400" dirty="0"/>
-          </a:p>
-        </p:txBody>
-      </p:sp>
-      <p:pic>
-        <p:nvPicPr>
-          <p:cNvPr id="10" name="Picture 9">
-            <a:extLst>
-              <a:ext uri="{FF2B5EF4-FFF2-40B4-BE49-F238E27FC236}">
-                <a16:creationId xmlns:a16="http://schemas.microsoft.com/office/drawing/2014/main" id="{53C532B2-0DBF-4DFC-97B6-4A8B12517AE6}"/>
-              </a:ext>
-            </a:extLst>
-          </p:cNvPr>
-          <p:cNvPicPr>
-            <a:picLocks noChangeAspect="1"/>
-          </p:cNvPicPr>
-          <p:nvPr/>
-        </p:nvPicPr>
-        <p:blipFill>
-          <a:blip r:embed="rId2"/>
-          <a:stretch>
-            <a:fillRect/>
-          </a:stretch>
-        </p:blipFill>
-        <p:spPr>
-          <a:xfrm>
-            <a:off x="233883" y="1250199"/>
-            <a:ext cx="11707455" cy="4739540"/>
-          </a:xfrm>
-          <a:prstGeom prst="rect">
-            <a:avLst/>
-          </a:prstGeom>
-        </p:spPr>
-      </p:pic>
-    </p:spTree>
-    <p:extLst>
-      <p:ext uri="{BB962C8B-B14F-4D97-AF65-F5344CB8AC3E}">
-        <p14:creationId xmlns:p14="http://schemas.microsoft.com/office/powerpoint/2010/main" val="3627014283"/>
-      </p:ext>
-    </p:extLst>
-  </p:cSld>
-  <p:clrMapOvr>
-    <a:masterClrMapping/>
-  </p:clrMapOvr>
-</p:sld>
-</file>
-
-<file path=ppt/slides/slide5.xml><?xml version="1.0" encoding="utf-8"?>
-<p:sld xmlns:a="http://schemas.openxmlformats.org/drawingml/2006/main" xmlns:r="http://schemas.openxmlformats.org/officeDocument/2006/relationships" xmlns:p="http://schemas.openxmlformats.org/presentationml/2006/main">
-  <p:cSld>
-    <p:spTree>
-      <p:nvGrpSpPr>
-        <p:cNvPr id="1" name=""/>
-        <p:cNvGrpSpPr/>
-        <p:nvPr/>
-      </p:nvGrpSpPr>
-      <p:grpSpPr>
-        <a:xfrm>
-          <a:off x="0" y="0"/>
-          <a:ext cx="0" cy="0"/>
-          <a:chOff x="0" y="0"/>
-          <a:chExt cx="0" cy="0"/>
-        </a:xfrm>
-      </p:grpSpPr>
-      <p:sp>
-        <p:nvSpPr>
           <p:cNvPr id="2" name="Title 1">
             <a:extLst>
               <a:ext uri="{FF2B5EF4-FFF2-40B4-BE49-F238E27FC236}">
@@ -11042,7 +11243,7 @@
             <a:fld id="{D57F1E4F-1CFF-5643-939E-217C01CDF565}" type="slidenum">
               <a:rPr lang="en-US" sz="1400" smtClean="0"/>
               <a:pPr/>
-              <a:t>5</a:t>
+              <a:t>4</a:t>
             </a:fld>
             <a:endParaRPr lang="en-US" sz="1400" dirty="0"/>
           </a:p>
@@ -11091,7 +11292,7 @@
 </p:sld>
 </file>
 
-<file path=ppt/slides/slide6.xml><?xml version="1.0" encoding="utf-8"?>
+<file path=ppt/slides/slide5.xml><?xml version="1.0" encoding="utf-8"?>
 <p:sld xmlns:a="http://schemas.openxmlformats.org/drawingml/2006/main" xmlns:r="http://schemas.openxmlformats.org/officeDocument/2006/relationships" xmlns:p="http://schemas.openxmlformats.org/presentationml/2006/main">
   <p:cSld>
     <p:spTree>
@@ -11172,7 +11373,7 @@
             <a:fld id="{D57F1E4F-1CFF-5643-939E-217C01CDF565}" type="slidenum">
               <a:rPr lang="en-US" sz="1400" smtClean="0"/>
               <a:pPr/>
-              <a:t>6</a:t>
+              <a:t>5</a:t>
             </a:fld>
             <a:endParaRPr lang="en-US" sz="1400" dirty="0"/>
           </a:p>
@@ -11629,7 +11830,7 @@
           </p:nvCxnSpPr>
           <p:spPr>
             <a:xfrm>
-              <a:off x="7270945" y="4966311"/>
+              <a:off x="7270945" y="4788739"/>
               <a:ext cx="1443847" cy="0"/>
             </a:xfrm>
             <a:prstGeom prst="line">
@@ -11671,7 +11872,7 @@
           <p:spPr>
             <a:xfrm>
               <a:off x="7335106" y="5396141"/>
-              <a:ext cx="3546805" cy="353943"/>
+              <a:ext cx="3404665" cy="325738"/>
             </a:xfrm>
             <a:prstGeom prst="rect">
               <a:avLst/>
@@ -11686,7 +11887,7 @@
             <a:p>
               <a:r>
                 <a:rPr lang="en-US" sz="1700" i="1" dirty="0"/>
-                <a:t>Working Set = WS Private + WS Shared</a:t>
+                <a:t>Working Set = WS Private + WS Shareable</a:t>
               </a:r>
             </a:p>
           </p:txBody>
@@ -11705,7 +11906,7 @@
 </p:sld>
 </file>
 
-<file path=ppt/slides/slide7.xml><?xml version="1.0" encoding="utf-8"?>
+<file path=ppt/slides/slide6.xml><?xml version="1.0" encoding="utf-8"?>
 <p:sld xmlns:a="http://schemas.openxmlformats.org/drawingml/2006/main" xmlns:r="http://schemas.openxmlformats.org/officeDocument/2006/relationships" xmlns:p="http://schemas.openxmlformats.org/presentationml/2006/main">
   <p:cSld>
     <p:spTree>
@@ -11847,7 +12048,7 @@
             <a:fld id="{D57F1E4F-1CFF-5643-939E-217C01CDF565}" type="slidenum">
               <a:rPr lang="en-US" sz="1400" smtClean="0"/>
               <a:pPr/>
-              <a:t>7</a:t>
+              <a:t>6</a:t>
             </a:fld>
             <a:endParaRPr lang="en-US" sz="1400" dirty="0"/>
           </a:p>
@@ -11901,7 +12102,7 @@
 </p:sld>
 </file>
 
-<file path=ppt/slides/slide8.xml><?xml version="1.0" encoding="utf-8"?>
+<file path=ppt/slides/slide7.xml><?xml version="1.0" encoding="utf-8"?>
 <p:sld xmlns:a="http://schemas.openxmlformats.org/drawingml/2006/main" xmlns:r="http://schemas.openxmlformats.org/officeDocument/2006/relationships" xmlns:p="http://schemas.openxmlformats.org/presentationml/2006/main">
   <p:cSld>
     <p:spTree>
@@ -12008,7 +12209,7 @@
             <a:fld id="{D57F1E4F-1CFF-5643-939E-217C01CDF565}" type="slidenum">
               <a:rPr lang="en-US" sz="1400" smtClean="0"/>
               <a:pPr/>
-              <a:t>8</a:t>
+              <a:t>7</a:t>
             </a:fld>
             <a:endParaRPr lang="en-US" sz="1400" dirty="0"/>
           </a:p>
@@ -12255,7 +12456,7 @@
 </p:sld>
 </file>
 
-<file path=ppt/slides/slide9.xml><?xml version="1.0" encoding="utf-8"?>
+<file path=ppt/slides/slide8.xml><?xml version="1.0" encoding="utf-8"?>
 <p:sld xmlns:a="http://schemas.openxmlformats.org/drawingml/2006/main" xmlns:r="http://schemas.openxmlformats.org/officeDocument/2006/relationships" xmlns:p="http://schemas.openxmlformats.org/presentationml/2006/main">
   <p:cSld>
     <p:spTree>
@@ -12296,7 +12497,7 @@
             <a:fld id="{D57F1E4F-1CFF-5643-939E-217C01CDF565}" type="slidenum">
               <a:rPr lang="en-US" sz="1400" smtClean="0"/>
               <a:pPr/>
-              <a:t>9</a:t>
+              <a:t>8</a:t>
             </a:fld>
             <a:endParaRPr lang="en-US" sz="1400" dirty="0"/>
           </a:p>
@@ -12336,6 +12537,126 @@
     <p:extLst>
       <p:ext uri="{BB962C8B-B14F-4D97-AF65-F5344CB8AC3E}">
         <p14:creationId xmlns:p14="http://schemas.microsoft.com/office/powerpoint/2010/main" val="3451108813"/>
+      </p:ext>
+    </p:extLst>
+  </p:cSld>
+  <p:clrMapOvr>
+    <a:masterClrMapping/>
+  </p:clrMapOvr>
+</p:sld>
+</file>
+
+<file path=ppt/slides/slide9.xml><?xml version="1.0" encoding="utf-8"?>
+<p:sld xmlns:a="http://schemas.openxmlformats.org/drawingml/2006/main" xmlns:r="http://schemas.openxmlformats.org/officeDocument/2006/relationships" xmlns:p="http://schemas.openxmlformats.org/presentationml/2006/main">
+  <p:cSld>
+    <p:spTree>
+      <p:nvGrpSpPr>
+        <p:cNvPr id="1" name=""/>
+        <p:cNvGrpSpPr/>
+        <p:nvPr/>
+      </p:nvGrpSpPr>
+      <p:grpSpPr>
+        <a:xfrm>
+          <a:off x="0" y="0"/>
+          <a:ext cx="0" cy="0"/>
+          <a:chOff x="0" y="0"/>
+          <a:chExt cx="0" cy="0"/>
+        </a:xfrm>
+      </p:grpSpPr>
+      <p:sp>
+        <p:nvSpPr>
+          <p:cNvPr id="2" name="Заголовок 1"/>
+          <p:cNvSpPr>
+            <a:spLocks noGrp="1"/>
+          </p:cNvSpPr>
+          <p:nvPr>
+            <p:ph type="title"/>
+          </p:nvPr>
+        </p:nvSpPr>
+        <p:spPr>
+          <a:xfrm>
+            <a:off x="1484310" y="330032"/>
+            <a:ext cx="10018713" cy="457200"/>
+          </a:xfrm>
+        </p:spPr>
+        <p:txBody>
+          <a:bodyPr>
+            <a:normAutofit fontScale="90000"/>
+          </a:bodyPr>
+          <a:lstStyle/>
+          <a:p>
+            <a:r>
+              <a:rPr lang="en-US" dirty="0"/>
+              <a:t>The structure of typical application</a:t>
+            </a:r>
+            <a:endParaRPr lang="ru-RU" dirty="0"/>
+          </a:p>
+        </p:txBody>
+      </p:sp>
+      <p:sp>
+        <p:nvSpPr>
+          <p:cNvPr id="5" name="Slide Number Placeholder 4">
+            <a:extLst>
+              <a:ext uri="{FF2B5EF4-FFF2-40B4-BE49-F238E27FC236}">
+                <a16:creationId xmlns:a16="http://schemas.microsoft.com/office/drawing/2014/main" id="{F43BC381-B53D-4A5D-97F7-9D3AA2B29C4D}"/>
+              </a:ext>
+            </a:extLst>
+          </p:cNvPr>
+          <p:cNvSpPr>
+            <a:spLocks noGrp="1"/>
+          </p:cNvSpPr>
+          <p:nvPr>
+            <p:ph type="sldNum" sz="quarter" idx="12"/>
+          </p:nvPr>
+        </p:nvSpPr>
+        <p:spPr/>
+        <p:txBody>
+          <a:bodyPr/>
+          <a:lstStyle/>
+          <a:p>
+            <a:fld id="{D57F1E4F-1CFF-5643-939E-217C01CDF565}" type="slidenum">
+              <a:rPr lang="en-US" sz="1400" smtClean="0"/>
+              <a:pPr/>
+              <a:t>9</a:t>
+            </a:fld>
+            <a:endParaRPr lang="en-US" sz="1400" dirty="0"/>
+          </a:p>
+        </p:txBody>
+      </p:sp>
+      <p:pic>
+        <p:nvPicPr>
+          <p:cNvPr id="10" name="Picture 9">
+            <a:extLst>
+              <a:ext uri="{FF2B5EF4-FFF2-40B4-BE49-F238E27FC236}">
+                <a16:creationId xmlns:a16="http://schemas.microsoft.com/office/drawing/2014/main" id="{53C532B2-0DBF-4DFC-97B6-4A8B12517AE6}"/>
+              </a:ext>
+            </a:extLst>
+          </p:cNvPr>
+          <p:cNvPicPr>
+            <a:picLocks noChangeAspect="1"/>
+          </p:cNvPicPr>
+          <p:nvPr/>
+        </p:nvPicPr>
+        <p:blipFill>
+          <a:blip r:embed="rId2"/>
+          <a:stretch>
+            <a:fillRect/>
+          </a:stretch>
+        </p:blipFill>
+        <p:spPr>
+          <a:xfrm>
+            <a:off x="233883" y="1250199"/>
+            <a:ext cx="11707455" cy="4739540"/>
+          </a:xfrm>
+          <a:prstGeom prst="rect">
+            <a:avLst/>
+          </a:prstGeom>
+        </p:spPr>
+      </p:pic>
+    </p:spTree>
+    <p:extLst>
+      <p:ext uri="{BB962C8B-B14F-4D97-AF65-F5344CB8AC3E}">
+        <p14:creationId xmlns:p14="http://schemas.microsoft.com/office/powerpoint/2010/main" val="3627014283"/>
       </p:ext>
     </p:extLst>
   </p:cSld>

</xml_diff>